<commit_message>
More stuff in the presentation
</commit_message>
<xml_diff>
--- a/SOLID Principles of OOD v2.pptx
+++ b/SOLID Principles of OOD v2.pptx
@@ -5,7 +5,7 @@
     <p:sldMasterId id="2147483648" r:id="rId1"/>
   </p:sldMasterIdLst>
   <p:notesMasterIdLst>
-    <p:notesMasterId r:id="rId47"/>
+    <p:notesMasterId r:id="rId55"/>
   </p:notesMasterIdLst>
   <p:sldIdLst>
     <p:sldId id="256" r:id="rId2"/>
@@ -34,25 +34,33 @@
     <p:sldId id="278" r:id="rId25"/>
     <p:sldId id="274" r:id="rId26"/>
     <p:sldId id="277" r:id="rId27"/>
-    <p:sldId id="275" r:id="rId28"/>
-    <p:sldId id="283" r:id="rId29"/>
-    <p:sldId id="279" r:id="rId30"/>
-    <p:sldId id="284" r:id="rId31"/>
-    <p:sldId id="280" r:id="rId32"/>
-    <p:sldId id="285" r:id="rId33"/>
-    <p:sldId id="281" r:id="rId34"/>
-    <p:sldId id="286" r:id="rId35"/>
-    <p:sldId id="282" r:id="rId36"/>
-    <p:sldId id="287" r:id="rId37"/>
-    <p:sldId id="311" r:id="rId38"/>
-    <p:sldId id="288" r:id="rId39"/>
-    <p:sldId id="300" r:id="rId40"/>
-    <p:sldId id="301" r:id="rId41"/>
-    <p:sldId id="295" r:id="rId42"/>
-    <p:sldId id="303" r:id="rId43"/>
-    <p:sldId id="302" r:id="rId44"/>
-    <p:sldId id="304" r:id="rId45"/>
-    <p:sldId id="276" r:id="rId46"/>
+    <p:sldId id="312" r:id="rId28"/>
+    <p:sldId id="275" r:id="rId29"/>
+    <p:sldId id="283" r:id="rId30"/>
+    <p:sldId id="313" r:id="rId31"/>
+    <p:sldId id="279" r:id="rId32"/>
+    <p:sldId id="284" r:id="rId33"/>
+    <p:sldId id="316" r:id="rId34"/>
+    <p:sldId id="315" r:id="rId35"/>
+    <p:sldId id="280" r:id="rId36"/>
+    <p:sldId id="285" r:id="rId37"/>
+    <p:sldId id="317" r:id="rId38"/>
+    <p:sldId id="314" r:id="rId39"/>
+    <p:sldId id="281" r:id="rId40"/>
+    <p:sldId id="286" r:id="rId41"/>
+    <p:sldId id="318" r:id="rId42"/>
+    <p:sldId id="282" r:id="rId43"/>
+    <p:sldId id="287" r:id="rId44"/>
+    <p:sldId id="319" r:id="rId45"/>
+    <p:sldId id="311" r:id="rId46"/>
+    <p:sldId id="288" r:id="rId47"/>
+    <p:sldId id="300" r:id="rId48"/>
+    <p:sldId id="301" r:id="rId49"/>
+    <p:sldId id="295" r:id="rId50"/>
+    <p:sldId id="303" r:id="rId51"/>
+    <p:sldId id="302" r:id="rId52"/>
+    <p:sldId id="304" r:id="rId53"/>
+    <p:sldId id="276" r:id="rId54"/>
   </p:sldIdLst>
   <p:sldSz cx="9144000" cy="6858000" type="screen4x3"/>
   <p:notesSz cx="6858000" cy="9144000"/>
@@ -237,7 +245,7 @@
             <a:fld id="{3EE9C784-6AE7-4DE7-B637-A04C32984173}" type="datetimeFigureOut">
               <a:rPr lang="en-US" smtClean="0"/>
               <a:pPr/>
-              <a:t>12/8/2012</a:t>
+              <a:t>12/9/2012</a:t>
             </a:fld>
             <a:endParaRPr lang="en-US"/>
           </a:p>
@@ -859,7 +867,7 @@
             <a:fld id="{FE753EDB-7AB4-42D9-B376-B6135C20C788}" type="datetimeFigureOut">
               <a:rPr lang="en-US" smtClean="0"/>
               <a:pPr/>
-              <a:t>12/8/2012</a:t>
+              <a:t>12/9/2012</a:t>
             </a:fld>
             <a:endParaRPr lang="en-US"/>
           </a:p>
@@ -1026,7 +1034,7 @@
             <a:fld id="{FE753EDB-7AB4-42D9-B376-B6135C20C788}" type="datetimeFigureOut">
               <a:rPr lang="en-US" smtClean="0"/>
               <a:pPr/>
-              <a:t>12/8/2012</a:t>
+              <a:t>12/9/2012</a:t>
             </a:fld>
             <a:endParaRPr lang="en-US"/>
           </a:p>
@@ -1203,7 +1211,7 @@
             <a:fld id="{FE753EDB-7AB4-42D9-B376-B6135C20C788}" type="datetimeFigureOut">
               <a:rPr lang="en-US" smtClean="0"/>
               <a:pPr/>
-              <a:t>12/8/2012</a:t>
+              <a:t>12/9/2012</a:t>
             </a:fld>
             <a:endParaRPr lang="en-US"/>
           </a:p>
@@ -1370,7 +1378,7 @@
             <a:fld id="{FE753EDB-7AB4-42D9-B376-B6135C20C788}" type="datetimeFigureOut">
               <a:rPr lang="en-US" smtClean="0"/>
               <a:pPr/>
-              <a:t>12/8/2012</a:t>
+              <a:t>12/9/2012</a:t>
             </a:fld>
             <a:endParaRPr lang="en-US"/>
           </a:p>
@@ -1613,7 +1621,7 @@
             <a:fld id="{FE753EDB-7AB4-42D9-B376-B6135C20C788}" type="datetimeFigureOut">
               <a:rPr lang="en-US" smtClean="0"/>
               <a:pPr/>
-              <a:t>12/8/2012</a:t>
+              <a:t>12/9/2012</a:t>
             </a:fld>
             <a:endParaRPr lang="en-US"/>
           </a:p>
@@ -1898,7 +1906,7 @@
             <a:fld id="{FE753EDB-7AB4-42D9-B376-B6135C20C788}" type="datetimeFigureOut">
               <a:rPr lang="en-US" smtClean="0"/>
               <a:pPr/>
-              <a:t>12/8/2012</a:t>
+              <a:t>12/9/2012</a:t>
             </a:fld>
             <a:endParaRPr lang="en-US"/>
           </a:p>
@@ -2317,7 +2325,7 @@
             <a:fld id="{FE753EDB-7AB4-42D9-B376-B6135C20C788}" type="datetimeFigureOut">
               <a:rPr lang="en-US" smtClean="0"/>
               <a:pPr/>
-              <a:t>12/8/2012</a:t>
+              <a:t>12/9/2012</a:t>
             </a:fld>
             <a:endParaRPr lang="en-US"/>
           </a:p>
@@ -2432,7 +2440,7 @@
             <a:fld id="{FE753EDB-7AB4-42D9-B376-B6135C20C788}" type="datetimeFigureOut">
               <a:rPr lang="en-US" smtClean="0"/>
               <a:pPr/>
-              <a:t>12/8/2012</a:t>
+              <a:t>12/9/2012</a:t>
             </a:fld>
             <a:endParaRPr lang="en-US"/>
           </a:p>
@@ -2524,7 +2532,7 @@
             <a:fld id="{FE753EDB-7AB4-42D9-B376-B6135C20C788}" type="datetimeFigureOut">
               <a:rPr lang="en-US" smtClean="0"/>
               <a:pPr/>
-              <a:t>12/8/2012</a:t>
+              <a:t>12/9/2012</a:t>
             </a:fld>
             <a:endParaRPr lang="en-US"/>
           </a:p>
@@ -2798,7 +2806,7 @@
             <a:fld id="{FE753EDB-7AB4-42D9-B376-B6135C20C788}" type="datetimeFigureOut">
               <a:rPr lang="en-US" smtClean="0"/>
               <a:pPr/>
-              <a:t>12/8/2012</a:t>
+              <a:t>12/9/2012</a:t>
             </a:fld>
             <a:endParaRPr lang="en-US"/>
           </a:p>
@@ -3048,7 +3056,7 @@
             <a:fld id="{FE753EDB-7AB4-42D9-B376-B6135C20C788}" type="datetimeFigureOut">
               <a:rPr lang="en-US" smtClean="0"/>
               <a:pPr/>
-              <a:t>12/8/2012</a:t>
+              <a:t>12/9/2012</a:t>
             </a:fld>
             <a:endParaRPr lang="en-US"/>
           </a:p>
@@ -3258,7 +3266,7 @@
             <a:fld id="{FE753EDB-7AB4-42D9-B376-B6135C20C788}" type="datetimeFigureOut">
               <a:rPr lang="en-US" smtClean="0"/>
               <a:pPr/>
-              <a:t>12/8/2012</a:t>
+              <a:t>12/9/2012</a:t>
             </a:fld>
             <a:endParaRPr lang="en-US"/>
           </a:p>
@@ -4892,11 +4900,7 @@
           <a:p>
             <a:r>
               <a:rPr lang="en-US" dirty="0" smtClean="0"/>
-              <a:t>So, what </a:t>
-            </a:r>
-            <a:r>
-              <a:rPr lang="en-US" dirty="0" smtClean="0"/>
-              <a:t>are SOLID principles about?</a:t>
+              <a:t>So, what are SOLID principles about?</a:t>
             </a:r>
             <a:endParaRPr lang="en-US" dirty="0"/>
           </a:p>
@@ -5486,67 +5490,11 @@
           <a:chExt cx="0" cy="0"/>
         </a:xfrm>
       </p:grpSpPr>
-      <p:sp>
-        <p:nvSpPr>
-          <p:cNvPr id="2" name="Title 1"/>
-          <p:cNvSpPr>
-            <a:spLocks noGrp="1"/>
-          </p:cNvSpPr>
-          <p:nvPr>
-            <p:ph type="title"/>
-          </p:nvPr>
-        </p:nvSpPr>
-        <p:spPr>
-          <a:xfrm>
-            <a:off x="609600" y="2209800"/>
-            <a:ext cx="8229600" cy="1143000"/>
-          </a:xfrm>
-        </p:spPr>
-        <p:txBody>
-          <a:bodyPr>
-            <a:normAutofit fontScale="90000"/>
-          </a:bodyPr>
-          <a:lstStyle/>
-          <a:p>
-            <a:r>
-              <a:rPr lang="en-US" dirty="0" smtClean="0"/>
-              <a:t>Talk is cheap, show me the code</a:t>
-            </a:r>
-            <a:br>
-              <a:rPr lang="en-US" dirty="0" smtClean="0"/>
-            </a:br>
-            <a:r>
-              <a:rPr lang="en-US" dirty="0" smtClean="0"/>
-              <a:t>- </a:t>
-            </a:r>
-            <a:r>
-              <a:rPr lang="en-US" dirty="0" err="1" smtClean="0"/>
-              <a:t>Linus</a:t>
-            </a:r>
-            <a:r>
-              <a:rPr lang="en-US" dirty="0" smtClean="0"/>
-              <a:t> </a:t>
-            </a:r>
-            <a:r>
-              <a:rPr lang="en-US" dirty="0" err="1" smtClean="0"/>
-              <a:t>Torvalds</a:t>
-            </a:r>
-            <a:endParaRPr lang="en-US" dirty="0"/>
-          </a:p>
-        </p:txBody>
-      </p:sp>
     </p:spTree>
   </p:cSld>
   <p:clrMapOvr>
     <a:masterClrMapping/>
   </p:clrMapOvr>
-  <p:timing>
-    <p:tnLst>
-      <p:par>
-        <p:cTn id="1" dur="indefinite" restart="never" nodeType="tmRoot"/>
-      </p:par>
-    </p:tnLst>
-  </p:timing>
 </p:sld>
 </file>
 
@@ -5577,35 +5525,42 @@
             <p:ph type="title"/>
           </p:nvPr>
         </p:nvSpPr>
-        <p:spPr/>
-        <p:txBody>
-          <a:bodyPr/>
-          <a:lstStyle/>
-          <a:p>
-            <a:r>
-              <a:rPr lang="en-US" dirty="0" smtClean="0"/>
-              <a:t>Reflect on SRP</a:t>
+        <p:spPr>
+          <a:xfrm>
+            <a:off x="609600" y="2209800"/>
+            <a:ext cx="8229600" cy="1143000"/>
+          </a:xfrm>
+        </p:spPr>
+        <p:txBody>
+          <a:bodyPr>
+            <a:normAutofit fontScale="90000"/>
+          </a:bodyPr>
+          <a:lstStyle/>
+          <a:p>
+            <a:r>
+              <a:rPr lang="en-US" dirty="0" smtClean="0"/>
+              <a:t>Talk is cheap, show me the code</a:t>
+            </a:r>
+            <a:br>
+              <a:rPr lang="en-US" dirty="0" smtClean="0"/>
+            </a:br>
+            <a:r>
+              <a:rPr lang="en-US" dirty="0" smtClean="0"/>
+              <a:t>- </a:t>
+            </a:r>
+            <a:r>
+              <a:rPr lang="en-US" dirty="0" err="1" smtClean="0"/>
+              <a:t>Linus</a:t>
+            </a:r>
+            <a:r>
+              <a:rPr lang="en-US" dirty="0" smtClean="0"/>
+              <a:t> </a:t>
+            </a:r>
+            <a:r>
+              <a:rPr lang="en-US" dirty="0" err="1" smtClean="0"/>
+              <a:t>Torvalds</a:t>
             </a:r>
             <a:endParaRPr lang="en-US" dirty="0"/>
-          </a:p>
-        </p:txBody>
-      </p:sp>
-      <p:sp>
-        <p:nvSpPr>
-          <p:cNvPr id="3" name="Content Placeholder 2"/>
-          <p:cNvSpPr>
-            <a:spLocks noGrp="1"/>
-          </p:cNvSpPr>
-          <p:nvPr>
-            <p:ph idx="1"/>
-          </p:nvPr>
-        </p:nvSpPr>
-        <p:spPr/>
-        <p:txBody>
-          <a:bodyPr/>
-          <a:lstStyle/>
-          <a:p>
-            <a:endParaRPr lang="en-US"/>
           </a:p>
         </p:txBody>
       </p:sp>
@@ -5641,41 +5596,66 @@
           <a:chExt cx="0" cy="0"/>
         </a:xfrm>
       </p:grpSpPr>
-      <p:pic>
-        <p:nvPicPr>
-          <p:cNvPr id="38914" name="Picture 2" descr="http://lostechies.com/derickbailey/files/2011/03/OpenClosedPrinciple2_2C596E17.jpg"/>
-          <p:cNvPicPr>
-            <a:picLocks noChangeAspect="1" noChangeArrowheads="1"/>
-          </p:cNvPicPr>
-          <p:nvPr/>
-        </p:nvPicPr>
-        <p:blipFill>
-          <a:blip r:embed="rId2" cstate="print"/>
-          <a:srcRect/>
-          <a:stretch>
-            <a:fillRect/>
-          </a:stretch>
-        </p:blipFill>
-        <p:spPr bwMode="auto">
-          <a:xfrm>
-            <a:off x="990600" y="304800"/>
-            <a:ext cx="7143750" cy="5715000"/>
-          </a:xfrm>
-          <a:prstGeom prst="rect">
-            <a:avLst/>
-          </a:prstGeom>
-          <a:ln>
-            <a:noFill/>
-          </a:ln>
-          <a:effectLst>
-            <a:outerShdw blurRad="292100" dist="139700" dir="2700000" algn="tl" rotWithShape="0">
-              <a:srgbClr val="333333">
-                <a:alpha val="65000"/>
-              </a:srgbClr>
-            </a:outerShdw>
-          </a:effectLst>
-        </p:spPr>
-      </p:pic>
+      <p:sp>
+        <p:nvSpPr>
+          <p:cNvPr id="2" name="Title 1"/>
+          <p:cNvSpPr>
+            <a:spLocks noGrp="1"/>
+          </p:cNvSpPr>
+          <p:nvPr>
+            <p:ph type="title"/>
+          </p:nvPr>
+        </p:nvSpPr>
+        <p:spPr/>
+        <p:txBody>
+          <a:bodyPr/>
+          <a:lstStyle/>
+          <a:p>
+            <a:r>
+              <a:rPr lang="en-US" dirty="0" smtClean="0"/>
+              <a:t>Reflect on SRP</a:t>
+            </a:r>
+            <a:endParaRPr lang="en-US" dirty="0"/>
+          </a:p>
+        </p:txBody>
+      </p:sp>
+      <p:sp>
+        <p:nvSpPr>
+          <p:cNvPr id="3" name="Content Placeholder 2"/>
+          <p:cNvSpPr>
+            <a:spLocks noGrp="1"/>
+          </p:cNvSpPr>
+          <p:nvPr>
+            <p:ph idx="1"/>
+          </p:nvPr>
+        </p:nvSpPr>
+        <p:spPr/>
+        <p:txBody>
+          <a:bodyPr/>
+          <a:lstStyle/>
+          <a:p>
+            <a:r>
+              <a:rPr lang="en-US" dirty="0" smtClean="0"/>
+              <a:t>A CLASS SHOULD HAVE ONE AND ONLY ONE RESPONSIBILITY.</a:t>
+            </a:r>
+          </a:p>
+          <a:p>
+            <a:pPr>
+              <a:buNone/>
+            </a:pPr>
+            <a:endParaRPr lang="en-US" dirty="0" smtClean="0"/>
+          </a:p>
+          <a:p>
+            <a:r>
+              <a:rPr lang="en-US" dirty="0" smtClean="0"/>
+              <a:t>THERE SHOULD NEVER BE MORE THAN ONE REASON FOR A CLASS TO CHANGE.</a:t>
+            </a:r>
+          </a:p>
+          <a:p>
+            <a:endParaRPr lang="en-US" dirty="0"/>
+          </a:p>
+        </p:txBody>
+      </p:sp>
     </p:spTree>
   </p:cSld>
   <p:clrMapOvr>
@@ -5906,7 +5886,7 @@
           <a:p>
             <a:r>
               <a:rPr lang="en-US" dirty="0" smtClean="0"/>
-              <a:t>Reflect on OCP</a:t>
+              <a:t>SRP</a:t>
             </a:r>
             <a:endParaRPr lang="en-US" dirty="0"/>
           </a:p>
@@ -5924,13 +5904,184 @@
         </p:nvSpPr>
         <p:spPr/>
         <p:txBody>
-          <a:bodyPr/>
-          <a:lstStyle/>
-          <a:p>
-            <a:endParaRPr lang="en-US"/>
-          </a:p>
-        </p:txBody>
-      </p:sp>
+          <a:bodyPr>
+            <a:normAutofit fontScale="62500" lnSpcReduction="20000"/>
+          </a:bodyPr>
+          <a:lstStyle/>
+          <a:p>
+            <a:pPr>
+              <a:buNone/>
+            </a:pPr>
+            <a:r>
+              <a:rPr lang="en-US" dirty="0" smtClean="0"/>
+              <a:t>Why is it important to separate two responsibilities into separate classes?</a:t>
+            </a:r>
+          </a:p>
+          <a:p>
+            <a:pPr>
+              <a:buNone/>
+            </a:pPr>
+            <a:r>
+              <a:rPr lang="en-US" dirty="0" smtClean="0"/>
+              <a:t>Because each responsibility is an axis of change. </a:t>
+            </a:r>
+            <a:endParaRPr lang="en-US" dirty="0" smtClean="0"/>
+          </a:p>
+          <a:p>
+            <a:pPr>
+              <a:buNone/>
+            </a:pPr>
+            <a:r>
+              <a:rPr lang="en-US" dirty="0" smtClean="0"/>
+              <a:t>When </a:t>
+            </a:r>
+            <a:r>
+              <a:rPr lang="en-US" dirty="0" smtClean="0"/>
+              <a:t>the requirements change, </a:t>
+            </a:r>
+            <a:r>
+              <a:rPr lang="en-US" dirty="0" smtClean="0"/>
+              <a:t>that change </a:t>
+            </a:r>
+            <a:r>
+              <a:rPr lang="en-US" dirty="0" smtClean="0"/>
+              <a:t>will be manifest through </a:t>
+            </a:r>
+            <a:r>
+              <a:rPr lang="en-US" dirty="0" smtClean="0"/>
+              <a:t>a change </a:t>
+            </a:r>
+            <a:r>
+              <a:rPr lang="en-US" dirty="0" smtClean="0"/>
+              <a:t>in responsibility amongst the classes. If a class assumes more than one responsibility, then there will be more than one reason for it to</a:t>
+            </a:r>
+          </a:p>
+          <a:p>
+            <a:pPr>
+              <a:buNone/>
+            </a:pPr>
+            <a:r>
+              <a:rPr lang="en-US" dirty="0" smtClean="0"/>
+              <a:t>change.</a:t>
+            </a:r>
+          </a:p>
+          <a:p>
+            <a:pPr>
+              <a:buNone/>
+            </a:pPr>
+            <a:endParaRPr lang="en-US" dirty="0" smtClean="0"/>
+          </a:p>
+          <a:p>
+            <a:pPr>
+              <a:buNone/>
+            </a:pPr>
+            <a:r>
+              <a:rPr lang="en-US" dirty="0" smtClean="0"/>
+              <a:t>If a class has more then one responsibility, then the responsibilities </a:t>
+            </a:r>
+            <a:r>
+              <a:rPr lang="en-US" dirty="0" smtClean="0"/>
+              <a:t>become coupled</a:t>
+            </a:r>
+            <a:r>
+              <a:rPr lang="en-US" dirty="0" smtClean="0"/>
+              <a:t>.</a:t>
+            </a:r>
+          </a:p>
+          <a:p>
+            <a:pPr>
+              <a:buNone/>
+            </a:pPr>
+            <a:r>
+              <a:rPr lang="en-US" dirty="0" smtClean="0"/>
+              <a:t>Changes to one responsibility may impair or inhibit the class’ ability to meet the others.</a:t>
+            </a:r>
+          </a:p>
+          <a:p>
+            <a:pPr>
+              <a:buNone/>
+            </a:pPr>
+            <a:r>
+              <a:rPr lang="en-US" dirty="0" smtClean="0"/>
+              <a:t>This kind of coupling leads to fragile designs that break in unexpected ways </a:t>
+            </a:r>
+            <a:r>
+              <a:rPr lang="en-US" dirty="0" smtClean="0"/>
+              <a:t>when changed</a:t>
+            </a:r>
+            <a:r>
+              <a:rPr lang="en-US" dirty="0" smtClean="0"/>
+              <a:t>.</a:t>
+            </a:r>
+          </a:p>
+          <a:p>
+            <a:pPr>
+              <a:buNone/>
+            </a:pPr>
+            <a:endParaRPr lang="en-US" dirty="0"/>
+          </a:p>
+        </p:txBody>
+      </p:sp>
+    </p:spTree>
+  </p:cSld>
+  <p:clrMapOvr>
+    <a:masterClrMapping/>
+  </p:clrMapOvr>
+</p:sld>
+</file>
+
+<file path=ppt/slides/slide31.xml><?xml version="1.0" encoding="utf-8"?>
+<p:sld xmlns:a="http://schemas.openxmlformats.org/drawingml/2006/main" xmlns:r="http://schemas.openxmlformats.org/officeDocument/2006/relationships" xmlns:p="http://schemas.openxmlformats.org/presentationml/2006/main">
+  <p:cSld>
+    <p:spTree>
+      <p:nvGrpSpPr>
+        <p:cNvPr id="1" name=""/>
+        <p:cNvGrpSpPr/>
+        <p:nvPr/>
+      </p:nvGrpSpPr>
+      <p:grpSpPr>
+        <a:xfrm>
+          <a:off x="0" y="0"/>
+          <a:ext cx="0" cy="0"/>
+          <a:chOff x="0" y="0"/>
+          <a:chExt cx="0" cy="0"/>
+        </a:xfrm>
+      </p:grpSpPr>
+      <p:pic>
+        <p:nvPicPr>
+          <p:cNvPr id="38914" name="Picture 2" descr="http://lostechies.com/derickbailey/files/2011/03/OpenClosedPrinciple2_2C596E17.jpg"/>
+          <p:cNvPicPr>
+            <a:picLocks noChangeAspect="1" noChangeArrowheads="1"/>
+          </p:cNvPicPr>
+          <p:nvPr/>
+        </p:nvPicPr>
+        <p:blipFill>
+          <a:blip r:embed="rId2" cstate="print"/>
+          <a:srcRect/>
+          <a:stretch>
+            <a:fillRect/>
+          </a:stretch>
+        </p:blipFill>
+        <p:spPr bwMode="auto">
+          <a:xfrm>
+            <a:off x="990600" y="304800"/>
+            <a:ext cx="7143750" cy="5715000"/>
+          </a:xfrm>
+          <a:prstGeom prst="rect">
+            <a:avLst/>
+          </a:prstGeom>
+          <a:ln>
+            <a:noFill/>
+          </a:ln>
+          <a:effectLst>
+            <a:outerShdw blurRad="292100" dist="139700" dir="2700000" algn="tl" rotWithShape="0">
+              <a:srgbClr val="333333">
+                <a:alpha val="65000"/>
+              </a:srgbClr>
+            </a:outerShdw>
+          </a:effectLst>
+        </p:spPr>
+      </p:pic>
     </p:spTree>
   </p:cSld>
   <p:clrMapOvr>
@@ -5946,7 +6097,340 @@
 </p:sld>
 </file>
 
-<file path=ppt/slides/slide31.xml><?xml version="1.0" encoding="utf-8"?>
+<file path=ppt/slides/slide32.xml><?xml version="1.0" encoding="utf-8"?>
+<p:sld xmlns:a="http://schemas.openxmlformats.org/drawingml/2006/main" xmlns:r="http://schemas.openxmlformats.org/officeDocument/2006/relationships" xmlns:p="http://schemas.openxmlformats.org/presentationml/2006/main">
+  <p:cSld>
+    <p:spTree>
+      <p:nvGrpSpPr>
+        <p:cNvPr id="1" name=""/>
+        <p:cNvGrpSpPr/>
+        <p:nvPr/>
+      </p:nvGrpSpPr>
+      <p:grpSpPr>
+        <a:xfrm>
+          <a:off x="0" y="0"/>
+          <a:ext cx="0" cy="0"/>
+          <a:chOff x="0" y="0"/>
+          <a:chExt cx="0" cy="0"/>
+        </a:xfrm>
+      </p:grpSpPr>
+      <p:sp>
+        <p:nvSpPr>
+          <p:cNvPr id="2" name="Title 1"/>
+          <p:cNvSpPr>
+            <a:spLocks noGrp="1"/>
+          </p:cNvSpPr>
+          <p:nvPr>
+            <p:ph type="title"/>
+          </p:nvPr>
+        </p:nvSpPr>
+        <p:spPr/>
+        <p:txBody>
+          <a:bodyPr/>
+          <a:lstStyle/>
+          <a:p>
+            <a:r>
+              <a:rPr lang="en-US" dirty="0" smtClean="0"/>
+              <a:t>Reflect on OCP</a:t>
+            </a:r>
+            <a:endParaRPr lang="en-US" dirty="0"/>
+          </a:p>
+        </p:txBody>
+      </p:sp>
+      <p:sp>
+        <p:nvSpPr>
+          <p:cNvPr id="3" name="Content Placeholder 2"/>
+          <p:cNvSpPr>
+            <a:spLocks noGrp="1"/>
+          </p:cNvSpPr>
+          <p:nvPr>
+            <p:ph idx="1"/>
+          </p:nvPr>
+        </p:nvSpPr>
+        <p:spPr/>
+        <p:txBody>
+          <a:bodyPr/>
+          <a:lstStyle/>
+          <a:p>
+            <a:pPr>
+              <a:buNone/>
+            </a:pPr>
+            <a:r>
+              <a:rPr lang="fr-FR" i="1" dirty="0" smtClean="0"/>
+              <a:t>	</a:t>
+            </a:r>
+          </a:p>
+          <a:p>
+            <a:pPr>
+              <a:buNone/>
+            </a:pPr>
+            <a:r>
+              <a:rPr lang="fr-FR" i="1" dirty="0" smtClean="0"/>
+              <a:t> </a:t>
+            </a:r>
+            <a:r>
+              <a:rPr lang="fr-FR" i="1" dirty="0" smtClean="0"/>
+              <a:t>  SOFTWARE </a:t>
+            </a:r>
+            <a:r>
+              <a:rPr lang="fr-FR" i="1" dirty="0" smtClean="0"/>
+              <a:t>ENTITIES (CLASSES, MODULES, FUNCTIONS, ETC</a:t>
+            </a:r>
+            <a:r>
+              <a:rPr lang="fr-FR" i="1" dirty="0" smtClean="0"/>
+              <a:t>.) </a:t>
+            </a:r>
+            <a:r>
+              <a:rPr lang="en-US" i="1" dirty="0" smtClean="0"/>
+              <a:t>SHOULD </a:t>
+            </a:r>
+            <a:r>
+              <a:rPr lang="en-US" i="1" dirty="0" smtClean="0"/>
+              <a:t>BE OPEN FOR EXTENSION, BUT CLOSED </a:t>
+            </a:r>
+            <a:r>
+              <a:rPr lang="en-US" i="1" dirty="0" smtClean="0"/>
+              <a:t>FOR MODIFICATION</a:t>
+            </a:r>
+            <a:r>
+              <a:rPr lang="en-US" i="1" dirty="0" smtClean="0"/>
+              <a:t>.</a:t>
+            </a:r>
+          </a:p>
+        </p:txBody>
+      </p:sp>
+    </p:spTree>
+  </p:cSld>
+  <p:clrMapOvr>
+    <a:masterClrMapping/>
+  </p:clrMapOvr>
+  <p:timing>
+    <p:tnLst>
+      <p:par>
+        <p:cTn id="1" dur="indefinite" restart="never" nodeType="tmRoot"/>
+      </p:par>
+    </p:tnLst>
+  </p:timing>
+</p:sld>
+</file>
+
+<file path=ppt/slides/slide33.xml><?xml version="1.0" encoding="utf-8"?>
+<p:sld xmlns:a="http://schemas.openxmlformats.org/drawingml/2006/main" xmlns:r="http://schemas.openxmlformats.org/officeDocument/2006/relationships" xmlns:p="http://schemas.openxmlformats.org/presentationml/2006/main">
+  <p:cSld>
+    <p:spTree>
+      <p:nvGrpSpPr>
+        <p:cNvPr id="1" name=""/>
+        <p:cNvGrpSpPr/>
+        <p:nvPr/>
+      </p:nvGrpSpPr>
+      <p:grpSpPr>
+        <a:xfrm>
+          <a:off x="0" y="0"/>
+          <a:ext cx="0" cy="0"/>
+          <a:chOff x="0" y="0"/>
+          <a:chExt cx="0" cy="0"/>
+        </a:xfrm>
+      </p:grpSpPr>
+      <p:sp>
+        <p:nvSpPr>
+          <p:cNvPr id="2" name="Title 1"/>
+          <p:cNvSpPr>
+            <a:spLocks noGrp="1"/>
+          </p:cNvSpPr>
+          <p:nvPr>
+            <p:ph type="title"/>
+          </p:nvPr>
+        </p:nvSpPr>
+        <p:spPr/>
+        <p:txBody>
+          <a:bodyPr/>
+          <a:lstStyle/>
+          <a:p>
+            <a:r>
+              <a:rPr lang="en-US" dirty="0" smtClean="0"/>
+              <a:t>OCP</a:t>
+            </a:r>
+            <a:endParaRPr lang="en-US" dirty="0"/>
+          </a:p>
+        </p:txBody>
+      </p:sp>
+      <p:sp>
+        <p:nvSpPr>
+          <p:cNvPr id="3" name="Content Placeholder 2"/>
+          <p:cNvSpPr>
+            <a:spLocks noGrp="1"/>
+          </p:cNvSpPr>
+          <p:nvPr>
+            <p:ph idx="1"/>
+          </p:nvPr>
+        </p:nvSpPr>
+        <p:spPr/>
+        <p:txBody>
+          <a:bodyPr/>
+          <a:lstStyle/>
+          <a:p>
+            <a:endParaRPr lang="en-US" dirty="0" smtClean="0"/>
+          </a:p>
+          <a:p>
+            <a:r>
+              <a:rPr lang="en-US" dirty="0" smtClean="0"/>
+              <a:t>Open to Extension : New Behavior can be added in the future</a:t>
+            </a:r>
+          </a:p>
+          <a:p>
+            <a:endParaRPr lang="en-US" dirty="0" smtClean="0"/>
+          </a:p>
+          <a:p>
+            <a:r>
+              <a:rPr lang="en-US" dirty="0" smtClean="0"/>
+              <a:t>Closed to Modification: Changes to existing </a:t>
+            </a:r>
+            <a:r>
+              <a:rPr lang="en-US" dirty="0" smtClean="0"/>
+              <a:t>code </a:t>
+            </a:r>
+            <a:r>
+              <a:rPr lang="en-US" dirty="0" smtClean="0"/>
+              <a:t>is not required.</a:t>
+            </a:r>
+          </a:p>
+          <a:p>
+            <a:endParaRPr lang="en-US" dirty="0"/>
+          </a:p>
+        </p:txBody>
+      </p:sp>
+    </p:spTree>
+  </p:cSld>
+  <p:clrMapOvr>
+    <a:masterClrMapping/>
+  </p:clrMapOvr>
+</p:sld>
+</file>
+
+<file path=ppt/slides/slide34.xml><?xml version="1.0" encoding="utf-8"?>
+<p:sld xmlns:a="http://schemas.openxmlformats.org/drawingml/2006/main" xmlns:r="http://schemas.openxmlformats.org/officeDocument/2006/relationships" xmlns:p="http://schemas.openxmlformats.org/presentationml/2006/main">
+  <p:cSld>
+    <p:spTree>
+      <p:nvGrpSpPr>
+        <p:cNvPr id="1" name=""/>
+        <p:cNvGrpSpPr/>
+        <p:nvPr/>
+      </p:nvGrpSpPr>
+      <p:grpSpPr>
+        <a:xfrm>
+          <a:off x="0" y="0"/>
+          <a:ext cx="0" cy="0"/>
+          <a:chOff x="0" y="0"/>
+          <a:chExt cx="0" cy="0"/>
+        </a:xfrm>
+      </p:grpSpPr>
+      <p:sp>
+        <p:nvSpPr>
+          <p:cNvPr id="2" name="Title 1"/>
+          <p:cNvSpPr>
+            <a:spLocks noGrp="1"/>
+          </p:cNvSpPr>
+          <p:nvPr>
+            <p:ph type="title"/>
+          </p:nvPr>
+        </p:nvSpPr>
+        <p:spPr/>
+        <p:txBody>
+          <a:bodyPr/>
+          <a:lstStyle/>
+          <a:p>
+            <a:r>
+              <a:rPr lang="en-US" dirty="0" smtClean="0"/>
+              <a:t>OCP</a:t>
+            </a:r>
+            <a:endParaRPr lang="en-US" dirty="0"/>
+          </a:p>
+        </p:txBody>
+      </p:sp>
+      <p:sp>
+        <p:nvSpPr>
+          <p:cNvPr id="3" name="Content Placeholder 2"/>
+          <p:cNvSpPr>
+            <a:spLocks noGrp="1"/>
+          </p:cNvSpPr>
+          <p:nvPr>
+            <p:ph idx="1"/>
+          </p:nvPr>
+        </p:nvSpPr>
+        <p:spPr/>
+        <p:txBody>
+          <a:bodyPr>
+            <a:normAutofit fontScale="70000" lnSpcReduction="20000"/>
+          </a:bodyPr>
+          <a:lstStyle/>
+          <a:p>
+            <a:endParaRPr lang="en-US" dirty="0" smtClean="0"/>
+          </a:p>
+          <a:p>
+            <a:r>
+              <a:rPr lang="en-US" dirty="0" smtClean="0"/>
+              <a:t>1. OCP is at the heart of Object Oriented design</a:t>
+            </a:r>
+          </a:p>
+          <a:p>
+            <a:r>
+              <a:rPr lang="en-US" dirty="0" smtClean="0"/>
+              <a:t>2. Conformance to OCP yields the greatest benefits of OOD, reusability &amp; maintainability</a:t>
+            </a:r>
+          </a:p>
+          <a:p>
+            <a:r>
+              <a:rPr lang="en-US" dirty="0" smtClean="0"/>
+              <a:t>3. Key to OCP is programming to abstractions. </a:t>
+            </a:r>
+          </a:p>
+          <a:p>
+            <a:r>
+              <a:rPr lang="en-US" dirty="0" smtClean="0"/>
+              <a:t>4. Do not depend on implementations, depend on abstractions.</a:t>
+            </a:r>
+          </a:p>
+          <a:p>
+            <a:r>
+              <a:rPr lang="en-US" dirty="0" smtClean="0"/>
+              <a:t>5. 100 % Conformance to OCP is not possible. There might be a requirement that may render our code not closed.</a:t>
+            </a:r>
+          </a:p>
+          <a:p>
+            <a:r>
+              <a:rPr lang="en-US" dirty="0" smtClean="0"/>
+              <a:t>6. Since closure cannot be complete, it should be strategic. </a:t>
+            </a:r>
+          </a:p>
+          <a:p>
+            <a:r>
+              <a:rPr lang="en-US" dirty="0" smtClean="0"/>
+              <a:t>7. Developer must choose what changes the code can be closed to.</a:t>
+            </a:r>
+          </a:p>
+          <a:p>
+            <a:r>
+              <a:rPr lang="en-US" dirty="0" smtClean="0"/>
+              <a:t>8. Experience would help a developer to make choices and design code for the most probable causes of change.</a:t>
+            </a:r>
+          </a:p>
+          <a:p>
+            <a:pPr>
+              <a:buNone/>
+            </a:pPr>
+            <a:endParaRPr lang="en-US" dirty="0"/>
+          </a:p>
+        </p:txBody>
+      </p:sp>
+    </p:spTree>
+  </p:cSld>
+  <p:clrMapOvr>
+    <a:masterClrMapping/>
+  </p:clrMapOvr>
+</p:sld>
+</file>
+
+<file path=ppt/slides/slide35.xml><?xml version="1.0" encoding="utf-8"?>
 <p:sld xmlns:a="http://schemas.openxmlformats.org/drawingml/2006/main" xmlns:r="http://schemas.openxmlformats.org/officeDocument/2006/relationships" xmlns:p="http://schemas.openxmlformats.org/presentationml/2006/main">
   <p:cSld>
     <p:spTree>
@@ -6013,7 +6497,7 @@
 </p:sld>
 </file>
 
-<file path=ppt/slides/slide32.xml><?xml version="1.0" encoding="utf-8"?>
+<file path=ppt/slides/slide36.xml><?xml version="1.0" encoding="utf-8"?>
 <p:sld xmlns:a="http://schemas.openxmlformats.org/drawingml/2006/main" xmlns:r="http://schemas.openxmlformats.org/officeDocument/2006/relationships" xmlns:p="http://schemas.openxmlformats.org/presentationml/2006/main">
   <p:cSld>
     <p:spTree>
@@ -6068,7 +6552,33 @@
           <a:bodyPr/>
           <a:lstStyle/>
           <a:p>
-            <a:endParaRPr lang="en-US"/>
+            <a:pPr>
+              <a:buNone/>
+            </a:pPr>
+            <a:r>
+              <a:rPr lang="en-US" i="1" dirty="0" smtClean="0"/>
+              <a:t>FUNCTIONS THAT USE POINTERS OR REFERENCES TO </a:t>
+            </a:r>
+            <a:r>
+              <a:rPr lang="en-US" i="1" dirty="0" smtClean="0"/>
+              <a:t>BASE CLASSES </a:t>
+            </a:r>
+            <a:r>
+              <a:rPr lang="en-US" i="1" dirty="0" smtClean="0"/>
+              <a:t>MUST BE ABLE TO USE OBJECTS OF DERIVED CLASSES</a:t>
+            </a:r>
+          </a:p>
+          <a:p>
+            <a:pPr>
+              <a:buNone/>
+            </a:pPr>
+            <a:r>
+              <a:rPr lang="en-US" i="1" dirty="0" smtClean="0"/>
+              <a:t>WITHOUT KNOWING IT.</a:t>
+            </a:r>
+          </a:p>
+          <a:p>
+            <a:endParaRPr lang="en-US" dirty="0"/>
           </a:p>
         </p:txBody>
       </p:sp>
@@ -6087,7 +6597,306 @@
 </p:sld>
 </file>
 
-<file path=ppt/slides/slide33.xml><?xml version="1.0" encoding="utf-8"?>
+<file path=ppt/slides/slide37.xml><?xml version="1.0" encoding="utf-8"?>
+<p:sld xmlns:a="http://schemas.openxmlformats.org/drawingml/2006/main" xmlns:r="http://schemas.openxmlformats.org/officeDocument/2006/relationships" xmlns:p="http://schemas.openxmlformats.org/presentationml/2006/main">
+  <p:cSld>
+    <p:spTree>
+      <p:nvGrpSpPr>
+        <p:cNvPr id="1" name=""/>
+        <p:cNvGrpSpPr/>
+        <p:nvPr/>
+      </p:nvGrpSpPr>
+      <p:grpSpPr>
+        <a:xfrm>
+          <a:off x="0" y="0"/>
+          <a:ext cx="0" cy="0"/>
+          <a:chOff x="0" y="0"/>
+          <a:chExt cx="0" cy="0"/>
+        </a:xfrm>
+      </p:grpSpPr>
+      <p:sp>
+        <p:nvSpPr>
+          <p:cNvPr id="2" name="Title 1"/>
+          <p:cNvSpPr>
+            <a:spLocks noGrp="1"/>
+          </p:cNvSpPr>
+          <p:nvPr>
+            <p:ph type="title"/>
+          </p:nvPr>
+        </p:nvSpPr>
+        <p:spPr/>
+        <p:txBody>
+          <a:bodyPr/>
+          <a:lstStyle/>
+          <a:p>
+            <a:r>
+              <a:rPr lang="en-US" dirty="0" smtClean="0"/>
+              <a:t>LSP</a:t>
+            </a:r>
+            <a:endParaRPr lang="en-US" dirty="0"/>
+          </a:p>
+        </p:txBody>
+      </p:sp>
+      <p:sp>
+        <p:nvSpPr>
+          <p:cNvPr id="3" name="Content Placeholder 2"/>
+          <p:cNvSpPr>
+            <a:spLocks noGrp="1"/>
+          </p:cNvSpPr>
+          <p:nvPr>
+            <p:ph idx="1"/>
+          </p:nvPr>
+        </p:nvSpPr>
+        <p:spPr/>
+        <p:txBody>
+          <a:bodyPr>
+            <a:normAutofit lnSpcReduction="10000"/>
+          </a:bodyPr>
+          <a:lstStyle/>
+          <a:p>
+            <a:pPr>
+              <a:buNone/>
+            </a:pPr>
+            <a:r>
+              <a:rPr lang="en-US" dirty="0" smtClean="0"/>
+              <a:t>The above is a paraphrase of the </a:t>
+            </a:r>
+            <a:r>
+              <a:rPr lang="en-US" dirty="0" err="1" smtClean="0"/>
+              <a:t>Liskov</a:t>
+            </a:r>
+            <a:r>
+              <a:rPr lang="en-US" dirty="0" smtClean="0"/>
+              <a:t> Substitution Principle (LSP). Barbara </a:t>
+            </a:r>
+            <a:r>
+              <a:rPr lang="en-US" dirty="0" err="1" smtClean="0"/>
+              <a:t>Liskov</a:t>
+            </a:r>
+            <a:r>
+              <a:rPr lang="en-US" dirty="0" smtClean="0"/>
+              <a:t> first</a:t>
+            </a:r>
+          </a:p>
+          <a:p>
+            <a:pPr>
+              <a:buNone/>
+            </a:pPr>
+            <a:r>
+              <a:rPr lang="en-US" dirty="0" smtClean="0"/>
+              <a:t>wrote it as follows </a:t>
+            </a:r>
+            <a:r>
+              <a:rPr lang="en-US" dirty="0" smtClean="0"/>
+              <a:t>:</a:t>
+            </a:r>
+            <a:endParaRPr lang="en-US" dirty="0" smtClean="0"/>
+          </a:p>
+          <a:p>
+            <a:pPr>
+              <a:buNone/>
+            </a:pPr>
+            <a:r>
+              <a:rPr lang="en-US" i="1" dirty="0" smtClean="0"/>
+              <a:t>If  for </a:t>
+            </a:r>
+            <a:r>
+              <a:rPr lang="en-US" i="1" dirty="0" smtClean="0"/>
+              <a:t>each object o1 of type S there is an object o2 of type T such that for all</a:t>
+            </a:r>
+          </a:p>
+          <a:p>
+            <a:pPr>
+              <a:buNone/>
+            </a:pPr>
+            <a:r>
+              <a:rPr lang="en-US" i="1" dirty="0" smtClean="0"/>
+              <a:t>programs P defined in terms of T, the behavior of P is unchanged when o1 is</a:t>
+            </a:r>
+          </a:p>
+          <a:p>
+            <a:pPr>
+              <a:buNone/>
+            </a:pPr>
+            <a:r>
+              <a:rPr lang="en-US" i="1" dirty="0" smtClean="0"/>
+              <a:t>substituted for o2 then S is a subtype of T.</a:t>
+            </a:r>
+          </a:p>
+          <a:p>
+            <a:endParaRPr lang="en-US" dirty="0" smtClean="0"/>
+          </a:p>
+          <a:p>
+            <a:endParaRPr lang="en-US" dirty="0"/>
+          </a:p>
+        </p:txBody>
+      </p:sp>
+    </p:spTree>
+  </p:cSld>
+  <p:clrMapOvr>
+    <a:masterClrMapping/>
+  </p:clrMapOvr>
+</p:sld>
+</file>
+
+<file path=ppt/slides/slide38.xml><?xml version="1.0" encoding="utf-8"?>
+<p:sld xmlns:a="http://schemas.openxmlformats.org/drawingml/2006/main" xmlns:r="http://schemas.openxmlformats.org/officeDocument/2006/relationships" xmlns:p="http://schemas.openxmlformats.org/presentationml/2006/main">
+  <p:cSld>
+    <p:spTree>
+      <p:nvGrpSpPr>
+        <p:cNvPr id="1" name=""/>
+        <p:cNvGrpSpPr/>
+        <p:nvPr/>
+      </p:nvGrpSpPr>
+      <p:grpSpPr>
+        <a:xfrm>
+          <a:off x="0" y="0"/>
+          <a:ext cx="0" cy="0"/>
+          <a:chOff x="0" y="0"/>
+          <a:chExt cx="0" cy="0"/>
+        </a:xfrm>
+      </p:grpSpPr>
+      <p:sp>
+        <p:nvSpPr>
+          <p:cNvPr id="2" name="Title 1"/>
+          <p:cNvSpPr>
+            <a:spLocks noGrp="1"/>
+          </p:cNvSpPr>
+          <p:nvPr>
+            <p:ph type="title"/>
+          </p:nvPr>
+        </p:nvSpPr>
+        <p:spPr/>
+        <p:txBody>
+          <a:bodyPr/>
+          <a:lstStyle/>
+          <a:p>
+            <a:r>
+              <a:rPr lang="en-US" dirty="0" smtClean="0"/>
+              <a:t>LSP</a:t>
+            </a:r>
+            <a:endParaRPr lang="en-US" dirty="0"/>
+          </a:p>
+        </p:txBody>
+      </p:sp>
+      <p:sp>
+        <p:nvSpPr>
+          <p:cNvPr id="3" name="Content Placeholder 2"/>
+          <p:cNvSpPr>
+            <a:spLocks noGrp="1"/>
+          </p:cNvSpPr>
+          <p:nvPr>
+            <p:ph idx="1"/>
+          </p:nvPr>
+        </p:nvSpPr>
+        <p:spPr/>
+        <p:txBody>
+          <a:bodyPr>
+            <a:normAutofit fontScale="47500" lnSpcReduction="20000"/>
+          </a:bodyPr>
+          <a:lstStyle/>
+          <a:p>
+            <a:r>
+              <a:rPr lang="en-US" dirty="0" smtClean="0"/>
+              <a:t>Sub-types must be substitutable for their base types.</a:t>
+            </a:r>
+          </a:p>
+          <a:p>
+            <a:endParaRPr lang="en-US" dirty="0" smtClean="0"/>
+          </a:p>
+          <a:p>
+            <a:r>
+              <a:rPr lang="en-US" dirty="0" smtClean="0"/>
+              <a:t>Named after Barbara </a:t>
+            </a:r>
+            <a:r>
+              <a:rPr lang="en-US" dirty="0" err="1" smtClean="0"/>
+              <a:t>Liskov</a:t>
+            </a:r>
+            <a:r>
+              <a:rPr lang="en-US" dirty="0" smtClean="0"/>
+              <a:t>, who gave the principle in 1988.</a:t>
+            </a:r>
+          </a:p>
+          <a:p>
+            <a:endParaRPr lang="en-US" b="1" dirty="0" smtClean="0"/>
+          </a:p>
+          <a:p>
+            <a:r>
+              <a:rPr lang="en-US" b="1" dirty="0" smtClean="0"/>
+              <a:t>Substitutability</a:t>
+            </a:r>
+          </a:p>
+          <a:p>
+            <a:endParaRPr lang="en-US" dirty="0" smtClean="0"/>
+          </a:p>
+          <a:p>
+            <a:r>
+              <a:rPr lang="en-US" dirty="0" smtClean="0"/>
+              <a:t>Calling code must not know the difference between a derived type and a base type.</a:t>
+            </a:r>
+          </a:p>
+          <a:p>
+            <a:endParaRPr lang="en-US" dirty="0" smtClean="0"/>
+          </a:p>
+          <a:p>
+            <a:r>
+              <a:rPr lang="en-US" dirty="0" smtClean="0"/>
+              <a:t>Child classes should not remove base class behavior.</a:t>
+            </a:r>
+          </a:p>
+          <a:p>
+            <a:endParaRPr lang="en-US" dirty="0" smtClean="0"/>
+          </a:p>
+          <a:p>
+            <a:endParaRPr lang="en-US" dirty="0" smtClean="0"/>
+          </a:p>
+          <a:p>
+            <a:r>
+              <a:rPr lang="en-US" b="1" dirty="0" smtClean="0"/>
+              <a:t>Native OOP: "IS-A" relationship </a:t>
+            </a:r>
+          </a:p>
+          <a:p>
+            <a:endParaRPr lang="en-US" b="1" dirty="0" smtClean="0"/>
+          </a:p>
+          <a:p>
+            <a:endParaRPr lang="en-US" b="1" dirty="0" smtClean="0"/>
+          </a:p>
+          <a:p>
+            <a:r>
+              <a:rPr lang="en-US" b="1" dirty="0" smtClean="0"/>
+              <a:t>LSP : "</a:t>
+            </a:r>
+            <a:r>
+              <a:rPr lang="en-US" b="1" dirty="0" smtClean="0"/>
+              <a:t>IS-SUBSTITUTABLE=FOR“</a:t>
+            </a:r>
+          </a:p>
+          <a:p>
+            <a:r>
+              <a:rPr lang="en-US" b="1" dirty="0" smtClean="0"/>
+              <a:t>LSP surfaces the undesired behavior problems in subtypes caused due to inheritance</a:t>
+            </a:r>
+            <a:endParaRPr lang="en-US" b="1" dirty="0" smtClean="0"/>
+          </a:p>
+          <a:p>
+            <a:endParaRPr lang="en-US" b="1" dirty="0" smtClean="0"/>
+          </a:p>
+          <a:p>
+            <a:endParaRPr lang="en-US" dirty="0"/>
+          </a:p>
+        </p:txBody>
+      </p:sp>
+    </p:spTree>
+  </p:cSld>
+  <p:clrMapOvr>
+    <a:masterClrMapping/>
+  </p:clrMapOvr>
+</p:sld>
+</file>
+
+<file path=ppt/slides/slide39.xml><?xml version="1.0" encoding="utf-8"?>
 <p:sld xmlns:a="http://schemas.openxmlformats.org/drawingml/2006/main" xmlns:r="http://schemas.openxmlformats.org/officeDocument/2006/relationships" xmlns:p="http://schemas.openxmlformats.org/presentationml/2006/main">
   <p:cSld>
     <p:spTree>
@@ -6154,7 +6963,7 @@
 </p:sld>
 </file>
 
-<file path=ppt/slides/slide34.xml><?xml version="1.0" encoding="utf-8"?>
+<file path=ppt/slides/slide4.xml><?xml version="1.0" encoding="utf-8"?>
 <p:sld xmlns:a="http://schemas.openxmlformats.org/drawingml/2006/main" xmlns:r="http://schemas.openxmlformats.org/officeDocument/2006/relationships" xmlns:p="http://schemas.openxmlformats.org/presentationml/2006/main">
   <p:cSld>
     <p:spTree>
@@ -6183,33 +6992,79 @@
         </p:nvSpPr>
         <p:spPr/>
         <p:txBody>
-          <a:bodyPr/>
-          <a:lstStyle/>
-          <a:p>
-            <a:r>
-              <a:rPr lang="en-US" dirty="0" smtClean="0"/>
-              <a:t>Reflect on ISP</a:t>
+          <a:bodyPr>
+            <a:normAutofit fontScale="90000"/>
+          </a:bodyPr>
+          <a:lstStyle/>
+          <a:p>
+            <a:r>
+              <a:rPr lang="en-US" dirty="0" smtClean="0"/>
+              <a:t/>
+            </a:r>
+            <a:br>
+              <a:rPr lang="en-US" dirty="0" smtClean="0"/>
+            </a:br>
+            <a:r>
+              <a:rPr lang="en-US" dirty="0"/>
+              <a:t/>
+            </a:r>
+            <a:br>
+              <a:rPr lang="en-US" dirty="0"/>
+            </a:br>
+            <a:r>
+              <a:rPr lang="en-US" dirty="0" smtClean="0"/>
+              <a:t/>
+            </a:r>
+            <a:br>
+              <a:rPr lang="en-US" dirty="0" smtClean="0"/>
+            </a:br>
+            <a:r>
+              <a:rPr lang="en-US" dirty="0"/>
+              <a:t/>
+            </a:r>
+            <a:br>
+              <a:rPr lang="en-US" dirty="0"/>
+            </a:br>
+            <a:r>
+              <a:rPr lang="en-US" dirty="0" smtClean="0"/>
+              <a:t/>
+            </a:r>
+            <a:br>
+              <a:rPr lang="en-US" dirty="0" smtClean="0"/>
+            </a:br>
+            <a:r>
+              <a:rPr lang="en-US" dirty="0"/>
+              <a:t/>
+            </a:r>
+            <a:br>
+              <a:rPr lang="en-US" dirty="0"/>
+            </a:br>
+            <a:r>
+              <a:rPr lang="en-US" dirty="0" smtClean="0"/>
+              <a:t/>
+            </a:r>
+            <a:br>
+              <a:rPr lang="en-US" dirty="0" smtClean="0"/>
+            </a:br>
+            <a:r>
+              <a:rPr lang="en-US" dirty="0"/>
+              <a:t/>
+            </a:r>
+            <a:br>
+              <a:rPr lang="en-US" dirty="0"/>
+            </a:br>
+            <a:r>
+              <a:rPr lang="en-US" dirty="0" smtClean="0"/>
+              <a:t/>
+            </a:r>
+            <a:br>
+              <a:rPr lang="en-US" dirty="0" smtClean="0"/>
+            </a:br>
+            <a:r>
+              <a:rPr lang="en-US" dirty="0" smtClean="0"/>
+              <a:t>EPP Motivation </a:t>
             </a:r>
             <a:endParaRPr lang="en-US" dirty="0"/>
-          </a:p>
-        </p:txBody>
-      </p:sp>
-      <p:sp>
-        <p:nvSpPr>
-          <p:cNvPr id="3" name="Content Placeholder 2"/>
-          <p:cNvSpPr>
-            <a:spLocks noGrp="1"/>
-          </p:cNvSpPr>
-          <p:nvPr>
-            <p:ph idx="1"/>
-          </p:nvPr>
-        </p:nvSpPr>
-        <p:spPr/>
-        <p:txBody>
-          <a:bodyPr/>
-          <a:lstStyle/>
-          <a:p>
-            <a:endParaRPr lang="en-US"/>
           </a:p>
         </p:txBody>
       </p:sp>
@@ -6228,7 +7083,307 @@
 </p:sld>
 </file>
 
-<file path=ppt/slides/slide35.xml><?xml version="1.0" encoding="utf-8"?>
+<file path=ppt/slides/slide40.xml><?xml version="1.0" encoding="utf-8"?>
+<p:sld xmlns:a="http://schemas.openxmlformats.org/drawingml/2006/main" xmlns:r="http://schemas.openxmlformats.org/officeDocument/2006/relationships" xmlns:p="http://schemas.openxmlformats.org/presentationml/2006/main">
+  <p:cSld>
+    <p:spTree>
+      <p:nvGrpSpPr>
+        <p:cNvPr id="1" name=""/>
+        <p:cNvGrpSpPr/>
+        <p:nvPr/>
+      </p:nvGrpSpPr>
+      <p:grpSpPr>
+        <a:xfrm>
+          <a:off x="0" y="0"/>
+          <a:ext cx="0" cy="0"/>
+          <a:chOff x="0" y="0"/>
+          <a:chExt cx="0" cy="0"/>
+        </a:xfrm>
+      </p:grpSpPr>
+      <p:sp>
+        <p:nvSpPr>
+          <p:cNvPr id="2" name="Title 1"/>
+          <p:cNvSpPr>
+            <a:spLocks noGrp="1"/>
+          </p:cNvSpPr>
+          <p:nvPr>
+            <p:ph type="title"/>
+          </p:nvPr>
+        </p:nvSpPr>
+        <p:spPr/>
+        <p:txBody>
+          <a:bodyPr/>
+          <a:lstStyle/>
+          <a:p>
+            <a:r>
+              <a:rPr lang="en-US" dirty="0" smtClean="0"/>
+              <a:t>Reflect on ISP</a:t>
+            </a:r>
+            <a:endParaRPr lang="en-US" dirty="0"/>
+          </a:p>
+        </p:txBody>
+      </p:sp>
+      <p:sp>
+        <p:nvSpPr>
+          <p:cNvPr id="3" name="Content Placeholder 2"/>
+          <p:cNvSpPr>
+            <a:spLocks noGrp="1"/>
+          </p:cNvSpPr>
+          <p:nvPr>
+            <p:ph idx="1"/>
+          </p:nvPr>
+        </p:nvSpPr>
+        <p:spPr/>
+        <p:txBody>
+          <a:bodyPr/>
+          <a:lstStyle/>
+          <a:p>
+            <a:pPr>
+              <a:buNone/>
+            </a:pPr>
+            <a:r>
+              <a:rPr lang="en-US" b="1" i="1" dirty="0" smtClean="0"/>
+              <a:t>CLIENTS SHOULD NOT BE FORCED TO DEPEND UPON </a:t>
+            </a:r>
+            <a:r>
+              <a:rPr lang="en-US" b="1" i="1" dirty="0" smtClean="0"/>
+              <a:t>INTERFACES THAT </a:t>
+            </a:r>
+            <a:r>
+              <a:rPr lang="en-US" b="1" i="1" dirty="0" smtClean="0"/>
+              <a:t>THEY DO NOT USE.</a:t>
+            </a:r>
+            <a:endParaRPr lang="en-US" dirty="0"/>
+          </a:p>
+        </p:txBody>
+      </p:sp>
+    </p:spTree>
+  </p:cSld>
+  <p:clrMapOvr>
+    <a:masterClrMapping/>
+  </p:clrMapOvr>
+  <p:timing>
+    <p:tnLst>
+      <p:par>
+        <p:cTn id="1" dur="indefinite" restart="never" nodeType="tmRoot"/>
+      </p:par>
+    </p:tnLst>
+  </p:timing>
+</p:sld>
+</file>
+
+<file path=ppt/slides/slide41.xml><?xml version="1.0" encoding="utf-8"?>
+<p:sld xmlns:a="http://schemas.openxmlformats.org/drawingml/2006/main" xmlns:r="http://schemas.openxmlformats.org/officeDocument/2006/relationships" xmlns:p="http://schemas.openxmlformats.org/presentationml/2006/main">
+  <p:cSld>
+    <p:spTree>
+      <p:nvGrpSpPr>
+        <p:cNvPr id="1" name=""/>
+        <p:cNvGrpSpPr/>
+        <p:nvPr/>
+      </p:nvGrpSpPr>
+      <p:grpSpPr>
+        <a:xfrm>
+          <a:off x="0" y="0"/>
+          <a:ext cx="0" cy="0"/>
+          <a:chOff x="0" y="0"/>
+          <a:chExt cx="0" cy="0"/>
+        </a:xfrm>
+      </p:grpSpPr>
+      <p:sp>
+        <p:nvSpPr>
+          <p:cNvPr id="2" name="Title 1"/>
+          <p:cNvSpPr>
+            <a:spLocks noGrp="1"/>
+          </p:cNvSpPr>
+          <p:nvPr>
+            <p:ph type="title"/>
+          </p:nvPr>
+        </p:nvSpPr>
+        <p:spPr/>
+        <p:txBody>
+          <a:bodyPr/>
+          <a:lstStyle/>
+          <a:p>
+            <a:r>
+              <a:rPr lang="en-US" dirty="0" smtClean="0"/>
+              <a:t>ISP</a:t>
+            </a:r>
+            <a:endParaRPr lang="en-US" dirty="0"/>
+          </a:p>
+        </p:txBody>
+      </p:sp>
+      <p:sp>
+        <p:nvSpPr>
+          <p:cNvPr id="3" name="Content Placeholder 2"/>
+          <p:cNvSpPr>
+            <a:spLocks noGrp="1"/>
+          </p:cNvSpPr>
+          <p:nvPr>
+            <p:ph idx="1"/>
+          </p:nvPr>
+        </p:nvSpPr>
+        <p:spPr/>
+        <p:txBody>
+          <a:bodyPr>
+            <a:normAutofit fontScale="47500" lnSpcReduction="20000"/>
+          </a:bodyPr>
+          <a:lstStyle/>
+          <a:p>
+            <a:pPr>
+              <a:buNone/>
+            </a:pPr>
+            <a:r>
+              <a:rPr lang="en-US" dirty="0" smtClean="0"/>
+              <a:t>Fat/Polluted interfaces</a:t>
+            </a:r>
+          </a:p>
+          <a:p>
+            <a:pPr>
+              <a:buNone/>
+            </a:pPr>
+            <a:endParaRPr lang="en-US" dirty="0" smtClean="0"/>
+          </a:p>
+          <a:p>
+            <a:pPr>
+              <a:buNone/>
+            </a:pPr>
+            <a:r>
+              <a:rPr lang="en-US" dirty="0" smtClean="0"/>
+              <a:t>Classes </a:t>
+            </a:r>
+            <a:r>
+              <a:rPr lang="en-US" dirty="0" smtClean="0"/>
+              <a:t>that have “fat” interfaces are classes whose interfaces are not cohesive.</a:t>
+            </a:r>
+          </a:p>
+          <a:p>
+            <a:pPr>
+              <a:buNone/>
+            </a:pPr>
+            <a:endParaRPr lang="en-US" dirty="0" smtClean="0"/>
+          </a:p>
+          <a:p>
+            <a:pPr>
+              <a:buNone/>
+            </a:pPr>
+            <a:r>
+              <a:rPr lang="en-US" dirty="0" smtClean="0"/>
+              <a:t>Let the client drive the interface.</a:t>
+            </a:r>
+            <a:endParaRPr lang="en-US" dirty="0" smtClean="0"/>
+          </a:p>
+          <a:p>
+            <a:pPr>
+              <a:buNone/>
+            </a:pPr>
+            <a:endParaRPr lang="en-US" dirty="0" smtClean="0"/>
+          </a:p>
+          <a:p>
+            <a:pPr>
+              <a:buNone/>
+            </a:pPr>
+            <a:r>
+              <a:rPr lang="en-US" dirty="0" smtClean="0"/>
+              <a:t>In other words, the interfaces of the class can be broken up into groups of member functions. Each</a:t>
+            </a:r>
+          </a:p>
+          <a:p>
+            <a:pPr>
+              <a:buNone/>
+            </a:pPr>
+            <a:r>
+              <a:rPr lang="en-US" dirty="0" smtClean="0"/>
+              <a:t>group serves a different set of clients. </a:t>
+            </a:r>
+            <a:endParaRPr lang="en-US" dirty="0" smtClean="0"/>
+          </a:p>
+          <a:p>
+            <a:pPr>
+              <a:buNone/>
+            </a:pPr>
+            <a:endParaRPr lang="en-US" dirty="0" smtClean="0"/>
+          </a:p>
+          <a:p>
+            <a:pPr>
+              <a:buNone/>
+            </a:pPr>
+            <a:r>
+              <a:rPr lang="en-US" dirty="0" smtClean="0"/>
+              <a:t>Thus </a:t>
+            </a:r>
+            <a:r>
+              <a:rPr lang="en-US" dirty="0" smtClean="0"/>
+              <a:t>some clients use one group of member functions,</a:t>
+            </a:r>
+          </a:p>
+          <a:p>
+            <a:pPr>
+              <a:buNone/>
+            </a:pPr>
+            <a:r>
+              <a:rPr lang="en-US" dirty="0" smtClean="0"/>
+              <a:t>and other clients use the other groups.</a:t>
+            </a:r>
+          </a:p>
+          <a:p>
+            <a:pPr>
+              <a:buNone/>
+            </a:pPr>
+            <a:endParaRPr lang="en-US" dirty="0" smtClean="0"/>
+          </a:p>
+          <a:p>
+            <a:pPr>
+              <a:buNone/>
+            </a:pPr>
+            <a:r>
+              <a:rPr lang="en-US" dirty="0" smtClean="0"/>
+              <a:t>The ISP acknowledges that there are objects that require non-cohesive interfaces;</a:t>
+            </a:r>
+          </a:p>
+          <a:p>
+            <a:pPr>
+              <a:buNone/>
+            </a:pPr>
+            <a:r>
+              <a:rPr lang="en-US" dirty="0" smtClean="0"/>
+              <a:t>however it suggests that clients should not know about them as a single class. Instead, clients</a:t>
+            </a:r>
+          </a:p>
+          <a:p>
+            <a:pPr>
+              <a:buNone/>
+            </a:pPr>
+            <a:r>
+              <a:rPr lang="en-US" dirty="0" smtClean="0"/>
+              <a:t>should know about abstract base classes that have cohesive interfaces. Some languages</a:t>
+            </a:r>
+          </a:p>
+          <a:p>
+            <a:pPr>
+              <a:buNone/>
+            </a:pPr>
+            <a:r>
+              <a:rPr lang="en-US" dirty="0" smtClean="0"/>
+              <a:t>refer to these abstract base classes as “interfaces”, “protocols” or “signatures”.</a:t>
+            </a:r>
+          </a:p>
+          <a:p>
+            <a:pPr>
+              <a:buNone/>
+            </a:pPr>
+            <a:endParaRPr lang="en-US" dirty="0"/>
+          </a:p>
+        </p:txBody>
+      </p:sp>
+    </p:spTree>
+  </p:cSld>
+  <p:clrMapOvr>
+    <a:masterClrMapping/>
+  </p:clrMapOvr>
+</p:sld>
+</file>
+
+<file path=ppt/slides/slide42.xml><?xml version="1.0" encoding="utf-8"?>
 <p:sld xmlns:a="http://schemas.openxmlformats.org/drawingml/2006/main" xmlns:r="http://schemas.openxmlformats.org/officeDocument/2006/relationships" xmlns:p="http://schemas.openxmlformats.org/presentationml/2006/main">
   <p:cSld>
     <p:spTree>
@@ -6295,7 +7450,7 @@
 </p:sld>
 </file>
 
-<file path=ppt/slides/slide36.xml><?xml version="1.0" encoding="utf-8"?>
+<file path=ppt/slides/slide43.xml><?xml version="1.0" encoding="utf-8"?>
 <p:sld xmlns:a="http://schemas.openxmlformats.org/drawingml/2006/main" xmlns:r="http://schemas.openxmlformats.org/officeDocument/2006/relationships" xmlns:p="http://schemas.openxmlformats.org/presentationml/2006/main">
   <p:cSld>
     <p:spTree>
@@ -6347,10 +7502,38 @@
         </p:nvSpPr>
         <p:spPr/>
         <p:txBody>
-          <a:bodyPr/>
-          <a:lstStyle/>
-          <a:p>
-            <a:endParaRPr lang="en-US" dirty="0"/>
+          <a:bodyPr>
+            <a:normAutofit/>
+          </a:bodyPr>
+          <a:lstStyle/>
+          <a:p>
+            <a:r>
+              <a:rPr lang="en-US" i="1" dirty="0" smtClean="0"/>
+              <a:t>A. HIGH LEVEL MODULES SHOULD NOT DEPEND UPON </a:t>
+            </a:r>
+            <a:r>
+              <a:rPr lang="en-US" i="1" dirty="0" smtClean="0"/>
+              <a:t>LOW LEVEL </a:t>
+            </a:r>
+            <a:r>
+              <a:rPr lang="en-US" i="1" dirty="0" smtClean="0"/>
+              <a:t>MODULES. BOTH SHOULD DEPEND UPON ABSTRACTIONS.</a:t>
+            </a:r>
+          </a:p>
+          <a:p>
+            <a:r>
+              <a:rPr lang="en-US" i="1" dirty="0" smtClean="0"/>
+              <a:t>B. ABSTRACTIONS SHOULD NOT DEPEND UPON DETAILS. </a:t>
+            </a:r>
+            <a:r>
+              <a:rPr lang="en-US" i="1" dirty="0" smtClean="0"/>
+              <a:t>DETAILS SHOULD </a:t>
+            </a:r>
+            <a:r>
+              <a:rPr lang="en-US" i="1" dirty="0" smtClean="0"/>
+              <a:t>DEPEND UPON ABSTRACTIONS.</a:t>
+            </a:r>
+            <a:endParaRPr lang="en-US" dirty="0" smtClean="0"/>
           </a:p>
         </p:txBody>
       </p:sp>
@@ -6369,7 +7552,7 @@
 </p:sld>
 </file>
 
-<file path=ppt/slides/slide37.xml><?xml version="1.0" encoding="utf-8"?>
+<file path=ppt/slides/slide44.xml><?xml version="1.0" encoding="utf-8"?>
 <p:sld xmlns:a="http://schemas.openxmlformats.org/drawingml/2006/main" xmlns:r="http://schemas.openxmlformats.org/officeDocument/2006/relationships" xmlns:p="http://schemas.openxmlformats.org/presentationml/2006/main">
   <p:cSld>
     <p:spTree>
@@ -6401,11 +7584,7 @@
           <a:bodyPr/>
           <a:lstStyle/>
           <a:p>
-            <a:r>
-              <a:rPr lang="en-US" dirty="0" smtClean="0"/>
-              <a:t>Other design smells &amp; principles</a:t>
-            </a:r>
-            <a:endParaRPr lang="en-US" dirty="0"/>
+            <a:endParaRPr lang="en-US"/>
           </a:p>
         </p:txBody>
       </p:sp>
@@ -6424,16 +7603,7 @@
           <a:bodyPr/>
           <a:lstStyle/>
           <a:p>
-            <a:r>
-              <a:rPr lang="en-US" dirty="0" smtClean="0"/>
-              <a:t>Needless Repetition : DRY</a:t>
-            </a:r>
-          </a:p>
-          <a:p>
-            <a:r>
-              <a:rPr lang="en-US" dirty="0" smtClean="0"/>
-              <a:t>Complex/Over design : YAGNI, KISS</a:t>
-            </a:r>
+            <a:endParaRPr lang="en-US"/>
           </a:p>
         </p:txBody>
       </p:sp>
@@ -6442,17 +7612,10 @@
   <p:clrMapOvr>
     <a:masterClrMapping/>
   </p:clrMapOvr>
-  <p:timing>
-    <p:tnLst>
-      <p:par>
-        <p:cTn id="1" dur="indefinite" restart="never" nodeType="tmRoot"/>
-      </p:par>
-    </p:tnLst>
-  </p:timing>
 </p:sld>
 </file>
 
-<file path=ppt/slides/slide38.xml><?xml version="1.0" encoding="utf-8"?>
+<file path=ppt/slides/slide45.xml><?xml version="1.0" encoding="utf-8"?>
 <p:sld xmlns:a="http://schemas.openxmlformats.org/drawingml/2006/main" xmlns:r="http://schemas.openxmlformats.org/officeDocument/2006/relationships" xmlns:p="http://schemas.openxmlformats.org/presentationml/2006/main">
   <p:cSld>
     <p:spTree>
@@ -6481,6 +7644,89 @@
         </p:nvSpPr>
         <p:spPr/>
         <p:txBody>
+          <a:bodyPr/>
+          <a:lstStyle/>
+          <a:p>
+            <a:r>
+              <a:rPr lang="en-US" dirty="0" smtClean="0"/>
+              <a:t>Other design smells &amp; principles</a:t>
+            </a:r>
+            <a:endParaRPr lang="en-US" dirty="0"/>
+          </a:p>
+        </p:txBody>
+      </p:sp>
+      <p:sp>
+        <p:nvSpPr>
+          <p:cNvPr id="3" name="Content Placeholder 2"/>
+          <p:cNvSpPr>
+            <a:spLocks noGrp="1"/>
+          </p:cNvSpPr>
+          <p:nvPr>
+            <p:ph idx="1"/>
+          </p:nvPr>
+        </p:nvSpPr>
+        <p:spPr/>
+        <p:txBody>
+          <a:bodyPr/>
+          <a:lstStyle/>
+          <a:p>
+            <a:r>
+              <a:rPr lang="en-US" dirty="0" smtClean="0"/>
+              <a:t>Needless Repetition : DRY</a:t>
+            </a:r>
+          </a:p>
+          <a:p>
+            <a:r>
+              <a:rPr lang="en-US" dirty="0" smtClean="0"/>
+              <a:t>Complex/Over design : YAGNI, KISS</a:t>
+            </a:r>
+          </a:p>
+        </p:txBody>
+      </p:sp>
+    </p:spTree>
+  </p:cSld>
+  <p:clrMapOvr>
+    <a:masterClrMapping/>
+  </p:clrMapOvr>
+  <p:timing>
+    <p:tnLst>
+      <p:par>
+        <p:cTn id="1" dur="indefinite" restart="never" nodeType="tmRoot"/>
+      </p:par>
+    </p:tnLst>
+  </p:timing>
+</p:sld>
+</file>
+
+<file path=ppt/slides/slide46.xml><?xml version="1.0" encoding="utf-8"?>
+<p:sld xmlns:a="http://schemas.openxmlformats.org/drawingml/2006/main" xmlns:r="http://schemas.openxmlformats.org/officeDocument/2006/relationships" xmlns:p="http://schemas.openxmlformats.org/presentationml/2006/main">
+  <p:cSld>
+    <p:spTree>
+      <p:nvGrpSpPr>
+        <p:cNvPr id="1" name=""/>
+        <p:cNvGrpSpPr/>
+        <p:nvPr/>
+      </p:nvGrpSpPr>
+      <p:grpSpPr>
+        <a:xfrm>
+          <a:off x="0" y="0"/>
+          <a:ext cx="0" cy="0"/>
+          <a:chOff x="0" y="0"/>
+          <a:chExt cx="0" cy="0"/>
+        </a:xfrm>
+      </p:grpSpPr>
+      <p:sp>
+        <p:nvSpPr>
+          <p:cNvPr id="2" name="Title 1"/>
+          <p:cNvSpPr>
+            <a:spLocks noGrp="1"/>
+          </p:cNvSpPr>
+          <p:nvPr>
+            <p:ph type="title"/>
+          </p:nvPr>
+        </p:nvSpPr>
+        <p:spPr/>
+        <p:txBody>
           <a:bodyPr>
             <a:normAutofit/>
           </a:bodyPr>
@@ -6514,13 +7760,8 @@
             </a:pPr>
             <a:r>
               <a:rPr lang="en-US" b="1" dirty="0" smtClean="0"/>
-              <a:t>TDD presents us an </a:t>
-            </a:r>
-            <a:r>
-              <a:rPr lang="en-US" b="1" dirty="0" smtClean="0"/>
-              <a:t>opportunity</a:t>
-            </a:r>
-            <a:endParaRPr lang="en-US" b="1" dirty="0" smtClean="0"/>
+              <a:t>TDD presents us an opportunity</a:t>
+            </a:r>
           </a:p>
           <a:p>
             <a:pPr>
@@ -6569,7 +7810,7 @@
 </p:sld>
 </file>
 
-<file path=ppt/slides/slide39.xml><?xml version="1.0" encoding="utf-8"?>
+<file path=ppt/slides/slide47.xml><?xml version="1.0" encoding="utf-8"?>
 <p:sld xmlns:a="http://schemas.openxmlformats.org/drawingml/2006/main" xmlns:r="http://schemas.openxmlformats.org/officeDocument/2006/relationships" xmlns:p="http://schemas.openxmlformats.org/presentationml/2006/main">
   <p:cSld>
     <p:spTree>
@@ -6635,127 +7876,7 @@
 </p:sld>
 </file>
 
-<file path=ppt/slides/slide4.xml><?xml version="1.0" encoding="utf-8"?>
-<p:sld xmlns:a="http://schemas.openxmlformats.org/drawingml/2006/main" xmlns:r="http://schemas.openxmlformats.org/officeDocument/2006/relationships" xmlns:p="http://schemas.openxmlformats.org/presentationml/2006/main">
-  <p:cSld>
-    <p:spTree>
-      <p:nvGrpSpPr>
-        <p:cNvPr id="1" name=""/>
-        <p:cNvGrpSpPr/>
-        <p:nvPr/>
-      </p:nvGrpSpPr>
-      <p:grpSpPr>
-        <a:xfrm>
-          <a:off x="0" y="0"/>
-          <a:ext cx="0" cy="0"/>
-          <a:chOff x="0" y="0"/>
-          <a:chExt cx="0" cy="0"/>
-        </a:xfrm>
-      </p:grpSpPr>
-      <p:sp>
-        <p:nvSpPr>
-          <p:cNvPr id="2" name="Title 1"/>
-          <p:cNvSpPr>
-            <a:spLocks noGrp="1"/>
-          </p:cNvSpPr>
-          <p:nvPr>
-            <p:ph type="title"/>
-          </p:nvPr>
-        </p:nvSpPr>
-        <p:spPr/>
-        <p:txBody>
-          <a:bodyPr>
-            <a:normAutofit fontScale="90000"/>
-          </a:bodyPr>
-          <a:lstStyle/>
-          <a:p>
-            <a:r>
-              <a:rPr lang="en-US" dirty="0" smtClean="0"/>
-              <a:t/>
-            </a:r>
-            <a:br>
-              <a:rPr lang="en-US" dirty="0" smtClean="0"/>
-            </a:br>
-            <a:r>
-              <a:rPr lang="en-US" dirty="0"/>
-              <a:t/>
-            </a:r>
-            <a:br>
-              <a:rPr lang="en-US" dirty="0"/>
-            </a:br>
-            <a:r>
-              <a:rPr lang="en-US" dirty="0" smtClean="0"/>
-              <a:t/>
-            </a:r>
-            <a:br>
-              <a:rPr lang="en-US" dirty="0" smtClean="0"/>
-            </a:br>
-            <a:r>
-              <a:rPr lang="en-US" dirty="0"/>
-              <a:t/>
-            </a:r>
-            <a:br>
-              <a:rPr lang="en-US" dirty="0"/>
-            </a:br>
-            <a:r>
-              <a:rPr lang="en-US" dirty="0" smtClean="0"/>
-              <a:t/>
-            </a:r>
-            <a:br>
-              <a:rPr lang="en-US" dirty="0" smtClean="0"/>
-            </a:br>
-            <a:r>
-              <a:rPr lang="en-US" dirty="0"/>
-              <a:t/>
-            </a:r>
-            <a:br>
-              <a:rPr lang="en-US" dirty="0"/>
-            </a:br>
-            <a:r>
-              <a:rPr lang="en-US" dirty="0" smtClean="0"/>
-              <a:t/>
-            </a:r>
-            <a:br>
-              <a:rPr lang="en-US" dirty="0" smtClean="0"/>
-            </a:br>
-            <a:r>
-              <a:rPr lang="en-US" dirty="0"/>
-              <a:t/>
-            </a:r>
-            <a:br>
-              <a:rPr lang="en-US" dirty="0"/>
-            </a:br>
-            <a:r>
-              <a:rPr lang="en-US" dirty="0" smtClean="0"/>
-              <a:t/>
-            </a:r>
-            <a:br>
-              <a:rPr lang="en-US" dirty="0" smtClean="0"/>
-            </a:br>
-            <a:r>
-              <a:rPr lang="en-US" dirty="0" smtClean="0"/>
-              <a:t>EPP Motivation </a:t>
-            </a:r>
-            <a:endParaRPr lang="en-US" dirty="0"/>
-          </a:p>
-        </p:txBody>
-      </p:sp>
-    </p:spTree>
-  </p:cSld>
-  <p:clrMapOvr>
-    <a:masterClrMapping/>
-  </p:clrMapOvr>
-  <p:timing>
-    <p:tnLst>
-      <p:par>
-        <p:cTn id="1" dur="indefinite" restart="never" nodeType="tmRoot"/>
-      </p:par>
-    </p:tnLst>
-  </p:timing>
-</p:sld>
-</file>
-
-<file path=ppt/slides/slide40.xml><?xml version="1.0" encoding="utf-8"?>
+<file path=ppt/slides/slide48.xml><?xml version="1.0" encoding="utf-8"?>
 <p:sld xmlns:a="http://schemas.openxmlformats.org/drawingml/2006/main" xmlns:r="http://schemas.openxmlformats.org/officeDocument/2006/relationships" xmlns:p="http://schemas.openxmlformats.org/presentationml/2006/main">
   <p:cSld>
     <p:spTree>
@@ -6821,7 +7942,7 @@
 </p:sld>
 </file>
 
-<file path=ppt/slides/slide41.xml><?xml version="1.0" encoding="utf-8"?>
+<file path=ppt/slides/slide49.xml><?xml version="1.0" encoding="utf-8"?>
 <p:sld xmlns:a="http://schemas.openxmlformats.org/drawingml/2006/main" xmlns:r="http://schemas.openxmlformats.org/officeDocument/2006/relationships" xmlns:p="http://schemas.openxmlformats.org/presentationml/2006/main">
   <p:cSld>
     <p:spTree>
@@ -6887,7 +8008,7 @@
 </p:sld>
 </file>
 
-<file path=ppt/slides/slide42.xml><?xml version="1.0" encoding="utf-8"?>
+<file path=ppt/slides/slide5.xml><?xml version="1.0" encoding="utf-8"?>
 <p:sld xmlns:a="http://schemas.openxmlformats.org/drawingml/2006/main" xmlns:r="http://schemas.openxmlformats.org/officeDocument/2006/relationships" xmlns:p="http://schemas.openxmlformats.org/presentationml/2006/main">
   <p:cSld>
     <p:spTree>
@@ -6906,7 +8027,7 @@
       </p:grpSpPr>
       <p:sp>
         <p:nvSpPr>
-          <p:cNvPr id="4" name="Title 3"/>
+          <p:cNvPr id="2" name="Title 1"/>
           <p:cNvSpPr>
             <a:spLocks noGrp="1"/>
           </p:cNvSpPr>
@@ -6914,20 +8035,48 @@
             <p:ph type="title"/>
           </p:nvPr>
         </p:nvSpPr>
-        <p:spPr>
-          <a:xfrm>
-            <a:off x="533400" y="2590800"/>
-            <a:ext cx="8229600" cy="1143000"/>
-          </a:xfrm>
-        </p:spPr>
-        <p:txBody>
-          <a:bodyPr/>
-          <a:lstStyle/>
-          <a:p>
-            <a:r>
-              <a:rPr lang="en-US" dirty="0" smtClean="0"/>
-              <a:t>What Next?</a:t>
-            </a:r>
+        <p:spPr/>
+        <p:txBody>
+          <a:bodyPr>
+            <a:normAutofit/>
+          </a:bodyPr>
+          <a:lstStyle/>
+          <a:p>
+            <a:r>
+              <a:rPr lang="en-US" dirty="0" smtClean="0"/>
+              <a:t>Engineering Philosophy</a:t>
+            </a:r>
+            <a:endParaRPr lang="en-US" dirty="0"/>
+          </a:p>
+        </p:txBody>
+      </p:sp>
+      <p:sp>
+        <p:nvSpPr>
+          <p:cNvPr id="3" name="Content Placeholder 2"/>
+          <p:cNvSpPr>
+            <a:spLocks noGrp="1"/>
+          </p:cNvSpPr>
+          <p:nvPr>
+            <p:ph idx="1"/>
+          </p:nvPr>
+        </p:nvSpPr>
+        <p:spPr/>
+        <p:txBody>
+          <a:bodyPr/>
+          <a:lstStyle/>
+          <a:p>
+            <a:r>
+              <a:rPr lang="en-US" dirty="0" smtClean="0"/>
+              <a:t>Beautiful, Maintainable Code</a:t>
+            </a:r>
+          </a:p>
+          <a:p>
+            <a:r>
+              <a:rPr lang="en-US" dirty="0" smtClean="0"/>
+              <a:t>We want to “Care” about our code</a:t>
+            </a:r>
+          </a:p>
+          <a:p>
             <a:endParaRPr lang="en-US" dirty="0"/>
           </a:p>
         </p:txBody>
@@ -6947,7 +8096,67 @@
 </p:sld>
 </file>
 
-<file path=ppt/slides/slide43.xml><?xml version="1.0" encoding="utf-8"?>
+<file path=ppt/slides/slide50.xml><?xml version="1.0" encoding="utf-8"?>
+<p:sld xmlns:a="http://schemas.openxmlformats.org/drawingml/2006/main" xmlns:r="http://schemas.openxmlformats.org/officeDocument/2006/relationships" xmlns:p="http://schemas.openxmlformats.org/presentationml/2006/main">
+  <p:cSld>
+    <p:spTree>
+      <p:nvGrpSpPr>
+        <p:cNvPr id="1" name=""/>
+        <p:cNvGrpSpPr/>
+        <p:nvPr/>
+      </p:nvGrpSpPr>
+      <p:grpSpPr>
+        <a:xfrm>
+          <a:off x="0" y="0"/>
+          <a:ext cx="0" cy="0"/>
+          <a:chOff x="0" y="0"/>
+          <a:chExt cx="0" cy="0"/>
+        </a:xfrm>
+      </p:grpSpPr>
+      <p:sp>
+        <p:nvSpPr>
+          <p:cNvPr id="4" name="Title 3"/>
+          <p:cNvSpPr>
+            <a:spLocks noGrp="1"/>
+          </p:cNvSpPr>
+          <p:nvPr>
+            <p:ph type="title"/>
+          </p:nvPr>
+        </p:nvSpPr>
+        <p:spPr>
+          <a:xfrm>
+            <a:off x="533400" y="2590800"/>
+            <a:ext cx="8229600" cy="1143000"/>
+          </a:xfrm>
+        </p:spPr>
+        <p:txBody>
+          <a:bodyPr/>
+          <a:lstStyle/>
+          <a:p>
+            <a:r>
+              <a:rPr lang="en-US" dirty="0" smtClean="0"/>
+              <a:t>What Next?</a:t>
+            </a:r>
+            <a:endParaRPr lang="en-US" dirty="0"/>
+          </a:p>
+        </p:txBody>
+      </p:sp>
+    </p:spTree>
+  </p:cSld>
+  <p:clrMapOvr>
+    <a:masterClrMapping/>
+  </p:clrMapOvr>
+  <p:timing>
+    <p:tnLst>
+      <p:par>
+        <p:cTn id="1" dur="indefinite" restart="never" nodeType="tmRoot"/>
+      </p:par>
+    </p:tnLst>
+  </p:timing>
+</p:sld>
+</file>
+
+<file path=ppt/slides/slide51.xml><?xml version="1.0" encoding="utf-8"?>
 <p:sld xmlns:a="http://schemas.openxmlformats.org/drawingml/2006/main" xmlns:r="http://schemas.openxmlformats.org/officeDocument/2006/relationships" xmlns:p="http://schemas.openxmlformats.org/presentationml/2006/main">
   <p:cSld>
     <p:spTree>
@@ -7038,7 +8247,7 @@
 </p:sld>
 </file>
 
-<file path=ppt/slides/slide44.xml><?xml version="1.0" encoding="utf-8"?>
+<file path=ppt/slides/slide52.xml><?xml version="1.0" encoding="utf-8"?>
 <p:sld xmlns:a="http://schemas.openxmlformats.org/drawingml/2006/main" xmlns:r="http://schemas.openxmlformats.org/officeDocument/2006/relationships" xmlns:p="http://schemas.openxmlformats.org/presentationml/2006/main">
   <p:cSld>
     <p:spTree>
@@ -7095,11 +8304,7 @@
           <a:p>
             <a:r>
               <a:rPr lang="en-US" dirty="0" smtClean="0"/>
-              <a:t>Design </a:t>
-            </a:r>
-            <a:r>
-              <a:rPr lang="en-US" dirty="0" smtClean="0"/>
-              <a:t>Patterns</a:t>
+              <a:t>Design Patterns</a:t>
             </a:r>
           </a:p>
           <a:p>
@@ -7107,7 +8312,6 @@
               <a:rPr lang="en-US" dirty="0" smtClean="0"/>
               <a:t>Refactoring to Patterns</a:t>
             </a:r>
-            <a:endParaRPr lang="en-US" dirty="0" smtClean="0"/>
           </a:p>
           <a:p>
             <a:r>
@@ -7139,7 +8343,7 @@
 </p:sld>
 </file>
 
-<file path=ppt/slides/slide45.xml><?xml version="1.0" encoding="utf-8"?>
+<file path=ppt/slides/slide53.xml><?xml version="1.0" encoding="utf-8"?>
 <p:sld xmlns:a="http://schemas.openxmlformats.org/drawingml/2006/main" xmlns:r="http://schemas.openxmlformats.org/officeDocument/2006/relationships" xmlns:p="http://schemas.openxmlformats.org/presentationml/2006/main">
   <p:cSld>
     <p:spTree>
@@ -7175,94 +8379,6 @@
               <a:rPr lang="en-US" dirty="0" smtClean="0"/>
               <a:t>References</a:t>
             </a:r>
-            <a:endParaRPr lang="en-US" dirty="0"/>
-          </a:p>
-        </p:txBody>
-      </p:sp>
-    </p:spTree>
-  </p:cSld>
-  <p:clrMapOvr>
-    <a:masterClrMapping/>
-  </p:clrMapOvr>
-  <p:timing>
-    <p:tnLst>
-      <p:par>
-        <p:cTn id="1" dur="indefinite" restart="never" nodeType="tmRoot"/>
-      </p:par>
-    </p:tnLst>
-  </p:timing>
-</p:sld>
-</file>
-
-<file path=ppt/slides/slide5.xml><?xml version="1.0" encoding="utf-8"?>
-<p:sld xmlns:a="http://schemas.openxmlformats.org/drawingml/2006/main" xmlns:r="http://schemas.openxmlformats.org/officeDocument/2006/relationships" xmlns:p="http://schemas.openxmlformats.org/presentationml/2006/main">
-  <p:cSld>
-    <p:spTree>
-      <p:nvGrpSpPr>
-        <p:cNvPr id="1" name=""/>
-        <p:cNvGrpSpPr/>
-        <p:nvPr/>
-      </p:nvGrpSpPr>
-      <p:grpSpPr>
-        <a:xfrm>
-          <a:off x="0" y="0"/>
-          <a:ext cx="0" cy="0"/>
-          <a:chOff x="0" y="0"/>
-          <a:chExt cx="0" cy="0"/>
-        </a:xfrm>
-      </p:grpSpPr>
-      <p:sp>
-        <p:nvSpPr>
-          <p:cNvPr id="2" name="Title 1"/>
-          <p:cNvSpPr>
-            <a:spLocks noGrp="1"/>
-          </p:cNvSpPr>
-          <p:nvPr>
-            <p:ph type="title"/>
-          </p:nvPr>
-        </p:nvSpPr>
-        <p:spPr/>
-        <p:txBody>
-          <a:bodyPr>
-            <a:normAutofit/>
-          </a:bodyPr>
-          <a:lstStyle/>
-          <a:p>
-            <a:r>
-              <a:rPr lang="en-US" dirty="0" smtClean="0"/>
-              <a:t>Engineering Philosophy</a:t>
-            </a:r>
-            <a:endParaRPr lang="en-US" dirty="0"/>
-          </a:p>
-        </p:txBody>
-      </p:sp>
-      <p:sp>
-        <p:nvSpPr>
-          <p:cNvPr id="3" name="Content Placeholder 2"/>
-          <p:cNvSpPr>
-            <a:spLocks noGrp="1"/>
-          </p:cNvSpPr>
-          <p:nvPr>
-            <p:ph idx="1"/>
-          </p:nvPr>
-        </p:nvSpPr>
-        <p:spPr/>
-        <p:txBody>
-          <a:bodyPr/>
-          <a:lstStyle/>
-          <a:p>
-            <a:r>
-              <a:rPr lang="en-US" dirty="0" smtClean="0"/>
-              <a:t>Beautiful, Maintainable Code</a:t>
-            </a:r>
-          </a:p>
-          <a:p>
-            <a:r>
-              <a:rPr lang="en-US" dirty="0" smtClean="0"/>
-              <a:t>We want to “Care” about our code</a:t>
-            </a:r>
-          </a:p>
-          <a:p>
             <a:endParaRPr lang="en-US" dirty="0"/>
           </a:p>
         </p:txBody>

</xml_diff>

<commit_message>
Added the missing SRP slides
</commit_message>
<xml_diff>
--- a/SOLID Principles of OOD v2.pptx
+++ b/SOLID Principles of OOD v2.pptx
@@ -5,7 +5,7 @@
     <p:sldMasterId id="2147483648" r:id="rId1"/>
   </p:sldMasterIdLst>
   <p:notesMasterIdLst>
-    <p:notesMasterId r:id="rId60"/>
+    <p:notesMasterId r:id="rId62"/>
   </p:notesMasterIdLst>
   <p:sldIdLst>
     <p:sldId id="256" r:id="rId2"/>
@@ -41,31 +41,33 @@
     <p:sldId id="329" r:id="rId32"/>
     <p:sldId id="283" r:id="rId33"/>
     <p:sldId id="313" r:id="rId34"/>
-    <p:sldId id="279" r:id="rId35"/>
-    <p:sldId id="284" r:id="rId36"/>
-    <p:sldId id="316" r:id="rId37"/>
-    <p:sldId id="315" r:id="rId38"/>
-    <p:sldId id="280" r:id="rId39"/>
-    <p:sldId id="285" r:id="rId40"/>
-    <p:sldId id="317" r:id="rId41"/>
-    <p:sldId id="314" r:id="rId42"/>
-    <p:sldId id="281" r:id="rId43"/>
-    <p:sldId id="286" r:id="rId44"/>
-    <p:sldId id="318" r:id="rId45"/>
-    <p:sldId id="282" r:id="rId46"/>
-    <p:sldId id="287" r:id="rId47"/>
-    <p:sldId id="319" r:id="rId48"/>
-    <p:sldId id="311" r:id="rId49"/>
-    <p:sldId id="288" r:id="rId50"/>
-    <p:sldId id="300" r:id="rId51"/>
-    <p:sldId id="301" r:id="rId52"/>
-    <p:sldId id="295" r:id="rId53"/>
-    <p:sldId id="303" r:id="rId54"/>
-    <p:sldId id="302" r:id="rId55"/>
-    <p:sldId id="304" r:id="rId56"/>
-    <p:sldId id="276" r:id="rId57"/>
-    <p:sldId id="326" r:id="rId58"/>
-    <p:sldId id="324" r:id="rId59"/>
+    <p:sldId id="331" r:id="rId35"/>
+    <p:sldId id="279" r:id="rId36"/>
+    <p:sldId id="284" r:id="rId37"/>
+    <p:sldId id="316" r:id="rId38"/>
+    <p:sldId id="315" r:id="rId39"/>
+    <p:sldId id="280" r:id="rId40"/>
+    <p:sldId id="285" r:id="rId41"/>
+    <p:sldId id="317" r:id="rId42"/>
+    <p:sldId id="314" r:id="rId43"/>
+    <p:sldId id="281" r:id="rId44"/>
+    <p:sldId id="286" r:id="rId45"/>
+    <p:sldId id="318" r:id="rId46"/>
+    <p:sldId id="282" r:id="rId47"/>
+    <p:sldId id="287" r:id="rId48"/>
+    <p:sldId id="319" r:id="rId49"/>
+    <p:sldId id="311" r:id="rId50"/>
+    <p:sldId id="288" r:id="rId51"/>
+    <p:sldId id="300" r:id="rId52"/>
+    <p:sldId id="301" r:id="rId53"/>
+    <p:sldId id="295" r:id="rId54"/>
+    <p:sldId id="303" r:id="rId55"/>
+    <p:sldId id="302" r:id="rId56"/>
+    <p:sldId id="304" r:id="rId57"/>
+    <p:sldId id="330" r:id="rId58"/>
+    <p:sldId id="276" r:id="rId59"/>
+    <p:sldId id="326" r:id="rId60"/>
+    <p:sldId id="324" r:id="rId61"/>
   </p:sldIdLst>
   <p:sldSz cx="9144000" cy="6858000" type="screen4x3"/>
   <p:notesSz cx="6858000" cy="9144000"/>
@@ -250,7 +252,7 @@
             <a:fld id="{3EE9C784-6AE7-4DE7-B637-A04C32984173}" type="datetimeFigureOut">
               <a:rPr lang="en-US" smtClean="0"/>
               <a:pPr/>
-              <a:t>12/10/2012</a:t>
+              <a:t>12/11/2012</a:t>
             </a:fld>
             <a:endParaRPr lang="en-US"/>
           </a:p>
@@ -872,7 +874,7 @@
             <a:fld id="{FE753EDB-7AB4-42D9-B376-B6135C20C788}" type="datetimeFigureOut">
               <a:rPr lang="en-US" smtClean="0"/>
               <a:pPr/>
-              <a:t>12/10/2012</a:t>
+              <a:t>12/11/2012</a:t>
             </a:fld>
             <a:endParaRPr lang="en-US"/>
           </a:p>
@@ -1039,7 +1041,7 @@
             <a:fld id="{FE753EDB-7AB4-42D9-B376-B6135C20C788}" type="datetimeFigureOut">
               <a:rPr lang="en-US" smtClean="0"/>
               <a:pPr/>
-              <a:t>12/10/2012</a:t>
+              <a:t>12/11/2012</a:t>
             </a:fld>
             <a:endParaRPr lang="en-US"/>
           </a:p>
@@ -1216,7 +1218,7 @@
             <a:fld id="{FE753EDB-7AB4-42D9-B376-B6135C20C788}" type="datetimeFigureOut">
               <a:rPr lang="en-US" smtClean="0"/>
               <a:pPr/>
-              <a:t>12/10/2012</a:t>
+              <a:t>12/11/2012</a:t>
             </a:fld>
             <a:endParaRPr lang="en-US"/>
           </a:p>
@@ -1383,7 +1385,7 @@
             <a:fld id="{FE753EDB-7AB4-42D9-B376-B6135C20C788}" type="datetimeFigureOut">
               <a:rPr lang="en-US" smtClean="0"/>
               <a:pPr/>
-              <a:t>12/10/2012</a:t>
+              <a:t>12/11/2012</a:t>
             </a:fld>
             <a:endParaRPr lang="en-US"/>
           </a:p>
@@ -1626,7 +1628,7 @@
             <a:fld id="{FE753EDB-7AB4-42D9-B376-B6135C20C788}" type="datetimeFigureOut">
               <a:rPr lang="en-US" smtClean="0"/>
               <a:pPr/>
-              <a:t>12/10/2012</a:t>
+              <a:t>12/11/2012</a:t>
             </a:fld>
             <a:endParaRPr lang="en-US"/>
           </a:p>
@@ -1911,7 +1913,7 @@
             <a:fld id="{FE753EDB-7AB4-42D9-B376-B6135C20C788}" type="datetimeFigureOut">
               <a:rPr lang="en-US" smtClean="0"/>
               <a:pPr/>
-              <a:t>12/10/2012</a:t>
+              <a:t>12/11/2012</a:t>
             </a:fld>
             <a:endParaRPr lang="en-US"/>
           </a:p>
@@ -2330,7 +2332,7 @@
             <a:fld id="{FE753EDB-7AB4-42D9-B376-B6135C20C788}" type="datetimeFigureOut">
               <a:rPr lang="en-US" smtClean="0"/>
               <a:pPr/>
-              <a:t>12/10/2012</a:t>
+              <a:t>12/11/2012</a:t>
             </a:fld>
             <a:endParaRPr lang="en-US"/>
           </a:p>
@@ -2445,7 +2447,7 @@
             <a:fld id="{FE753EDB-7AB4-42D9-B376-B6135C20C788}" type="datetimeFigureOut">
               <a:rPr lang="en-US" smtClean="0"/>
               <a:pPr/>
-              <a:t>12/10/2012</a:t>
+              <a:t>12/11/2012</a:t>
             </a:fld>
             <a:endParaRPr lang="en-US"/>
           </a:p>
@@ -2537,7 +2539,7 @@
             <a:fld id="{FE753EDB-7AB4-42D9-B376-B6135C20C788}" type="datetimeFigureOut">
               <a:rPr lang="en-US" smtClean="0"/>
               <a:pPr/>
-              <a:t>12/10/2012</a:t>
+              <a:t>12/11/2012</a:t>
             </a:fld>
             <a:endParaRPr lang="en-US"/>
           </a:p>
@@ -2811,7 +2813,7 @@
             <a:fld id="{FE753EDB-7AB4-42D9-B376-B6135C20C788}" type="datetimeFigureOut">
               <a:rPr lang="en-US" smtClean="0"/>
               <a:pPr/>
-              <a:t>12/10/2012</a:t>
+              <a:t>12/11/2012</a:t>
             </a:fld>
             <a:endParaRPr lang="en-US"/>
           </a:p>
@@ -3061,7 +3063,7 @@
             <a:fld id="{FE753EDB-7AB4-42D9-B376-B6135C20C788}" type="datetimeFigureOut">
               <a:rPr lang="en-US" smtClean="0"/>
               <a:pPr/>
-              <a:t>12/10/2012</a:t>
+              <a:t>12/11/2012</a:t>
             </a:fld>
             <a:endParaRPr lang="en-US"/>
           </a:p>
@@ -3271,7 +3273,7 @@
             <a:fld id="{FE753EDB-7AB4-42D9-B376-B6135C20C788}" type="datetimeFigureOut">
               <a:rPr lang="en-US" smtClean="0"/>
               <a:pPr/>
-              <a:t>12/10/2012</a:t>
+              <a:t>12/11/2012</a:t>
             </a:fld>
             <a:endParaRPr lang="en-US"/>
           </a:p>
@@ -3859,11 +3861,7 @@
           <a:p>
             <a:r>
               <a:rPr lang="en-US" dirty="0" smtClean="0"/>
-              <a:t>Code </a:t>
-            </a:r>
-            <a:r>
-              <a:rPr lang="en-US" dirty="0" smtClean="0"/>
-              <a:t>Smells [Problems]</a:t>
+              <a:t>Code Smells [Problems]</a:t>
             </a:r>
             <a:endParaRPr lang="en-US" dirty="0"/>
           </a:p>
@@ -3886,13 +3884,8 @@
           <a:p>
             <a:r>
               <a:rPr lang="en-US" dirty="0" smtClean="0"/>
-              <a:t>Refactoring –  Improving the design of existing code [Martin Fowler</a:t>
-            </a:r>
-            <a:r>
-              <a:rPr lang="en-US" dirty="0" smtClean="0"/>
-              <a:t>]</a:t>
-            </a:r>
-            <a:endParaRPr lang="en-US" dirty="0" smtClean="0"/>
+              <a:t>Refactoring –  Improving the design of existing code [Martin Fowler]</a:t>
+            </a:r>
           </a:p>
           <a:p>
             <a:r>
@@ -4051,11 +4044,7 @@
           <a:p>
             <a:r>
               <a:rPr lang="en-US" dirty="0" smtClean="0"/>
-              <a:t>Design </a:t>
-            </a:r>
-            <a:r>
-              <a:rPr lang="en-US" dirty="0" smtClean="0"/>
-              <a:t>Smells</a:t>
+              <a:t>Design Smells</a:t>
             </a:r>
             <a:endParaRPr lang="en-US" dirty="0"/>
           </a:p>
@@ -4092,7 +4081,6 @@
               <a:rPr lang="en-US" dirty="0" smtClean="0"/>
               <a:t>Rigidity</a:t>
             </a:r>
-            <a:endParaRPr lang="en-US" dirty="0" smtClean="0"/>
           </a:p>
           <a:p>
             <a:r>
@@ -4188,11 +4176,7 @@
           <a:p>
             <a:r>
               <a:rPr lang="en-US" dirty="0" smtClean="0"/>
-              <a:t>In 1992, Jack Reeves wrote a seminal </a:t>
-            </a:r>
-            <a:r>
-              <a:rPr lang="en-US" dirty="0" smtClean="0"/>
-              <a:t>article "</a:t>
+              <a:t>In 1992, Jack Reeves wrote a seminal article "</a:t>
             </a:r>
             <a:r>
               <a:rPr lang="en-US" b="1" dirty="0" smtClean="0"/>
@@ -4204,27 +4188,11 @@
             </a:r>
             <a:r>
               <a:rPr lang="en-US" i="1" dirty="0" smtClean="0"/>
-              <a:t>C++ Journal.[1] In </a:t>
-            </a:r>
-            <a:r>
-              <a:rPr lang="en-US" i="1" dirty="0" smtClean="0"/>
-              <a:t>this </a:t>
-            </a:r>
-            <a:r>
-              <a:rPr lang="en-US" dirty="0" smtClean="0"/>
-              <a:t>article</a:t>
-            </a:r>
-            <a:r>
-              <a:rPr lang="en-US" dirty="0" smtClean="0"/>
-              <a:t>, Reeves argued that the design of a software system is documented primarily by its </a:t>
-            </a:r>
-            <a:r>
-              <a:rPr lang="en-US" dirty="0" smtClean="0"/>
-              <a:t>source code</a:t>
-            </a:r>
-            <a:r>
-              <a:rPr lang="en-US" dirty="0" smtClean="0"/>
-              <a:t>, that diagrams representing the source code are ancillary to the design and are not the design</a:t>
+              <a:t>C++ Journal.[1] In this </a:t>
+            </a:r>
+            <a:r>
+              <a:rPr lang="en-US" dirty="0" smtClean="0"/>
+              <a:t>article, Reeves argued that the design of a software system is documented primarily by its source code, that diagrams representing the source code are ancillary to the design and are not the design</a:t>
             </a:r>
           </a:p>
           <a:p>
@@ -4237,11 +4205,7 @@
             </a:r>
             <a:r>
               <a:rPr lang="en-US" b="1" dirty="0" smtClean="0"/>
-              <a:t>The </a:t>
-            </a:r>
-            <a:r>
-              <a:rPr lang="en-US" b="1" dirty="0" smtClean="0"/>
-              <a:t>source code </a:t>
+              <a:t>The source code </a:t>
             </a:r>
             <a:r>
               <a:rPr lang="en-US" b="1" i="1" dirty="0" smtClean="0"/>
@@ -4401,11 +4365,7 @@
           <a:p>
             <a:r>
               <a:rPr lang="en-US" dirty="0" smtClean="0"/>
-              <a:t>Rigidity is the tendency for software to be difficult to change, even in simple ways. A design is rigid if a single change causes a cascade of subsequent changes in dependent modules. The more modules that must be changed, the more rigid the design</a:t>
-            </a:r>
-            <a:r>
-              <a:rPr lang="en-US" dirty="0" smtClean="0"/>
-              <a:t>.</a:t>
+              <a:t>Rigidity is the tendency for software to be difficult to change, even in simple ways. A design is rigid if a single change causes a cascade of subsequent changes in dependent modules. The more modules that must be changed, the more rigid the design.</a:t>
             </a:r>
           </a:p>
           <a:p>
@@ -4557,11 +4517,7 @@
           <a:p>
             <a:r>
               <a:rPr lang="en-US" dirty="0" smtClean="0"/>
-              <a:t>Fragility is the tendency of a program to break in many places when a single change is made. Often, the new problems are in areas that have no conceptual relationship with the area that was changed. Fixing those problems leads to even more problems, and the development team begins to resemble a dog chasing its tail</a:t>
-            </a:r>
-            <a:r>
-              <a:rPr lang="en-US" dirty="0" smtClean="0"/>
-              <a:t>.</a:t>
+              <a:t>Fragility is the tendency of a program to break in many places when a single change is made. Often, the new problems are in areas that have no conceptual relationship with the area that was changed. Fixing those problems leads to even more problems, and the development team begins to resemble a dog chasing its tail.</a:t>
             </a:r>
           </a:p>
           <a:p>
@@ -5096,13 +5052,8 @@
             </a:r>
             <a:r>
               <a:rPr lang="en-US" dirty="0" smtClean="0"/>
-              <a:t>ave committed the same </a:t>
-            </a:r>
-            <a:r>
-              <a:rPr lang="en-US" dirty="0" smtClean="0"/>
-              <a:t>kind of design mistakes </a:t>
-            </a:r>
-            <a:endParaRPr lang="en-US" dirty="0" smtClean="0"/>
+              <a:t>ave committed the same kind of design mistakes </a:t>
+            </a:r>
           </a:p>
           <a:p>
             <a:r>
@@ -5113,11 +5064,7 @@
           <a:p>
             <a:r>
               <a:rPr lang="en-US" dirty="0" smtClean="0"/>
-              <a:t>Some have </a:t>
-            </a:r>
-            <a:r>
-              <a:rPr lang="en-US" dirty="0" smtClean="0"/>
-              <a:t>specified some GUIDELINES</a:t>
+              <a:t>Some have specified some GUIDELINES</a:t>
             </a:r>
           </a:p>
           <a:p>
@@ -5837,11 +5784,7 @@
             </a:pPr>
             <a:r>
               <a:rPr lang="en-US" sz="2400" dirty="0" smtClean="0"/>
-              <a:t>Working Effectively with Legacy </a:t>
-            </a:r>
-            <a:r>
-              <a:rPr lang="en-US" sz="2400" dirty="0" smtClean="0"/>
-              <a:t>Code</a:t>
+              <a:t>Working Effectively with Legacy Code</a:t>
             </a:r>
           </a:p>
           <a:p>
@@ -6450,13 +6393,124 @@
         </p:spPr>
         <p:txBody>
           <a:bodyPr>
-            <a:normAutofit/>
+            <a:normAutofit fontScale="70000" lnSpcReduction="20000"/>
           </a:bodyPr>
           <a:lstStyle/>
           <a:p>
             <a:pPr>
               <a:buNone/>
             </a:pPr>
+            <a:r>
+              <a:rPr lang="en-US" dirty="0" smtClean="0"/>
+              <a:t>    	Why </a:t>
+            </a:r>
+            <a:r>
+              <a:rPr lang="en-US" dirty="0" smtClean="0"/>
+              <a:t>is it important to separate two responsibilities into </a:t>
+            </a:r>
+            <a:r>
+              <a:rPr lang="en-US" dirty="0" smtClean="0"/>
+              <a:t>separate classes</a:t>
+            </a:r>
+            <a:r>
+              <a:rPr lang="en-US" dirty="0" smtClean="0"/>
+              <a:t>?</a:t>
+            </a:r>
+          </a:p>
+          <a:p>
+            <a:pPr>
+              <a:buNone/>
+            </a:pPr>
+            <a:endParaRPr lang="en-US" dirty="0" smtClean="0"/>
+          </a:p>
+          <a:p>
+            <a:pPr>
+              <a:buNone/>
+            </a:pPr>
+            <a:r>
+              <a:rPr lang="en-US" dirty="0" smtClean="0"/>
+              <a:t>	</a:t>
+            </a:r>
+            <a:r>
+              <a:rPr lang="en-US" dirty="0" smtClean="0"/>
+              <a:t>Because </a:t>
+            </a:r>
+            <a:r>
+              <a:rPr lang="en-US" dirty="0" smtClean="0"/>
+              <a:t>each responsibility is an axis of change. When the requirements change, </a:t>
+            </a:r>
+            <a:r>
+              <a:rPr lang="en-US" dirty="0" smtClean="0"/>
+              <a:t>that change </a:t>
+            </a:r>
+            <a:r>
+              <a:rPr lang="en-US" dirty="0" smtClean="0"/>
+              <a:t>will be manifest through a change in responsibility amongst the classes. If a </a:t>
+            </a:r>
+            <a:r>
+              <a:rPr lang="en-US" dirty="0" smtClean="0"/>
+              <a:t>class assumes </a:t>
+            </a:r>
+            <a:r>
+              <a:rPr lang="en-US" dirty="0" smtClean="0"/>
+              <a:t>more than one responsibility, then there will be more than one reason for it </a:t>
+            </a:r>
+            <a:r>
+              <a:rPr lang="en-US" dirty="0" smtClean="0"/>
+              <a:t>to change</a:t>
+            </a:r>
+            <a:r>
+              <a:rPr lang="en-US" dirty="0" smtClean="0"/>
+              <a:t>.</a:t>
+            </a:r>
+          </a:p>
+          <a:p>
+            <a:pPr>
+              <a:buNone/>
+            </a:pPr>
+            <a:endParaRPr lang="en-US" dirty="0" smtClean="0"/>
+          </a:p>
+          <a:p>
+            <a:pPr>
+              <a:buNone/>
+            </a:pPr>
+            <a:r>
+              <a:rPr lang="en-US" dirty="0" smtClean="0"/>
+              <a:t>	If </a:t>
+            </a:r>
+            <a:r>
+              <a:rPr lang="en-US" dirty="0" smtClean="0"/>
+              <a:t>a class has more then one responsibility, then the responsibilities become coupled</a:t>
+            </a:r>
+            <a:r>
+              <a:rPr lang="en-US" dirty="0" smtClean="0"/>
+              <a:t>. Changes </a:t>
+            </a:r>
+            <a:r>
+              <a:rPr lang="en-US" dirty="0" smtClean="0"/>
+              <a:t>to one responsibility may impair or inhibit the class’ ability to meet the others</a:t>
+            </a:r>
+            <a:r>
+              <a:rPr lang="en-US" dirty="0" smtClean="0"/>
+              <a:t>. This </a:t>
+            </a:r>
+            <a:r>
+              <a:rPr lang="en-US" dirty="0" smtClean="0"/>
+              <a:t>kind of coupling leads to fragile designs that break in unexpected ways when</a:t>
+            </a:r>
+          </a:p>
+          <a:p>
+            <a:pPr>
+              <a:buNone/>
+            </a:pPr>
+            <a:r>
+              <a:rPr lang="en-US" dirty="0" smtClean="0"/>
+              <a:t>	changed</a:t>
+            </a:r>
+            <a:r>
+              <a:rPr lang="en-US" dirty="0" smtClean="0"/>
+              <a:t>.</a:t>
+            </a:r>
             <a:endParaRPr lang="en-US" dirty="0"/>
           </a:p>
         </p:txBody>
@@ -6477,6 +6531,167 @@
 </file>
 
 <file path=ppt/slides/slide34.xml><?xml version="1.0" encoding="utf-8"?>
+<p:sld xmlns:a="http://schemas.openxmlformats.org/drawingml/2006/main" xmlns:r="http://schemas.openxmlformats.org/officeDocument/2006/relationships" xmlns:p="http://schemas.openxmlformats.org/presentationml/2006/main">
+  <p:cSld>
+    <p:spTree>
+      <p:nvGrpSpPr>
+        <p:cNvPr id="1" name=""/>
+        <p:cNvGrpSpPr/>
+        <p:nvPr/>
+      </p:nvGrpSpPr>
+      <p:grpSpPr>
+        <a:xfrm>
+          <a:off x="0" y="0"/>
+          <a:ext cx="0" cy="0"/>
+          <a:chOff x="0" y="0"/>
+          <a:chExt cx="0" cy="0"/>
+        </a:xfrm>
+      </p:grpSpPr>
+      <p:sp>
+        <p:nvSpPr>
+          <p:cNvPr id="2" name="Title 1"/>
+          <p:cNvSpPr>
+            <a:spLocks noGrp="1"/>
+          </p:cNvSpPr>
+          <p:nvPr>
+            <p:ph type="title"/>
+          </p:nvPr>
+        </p:nvSpPr>
+        <p:spPr/>
+        <p:txBody>
+          <a:bodyPr/>
+          <a:lstStyle/>
+          <a:p>
+            <a:r>
+              <a:rPr lang="en-US" dirty="0" smtClean="0"/>
+              <a:t>SRP</a:t>
+            </a:r>
+            <a:endParaRPr lang="en-US" dirty="0"/>
+          </a:p>
+        </p:txBody>
+      </p:sp>
+      <p:sp>
+        <p:nvSpPr>
+          <p:cNvPr id="3" name="Content Placeholder 2"/>
+          <p:cNvSpPr>
+            <a:spLocks noGrp="1"/>
+          </p:cNvSpPr>
+          <p:nvPr>
+            <p:ph idx="1"/>
+          </p:nvPr>
+        </p:nvSpPr>
+        <p:spPr/>
+        <p:txBody>
+          <a:bodyPr>
+            <a:normAutofit fontScale="70000" lnSpcReduction="20000"/>
+          </a:bodyPr>
+          <a:lstStyle/>
+          <a:p>
+            <a:r>
+              <a:rPr lang="en-US" dirty="0" smtClean="0"/>
+              <a:t>Responsibility means a reason to change. Responsibility is an axis for change</a:t>
+            </a:r>
+            <a:r>
+              <a:rPr lang="en-US" dirty="0" smtClean="0"/>
+              <a:t>.</a:t>
+            </a:r>
+            <a:endParaRPr lang="en-US" dirty="0" smtClean="0"/>
+          </a:p>
+          <a:p>
+            <a:r>
+              <a:rPr lang="en-US" dirty="0" smtClean="0"/>
+              <a:t>Change in requirements are often the case</a:t>
+            </a:r>
+            <a:r>
+              <a:rPr lang="en-US" dirty="0" smtClean="0"/>
+              <a:t>.</a:t>
+            </a:r>
+            <a:endParaRPr lang="en-US" dirty="0" smtClean="0"/>
+          </a:p>
+          <a:p>
+            <a:r>
+              <a:rPr lang="en-US" dirty="0" smtClean="0"/>
+              <a:t>Following the Single Responsibility Principle can lead us to our goal of Strong Cohesion &amp; Loose Coupling</a:t>
+            </a:r>
+            <a:r>
+              <a:rPr lang="en-US" dirty="0" smtClean="0"/>
+              <a:t>.</a:t>
+            </a:r>
+            <a:endParaRPr lang="en-US" dirty="0" smtClean="0"/>
+          </a:p>
+          <a:p>
+            <a:r>
+              <a:rPr lang="en-US" dirty="0" smtClean="0"/>
+              <a:t>Many small classes with distinct responsibilities results in a more flexible design</a:t>
+            </a:r>
+            <a:r>
+              <a:rPr lang="en-US" dirty="0" smtClean="0"/>
+              <a:t>.</a:t>
+            </a:r>
+            <a:endParaRPr lang="en-US" dirty="0" smtClean="0"/>
+          </a:p>
+          <a:p>
+            <a:r>
+              <a:rPr lang="en-US" dirty="0" smtClean="0"/>
+              <a:t>The SRP is one of the simplest of the principle, and one of the hardest to get right. </a:t>
+            </a:r>
+          </a:p>
+          <a:p>
+            <a:r>
+              <a:rPr lang="en-US" dirty="0" smtClean="0"/>
+              <a:t>Conjoining responsibilities is something that we do naturally</a:t>
+            </a:r>
+            <a:r>
+              <a:rPr lang="en-US" dirty="0" smtClean="0"/>
+              <a:t>.</a:t>
+            </a:r>
+            <a:endParaRPr lang="en-US" dirty="0" smtClean="0"/>
+          </a:p>
+          <a:p>
+            <a:r>
+              <a:rPr lang="en-US" dirty="0" smtClean="0"/>
+              <a:t>Finding and separating those responsibilities from one another is much of what software design is really about</a:t>
+            </a:r>
+            <a:r>
+              <a:rPr lang="en-US" dirty="0" smtClean="0"/>
+              <a:t>.</a:t>
+            </a:r>
+            <a:endParaRPr lang="en-US" dirty="0" smtClean="0"/>
+          </a:p>
+          <a:p>
+            <a:r>
+              <a:rPr lang="en-US" dirty="0" smtClean="0"/>
+              <a:t>Multiple small </a:t>
+            </a:r>
+            <a:r>
+              <a:rPr lang="en-US" dirty="0" smtClean="0"/>
+              <a:t>interfaces </a:t>
+            </a:r>
+            <a:r>
+              <a:rPr lang="en-US" dirty="0" smtClean="0"/>
+              <a:t>that follow Interface Segregation Principle can help in </a:t>
+            </a:r>
+            <a:r>
+              <a:rPr lang="en-US" dirty="0" smtClean="0"/>
+              <a:t>achieving </a:t>
+            </a:r>
+            <a:r>
+              <a:rPr lang="en-US" dirty="0" smtClean="0"/>
+              <a:t>SRP.</a:t>
+            </a:r>
+            <a:endParaRPr lang="en-US" dirty="0"/>
+          </a:p>
+        </p:txBody>
+      </p:sp>
+    </p:spTree>
+  </p:cSld>
+  <p:clrMapOvr>
+    <a:masterClrMapping/>
+  </p:clrMapOvr>
+</p:sld>
+</file>
+
+<file path=ppt/slides/slide35.xml><?xml version="1.0" encoding="utf-8"?>
 <p:sld xmlns:a="http://schemas.openxmlformats.org/drawingml/2006/main" xmlns:r="http://schemas.openxmlformats.org/officeDocument/2006/relationships" xmlns:p="http://schemas.openxmlformats.org/presentationml/2006/main">
   <p:cSld>
     <p:spTree>
@@ -6543,99 +6758,6 @@
 </p:sld>
 </file>
 
-<file path=ppt/slides/slide35.xml><?xml version="1.0" encoding="utf-8"?>
-<p:sld xmlns:a="http://schemas.openxmlformats.org/drawingml/2006/main" xmlns:r="http://schemas.openxmlformats.org/officeDocument/2006/relationships" xmlns:p="http://schemas.openxmlformats.org/presentationml/2006/main">
-  <p:cSld>
-    <p:spTree>
-      <p:nvGrpSpPr>
-        <p:cNvPr id="1" name=""/>
-        <p:cNvGrpSpPr/>
-        <p:nvPr/>
-      </p:nvGrpSpPr>
-      <p:grpSpPr>
-        <a:xfrm>
-          <a:off x="0" y="0"/>
-          <a:ext cx="0" cy="0"/>
-          <a:chOff x="0" y="0"/>
-          <a:chExt cx="0" cy="0"/>
-        </a:xfrm>
-      </p:grpSpPr>
-      <p:sp>
-        <p:nvSpPr>
-          <p:cNvPr id="2" name="Title 1"/>
-          <p:cNvSpPr>
-            <a:spLocks noGrp="1"/>
-          </p:cNvSpPr>
-          <p:nvPr>
-            <p:ph type="title"/>
-          </p:nvPr>
-        </p:nvSpPr>
-        <p:spPr/>
-        <p:txBody>
-          <a:bodyPr/>
-          <a:lstStyle/>
-          <a:p>
-            <a:r>
-              <a:rPr lang="en-US" dirty="0" smtClean="0"/>
-              <a:t>Reflect on OCP</a:t>
-            </a:r>
-            <a:endParaRPr lang="en-US" dirty="0"/>
-          </a:p>
-        </p:txBody>
-      </p:sp>
-      <p:sp>
-        <p:nvSpPr>
-          <p:cNvPr id="3" name="Content Placeholder 2"/>
-          <p:cNvSpPr>
-            <a:spLocks noGrp="1"/>
-          </p:cNvSpPr>
-          <p:nvPr>
-            <p:ph idx="1"/>
-          </p:nvPr>
-        </p:nvSpPr>
-        <p:spPr/>
-        <p:txBody>
-          <a:bodyPr/>
-          <a:lstStyle/>
-          <a:p>
-            <a:pPr>
-              <a:buNone/>
-            </a:pPr>
-            <a:r>
-              <a:rPr lang="fr-FR" i="1" dirty="0" smtClean="0"/>
-              <a:t>	</a:t>
-            </a:r>
-          </a:p>
-          <a:p>
-            <a:pPr>
-              <a:buNone/>
-            </a:pPr>
-            <a:r>
-              <a:rPr lang="fr-FR" i="1" dirty="0" smtClean="0"/>
-              <a:t>   SOFTWARE ENTITIES (CLASSES, MODULES, FUNCTIONS, ETC.) </a:t>
-            </a:r>
-            <a:r>
-              <a:rPr lang="en-US" i="1" dirty="0" smtClean="0"/>
-              <a:t>SHOULD BE OPEN FOR EXTENSION, BUT CLOSED FOR MODIFICATION.</a:t>
-            </a:r>
-          </a:p>
-        </p:txBody>
-      </p:sp>
-    </p:spTree>
-  </p:cSld>
-  <p:clrMapOvr>
-    <a:masterClrMapping/>
-  </p:clrMapOvr>
-  <p:timing>
-    <p:tnLst>
-      <p:par>
-        <p:cTn id="1" dur="indefinite" restart="never" nodeType="tmRoot"/>
-      </p:par>
-    </p:tnLst>
-  </p:timing>
-</p:sld>
-</file>
-
 <file path=ppt/slides/slide36.xml><?xml version="1.0" encoding="utf-8"?>
 <p:sld xmlns:a="http://schemas.openxmlformats.org/drawingml/2006/main" xmlns:r="http://schemas.openxmlformats.org/officeDocument/2006/relationships" xmlns:p="http://schemas.openxmlformats.org/presentationml/2006/main">
   <p:cSld>
@@ -6670,7 +6792,7 @@
           <a:p>
             <a:r>
               <a:rPr lang="en-US" dirty="0" smtClean="0"/>
-              <a:t>OCP</a:t>
+              <a:t>Reflect on OCP</a:t>
             </a:r>
             <a:endParaRPr lang="en-US" dirty="0"/>
           </a:p>
@@ -6691,25 +6813,26 @@
           <a:bodyPr/>
           <a:lstStyle/>
           <a:p>
-            <a:endParaRPr lang="en-US" dirty="0" smtClean="0"/>
-          </a:p>
-          <a:p>
-            <a:r>
-              <a:rPr lang="en-US" dirty="0" smtClean="0"/>
-              <a:t>Open to Extension : New Behavior can be added in the future</a:t>
-            </a:r>
-          </a:p>
-          <a:p>
-            <a:endParaRPr lang="en-US" dirty="0" smtClean="0"/>
-          </a:p>
-          <a:p>
-            <a:r>
-              <a:rPr lang="en-US" dirty="0" smtClean="0"/>
-              <a:t>Closed to Modification: Changes to existing code is not required.</a:t>
-            </a:r>
-          </a:p>
-          <a:p>
-            <a:endParaRPr lang="en-US" dirty="0"/>
+            <a:pPr>
+              <a:buNone/>
+            </a:pPr>
+            <a:r>
+              <a:rPr lang="fr-FR" i="1" dirty="0" smtClean="0"/>
+              <a:t>	</a:t>
+            </a:r>
+          </a:p>
+          <a:p>
+            <a:pPr>
+              <a:buNone/>
+            </a:pPr>
+            <a:r>
+              <a:rPr lang="fr-FR" i="1" dirty="0" smtClean="0"/>
+              <a:t>   SOFTWARE ENTITIES (CLASSES, MODULES, FUNCTIONS, ETC.) </a:t>
+            </a:r>
+            <a:r>
+              <a:rPr lang="en-US" i="1" dirty="0" smtClean="0"/>
+              <a:t>SHOULD BE OPEN FOR EXTENSION, BUT CLOSED FOR MODIFICATION.</a:t>
+            </a:r>
           </a:p>
         </p:txBody>
       </p:sp>
@@ -6780,100 +6903,27 @@
         </p:nvSpPr>
         <p:spPr/>
         <p:txBody>
-          <a:bodyPr>
-            <a:normAutofit fontScale="70000" lnSpcReduction="20000"/>
-          </a:bodyPr>
-          <a:lstStyle/>
-          <a:p>
-            <a:r>
-              <a:rPr lang="en-US" dirty="0" smtClean="0"/>
-              <a:t>The OCP Principle was given by Bertrand Meyer</a:t>
-            </a:r>
-          </a:p>
-          <a:p>
-            <a:r>
-              <a:rPr lang="en-US" dirty="0" smtClean="0"/>
-              <a:t>OCP </a:t>
-            </a:r>
-            <a:r>
-              <a:rPr lang="en-US" dirty="0" smtClean="0"/>
-              <a:t>is at the heart of Object Oriented design</a:t>
-            </a:r>
-          </a:p>
-          <a:p>
-            <a:r>
-              <a:rPr lang="en-US" dirty="0" smtClean="0"/>
-              <a:t>Conformance </a:t>
-            </a:r>
-            <a:r>
-              <a:rPr lang="en-US" dirty="0" smtClean="0"/>
-              <a:t>to OCP yields the greatest benefits of OOD, reusability &amp; maintainability</a:t>
-            </a:r>
-          </a:p>
-          <a:p>
-            <a:r>
-              <a:rPr lang="en-US" dirty="0" smtClean="0"/>
-              <a:t>Key </a:t>
-            </a:r>
-            <a:r>
-              <a:rPr lang="en-US" dirty="0" smtClean="0"/>
-              <a:t>to OCP is programming to abstractions. </a:t>
-            </a:r>
-          </a:p>
-          <a:p>
-            <a:r>
-              <a:rPr lang="en-US" dirty="0" smtClean="0"/>
-              <a:t>Do </a:t>
-            </a:r>
-            <a:r>
-              <a:rPr lang="en-US" dirty="0" smtClean="0"/>
-              <a:t>not depend on implementations, depend on abstractions.</a:t>
-            </a:r>
-          </a:p>
-          <a:p>
-            <a:r>
-              <a:rPr lang="en-US" dirty="0" smtClean="0"/>
-              <a:t>100 </a:t>
-            </a:r>
-            <a:r>
-              <a:rPr lang="en-US" dirty="0" smtClean="0"/>
-              <a:t>% Conformance to OCP is not possible. There might be a requirement that may render our code not closed.</a:t>
-            </a:r>
-          </a:p>
-          <a:p>
-            <a:r>
-              <a:rPr lang="en-US" dirty="0" smtClean="0"/>
-              <a:t> </a:t>
-            </a:r>
-            <a:r>
-              <a:rPr lang="en-US" dirty="0" smtClean="0"/>
-              <a:t>Since closure cannot be complete, it should be strategic. </a:t>
-            </a:r>
-          </a:p>
-          <a:p>
-            <a:r>
-              <a:rPr lang="en-US" dirty="0" smtClean="0"/>
-              <a:t> </a:t>
-            </a:r>
-            <a:r>
-              <a:rPr lang="en-US" dirty="0" smtClean="0"/>
-              <a:t>Developer must choose what changes the code can be closed to.</a:t>
-            </a:r>
-          </a:p>
-          <a:p>
-            <a:r>
-              <a:rPr lang="en-US" dirty="0" smtClean="0"/>
-              <a:t>Experience </a:t>
-            </a:r>
-            <a:r>
-              <a:rPr lang="en-US" dirty="0" smtClean="0"/>
-              <a:t>would help a developer to make choices and design code for the most probable causes of change.</a:t>
-            </a:r>
-          </a:p>
-          <a:p>
-            <a:pPr>
-              <a:buNone/>
-            </a:pPr>
+          <a:bodyPr/>
+          <a:lstStyle/>
+          <a:p>
+            <a:endParaRPr lang="en-US" dirty="0" smtClean="0"/>
+          </a:p>
+          <a:p>
+            <a:r>
+              <a:rPr lang="en-US" dirty="0" smtClean="0"/>
+              <a:t>Open to Extension : New Behavior can be added in the future</a:t>
+            </a:r>
+          </a:p>
+          <a:p>
+            <a:endParaRPr lang="en-US" dirty="0" smtClean="0"/>
+          </a:p>
+          <a:p>
+            <a:r>
+              <a:rPr lang="en-US" dirty="0" smtClean="0"/>
+              <a:t>Closed to Modification: Changes to existing code is not required.</a:t>
+            </a:r>
+          </a:p>
+          <a:p>
             <a:endParaRPr lang="en-US" dirty="0"/>
           </a:p>
         </p:txBody>
@@ -6894,6 +6944,139 @@
 </file>
 
 <file path=ppt/slides/slide38.xml><?xml version="1.0" encoding="utf-8"?>
+<p:sld xmlns:a="http://schemas.openxmlformats.org/drawingml/2006/main" xmlns:r="http://schemas.openxmlformats.org/officeDocument/2006/relationships" xmlns:p="http://schemas.openxmlformats.org/presentationml/2006/main">
+  <p:cSld>
+    <p:spTree>
+      <p:nvGrpSpPr>
+        <p:cNvPr id="1" name=""/>
+        <p:cNvGrpSpPr/>
+        <p:nvPr/>
+      </p:nvGrpSpPr>
+      <p:grpSpPr>
+        <a:xfrm>
+          <a:off x="0" y="0"/>
+          <a:ext cx="0" cy="0"/>
+          <a:chOff x="0" y="0"/>
+          <a:chExt cx="0" cy="0"/>
+        </a:xfrm>
+      </p:grpSpPr>
+      <p:sp>
+        <p:nvSpPr>
+          <p:cNvPr id="2" name="Title 1"/>
+          <p:cNvSpPr>
+            <a:spLocks noGrp="1"/>
+          </p:cNvSpPr>
+          <p:nvPr>
+            <p:ph type="title"/>
+          </p:nvPr>
+        </p:nvSpPr>
+        <p:spPr/>
+        <p:txBody>
+          <a:bodyPr/>
+          <a:lstStyle/>
+          <a:p>
+            <a:r>
+              <a:rPr lang="en-US" dirty="0" smtClean="0"/>
+              <a:t>OCP</a:t>
+            </a:r>
+            <a:endParaRPr lang="en-US" dirty="0"/>
+          </a:p>
+        </p:txBody>
+      </p:sp>
+      <p:sp>
+        <p:nvSpPr>
+          <p:cNvPr id="3" name="Content Placeholder 2"/>
+          <p:cNvSpPr>
+            <a:spLocks noGrp="1"/>
+          </p:cNvSpPr>
+          <p:nvPr>
+            <p:ph idx="1"/>
+          </p:nvPr>
+        </p:nvSpPr>
+        <p:spPr/>
+        <p:txBody>
+          <a:bodyPr>
+            <a:normAutofit fontScale="70000" lnSpcReduction="20000"/>
+          </a:bodyPr>
+          <a:lstStyle/>
+          <a:p>
+            <a:r>
+              <a:rPr lang="en-US" dirty="0" smtClean="0"/>
+              <a:t>The OCP Principle was given by Bertrand Meyer</a:t>
+            </a:r>
+          </a:p>
+          <a:p>
+            <a:r>
+              <a:rPr lang="en-US" dirty="0" smtClean="0"/>
+              <a:t>OCP is at the heart of Object Oriented design</a:t>
+            </a:r>
+          </a:p>
+          <a:p>
+            <a:r>
+              <a:rPr lang="en-US" dirty="0" smtClean="0"/>
+              <a:t>Conformance to OCP yields the greatest benefits of OOD, reusability &amp; maintainability</a:t>
+            </a:r>
+          </a:p>
+          <a:p>
+            <a:r>
+              <a:rPr lang="en-US" dirty="0" smtClean="0"/>
+              <a:t>Key to OCP is programming to abstractions. </a:t>
+            </a:r>
+          </a:p>
+          <a:p>
+            <a:r>
+              <a:rPr lang="en-US" dirty="0" smtClean="0"/>
+              <a:t>Do not depend on implementations, depend on abstractions.</a:t>
+            </a:r>
+          </a:p>
+          <a:p>
+            <a:r>
+              <a:rPr lang="en-US" dirty="0" smtClean="0"/>
+              <a:t>100 % Conformance to OCP is not possible. There might be a requirement that may render our code not closed.</a:t>
+            </a:r>
+          </a:p>
+          <a:p>
+            <a:r>
+              <a:rPr lang="en-US" dirty="0" smtClean="0"/>
+              <a:t> Since closure cannot be complete, it should be strategic. </a:t>
+            </a:r>
+          </a:p>
+          <a:p>
+            <a:r>
+              <a:rPr lang="en-US" dirty="0" smtClean="0"/>
+              <a:t> Developer must choose what changes the code can be closed to.</a:t>
+            </a:r>
+          </a:p>
+          <a:p>
+            <a:r>
+              <a:rPr lang="en-US" dirty="0" smtClean="0"/>
+              <a:t>Experience would help a developer to make choices and design code for the most probable causes of change.</a:t>
+            </a:r>
+          </a:p>
+          <a:p>
+            <a:pPr>
+              <a:buNone/>
+            </a:pPr>
+            <a:endParaRPr lang="en-US" dirty="0"/>
+          </a:p>
+        </p:txBody>
+      </p:sp>
+    </p:spTree>
+  </p:cSld>
+  <p:clrMapOvr>
+    <a:masterClrMapping/>
+  </p:clrMapOvr>
+  <p:timing>
+    <p:tnLst>
+      <p:par>
+        <p:cTn id="1" dur="indefinite" restart="never" nodeType="tmRoot"/>
+      </p:par>
+    </p:tnLst>
+  </p:timing>
+</p:sld>
+</file>
+
+<file path=ppt/slides/slide39.xml><?xml version="1.0" encoding="utf-8"?>
 <p:sld xmlns:a="http://schemas.openxmlformats.org/drawingml/2006/main" xmlns:r="http://schemas.openxmlformats.org/officeDocument/2006/relationships" xmlns:p="http://schemas.openxmlformats.org/presentationml/2006/main">
   <p:cSld>
     <p:spTree>
@@ -6960,104 +7143,6 @@
 </p:sld>
 </file>
 
-<file path=ppt/slides/slide39.xml><?xml version="1.0" encoding="utf-8"?>
-<p:sld xmlns:a="http://schemas.openxmlformats.org/drawingml/2006/main" xmlns:r="http://schemas.openxmlformats.org/officeDocument/2006/relationships" xmlns:p="http://schemas.openxmlformats.org/presentationml/2006/main">
-  <p:cSld>
-    <p:spTree>
-      <p:nvGrpSpPr>
-        <p:cNvPr id="1" name=""/>
-        <p:cNvGrpSpPr/>
-        <p:nvPr/>
-      </p:nvGrpSpPr>
-      <p:grpSpPr>
-        <a:xfrm>
-          <a:off x="0" y="0"/>
-          <a:ext cx="0" cy="0"/>
-          <a:chOff x="0" y="0"/>
-          <a:chExt cx="0" cy="0"/>
-        </a:xfrm>
-      </p:grpSpPr>
-      <p:sp>
-        <p:nvSpPr>
-          <p:cNvPr id="2" name="Title 1"/>
-          <p:cNvSpPr>
-            <a:spLocks noGrp="1"/>
-          </p:cNvSpPr>
-          <p:nvPr>
-            <p:ph type="title"/>
-          </p:nvPr>
-        </p:nvSpPr>
-        <p:spPr/>
-        <p:txBody>
-          <a:bodyPr/>
-          <a:lstStyle/>
-          <a:p>
-            <a:r>
-              <a:rPr lang="en-US" dirty="0" smtClean="0"/>
-              <a:t>Reflect on LSP</a:t>
-            </a:r>
-            <a:endParaRPr lang="en-US" dirty="0"/>
-          </a:p>
-        </p:txBody>
-      </p:sp>
-      <p:sp>
-        <p:nvSpPr>
-          <p:cNvPr id="3" name="Content Placeholder 2"/>
-          <p:cNvSpPr>
-            <a:spLocks noGrp="1"/>
-          </p:cNvSpPr>
-          <p:nvPr>
-            <p:ph idx="1"/>
-          </p:nvPr>
-        </p:nvSpPr>
-        <p:spPr/>
-        <p:txBody>
-          <a:bodyPr/>
-          <a:lstStyle/>
-          <a:p>
-            <a:pPr>
-              <a:buNone/>
-            </a:pPr>
-            <a:r>
-              <a:rPr lang="en-US" i="1" dirty="0" smtClean="0"/>
-              <a:t>    FUNCTIONS </a:t>
-            </a:r>
-            <a:r>
-              <a:rPr lang="en-US" i="1" dirty="0" smtClean="0"/>
-              <a:t>THAT USE POINTERS OR REFERENCES TO BASE CLASSES MUST BE ABLE TO USE OBJECTS OF DERIVED CLASSES</a:t>
-            </a:r>
-          </a:p>
-          <a:p>
-            <a:pPr>
-              <a:buNone/>
-            </a:pPr>
-            <a:r>
-              <a:rPr lang="en-US" i="1" dirty="0" smtClean="0"/>
-              <a:t>    WITHOUT </a:t>
-            </a:r>
-            <a:r>
-              <a:rPr lang="en-US" i="1" dirty="0" smtClean="0"/>
-              <a:t>KNOWING IT.</a:t>
-            </a:r>
-            <a:endParaRPr lang="en-US" i="1" dirty="0"/>
-          </a:p>
-        </p:txBody>
-      </p:sp>
-    </p:spTree>
-  </p:cSld>
-  <p:clrMapOvr>
-    <a:masterClrMapping/>
-  </p:clrMapOvr>
-  <p:timing>
-    <p:tnLst>
-      <p:par>
-        <p:cTn id="1" dur="indefinite" restart="never" nodeType="tmRoot"/>
-      </p:par>
-    </p:tnLst>
-  </p:timing>
-</p:sld>
-</file>
-
 <file path=ppt/slides/slide4.xml><?xml version="1.0" encoding="utf-8"?>
 <p:sld xmlns:a="http://schemas.openxmlformats.org/drawingml/2006/main" xmlns:r="http://schemas.openxmlformats.org/officeDocument/2006/relationships" xmlns:p="http://schemas.openxmlformats.org/presentationml/2006/main">
   <p:cSld>
@@ -7212,7 +7297,7 @@
           <a:p>
             <a:r>
               <a:rPr lang="en-US" dirty="0" smtClean="0"/>
-              <a:t>LSP</a:t>
+              <a:t>Reflect on LSP</a:t>
             </a:r>
             <a:endParaRPr lang="en-US" dirty="0"/>
           </a:p>
@@ -7230,29 +7315,15 @@
         </p:nvSpPr>
         <p:spPr/>
         <p:txBody>
-          <a:bodyPr>
-            <a:normAutofit/>
-          </a:bodyPr>
+          <a:bodyPr/>
           <a:lstStyle/>
           <a:p>
             <a:pPr>
               <a:buNone/>
             </a:pPr>
             <a:r>
-              <a:rPr lang="en-US" sz="2400" dirty="0" smtClean="0"/>
-              <a:t>The above is a paraphrase of the </a:t>
-            </a:r>
-            <a:r>
-              <a:rPr lang="en-US" sz="2400" dirty="0" err="1" smtClean="0"/>
-              <a:t>Liskov</a:t>
-            </a:r>
-            <a:r>
-              <a:rPr lang="en-US" sz="2400" dirty="0" smtClean="0"/>
-              <a:t> Substitution </a:t>
-            </a:r>
-            <a:r>
-              <a:rPr lang="en-US" sz="2400" dirty="0" smtClean="0"/>
-              <a:t>Principle</a:t>
+              <a:rPr lang="en-US" i="1" dirty="0" smtClean="0"/>
+              <a:t>    FUNCTIONS THAT USE POINTERS OR REFERENCES TO BASE CLASSES MUST BE ABLE TO USE OBJECTS OF DERIVED CLASSES</a:t>
             </a:r>
           </a:p>
           <a:p>
@@ -7260,61 +7331,10 @@
               <a:buNone/>
             </a:pPr>
             <a:r>
-              <a:rPr lang="en-US" dirty="0" smtClean="0"/>
-              <a:t>Barbara </a:t>
-            </a:r>
-            <a:r>
-              <a:rPr lang="en-US" dirty="0" err="1" smtClean="0"/>
-              <a:t>Liskov</a:t>
-            </a:r>
-            <a:r>
-              <a:rPr lang="en-US" dirty="0" smtClean="0"/>
-              <a:t> first wrote it as follows :</a:t>
-            </a:r>
-          </a:p>
-          <a:p>
-            <a:pPr>
-              <a:buNone/>
-            </a:pPr>
-            <a:r>
-              <a:rPr lang="en-US" dirty="0" smtClean="0"/>
-              <a:t>    If  </a:t>
-            </a:r>
-            <a:r>
-              <a:rPr lang="en-US" dirty="0" smtClean="0"/>
-              <a:t>for each object o1 of type S there is an </a:t>
-            </a:r>
-            <a:r>
-              <a:rPr lang="en-US" dirty="0" smtClean="0"/>
-              <a:t>object o2 </a:t>
-            </a:r>
-            <a:r>
-              <a:rPr lang="en-US" dirty="0" smtClean="0"/>
-              <a:t>of type T such that for </a:t>
-            </a:r>
-            <a:r>
-              <a:rPr lang="en-US" dirty="0" smtClean="0"/>
-              <a:t>all programs </a:t>
-            </a:r>
-            <a:r>
-              <a:rPr lang="en-US" dirty="0" smtClean="0"/>
-              <a:t>P defined in terms of T, the behavior of P is unchanged when o1 </a:t>
-            </a:r>
-            <a:r>
-              <a:rPr lang="en-US" dirty="0" smtClean="0"/>
-              <a:t>is substituted </a:t>
-            </a:r>
-            <a:r>
-              <a:rPr lang="en-US" dirty="0" smtClean="0"/>
-              <a:t>for o2 then S is a subtype of T.</a:t>
-            </a:r>
-            <a:endParaRPr lang="en-US" dirty="0" smtClean="0"/>
-          </a:p>
-          <a:p>
-            <a:pPr>
-              <a:buNone/>
-            </a:pPr>
-            <a:endParaRPr lang="en-US" dirty="0"/>
+              <a:rPr lang="en-US" i="1" dirty="0" smtClean="0"/>
+              <a:t>    WITHOUT KNOWING IT.</a:t>
+            </a:r>
+            <a:endParaRPr lang="en-US" i="1" dirty="0"/>
           </a:p>
         </p:txBody>
       </p:sp>
@@ -7386,103 +7406,56 @@
         <p:spPr/>
         <p:txBody>
           <a:bodyPr>
-            <a:normAutofit fontScale="77500" lnSpcReduction="20000"/>
+            <a:normAutofit/>
           </a:bodyPr>
           <a:lstStyle/>
-          <a:p>
-            <a:r>
-              <a:rPr lang="en-US" dirty="0" smtClean="0"/>
-              <a:t>Named </a:t>
-            </a:r>
-            <a:r>
-              <a:rPr lang="en-US" dirty="0" smtClean="0"/>
-              <a:t>after Barbara </a:t>
-            </a:r>
-            <a:r>
-              <a:rPr lang="en-US" dirty="0" err="1" smtClean="0"/>
-              <a:t>Liskov</a:t>
-            </a:r>
-            <a:r>
-              <a:rPr lang="en-US" dirty="0" smtClean="0"/>
-              <a:t>, who gave the principle in 1988</a:t>
-            </a:r>
-            <a:r>
-              <a:rPr lang="en-US" dirty="0" smtClean="0"/>
-              <a:t>.</a:t>
-            </a:r>
-            <a:endParaRPr lang="en-US" dirty="0" smtClean="0"/>
-          </a:p>
-          <a:p>
-            <a:r>
-              <a:rPr lang="en-US" dirty="0" smtClean="0"/>
-              <a:t>Substitutability</a:t>
-            </a:r>
-            <a:endParaRPr lang="en-US" dirty="0" smtClean="0"/>
-          </a:p>
-          <a:p>
-            <a:r>
-              <a:rPr lang="en-US" dirty="0" smtClean="0"/>
-              <a:t>Calling code must not know the difference between a derived type and a base type</a:t>
-            </a:r>
-            <a:r>
-              <a:rPr lang="en-US" dirty="0" smtClean="0"/>
-              <a:t>.</a:t>
-            </a:r>
-          </a:p>
-          <a:p>
-            <a:r>
-              <a:rPr lang="en-US" dirty="0" smtClean="0"/>
-              <a:t>Sub-types must be substitutable for their base types</a:t>
-            </a:r>
-            <a:r>
-              <a:rPr lang="en-US" dirty="0" smtClean="0"/>
-              <a:t>.</a:t>
-            </a:r>
-            <a:endParaRPr lang="en-US" dirty="0" smtClean="0"/>
-          </a:p>
-          <a:p>
-            <a:r>
-              <a:rPr lang="en-US" dirty="0" smtClean="0"/>
-              <a:t>Child classes should not remove base class behavior</a:t>
-            </a:r>
-            <a:r>
-              <a:rPr lang="en-US" dirty="0" smtClean="0"/>
-              <a:t>.</a:t>
-            </a:r>
-            <a:endParaRPr lang="en-US" dirty="0" smtClean="0"/>
-          </a:p>
-          <a:p>
-            <a:r>
-              <a:rPr lang="en-US" dirty="0" smtClean="0"/>
-              <a:t>Native OOP: "IS-A" relationship </a:t>
-            </a:r>
-          </a:p>
-          <a:p>
-            <a:r>
-              <a:rPr lang="en-US" dirty="0" smtClean="0"/>
-              <a:t>LSP : "IS-SUBSTITUTABLE=FOR</a:t>
-            </a:r>
-            <a:r>
-              <a:rPr lang="en-US" dirty="0" smtClean="0"/>
-              <a:t>“</a:t>
-            </a:r>
-          </a:p>
           <a:p>
             <a:pPr>
               <a:buNone/>
             </a:pPr>
-            <a:endParaRPr lang="en-US" b="1" dirty="0" smtClean="0"/>
-          </a:p>
-          <a:p>
-            <a:r>
-              <a:rPr lang="en-US" b="1" dirty="0" smtClean="0"/>
-              <a:t>LSP surfaces the undesired behavior problems in subtypes caused due to inheritance</a:t>
-            </a:r>
-          </a:p>
-          <a:p>
-            <a:endParaRPr lang="en-US" b="1" dirty="0" smtClean="0"/>
-          </a:p>
-          <a:p>
+            <a:r>
+              <a:rPr lang="en-US" sz="2400" dirty="0" smtClean="0"/>
+              <a:t>The above is a paraphrase of the </a:t>
+            </a:r>
+            <a:r>
+              <a:rPr lang="en-US" sz="2400" dirty="0" err="1" smtClean="0"/>
+              <a:t>Liskov</a:t>
+            </a:r>
+            <a:r>
+              <a:rPr lang="en-US" sz="2400" dirty="0" smtClean="0"/>
+              <a:t> Substitution Principle</a:t>
+            </a:r>
+          </a:p>
+          <a:p>
+            <a:pPr>
+              <a:buNone/>
+            </a:pPr>
+            <a:r>
+              <a:rPr lang="en-US" dirty="0" smtClean="0"/>
+              <a:t>Barbara </a:t>
+            </a:r>
+            <a:r>
+              <a:rPr lang="en-US" dirty="0" err="1" smtClean="0"/>
+              <a:t>Liskov</a:t>
+            </a:r>
+            <a:r>
+              <a:rPr lang="en-US" dirty="0" smtClean="0"/>
+              <a:t> first wrote it as follows :</a:t>
+            </a:r>
+          </a:p>
+          <a:p>
+            <a:pPr>
+              <a:buNone/>
+            </a:pPr>
+            <a:r>
+              <a:rPr lang="en-US" dirty="0" smtClean="0"/>
+              <a:t>    If  for each object o1 of type S there is an object o2 of type T such that for all programs P defined in terms of T, the behavior of P is unchanged when o1 is substituted for o2 then S is a subtype of T.</a:t>
+            </a:r>
+          </a:p>
+          <a:p>
+            <a:pPr>
+              <a:buNone/>
+            </a:pPr>
             <a:endParaRPr lang="en-US" dirty="0"/>
           </a:p>
         </p:txBody>
@@ -7503,6 +7476,147 @@
 </file>
 
 <file path=ppt/slides/slide42.xml><?xml version="1.0" encoding="utf-8"?>
+<p:sld xmlns:a="http://schemas.openxmlformats.org/drawingml/2006/main" xmlns:r="http://schemas.openxmlformats.org/officeDocument/2006/relationships" xmlns:p="http://schemas.openxmlformats.org/presentationml/2006/main">
+  <p:cSld>
+    <p:spTree>
+      <p:nvGrpSpPr>
+        <p:cNvPr id="1" name=""/>
+        <p:cNvGrpSpPr/>
+        <p:nvPr/>
+      </p:nvGrpSpPr>
+      <p:grpSpPr>
+        <a:xfrm>
+          <a:off x="0" y="0"/>
+          <a:ext cx="0" cy="0"/>
+          <a:chOff x="0" y="0"/>
+          <a:chExt cx="0" cy="0"/>
+        </a:xfrm>
+      </p:grpSpPr>
+      <p:sp>
+        <p:nvSpPr>
+          <p:cNvPr id="2" name="Title 1"/>
+          <p:cNvSpPr>
+            <a:spLocks noGrp="1"/>
+          </p:cNvSpPr>
+          <p:nvPr>
+            <p:ph type="title"/>
+          </p:nvPr>
+        </p:nvSpPr>
+        <p:spPr/>
+        <p:txBody>
+          <a:bodyPr/>
+          <a:lstStyle/>
+          <a:p>
+            <a:r>
+              <a:rPr lang="en-US" dirty="0" smtClean="0"/>
+              <a:t>LSP</a:t>
+            </a:r>
+            <a:endParaRPr lang="en-US" dirty="0"/>
+          </a:p>
+        </p:txBody>
+      </p:sp>
+      <p:sp>
+        <p:nvSpPr>
+          <p:cNvPr id="3" name="Content Placeholder 2"/>
+          <p:cNvSpPr>
+            <a:spLocks noGrp="1"/>
+          </p:cNvSpPr>
+          <p:nvPr>
+            <p:ph idx="1"/>
+          </p:nvPr>
+        </p:nvSpPr>
+        <p:spPr/>
+        <p:txBody>
+          <a:bodyPr>
+            <a:normAutofit fontScale="77500" lnSpcReduction="20000"/>
+          </a:bodyPr>
+          <a:lstStyle/>
+          <a:p>
+            <a:r>
+              <a:rPr lang="en-US" dirty="0" smtClean="0"/>
+              <a:t>Named after Barbara </a:t>
+            </a:r>
+            <a:r>
+              <a:rPr lang="en-US" dirty="0" err="1" smtClean="0"/>
+              <a:t>Liskov</a:t>
+            </a:r>
+            <a:r>
+              <a:rPr lang="en-US" dirty="0" smtClean="0"/>
+              <a:t>, who gave the principle in 1988.</a:t>
+            </a:r>
+          </a:p>
+          <a:p>
+            <a:r>
+              <a:rPr lang="en-US" dirty="0" smtClean="0"/>
+              <a:t>Substitutability</a:t>
+            </a:r>
+          </a:p>
+          <a:p>
+            <a:r>
+              <a:rPr lang="en-US" dirty="0" smtClean="0"/>
+              <a:t>Calling code must not know the difference between a derived type and a base type.</a:t>
+            </a:r>
+          </a:p>
+          <a:p>
+            <a:r>
+              <a:rPr lang="en-US" dirty="0" smtClean="0"/>
+              <a:t>Sub-types must be substitutable for their base types.</a:t>
+            </a:r>
+          </a:p>
+          <a:p>
+            <a:r>
+              <a:rPr lang="en-US" dirty="0" smtClean="0"/>
+              <a:t>Child classes should not remove base class behavior.</a:t>
+            </a:r>
+          </a:p>
+          <a:p>
+            <a:r>
+              <a:rPr lang="en-US" dirty="0" smtClean="0"/>
+              <a:t>Native OOP: "IS-A" relationship </a:t>
+            </a:r>
+          </a:p>
+          <a:p>
+            <a:r>
+              <a:rPr lang="en-US" dirty="0" smtClean="0"/>
+              <a:t>LSP : "IS-SUBSTITUTABLE=FOR“</a:t>
+            </a:r>
+          </a:p>
+          <a:p>
+            <a:pPr>
+              <a:buNone/>
+            </a:pPr>
+            <a:endParaRPr lang="en-US" b="1" dirty="0" smtClean="0"/>
+          </a:p>
+          <a:p>
+            <a:r>
+              <a:rPr lang="en-US" b="1" dirty="0" smtClean="0"/>
+              <a:t>LSP surfaces the undesired behavior problems in subtypes caused due to inheritance</a:t>
+            </a:r>
+          </a:p>
+          <a:p>
+            <a:endParaRPr lang="en-US" b="1" dirty="0" smtClean="0"/>
+          </a:p>
+          <a:p>
+            <a:endParaRPr lang="en-US" dirty="0"/>
+          </a:p>
+        </p:txBody>
+      </p:sp>
+    </p:spTree>
+  </p:cSld>
+  <p:clrMapOvr>
+    <a:masterClrMapping/>
+  </p:clrMapOvr>
+  <p:timing>
+    <p:tnLst>
+      <p:par>
+        <p:cTn id="1" dur="indefinite" restart="never" nodeType="tmRoot"/>
+      </p:par>
+    </p:tnLst>
+  </p:timing>
+</p:sld>
+</file>
+
+<file path=ppt/slides/slide43.xml><?xml version="1.0" encoding="utf-8"?>
 <p:sld xmlns:a="http://schemas.openxmlformats.org/drawingml/2006/main" xmlns:r="http://schemas.openxmlformats.org/officeDocument/2006/relationships" xmlns:p="http://schemas.openxmlformats.org/presentationml/2006/main">
   <p:cSld>
     <p:spTree>
@@ -7569,108 +7683,6 @@
 </p:sld>
 </file>
 
-<file path=ppt/slides/slide43.xml><?xml version="1.0" encoding="utf-8"?>
-<p:sld xmlns:a="http://schemas.openxmlformats.org/drawingml/2006/main" xmlns:r="http://schemas.openxmlformats.org/officeDocument/2006/relationships" xmlns:p="http://schemas.openxmlformats.org/presentationml/2006/main">
-  <p:cSld>
-    <p:spTree>
-      <p:nvGrpSpPr>
-        <p:cNvPr id="1" name=""/>
-        <p:cNvGrpSpPr/>
-        <p:nvPr/>
-      </p:nvGrpSpPr>
-      <p:grpSpPr>
-        <a:xfrm>
-          <a:off x="0" y="0"/>
-          <a:ext cx="0" cy="0"/>
-          <a:chOff x="0" y="0"/>
-          <a:chExt cx="0" cy="0"/>
-        </a:xfrm>
-      </p:grpSpPr>
-      <p:sp>
-        <p:nvSpPr>
-          <p:cNvPr id="2" name="Title 1"/>
-          <p:cNvSpPr>
-            <a:spLocks noGrp="1"/>
-          </p:cNvSpPr>
-          <p:nvPr>
-            <p:ph type="title"/>
-          </p:nvPr>
-        </p:nvSpPr>
-        <p:spPr/>
-        <p:txBody>
-          <a:bodyPr/>
-          <a:lstStyle/>
-          <a:p>
-            <a:r>
-              <a:rPr lang="en-US" dirty="0" smtClean="0"/>
-              <a:t>Reflect on ISP</a:t>
-            </a:r>
-            <a:endParaRPr lang="en-US" dirty="0"/>
-          </a:p>
-        </p:txBody>
-      </p:sp>
-      <p:sp>
-        <p:nvSpPr>
-          <p:cNvPr id="3" name="Content Placeholder 2"/>
-          <p:cNvSpPr>
-            <a:spLocks noGrp="1"/>
-          </p:cNvSpPr>
-          <p:nvPr>
-            <p:ph idx="1"/>
-          </p:nvPr>
-        </p:nvSpPr>
-        <p:spPr/>
-        <p:txBody>
-          <a:bodyPr/>
-          <a:lstStyle/>
-          <a:p>
-            <a:pPr>
-              <a:buNone/>
-            </a:pPr>
-            <a:r>
-              <a:rPr lang="en-US" dirty="0" smtClean="0"/>
-              <a:t>	</a:t>
-            </a:r>
-            <a:r>
-              <a:rPr lang="en-US" i="1" dirty="0" smtClean="0"/>
-              <a:t>CLIENTS </a:t>
-            </a:r>
-            <a:r>
-              <a:rPr lang="en-US" i="1" dirty="0" smtClean="0"/>
-              <a:t>SHOULD NOT BE FORCED TO </a:t>
-            </a:r>
-            <a:r>
-              <a:rPr lang="en-US" i="1" dirty="0" smtClean="0"/>
-              <a:t>DEPEND UPON </a:t>
-            </a:r>
-            <a:r>
-              <a:rPr lang="en-US" i="1" dirty="0" smtClean="0"/>
-              <a:t>INTERFACES THAT THEY DO NOT USE.</a:t>
-            </a:r>
-          </a:p>
-          <a:p>
-            <a:pPr>
-              <a:buNone/>
-            </a:pPr>
-            <a:endParaRPr lang="en-US" dirty="0"/>
-          </a:p>
-        </p:txBody>
-      </p:sp>
-    </p:spTree>
-  </p:cSld>
-  <p:clrMapOvr>
-    <a:masterClrMapping/>
-  </p:clrMapOvr>
-  <p:timing>
-    <p:tnLst>
-      <p:par>
-        <p:cTn id="1" dur="indefinite" restart="never" nodeType="tmRoot"/>
-      </p:par>
-    </p:tnLst>
-  </p:timing>
-</p:sld>
-</file>
-
 <file path=ppt/slides/slide44.xml><?xml version="1.0" encoding="utf-8"?>
 <p:sld xmlns:a="http://schemas.openxmlformats.org/drawingml/2006/main" xmlns:r="http://schemas.openxmlformats.org/officeDocument/2006/relationships" xmlns:p="http://schemas.openxmlformats.org/presentationml/2006/main">
   <p:cSld>
@@ -7705,7 +7717,7 @@
           <a:p>
             <a:r>
               <a:rPr lang="en-US" dirty="0" smtClean="0"/>
-              <a:t>ISP</a:t>
+              <a:t>Reflect on ISP</a:t>
             </a:r>
             <a:endParaRPr lang="en-US" dirty="0"/>
           </a:p>
@@ -7723,117 +7735,35 @@
         </p:nvSpPr>
         <p:spPr/>
         <p:txBody>
-          <a:bodyPr>
-            <a:normAutofit fontScale="70000" lnSpcReduction="20000"/>
-          </a:bodyPr>
-          <a:lstStyle/>
-          <a:p>
-            <a:r>
-              <a:rPr lang="en-US" dirty="0" smtClean="0"/>
-              <a:t>Fat/Polluted interfaces</a:t>
-            </a:r>
-          </a:p>
-          <a:p>
-            <a:r>
-              <a:rPr lang="en-US" dirty="0" smtClean="0"/>
-              <a:t>Classes </a:t>
-            </a:r>
-            <a:r>
-              <a:rPr lang="en-US" dirty="0" smtClean="0"/>
-              <a:t>that have “fat” interfaces are classes whose interfaces are not cohesive</a:t>
-            </a:r>
-            <a:r>
-              <a:rPr lang="en-US" dirty="0" smtClean="0"/>
-              <a:t>.</a:t>
-            </a:r>
-            <a:endParaRPr lang="en-US" dirty="0" smtClean="0"/>
-          </a:p>
-          <a:p>
-            <a:r>
-              <a:rPr lang="en-US" dirty="0" smtClean="0"/>
-              <a:t>Let the client drive the interface</a:t>
-            </a:r>
-            <a:r>
-              <a:rPr lang="en-US" dirty="0" smtClean="0"/>
-              <a:t>.</a:t>
-            </a:r>
-            <a:endParaRPr lang="en-US" dirty="0" smtClean="0"/>
-          </a:p>
-          <a:p>
-            <a:r>
-              <a:rPr lang="en-US" dirty="0" smtClean="0"/>
-              <a:t>In other words, the interfaces of the class can be broken up into groups of member functions. </a:t>
-            </a:r>
-            <a:r>
-              <a:rPr lang="en-US" dirty="0" smtClean="0"/>
-              <a:t>Each group </a:t>
-            </a:r>
-            <a:r>
-              <a:rPr lang="en-US" dirty="0" smtClean="0"/>
-              <a:t>serves a different set of clients. </a:t>
-            </a:r>
-            <a:r>
-              <a:rPr lang="en-US" dirty="0" smtClean="0"/>
-              <a:t> Thus </a:t>
-            </a:r>
-            <a:r>
-              <a:rPr lang="en-US" dirty="0" smtClean="0"/>
-              <a:t>some clients use one group of member </a:t>
-            </a:r>
-            <a:r>
-              <a:rPr lang="en-US" dirty="0" smtClean="0"/>
-              <a:t>functions, and </a:t>
-            </a:r>
-            <a:r>
-              <a:rPr lang="en-US" dirty="0" smtClean="0"/>
-              <a:t>other clients use the other groups</a:t>
-            </a:r>
-            <a:r>
-              <a:rPr lang="en-US" dirty="0" smtClean="0"/>
-              <a:t>.</a:t>
-            </a:r>
-            <a:endParaRPr lang="en-US" dirty="0" smtClean="0"/>
-          </a:p>
-          <a:p>
-            <a:r>
-              <a:rPr lang="en-US" dirty="0" smtClean="0"/>
-              <a:t>The ISP acknowledges that there are objects that require non-cohesive interfaces</a:t>
-            </a:r>
-            <a:r>
-              <a:rPr lang="en-US" dirty="0" smtClean="0"/>
-              <a:t>;  however </a:t>
-            </a:r>
-            <a:r>
-              <a:rPr lang="en-US" dirty="0" smtClean="0"/>
-              <a:t>it suggests that clients should not know about them as a single class. </a:t>
-            </a:r>
-            <a:r>
-              <a:rPr lang="en-US" dirty="0" smtClean="0"/>
-              <a:t> Instead</a:t>
-            </a:r>
-            <a:r>
-              <a:rPr lang="en-US" dirty="0" smtClean="0"/>
-              <a:t>, </a:t>
-            </a:r>
-            <a:r>
-              <a:rPr lang="en-US" dirty="0" smtClean="0"/>
-              <a:t>clients should </a:t>
-            </a:r>
-            <a:r>
-              <a:rPr lang="en-US" dirty="0" smtClean="0"/>
-              <a:t>know about abstract base classes that have cohesive interfaces. </a:t>
-            </a:r>
-            <a:endParaRPr lang="en-US" dirty="0" smtClean="0"/>
-          </a:p>
-          <a:p>
-            <a:r>
-              <a:rPr lang="en-US" dirty="0" smtClean="0"/>
-              <a:t>Some languages refer </a:t>
-            </a:r>
-            <a:r>
-              <a:rPr lang="en-US" dirty="0" smtClean="0"/>
-              <a:t>to these abstract base classes as “interfaces”, “protocols” or “signatures”.</a:t>
-            </a:r>
+          <a:bodyPr/>
+          <a:lstStyle/>
+          <a:p>
+            <a:pPr>
+              <a:buNone/>
+            </a:pPr>
+            <a:r>
+              <a:rPr lang="en-US" dirty="0" smtClean="0"/>
+              <a:t>	</a:t>
+            </a:r>
+            <a:endParaRPr lang="en-US" i="1" dirty="0" smtClean="0"/>
+          </a:p>
+          <a:p>
+            <a:pPr>
+              <a:buNone/>
+            </a:pPr>
+            <a:r>
+              <a:rPr lang="en-US" i="1" dirty="0" smtClean="0"/>
+              <a:t>	CLIENTS </a:t>
+            </a:r>
+            <a:r>
+              <a:rPr lang="en-US" i="1" dirty="0" smtClean="0"/>
+              <a:t>SHOULD NOT BE FORCED TO DEPEND UPON INTERFACES THAT THEY DO NOT USE.</a:t>
+            </a:r>
+          </a:p>
+          <a:p>
+            <a:pPr>
+              <a:buNone/>
+            </a:pPr>
             <a:endParaRPr lang="en-US" dirty="0"/>
           </a:p>
         </p:txBody>
@@ -7854,6 +7784,116 @@
 </file>
 
 <file path=ppt/slides/slide45.xml><?xml version="1.0" encoding="utf-8"?>
+<p:sld xmlns:a="http://schemas.openxmlformats.org/drawingml/2006/main" xmlns:r="http://schemas.openxmlformats.org/officeDocument/2006/relationships" xmlns:p="http://schemas.openxmlformats.org/presentationml/2006/main">
+  <p:cSld>
+    <p:spTree>
+      <p:nvGrpSpPr>
+        <p:cNvPr id="1" name=""/>
+        <p:cNvGrpSpPr/>
+        <p:nvPr/>
+      </p:nvGrpSpPr>
+      <p:grpSpPr>
+        <a:xfrm>
+          <a:off x="0" y="0"/>
+          <a:ext cx="0" cy="0"/>
+          <a:chOff x="0" y="0"/>
+          <a:chExt cx="0" cy="0"/>
+        </a:xfrm>
+      </p:grpSpPr>
+      <p:sp>
+        <p:nvSpPr>
+          <p:cNvPr id="2" name="Title 1"/>
+          <p:cNvSpPr>
+            <a:spLocks noGrp="1"/>
+          </p:cNvSpPr>
+          <p:nvPr>
+            <p:ph type="title"/>
+          </p:nvPr>
+        </p:nvSpPr>
+        <p:spPr/>
+        <p:txBody>
+          <a:bodyPr/>
+          <a:lstStyle/>
+          <a:p>
+            <a:r>
+              <a:rPr lang="en-US" dirty="0" smtClean="0"/>
+              <a:t>ISP</a:t>
+            </a:r>
+            <a:endParaRPr lang="en-US" dirty="0"/>
+          </a:p>
+        </p:txBody>
+      </p:sp>
+      <p:sp>
+        <p:nvSpPr>
+          <p:cNvPr id="3" name="Content Placeholder 2"/>
+          <p:cNvSpPr>
+            <a:spLocks noGrp="1"/>
+          </p:cNvSpPr>
+          <p:nvPr>
+            <p:ph idx="1"/>
+          </p:nvPr>
+        </p:nvSpPr>
+        <p:spPr/>
+        <p:txBody>
+          <a:bodyPr>
+            <a:normAutofit fontScale="70000" lnSpcReduction="20000"/>
+          </a:bodyPr>
+          <a:lstStyle/>
+          <a:p>
+            <a:r>
+              <a:rPr lang="en-US" dirty="0" smtClean="0"/>
+              <a:t>Fat/Polluted interfaces</a:t>
+            </a:r>
+          </a:p>
+          <a:p>
+            <a:r>
+              <a:rPr lang="en-US" dirty="0" smtClean="0"/>
+              <a:t>Classes that have “fat” interfaces are classes whose interfaces are not cohesive.</a:t>
+            </a:r>
+          </a:p>
+          <a:p>
+            <a:r>
+              <a:rPr lang="en-US" dirty="0" smtClean="0"/>
+              <a:t>Let the client drive the interface.</a:t>
+            </a:r>
+          </a:p>
+          <a:p>
+            <a:r>
+              <a:rPr lang="en-US" dirty="0" smtClean="0"/>
+              <a:t>In other words, the interfaces of the class can be broken up into groups of member functions. Each group serves a different set of clients.  Thus some clients use one group of member functions, and other clients use the other groups.</a:t>
+            </a:r>
+          </a:p>
+          <a:p>
+            <a:r>
+              <a:rPr lang="en-US" dirty="0" smtClean="0"/>
+              <a:t>The ISP acknowledges that there are objects that require non-cohesive interfaces;  however it suggests that clients should not know about them as a single class.  Instead, clients should know about abstract base classes that have cohesive interfaces. </a:t>
+            </a:r>
+          </a:p>
+          <a:p>
+            <a:r>
+              <a:rPr lang="en-US" dirty="0" smtClean="0"/>
+              <a:t>Some languages refer to these abstract base classes as “interfaces”, “protocols” or “signatures”.</a:t>
+            </a:r>
+            <a:endParaRPr lang="en-US" dirty="0"/>
+          </a:p>
+        </p:txBody>
+      </p:sp>
+    </p:spTree>
+  </p:cSld>
+  <p:clrMapOvr>
+    <a:masterClrMapping/>
+  </p:clrMapOvr>
+  <p:timing>
+    <p:tnLst>
+      <p:par>
+        <p:cTn id="1" dur="indefinite" restart="never" nodeType="tmRoot"/>
+      </p:par>
+    </p:tnLst>
+  </p:timing>
+</p:sld>
+</file>
+
+<file path=ppt/slides/slide46.xml><?xml version="1.0" encoding="utf-8"?>
 <p:sld xmlns:a="http://schemas.openxmlformats.org/drawingml/2006/main" xmlns:r="http://schemas.openxmlformats.org/officeDocument/2006/relationships" xmlns:p="http://schemas.openxmlformats.org/presentationml/2006/main">
   <p:cSld>
     <p:spTree>
@@ -7920,99 +7960,6 @@
 </p:sld>
 </file>
 
-<file path=ppt/slides/slide46.xml><?xml version="1.0" encoding="utf-8"?>
-<p:sld xmlns:a="http://schemas.openxmlformats.org/drawingml/2006/main" xmlns:r="http://schemas.openxmlformats.org/officeDocument/2006/relationships" xmlns:p="http://schemas.openxmlformats.org/presentationml/2006/main">
-  <p:cSld>
-    <p:spTree>
-      <p:nvGrpSpPr>
-        <p:cNvPr id="1" name=""/>
-        <p:cNvGrpSpPr/>
-        <p:nvPr/>
-      </p:nvGrpSpPr>
-      <p:grpSpPr>
-        <a:xfrm>
-          <a:off x="0" y="0"/>
-          <a:ext cx="0" cy="0"/>
-          <a:chOff x="0" y="0"/>
-          <a:chExt cx="0" cy="0"/>
-        </a:xfrm>
-      </p:grpSpPr>
-      <p:sp>
-        <p:nvSpPr>
-          <p:cNvPr id="2" name="Title 1"/>
-          <p:cNvSpPr>
-            <a:spLocks noGrp="1"/>
-          </p:cNvSpPr>
-          <p:nvPr>
-            <p:ph type="title"/>
-          </p:nvPr>
-        </p:nvSpPr>
-        <p:spPr/>
-        <p:txBody>
-          <a:bodyPr/>
-          <a:lstStyle/>
-          <a:p>
-            <a:r>
-              <a:rPr lang="en-US" dirty="0" smtClean="0"/>
-              <a:t>Reflect on DIP</a:t>
-            </a:r>
-            <a:endParaRPr lang="en-US" dirty="0"/>
-          </a:p>
-        </p:txBody>
-      </p:sp>
-      <p:sp>
-        <p:nvSpPr>
-          <p:cNvPr id="3" name="Content Placeholder 2"/>
-          <p:cNvSpPr>
-            <a:spLocks noGrp="1"/>
-          </p:cNvSpPr>
-          <p:nvPr>
-            <p:ph idx="1"/>
-          </p:nvPr>
-        </p:nvSpPr>
-        <p:spPr/>
-        <p:txBody>
-          <a:bodyPr>
-            <a:normAutofit/>
-          </a:bodyPr>
-          <a:lstStyle/>
-          <a:p>
-            <a:r>
-              <a:rPr lang="en-US" i="1" dirty="0" smtClean="0"/>
-              <a:t>A. HIGH LEVEL MODULES SHOULD NOT DEPEND UPON LOW LEVEL MODULES. BOTH SHOULD DEPEND UPON ABSTRACTIONS</a:t>
-            </a:r>
-            <a:r>
-              <a:rPr lang="en-US" i="1" dirty="0" smtClean="0"/>
-              <a:t>.</a:t>
-            </a:r>
-          </a:p>
-          <a:p>
-            <a:endParaRPr lang="en-US" i="1" dirty="0" smtClean="0"/>
-          </a:p>
-          <a:p>
-            <a:r>
-              <a:rPr lang="en-US" i="1" dirty="0" smtClean="0"/>
-              <a:t>B. ABSTRACTIONS SHOULD NOT DEPEND UPON DETAILS. DETAILS SHOULD DEPEND UPON ABSTRACTIONS.</a:t>
-            </a:r>
-            <a:endParaRPr lang="en-US" dirty="0" smtClean="0"/>
-          </a:p>
-        </p:txBody>
-      </p:sp>
-    </p:spTree>
-  </p:cSld>
-  <p:clrMapOvr>
-    <a:masterClrMapping/>
-  </p:clrMapOvr>
-  <p:timing>
-    <p:tnLst>
-      <p:par>
-        <p:cTn id="1" dur="indefinite" restart="never" nodeType="tmRoot"/>
-      </p:par>
-    </p:tnLst>
-  </p:timing>
-</p:sld>
-</file>
-
 <file path=ppt/slides/slide47.xml><?xml version="1.0" encoding="utf-8"?>
 <p:sld xmlns:a="http://schemas.openxmlformats.org/drawingml/2006/main" xmlns:r="http://schemas.openxmlformats.org/officeDocument/2006/relationships" xmlns:p="http://schemas.openxmlformats.org/presentationml/2006/main">
   <p:cSld>
@@ -8047,7 +7994,7 @@
           <a:p>
             <a:r>
               <a:rPr lang="en-US" dirty="0" smtClean="0"/>
-              <a:t>DIP</a:t>
+              <a:t>Reflect on DIP</a:t>
             </a:r>
             <a:endParaRPr lang="en-US" dirty="0"/>
           </a:p>
@@ -8066,59 +8013,24 @@
         <p:spPr/>
         <p:txBody>
           <a:bodyPr>
-            <a:normAutofit lnSpcReduction="10000"/>
+            <a:normAutofit/>
           </a:bodyPr>
           <a:lstStyle/>
           <a:p>
             <a:r>
-              <a:rPr lang="en-US" dirty="0" smtClean="0"/>
-              <a:t>Code to an abstraction, not an implementation</a:t>
-            </a:r>
-          </a:p>
-          <a:p>
-            <a:r>
-              <a:rPr lang="en-US" dirty="0" smtClean="0"/>
-              <a:t>Dependencies can also include libraries, files, file system, mail service, databases etc</a:t>
-            </a:r>
-          </a:p>
-          <a:p>
-            <a:r>
-              <a:rPr lang="en-US" dirty="0" smtClean="0"/>
-              <a:t>In the API, How can we swap the existing ORM </a:t>
-            </a:r>
-            <a:r>
-              <a:rPr lang="en-US" dirty="0" err="1" smtClean="0"/>
-              <a:t>Nhibernate</a:t>
-            </a:r>
-            <a:r>
-              <a:rPr lang="en-US" dirty="0" smtClean="0"/>
-              <a:t> with another ORM such as Entity FW or more still </a:t>
-            </a:r>
-            <a:r>
-              <a:rPr lang="en-US" dirty="0" err="1" smtClean="0"/>
-              <a:t>MongoDB</a:t>
-            </a:r>
-            <a:r>
-              <a:rPr lang="en-US" dirty="0" smtClean="0"/>
-              <a:t> as the DB</a:t>
-            </a:r>
-          </a:p>
-          <a:p>
-            <a:r>
-              <a:rPr lang="en-US" dirty="0" smtClean="0"/>
-              <a:t>Tools to recognize dependencies: </a:t>
-            </a:r>
-            <a:r>
-              <a:rPr lang="en-US" dirty="0" err="1" smtClean="0"/>
-              <a:t>Ndepend</a:t>
-            </a:r>
-            <a:r>
-              <a:rPr lang="en-US" dirty="0" smtClean="0"/>
-              <a:t>, VS Ultimate Architecture tab</a:t>
-            </a:r>
-          </a:p>
-          <a:p>
-            <a:endParaRPr lang="en-US" dirty="0"/>
+              <a:rPr lang="en-US" i="1" dirty="0" smtClean="0"/>
+              <a:t>A. HIGH LEVEL MODULES SHOULD NOT DEPEND UPON LOW LEVEL MODULES. BOTH SHOULD DEPEND UPON ABSTRACTIONS.</a:t>
+            </a:r>
+          </a:p>
+          <a:p>
+            <a:endParaRPr lang="en-US" i="1" dirty="0" smtClean="0"/>
+          </a:p>
+          <a:p>
+            <a:r>
+              <a:rPr lang="en-US" i="1" dirty="0" smtClean="0"/>
+              <a:t>B. ABSTRACTIONS SHOULD NOT DEPEND UPON DETAILS. DETAILS SHOULD DEPEND UPON ABSTRACTIONS.</a:t>
+            </a:r>
+            <a:endParaRPr lang="en-US" dirty="0" smtClean="0"/>
           </a:p>
         </p:txBody>
       </p:sp>
@@ -8171,7 +8083,7 @@
           <a:p>
             <a:r>
               <a:rPr lang="en-US" dirty="0" smtClean="0"/>
-              <a:t>Other design smells &amp; principles</a:t>
+              <a:t>DIP</a:t>
             </a:r>
             <a:endParaRPr lang="en-US" dirty="0"/>
           </a:p>
@@ -8189,19 +8101,64 @@
         </p:nvSpPr>
         <p:spPr/>
         <p:txBody>
-          <a:bodyPr/>
-          <a:lstStyle/>
-          <a:p>
-            <a:r>
-              <a:rPr lang="en-US" dirty="0" smtClean="0"/>
-              <a:t>Needless Repetition : DRY</a:t>
-            </a:r>
-          </a:p>
-          <a:p>
-            <a:r>
-              <a:rPr lang="en-US" dirty="0" smtClean="0"/>
-              <a:t>Complex/Over design : YAGNI, KISS</a:t>
-            </a:r>
+          <a:bodyPr>
+            <a:normAutofit lnSpcReduction="10000"/>
+          </a:bodyPr>
+          <a:lstStyle/>
+          <a:p>
+            <a:r>
+              <a:rPr lang="en-US" dirty="0" smtClean="0"/>
+              <a:t>Code to an abstraction, not an implementation</a:t>
+            </a:r>
+          </a:p>
+          <a:p>
+            <a:r>
+              <a:rPr lang="en-US" dirty="0" smtClean="0"/>
+              <a:t>Dependencies can also include libraries, files, file system, mail service, databases etc</a:t>
+            </a:r>
+          </a:p>
+          <a:p>
+            <a:r>
+              <a:rPr lang="en-US" dirty="0" smtClean="0"/>
+              <a:t>In the API, How can we swap the existing ORM </a:t>
+            </a:r>
+            <a:r>
+              <a:rPr lang="en-US" dirty="0" err="1" smtClean="0"/>
+              <a:t>NHibernate</a:t>
+            </a:r>
+            <a:r>
+              <a:rPr lang="en-US" dirty="0" smtClean="0"/>
+              <a:t> </a:t>
+            </a:r>
+            <a:r>
+              <a:rPr lang="en-US" dirty="0" smtClean="0"/>
+              <a:t>with another ORM such as Entity FW or more still </a:t>
+            </a:r>
+            <a:r>
+              <a:rPr lang="en-US" dirty="0" err="1" smtClean="0"/>
+              <a:t>MongoDB</a:t>
+            </a:r>
+            <a:r>
+              <a:rPr lang="en-US" dirty="0" smtClean="0"/>
+              <a:t> as the DB</a:t>
+            </a:r>
+          </a:p>
+          <a:p>
+            <a:r>
+              <a:rPr lang="en-US" dirty="0" smtClean="0"/>
+              <a:t>Tools to recognize dependencies: </a:t>
+            </a:r>
+            <a:r>
+              <a:rPr lang="en-US" dirty="0" err="1" smtClean="0"/>
+              <a:t>Ndepend</a:t>
+            </a:r>
+            <a:r>
+              <a:rPr lang="en-US" dirty="0" smtClean="0"/>
+              <a:t>, VS Ultimate Architecture tab</a:t>
+            </a:r>
+          </a:p>
+          <a:p>
+            <a:endParaRPr lang="en-US" dirty="0"/>
           </a:p>
         </p:txBody>
       </p:sp>
@@ -8221,6 +8178,177 @@
 </file>
 
 <file path=ppt/slides/slide49.xml><?xml version="1.0" encoding="utf-8"?>
+<p:sld xmlns:a="http://schemas.openxmlformats.org/drawingml/2006/main" xmlns:r="http://schemas.openxmlformats.org/officeDocument/2006/relationships" xmlns:p="http://schemas.openxmlformats.org/presentationml/2006/main">
+  <p:cSld>
+    <p:spTree>
+      <p:nvGrpSpPr>
+        <p:cNvPr id="1" name=""/>
+        <p:cNvGrpSpPr/>
+        <p:nvPr/>
+      </p:nvGrpSpPr>
+      <p:grpSpPr>
+        <a:xfrm>
+          <a:off x="0" y="0"/>
+          <a:ext cx="0" cy="0"/>
+          <a:chOff x="0" y="0"/>
+          <a:chExt cx="0" cy="0"/>
+        </a:xfrm>
+      </p:grpSpPr>
+      <p:sp>
+        <p:nvSpPr>
+          <p:cNvPr id="2" name="Title 1"/>
+          <p:cNvSpPr>
+            <a:spLocks noGrp="1"/>
+          </p:cNvSpPr>
+          <p:nvPr>
+            <p:ph type="title"/>
+          </p:nvPr>
+        </p:nvSpPr>
+        <p:spPr/>
+        <p:txBody>
+          <a:bodyPr/>
+          <a:lstStyle/>
+          <a:p>
+            <a:r>
+              <a:rPr lang="en-US" dirty="0" smtClean="0"/>
+              <a:t>Other design smells &amp; principles</a:t>
+            </a:r>
+            <a:endParaRPr lang="en-US" dirty="0"/>
+          </a:p>
+        </p:txBody>
+      </p:sp>
+      <p:sp>
+        <p:nvSpPr>
+          <p:cNvPr id="3" name="Content Placeholder 2"/>
+          <p:cNvSpPr>
+            <a:spLocks noGrp="1"/>
+          </p:cNvSpPr>
+          <p:nvPr>
+            <p:ph idx="1"/>
+          </p:nvPr>
+        </p:nvSpPr>
+        <p:spPr/>
+        <p:txBody>
+          <a:bodyPr/>
+          <a:lstStyle/>
+          <a:p>
+            <a:r>
+              <a:rPr lang="en-US" dirty="0" smtClean="0"/>
+              <a:t>Needless Repetition : DRY</a:t>
+            </a:r>
+          </a:p>
+          <a:p>
+            <a:r>
+              <a:rPr lang="en-US" dirty="0" smtClean="0"/>
+              <a:t>Complex/Over design : YAGNI, KISS</a:t>
+            </a:r>
+          </a:p>
+        </p:txBody>
+      </p:sp>
+    </p:spTree>
+  </p:cSld>
+  <p:clrMapOvr>
+    <a:masterClrMapping/>
+  </p:clrMapOvr>
+  <p:timing>
+    <p:tnLst>
+      <p:par>
+        <p:cTn id="1" dur="indefinite" restart="never" nodeType="tmRoot"/>
+      </p:par>
+    </p:tnLst>
+  </p:timing>
+</p:sld>
+</file>
+
+<file path=ppt/slides/slide5.xml><?xml version="1.0" encoding="utf-8"?>
+<p:sld xmlns:a="http://schemas.openxmlformats.org/drawingml/2006/main" xmlns:r="http://schemas.openxmlformats.org/officeDocument/2006/relationships" xmlns:p="http://schemas.openxmlformats.org/presentationml/2006/main">
+  <p:cSld>
+    <p:spTree>
+      <p:nvGrpSpPr>
+        <p:cNvPr id="1" name=""/>
+        <p:cNvGrpSpPr/>
+        <p:nvPr/>
+      </p:nvGrpSpPr>
+      <p:grpSpPr>
+        <a:xfrm>
+          <a:off x="0" y="0"/>
+          <a:ext cx="0" cy="0"/>
+          <a:chOff x="0" y="0"/>
+          <a:chExt cx="0" cy="0"/>
+        </a:xfrm>
+      </p:grpSpPr>
+      <p:sp>
+        <p:nvSpPr>
+          <p:cNvPr id="2" name="Title 1"/>
+          <p:cNvSpPr>
+            <a:spLocks noGrp="1"/>
+          </p:cNvSpPr>
+          <p:nvPr>
+            <p:ph type="title"/>
+          </p:nvPr>
+        </p:nvSpPr>
+        <p:spPr/>
+        <p:txBody>
+          <a:bodyPr>
+            <a:normAutofit/>
+          </a:bodyPr>
+          <a:lstStyle/>
+          <a:p>
+            <a:r>
+              <a:rPr lang="en-US" dirty="0" smtClean="0"/>
+              <a:t>Engineering Philosophy</a:t>
+            </a:r>
+            <a:endParaRPr lang="en-US" dirty="0"/>
+          </a:p>
+        </p:txBody>
+      </p:sp>
+      <p:sp>
+        <p:nvSpPr>
+          <p:cNvPr id="3" name="Content Placeholder 2"/>
+          <p:cNvSpPr>
+            <a:spLocks noGrp="1"/>
+          </p:cNvSpPr>
+          <p:nvPr>
+            <p:ph idx="1"/>
+          </p:nvPr>
+        </p:nvSpPr>
+        <p:spPr/>
+        <p:txBody>
+          <a:bodyPr/>
+          <a:lstStyle/>
+          <a:p>
+            <a:r>
+              <a:rPr lang="en-US" dirty="0" smtClean="0"/>
+              <a:t>Beautiful, Maintainable Code</a:t>
+            </a:r>
+          </a:p>
+          <a:p>
+            <a:r>
+              <a:rPr lang="en-US" dirty="0" smtClean="0"/>
+              <a:t>We want to “Care” about our code</a:t>
+            </a:r>
+          </a:p>
+          <a:p>
+            <a:endParaRPr lang="en-US" dirty="0"/>
+          </a:p>
+        </p:txBody>
+      </p:sp>
+    </p:spTree>
+  </p:cSld>
+  <p:clrMapOvr>
+    <a:masterClrMapping/>
+  </p:clrMapOvr>
+  <p:timing>
+    <p:tnLst>
+      <p:par>
+        <p:cTn id="1" dur="indefinite" restart="never" nodeType="tmRoot"/>
+      </p:par>
+    </p:tnLst>
+  </p:timing>
+</p:sld>
+</file>
+
+<file path=ppt/slides/slide50.xml><?xml version="1.0" encoding="utf-8"?>
 <p:sld xmlns:a="http://schemas.openxmlformats.org/drawingml/2006/main" xmlns:r="http://schemas.openxmlformats.org/officeDocument/2006/relationships" xmlns:p="http://schemas.openxmlformats.org/presentationml/2006/main">
   <p:cSld>
     <p:spTree>
@@ -8332,95 +8460,7 @@
 </p:sld>
 </file>
 
-<file path=ppt/slides/slide5.xml><?xml version="1.0" encoding="utf-8"?>
-<p:sld xmlns:a="http://schemas.openxmlformats.org/drawingml/2006/main" xmlns:r="http://schemas.openxmlformats.org/officeDocument/2006/relationships" xmlns:p="http://schemas.openxmlformats.org/presentationml/2006/main">
-  <p:cSld>
-    <p:spTree>
-      <p:nvGrpSpPr>
-        <p:cNvPr id="1" name=""/>
-        <p:cNvGrpSpPr/>
-        <p:nvPr/>
-      </p:nvGrpSpPr>
-      <p:grpSpPr>
-        <a:xfrm>
-          <a:off x="0" y="0"/>
-          <a:ext cx="0" cy="0"/>
-          <a:chOff x="0" y="0"/>
-          <a:chExt cx="0" cy="0"/>
-        </a:xfrm>
-      </p:grpSpPr>
-      <p:sp>
-        <p:nvSpPr>
-          <p:cNvPr id="2" name="Title 1"/>
-          <p:cNvSpPr>
-            <a:spLocks noGrp="1"/>
-          </p:cNvSpPr>
-          <p:nvPr>
-            <p:ph type="title"/>
-          </p:nvPr>
-        </p:nvSpPr>
-        <p:spPr/>
-        <p:txBody>
-          <a:bodyPr>
-            <a:normAutofit/>
-          </a:bodyPr>
-          <a:lstStyle/>
-          <a:p>
-            <a:r>
-              <a:rPr lang="en-US" dirty="0" smtClean="0"/>
-              <a:t>Engineering Philosophy</a:t>
-            </a:r>
-            <a:endParaRPr lang="en-US" dirty="0"/>
-          </a:p>
-        </p:txBody>
-      </p:sp>
-      <p:sp>
-        <p:nvSpPr>
-          <p:cNvPr id="3" name="Content Placeholder 2"/>
-          <p:cNvSpPr>
-            <a:spLocks noGrp="1"/>
-          </p:cNvSpPr>
-          <p:nvPr>
-            <p:ph idx="1"/>
-          </p:nvPr>
-        </p:nvSpPr>
-        <p:spPr/>
-        <p:txBody>
-          <a:bodyPr/>
-          <a:lstStyle/>
-          <a:p>
-            <a:r>
-              <a:rPr lang="en-US" dirty="0" smtClean="0"/>
-              <a:t>Beautiful, Maintainable Code</a:t>
-            </a:r>
-          </a:p>
-          <a:p>
-            <a:r>
-              <a:rPr lang="en-US" dirty="0" smtClean="0"/>
-              <a:t>We want to “Care” about our code</a:t>
-            </a:r>
-          </a:p>
-          <a:p>
-            <a:endParaRPr lang="en-US" dirty="0"/>
-          </a:p>
-        </p:txBody>
-      </p:sp>
-    </p:spTree>
-  </p:cSld>
-  <p:clrMapOvr>
-    <a:masterClrMapping/>
-  </p:clrMapOvr>
-  <p:timing>
-    <p:tnLst>
-      <p:par>
-        <p:cTn id="1" dur="indefinite" restart="never" nodeType="tmRoot"/>
-      </p:par>
-    </p:tnLst>
-  </p:timing>
-</p:sld>
-</file>
-
-<file path=ppt/slides/slide50.xml><?xml version="1.0" encoding="utf-8"?>
+<file path=ppt/slides/slide51.xml><?xml version="1.0" encoding="utf-8"?>
 <p:sld xmlns:a="http://schemas.openxmlformats.org/drawingml/2006/main" xmlns:r="http://schemas.openxmlformats.org/officeDocument/2006/relationships" xmlns:p="http://schemas.openxmlformats.org/presentationml/2006/main">
   <p:cSld>
     <p:spTree>
@@ -8486,7 +8526,7 @@
 </p:sld>
 </file>
 
-<file path=ppt/slides/slide51.xml><?xml version="1.0" encoding="utf-8"?>
+<file path=ppt/slides/slide52.xml><?xml version="1.0" encoding="utf-8"?>
 <p:sld xmlns:a="http://schemas.openxmlformats.org/drawingml/2006/main" xmlns:r="http://schemas.openxmlformats.org/officeDocument/2006/relationships" xmlns:p="http://schemas.openxmlformats.org/presentationml/2006/main">
   <p:cSld>
     <p:spTree>
@@ -8552,7 +8592,7 @@
 </p:sld>
 </file>
 
-<file path=ppt/slides/slide52.xml><?xml version="1.0" encoding="utf-8"?>
+<file path=ppt/slides/slide53.xml><?xml version="1.0" encoding="utf-8"?>
 <p:sld xmlns:a="http://schemas.openxmlformats.org/drawingml/2006/main" xmlns:r="http://schemas.openxmlformats.org/officeDocument/2006/relationships" xmlns:p="http://schemas.openxmlformats.org/presentationml/2006/main">
   <p:cSld>
     <p:spTree>
@@ -8618,7 +8658,7 @@
 </p:sld>
 </file>
 
-<file path=ppt/slides/slide53.xml><?xml version="1.0" encoding="utf-8"?>
+<file path=ppt/slides/slide54.xml><?xml version="1.0" encoding="utf-8"?>
 <p:sld xmlns:a="http://schemas.openxmlformats.org/drawingml/2006/main" xmlns:r="http://schemas.openxmlformats.org/officeDocument/2006/relationships" xmlns:p="http://schemas.openxmlformats.org/presentationml/2006/main">
   <p:cSld>
     <p:spTree>
@@ -8678,7 +8718,7 @@
 </p:sld>
 </file>
 
-<file path=ppt/slides/slide54.xml><?xml version="1.0" encoding="utf-8"?>
+<file path=ppt/slides/slide55.xml><?xml version="1.0" encoding="utf-8"?>
 <p:sld xmlns:a="http://schemas.openxmlformats.org/drawingml/2006/main" xmlns:r="http://schemas.openxmlformats.org/officeDocument/2006/relationships" xmlns:p="http://schemas.openxmlformats.org/presentationml/2006/main">
   <p:cSld>
     <p:spTree>
@@ -8769,102 +8809,6 @@
 </p:sld>
 </file>
 
-<file path=ppt/slides/slide55.xml><?xml version="1.0" encoding="utf-8"?>
-<p:sld xmlns:a="http://schemas.openxmlformats.org/drawingml/2006/main" xmlns:r="http://schemas.openxmlformats.org/officeDocument/2006/relationships" xmlns:p="http://schemas.openxmlformats.org/presentationml/2006/main">
-  <p:cSld>
-    <p:spTree>
-      <p:nvGrpSpPr>
-        <p:cNvPr id="1" name=""/>
-        <p:cNvGrpSpPr/>
-        <p:nvPr/>
-      </p:nvGrpSpPr>
-      <p:grpSpPr>
-        <a:xfrm>
-          <a:off x="0" y="0"/>
-          <a:ext cx="0" cy="0"/>
-          <a:chOff x="0" y="0"/>
-          <a:chExt cx="0" cy="0"/>
-        </a:xfrm>
-      </p:grpSpPr>
-      <p:sp>
-        <p:nvSpPr>
-          <p:cNvPr id="2" name="Title 1"/>
-          <p:cNvSpPr>
-            <a:spLocks noGrp="1"/>
-          </p:cNvSpPr>
-          <p:nvPr>
-            <p:ph type="title"/>
-          </p:nvPr>
-        </p:nvSpPr>
-        <p:spPr/>
-        <p:txBody>
-          <a:bodyPr/>
-          <a:lstStyle/>
-          <a:p>
-            <a:r>
-              <a:rPr lang="en-US" dirty="0" smtClean="0"/>
-              <a:t>For us, its constant learning</a:t>
-            </a:r>
-            <a:endParaRPr lang="en-US" dirty="0"/>
-          </a:p>
-        </p:txBody>
-      </p:sp>
-      <p:sp>
-        <p:nvSpPr>
-          <p:cNvPr id="3" name="Content Placeholder 2"/>
-          <p:cNvSpPr>
-            <a:spLocks noGrp="1"/>
-          </p:cNvSpPr>
-          <p:nvPr>
-            <p:ph idx="1"/>
-          </p:nvPr>
-        </p:nvSpPr>
-        <p:spPr/>
-        <p:txBody>
-          <a:bodyPr/>
-          <a:lstStyle/>
-          <a:p>
-            <a:r>
-              <a:rPr lang="en-US" dirty="0" smtClean="0"/>
-              <a:t>Design Patterns</a:t>
-            </a:r>
-          </a:p>
-          <a:p>
-            <a:r>
-              <a:rPr lang="en-US" dirty="0" smtClean="0"/>
-              <a:t>Refactoring to Patterns</a:t>
-            </a:r>
-          </a:p>
-          <a:p>
-            <a:r>
-              <a:rPr lang="en-US" dirty="0" smtClean="0"/>
-              <a:t>Architectural Patterns</a:t>
-            </a:r>
-          </a:p>
-          <a:p>
-            <a:r>
-              <a:rPr lang="en-US" dirty="0" smtClean="0"/>
-              <a:t>Patterns in JavaScript</a:t>
-            </a:r>
-            <a:endParaRPr lang="en-US" dirty="0"/>
-          </a:p>
-        </p:txBody>
-      </p:sp>
-    </p:spTree>
-  </p:cSld>
-  <p:clrMapOvr>
-    <a:masterClrMapping/>
-  </p:clrMapOvr>
-  <p:timing>
-    <p:tnLst>
-      <p:par>
-        <p:cTn id="1" dur="indefinite" restart="never" nodeType="tmRoot"/>
-      </p:par>
-    </p:tnLst>
-  </p:timing>
-</p:sld>
-</file>
-
 <file path=ppt/slides/slide56.xml><?xml version="1.0" encoding="utf-8"?>
 <p:sld xmlns:a="http://schemas.openxmlformats.org/drawingml/2006/main" xmlns:r="http://schemas.openxmlformats.org/officeDocument/2006/relationships" xmlns:p="http://schemas.openxmlformats.org/presentationml/2006/main">
   <p:cSld>
@@ -8899,7 +8843,7 @@
           <a:p>
             <a:r>
               <a:rPr lang="en-US" dirty="0" smtClean="0"/>
-              <a:t>References</a:t>
+              <a:t>For us, its constant learning</a:t>
             </a:r>
             <a:endParaRPr lang="en-US" dirty="0"/>
           </a:p>
@@ -8921,53 +8865,27 @@
           <a:lstStyle/>
           <a:p>
             <a:r>
-              <a:rPr lang="en-US" dirty="0" smtClean="0">
-                <a:hlinkClick r:id="rId2"/>
-              </a:rPr>
-              <a:t>http://</a:t>
-            </a:r>
-            <a:r>
-              <a:rPr lang="en-US" dirty="0" smtClean="0">
-                <a:hlinkClick r:id="rId2"/>
-              </a:rPr>
-              <a:t>butunclebob.com/ArticleS.UncleBob.PrinciplesOfOod</a:t>
-            </a:r>
-            <a:endParaRPr lang="en-US" dirty="0" smtClean="0"/>
-          </a:p>
-          <a:p>
-            <a:r>
-              <a:rPr lang="en-US" dirty="0" smtClean="0">
-                <a:hlinkClick r:id="rId3"/>
-              </a:rPr>
-              <a:t>http://lostechies.com/derickbailey/2009/02/11/solid-development-principles-in-motivational-pictures</a:t>
-            </a:r>
-            <a:r>
-              <a:rPr lang="en-US" dirty="0" smtClean="0">
-                <a:hlinkClick r:id="rId3"/>
-              </a:rPr>
-              <a:t>/</a:t>
-            </a:r>
-            <a:endParaRPr lang="en-US" dirty="0" smtClean="0"/>
-          </a:p>
-          <a:p>
-            <a:r>
-              <a:rPr lang="en-US" dirty="0" smtClean="0">
-                <a:hlinkClick r:id="rId4"/>
-              </a:rPr>
-              <a:t>http://</a:t>
-            </a:r>
-            <a:r>
-              <a:rPr lang="en-US" dirty="0" smtClean="0">
-                <a:hlinkClick r:id="rId4"/>
-              </a:rPr>
-              <a:t>bighugelabs.com/motivator.php</a:t>
-            </a:r>
-            <a:endParaRPr lang="en-US" dirty="0" smtClean="0"/>
-          </a:p>
-          <a:p>
-            <a:endParaRPr lang="en-US" dirty="0" smtClean="0"/>
-          </a:p>
-          <a:p>
+              <a:rPr lang="en-US" dirty="0" smtClean="0"/>
+              <a:t>Design Patterns</a:t>
+            </a:r>
+          </a:p>
+          <a:p>
+            <a:r>
+              <a:rPr lang="en-US" dirty="0" smtClean="0"/>
+              <a:t>Refactoring to Patterns</a:t>
+            </a:r>
+          </a:p>
+          <a:p>
+            <a:r>
+              <a:rPr lang="en-US" dirty="0" smtClean="0"/>
+              <a:t>Architectural Patterns</a:t>
+            </a:r>
+          </a:p>
+          <a:p>
+            <a:r>
+              <a:rPr lang="en-US" dirty="0" smtClean="0"/>
+              <a:t>Patterns in JavaScript</a:t>
+            </a:r>
             <a:endParaRPr lang="en-US" dirty="0"/>
           </a:p>
         </p:txBody>
@@ -9016,12 +8934,14 @@
         </p:nvSpPr>
         <p:spPr/>
         <p:txBody>
-          <a:bodyPr/>
-          <a:lstStyle/>
-          <a:p>
-            <a:r>
-              <a:rPr lang="en-US" dirty="0" smtClean="0"/>
-              <a:t>Ruby SOLID Principles</a:t>
+          <a:bodyPr>
+            <a:normAutofit/>
+          </a:bodyPr>
+          <a:lstStyle/>
+          <a:p>
+            <a:r>
+              <a:rPr lang="en-US" dirty="0" smtClean="0"/>
+              <a:t>Code, presentation can be found at</a:t>
             </a:r>
             <a:endParaRPr lang="en-US" dirty="0"/>
           </a:p>
@@ -9046,32 +8966,8 @@
               <a:rPr lang="en-US" dirty="0" smtClean="0">
                 <a:hlinkClick r:id="rId2"/>
               </a:rPr>
-              <a:t>http://</a:t>
-            </a:r>
-            <a:r>
-              <a:rPr lang="en-US" dirty="0" smtClean="0">
-                <a:hlinkClick r:id="rId2"/>
-              </a:rPr>
-              <a:t>blip.tv/rubynation/jim-weirich-3672101</a:t>
-            </a:r>
-            <a:endParaRPr lang="en-US" dirty="0" smtClean="0"/>
-          </a:p>
-          <a:p>
-            <a:r>
-              <a:rPr lang="en-US" dirty="0" smtClean="0">
-                <a:hlinkClick r:id="rId3"/>
-              </a:rPr>
-              <a:t>http://</a:t>
-            </a:r>
-            <a:r>
-              <a:rPr lang="en-US" dirty="0" smtClean="0">
-                <a:hlinkClick r:id="rId3"/>
-              </a:rPr>
-              <a:t>www.confreaks.com/videos/240-goruco2009-solid-object-oriented-design</a:t>
-            </a:r>
-            <a:endParaRPr lang="en-US" dirty="0" smtClean="0"/>
-          </a:p>
-          <a:p>
+              <a:t>https://github.com/chris-gibson/solid</a:t>
+            </a:r>
             <a:endParaRPr lang="en-US" dirty="0" smtClean="0"/>
           </a:p>
           <a:p>
@@ -9088,6 +8984,301 @@
 </file>
 
 <file path=ppt/slides/slide58.xml><?xml version="1.0" encoding="utf-8"?>
+<p:sld xmlns:a="http://schemas.openxmlformats.org/drawingml/2006/main" xmlns:r="http://schemas.openxmlformats.org/officeDocument/2006/relationships" xmlns:p="http://schemas.openxmlformats.org/presentationml/2006/main">
+  <p:cSld>
+    <p:spTree>
+      <p:nvGrpSpPr>
+        <p:cNvPr id="1" name=""/>
+        <p:cNvGrpSpPr/>
+        <p:nvPr/>
+      </p:nvGrpSpPr>
+      <p:grpSpPr>
+        <a:xfrm>
+          <a:off x="0" y="0"/>
+          <a:ext cx="0" cy="0"/>
+          <a:chOff x="0" y="0"/>
+          <a:chExt cx="0" cy="0"/>
+        </a:xfrm>
+      </p:grpSpPr>
+      <p:sp>
+        <p:nvSpPr>
+          <p:cNvPr id="2" name="Title 1"/>
+          <p:cNvSpPr>
+            <a:spLocks noGrp="1"/>
+          </p:cNvSpPr>
+          <p:nvPr>
+            <p:ph type="title"/>
+          </p:nvPr>
+        </p:nvSpPr>
+        <p:spPr/>
+        <p:txBody>
+          <a:bodyPr/>
+          <a:lstStyle/>
+          <a:p>
+            <a:r>
+              <a:rPr lang="en-US" dirty="0" smtClean="0"/>
+              <a:t>References</a:t>
+            </a:r>
+            <a:endParaRPr lang="en-US" dirty="0"/>
+          </a:p>
+        </p:txBody>
+      </p:sp>
+      <p:sp>
+        <p:nvSpPr>
+          <p:cNvPr id="3" name="Content Placeholder 2"/>
+          <p:cNvSpPr>
+            <a:spLocks noGrp="1"/>
+          </p:cNvSpPr>
+          <p:nvPr>
+            <p:ph idx="1"/>
+          </p:nvPr>
+        </p:nvSpPr>
+        <p:spPr/>
+        <p:txBody>
+          <a:bodyPr/>
+          <a:lstStyle/>
+          <a:p>
+            <a:r>
+              <a:rPr lang="en-US" dirty="0" smtClean="0">
+                <a:hlinkClick r:id="rId2"/>
+              </a:rPr>
+              <a:t>http://butunclebob.com/ArticleS.UncleBob.PrinciplesOfOod</a:t>
+            </a:r>
+            <a:endParaRPr lang="en-US" dirty="0" smtClean="0"/>
+          </a:p>
+          <a:p>
+            <a:r>
+              <a:rPr lang="en-US" dirty="0" smtClean="0">
+                <a:hlinkClick r:id="rId3"/>
+              </a:rPr>
+              <a:t>http://lostechies.com/derickbailey/2009/02/11/solid-development-principles-in-motivational-pictures/</a:t>
+            </a:r>
+            <a:endParaRPr lang="en-US" dirty="0" smtClean="0"/>
+          </a:p>
+          <a:p>
+            <a:r>
+              <a:rPr lang="en-US" dirty="0" smtClean="0">
+                <a:hlinkClick r:id="rId4"/>
+              </a:rPr>
+              <a:t>http://bighugelabs.com/motivator.php</a:t>
+            </a:r>
+            <a:endParaRPr lang="en-US" dirty="0" smtClean="0"/>
+          </a:p>
+          <a:p>
+            <a:endParaRPr lang="en-US" dirty="0" smtClean="0"/>
+          </a:p>
+          <a:p>
+            <a:endParaRPr lang="en-US" dirty="0"/>
+          </a:p>
+        </p:txBody>
+      </p:sp>
+    </p:spTree>
+  </p:cSld>
+  <p:clrMapOvr>
+    <a:masterClrMapping/>
+  </p:clrMapOvr>
+  <p:timing>
+    <p:tnLst>
+      <p:par>
+        <p:cTn id="1" dur="indefinite" restart="never" nodeType="tmRoot"/>
+      </p:par>
+    </p:tnLst>
+  </p:timing>
+</p:sld>
+</file>
+
+<file path=ppt/slides/slide59.xml><?xml version="1.0" encoding="utf-8"?>
+<p:sld xmlns:a="http://schemas.openxmlformats.org/drawingml/2006/main" xmlns:r="http://schemas.openxmlformats.org/officeDocument/2006/relationships" xmlns:p="http://schemas.openxmlformats.org/presentationml/2006/main">
+  <p:cSld>
+    <p:spTree>
+      <p:nvGrpSpPr>
+        <p:cNvPr id="1" name=""/>
+        <p:cNvGrpSpPr/>
+        <p:nvPr/>
+      </p:nvGrpSpPr>
+      <p:grpSpPr>
+        <a:xfrm>
+          <a:off x="0" y="0"/>
+          <a:ext cx="0" cy="0"/>
+          <a:chOff x="0" y="0"/>
+          <a:chExt cx="0" cy="0"/>
+        </a:xfrm>
+      </p:grpSpPr>
+      <p:sp>
+        <p:nvSpPr>
+          <p:cNvPr id="2" name="Title 1"/>
+          <p:cNvSpPr>
+            <a:spLocks noGrp="1"/>
+          </p:cNvSpPr>
+          <p:nvPr>
+            <p:ph type="title"/>
+          </p:nvPr>
+        </p:nvSpPr>
+        <p:spPr/>
+        <p:txBody>
+          <a:bodyPr/>
+          <a:lstStyle/>
+          <a:p>
+            <a:r>
+              <a:rPr lang="en-US" dirty="0" smtClean="0"/>
+              <a:t>Ruby SOLID Principles</a:t>
+            </a:r>
+            <a:endParaRPr lang="en-US" dirty="0"/>
+          </a:p>
+        </p:txBody>
+      </p:sp>
+      <p:sp>
+        <p:nvSpPr>
+          <p:cNvPr id="3" name="Content Placeholder 2"/>
+          <p:cNvSpPr>
+            <a:spLocks noGrp="1"/>
+          </p:cNvSpPr>
+          <p:nvPr>
+            <p:ph idx="1"/>
+          </p:nvPr>
+        </p:nvSpPr>
+        <p:spPr/>
+        <p:txBody>
+          <a:bodyPr/>
+          <a:lstStyle/>
+          <a:p>
+            <a:r>
+              <a:rPr lang="en-US" dirty="0" smtClean="0">
+                <a:hlinkClick r:id="rId2"/>
+              </a:rPr>
+              <a:t>http://blip.tv/rubynation/jim-weirich-3672101</a:t>
+            </a:r>
+            <a:endParaRPr lang="en-US" dirty="0" smtClean="0"/>
+          </a:p>
+          <a:p>
+            <a:r>
+              <a:rPr lang="en-US" dirty="0" smtClean="0">
+                <a:hlinkClick r:id="rId3"/>
+              </a:rPr>
+              <a:t>http://www.confreaks.com/videos/240-goruco2009-solid-object-oriented-design</a:t>
+            </a:r>
+            <a:endParaRPr lang="en-US" dirty="0" smtClean="0"/>
+          </a:p>
+          <a:p>
+            <a:endParaRPr lang="en-US" dirty="0" smtClean="0"/>
+          </a:p>
+          <a:p>
+            <a:endParaRPr lang="en-US" dirty="0"/>
+          </a:p>
+        </p:txBody>
+      </p:sp>
+    </p:spTree>
+  </p:cSld>
+  <p:clrMapOvr>
+    <a:masterClrMapping/>
+  </p:clrMapOvr>
+</p:sld>
+</file>
+
+<file path=ppt/slides/slide6.xml><?xml version="1.0" encoding="utf-8"?>
+<p:sld xmlns:a="http://schemas.openxmlformats.org/drawingml/2006/main" xmlns:r="http://schemas.openxmlformats.org/officeDocument/2006/relationships" xmlns:p="http://schemas.openxmlformats.org/presentationml/2006/main">
+  <p:cSld>
+    <p:spTree>
+      <p:nvGrpSpPr>
+        <p:cNvPr id="1" name=""/>
+        <p:cNvGrpSpPr/>
+        <p:nvPr/>
+      </p:nvGrpSpPr>
+      <p:grpSpPr>
+        <a:xfrm>
+          <a:off x="0" y="0"/>
+          <a:ext cx="0" cy="0"/>
+          <a:chOff x="0" y="0"/>
+          <a:chExt cx="0" cy="0"/>
+        </a:xfrm>
+      </p:grpSpPr>
+      <p:sp>
+        <p:nvSpPr>
+          <p:cNvPr id="2" name="Title 1"/>
+          <p:cNvSpPr>
+            <a:spLocks noGrp="1"/>
+          </p:cNvSpPr>
+          <p:nvPr>
+            <p:ph type="title"/>
+          </p:nvPr>
+        </p:nvSpPr>
+        <p:spPr/>
+        <p:txBody>
+          <a:bodyPr/>
+          <a:lstStyle/>
+          <a:p>
+            <a:r>
+              <a:rPr lang="en-US" dirty="0" smtClean="0"/>
+              <a:t>Norman </a:t>
+            </a:r>
+            <a:r>
+              <a:rPr lang="en-US" dirty="0" err="1" smtClean="0"/>
+              <a:t>Rockstars</a:t>
+            </a:r>
+            <a:r>
+              <a:rPr lang="en-US" dirty="0" smtClean="0"/>
+              <a:t> follow</a:t>
+            </a:r>
+            <a:endParaRPr lang="en-US" dirty="0"/>
+          </a:p>
+        </p:txBody>
+      </p:sp>
+      <p:sp>
+        <p:nvSpPr>
+          <p:cNvPr id="3" name="Content Placeholder 2"/>
+          <p:cNvSpPr>
+            <a:spLocks noGrp="1"/>
+          </p:cNvSpPr>
+          <p:nvPr>
+            <p:ph idx="1"/>
+          </p:nvPr>
+        </p:nvSpPr>
+        <p:spPr/>
+        <p:txBody>
+          <a:bodyPr/>
+          <a:lstStyle/>
+          <a:p>
+            <a:r>
+              <a:rPr lang="en-US" dirty="0" smtClean="0"/>
+              <a:t>Kaizen</a:t>
+            </a:r>
+          </a:p>
+          <a:p>
+            <a:r>
+              <a:rPr lang="en-US" dirty="0" smtClean="0"/>
+              <a:t>Yesterday we have code that works </a:t>
+            </a:r>
+          </a:p>
+          <a:p>
+            <a:r>
+              <a:rPr lang="en-US" b="1" dirty="0" smtClean="0"/>
+              <a:t>Today we want to improve it</a:t>
+            </a:r>
+          </a:p>
+          <a:p>
+            <a:endParaRPr lang="en-US" dirty="0" smtClean="0"/>
+          </a:p>
+          <a:p>
+            <a:endParaRPr lang="en-US" dirty="0"/>
+          </a:p>
+        </p:txBody>
+      </p:sp>
+    </p:spTree>
+  </p:cSld>
+  <p:clrMapOvr>
+    <a:masterClrMapping/>
+  </p:clrMapOvr>
+  <p:timing>
+    <p:tnLst>
+      <p:par>
+        <p:cTn id="1" dur="indefinite" restart="never" nodeType="tmRoot"/>
+      </p:par>
+    </p:tnLst>
+  </p:timing>
+</p:sld>
+</file>
+
+<file path=ppt/slides/slide60.xml><?xml version="1.0" encoding="utf-8"?>
 <p:sld xmlns:a="http://schemas.openxmlformats.org/drawingml/2006/main" xmlns:r="http://schemas.openxmlformats.org/officeDocument/2006/relationships" xmlns:p="http://schemas.openxmlformats.org/presentationml/2006/main">
   <p:cSld>
     <p:spTree>
@@ -9239,109 +9430,6 @@
   <p:clrMapOvr>
     <a:masterClrMapping/>
   </p:clrMapOvr>
-</p:sld>
-</file>
-
-<file path=ppt/slides/slide6.xml><?xml version="1.0" encoding="utf-8"?>
-<p:sld xmlns:a="http://schemas.openxmlformats.org/drawingml/2006/main" xmlns:r="http://schemas.openxmlformats.org/officeDocument/2006/relationships" xmlns:p="http://schemas.openxmlformats.org/presentationml/2006/main">
-  <p:cSld>
-    <p:spTree>
-      <p:nvGrpSpPr>
-        <p:cNvPr id="1" name=""/>
-        <p:cNvGrpSpPr/>
-        <p:nvPr/>
-      </p:nvGrpSpPr>
-      <p:grpSpPr>
-        <a:xfrm>
-          <a:off x="0" y="0"/>
-          <a:ext cx="0" cy="0"/>
-          <a:chOff x="0" y="0"/>
-          <a:chExt cx="0" cy="0"/>
-        </a:xfrm>
-      </p:grpSpPr>
-      <p:sp>
-        <p:nvSpPr>
-          <p:cNvPr id="2" name="Title 1"/>
-          <p:cNvSpPr>
-            <a:spLocks noGrp="1"/>
-          </p:cNvSpPr>
-          <p:nvPr>
-            <p:ph type="title"/>
-          </p:nvPr>
-        </p:nvSpPr>
-        <p:spPr/>
-        <p:txBody>
-          <a:bodyPr/>
-          <a:lstStyle/>
-          <a:p>
-            <a:r>
-              <a:rPr lang="en-US" dirty="0" smtClean="0"/>
-              <a:t>Norman </a:t>
-            </a:r>
-            <a:r>
-              <a:rPr lang="en-US" dirty="0" err="1" smtClean="0"/>
-              <a:t>Rockstars</a:t>
-            </a:r>
-            <a:r>
-              <a:rPr lang="en-US" dirty="0" smtClean="0"/>
-              <a:t> follow</a:t>
-            </a:r>
-            <a:endParaRPr lang="en-US" dirty="0"/>
-          </a:p>
-        </p:txBody>
-      </p:sp>
-      <p:sp>
-        <p:nvSpPr>
-          <p:cNvPr id="3" name="Content Placeholder 2"/>
-          <p:cNvSpPr>
-            <a:spLocks noGrp="1"/>
-          </p:cNvSpPr>
-          <p:nvPr>
-            <p:ph idx="1"/>
-          </p:nvPr>
-        </p:nvSpPr>
-        <p:spPr/>
-        <p:txBody>
-          <a:bodyPr/>
-          <a:lstStyle/>
-          <a:p>
-            <a:r>
-              <a:rPr lang="en-US" dirty="0" smtClean="0"/>
-              <a:t>Kaizen</a:t>
-            </a:r>
-          </a:p>
-          <a:p>
-            <a:r>
-              <a:rPr lang="en-US" dirty="0" smtClean="0"/>
-              <a:t>Yesterday we have code that works </a:t>
-            </a:r>
-          </a:p>
-          <a:p>
-            <a:r>
-              <a:rPr lang="en-US" b="1" dirty="0" smtClean="0"/>
-              <a:t>Today we want to improve it</a:t>
-            </a:r>
-          </a:p>
-          <a:p>
-            <a:endParaRPr lang="en-US" dirty="0" smtClean="0"/>
-          </a:p>
-          <a:p>
-            <a:endParaRPr lang="en-US" dirty="0"/>
-          </a:p>
-        </p:txBody>
-      </p:sp>
-    </p:spTree>
-  </p:cSld>
-  <p:clrMapOvr>
-    <a:masterClrMapping/>
-  </p:clrMapOvr>
-  <p:timing>
-    <p:tnLst>
-      <p:par>
-        <p:cTn id="1" dur="indefinite" restart="never" nodeType="tmRoot"/>
-      </p:par>
-    </p:tnLst>
-  </p:timing>
 </p:sld>
 </file>
 

</xml_diff>

<commit_message>
organizing the presentation, adding more stuff
</commit_message>
<xml_diff>
--- a/SOLID Principles of OOD v2.pptx
+++ b/SOLID Principles of OOD v2.pptx
@@ -5,7 +5,7 @@
     <p:sldMasterId id="2147483648" r:id="rId1"/>
   </p:sldMasterIdLst>
   <p:notesMasterIdLst>
-    <p:notesMasterId r:id="rId62"/>
+    <p:notesMasterId r:id="rId73"/>
   </p:notesMasterIdLst>
   <p:sldIdLst>
     <p:sldId id="256" r:id="rId2"/>
@@ -14,8 +14,8 @@
     <p:sldId id="259" r:id="rId5"/>
     <p:sldId id="269" r:id="rId6"/>
     <p:sldId id="305" r:id="rId7"/>
-    <p:sldId id="293" r:id="rId8"/>
-    <p:sldId id="263" r:id="rId9"/>
+    <p:sldId id="263" r:id="rId8"/>
+    <p:sldId id="332" r:id="rId9"/>
     <p:sldId id="328" r:id="rId10"/>
     <p:sldId id="265" r:id="rId11"/>
     <p:sldId id="261" r:id="rId12"/>
@@ -30,44 +30,55 @@
     <p:sldId id="309" r:id="rId21"/>
     <p:sldId id="298" r:id="rId22"/>
     <p:sldId id="308" r:id="rId23"/>
-    <p:sldId id="268" r:id="rId24"/>
-    <p:sldId id="266" r:id="rId25"/>
-    <p:sldId id="267" r:id="rId26"/>
-    <p:sldId id="278" r:id="rId27"/>
-    <p:sldId id="274" r:id="rId28"/>
-    <p:sldId id="327" r:id="rId29"/>
-    <p:sldId id="277" r:id="rId30"/>
-    <p:sldId id="275" r:id="rId31"/>
-    <p:sldId id="329" r:id="rId32"/>
-    <p:sldId id="283" r:id="rId33"/>
-    <p:sldId id="313" r:id="rId34"/>
-    <p:sldId id="331" r:id="rId35"/>
-    <p:sldId id="279" r:id="rId36"/>
-    <p:sldId id="284" r:id="rId37"/>
-    <p:sldId id="316" r:id="rId38"/>
-    <p:sldId id="315" r:id="rId39"/>
-    <p:sldId id="280" r:id="rId40"/>
-    <p:sldId id="285" r:id="rId41"/>
-    <p:sldId id="317" r:id="rId42"/>
-    <p:sldId id="314" r:id="rId43"/>
-    <p:sldId id="281" r:id="rId44"/>
-    <p:sldId id="286" r:id="rId45"/>
-    <p:sldId id="318" r:id="rId46"/>
-    <p:sldId id="282" r:id="rId47"/>
-    <p:sldId id="287" r:id="rId48"/>
-    <p:sldId id="319" r:id="rId49"/>
-    <p:sldId id="311" r:id="rId50"/>
-    <p:sldId id="288" r:id="rId51"/>
-    <p:sldId id="300" r:id="rId52"/>
-    <p:sldId id="301" r:id="rId53"/>
-    <p:sldId id="295" r:id="rId54"/>
-    <p:sldId id="303" r:id="rId55"/>
-    <p:sldId id="302" r:id="rId56"/>
-    <p:sldId id="304" r:id="rId57"/>
-    <p:sldId id="330" r:id="rId58"/>
-    <p:sldId id="276" r:id="rId59"/>
-    <p:sldId id="326" r:id="rId60"/>
-    <p:sldId id="324" r:id="rId61"/>
+    <p:sldId id="293" r:id="rId24"/>
+    <p:sldId id="274" r:id="rId25"/>
+    <p:sldId id="327" r:id="rId26"/>
+    <p:sldId id="336" r:id="rId27"/>
+    <p:sldId id="266" r:id="rId28"/>
+    <p:sldId id="267" r:id="rId29"/>
+    <p:sldId id="335" r:id="rId30"/>
+    <p:sldId id="333" r:id="rId31"/>
+    <p:sldId id="334" r:id="rId32"/>
+    <p:sldId id="268" r:id="rId33"/>
+    <p:sldId id="278" r:id="rId34"/>
+    <p:sldId id="275" r:id="rId35"/>
+    <p:sldId id="329" r:id="rId36"/>
+    <p:sldId id="277" r:id="rId37"/>
+    <p:sldId id="283" r:id="rId38"/>
+    <p:sldId id="313" r:id="rId39"/>
+    <p:sldId id="331" r:id="rId40"/>
+    <p:sldId id="279" r:id="rId41"/>
+    <p:sldId id="284" r:id="rId42"/>
+    <p:sldId id="316" r:id="rId43"/>
+    <p:sldId id="315" r:id="rId44"/>
+    <p:sldId id="280" r:id="rId45"/>
+    <p:sldId id="285" r:id="rId46"/>
+    <p:sldId id="317" r:id="rId47"/>
+    <p:sldId id="314" r:id="rId48"/>
+    <p:sldId id="281" r:id="rId49"/>
+    <p:sldId id="286" r:id="rId50"/>
+    <p:sldId id="338" r:id="rId51"/>
+    <p:sldId id="318" r:id="rId52"/>
+    <p:sldId id="282" r:id="rId53"/>
+    <p:sldId id="287" r:id="rId54"/>
+    <p:sldId id="319" r:id="rId55"/>
+    <p:sldId id="340" r:id="rId56"/>
+    <p:sldId id="339" r:id="rId57"/>
+    <p:sldId id="341" r:id="rId58"/>
+    <p:sldId id="342" r:id="rId59"/>
+    <p:sldId id="337" r:id="rId60"/>
+    <p:sldId id="311" r:id="rId61"/>
+    <p:sldId id="288" r:id="rId62"/>
+    <p:sldId id="300" r:id="rId63"/>
+    <p:sldId id="301" r:id="rId64"/>
+    <p:sldId id="295" r:id="rId65"/>
+    <p:sldId id="303" r:id="rId66"/>
+    <p:sldId id="302" r:id="rId67"/>
+    <p:sldId id="304" r:id="rId68"/>
+    <p:sldId id="330" r:id="rId69"/>
+    <p:sldId id="276" r:id="rId70"/>
+    <p:sldId id="326" r:id="rId71"/>
+    <p:sldId id="324" r:id="rId72"/>
   </p:sldIdLst>
   <p:sldSz cx="9144000" cy="6858000" type="screen4x3"/>
   <p:notesSz cx="6858000" cy="9144000"/>
@@ -3861,7 +3872,15 @@
           <a:p>
             <a:r>
               <a:rPr lang="en-US" dirty="0" smtClean="0"/>
-              <a:t>Code Smells [Problems]</a:t>
+              <a:t>Code Problems </a:t>
+            </a:r>
+            <a:r>
+              <a:rPr lang="en-US" dirty="0" err="1" smtClean="0"/>
+              <a:t>a.k.a</a:t>
+            </a:r>
+            <a:r>
+              <a:rPr lang="en-US" dirty="0" smtClean="0"/>
+              <a:t> Code Smells</a:t>
             </a:r>
             <a:endParaRPr lang="en-US" dirty="0"/>
           </a:p>
@@ -3941,7 +3960,7 @@
         <p:spPr/>
         <p:txBody>
           <a:bodyPr>
-            <a:normAutofit fontScale="90000"/>
+            <a:normAutofit/>
           </a:bodyPr>
           <a:lstStyle/>
           <a:p>
@@ -3955,7 +3974,11 @@
             </a:r>
             <a:r>
               <a:rPr lang="en-US" dirty="0" smtClean="0"/>
-              <a:t> Screen Capture</a:t>
+              <a:t> </a:t>
+            </a:r>
+            <a:r>
+              <a:rPr lang="en-US" dirty="0" smtClean="0"/>
+              <a:t>Catalog</a:t>
             </a:r>
             <a:endParaRPr lang="en-US" dirty="0"/>
           </a:p>
@@ -4067,8 +4090,9 @@
           <a:p>
             <a:r>
               <a:rPr lang="en-US" dirty="0" smtClean="0"/>
-              <a:t>Clean Code : A handbook of Agile Software Craftsmanship [Bob Martin]</a:t>
-            </a:r>
+              <a:t>Agile Principles &amp; Practices[Bob Martin]</a:t>
+            </a:r>
+            <a:endParaRPr lang="en-US" dirty="0" smtClean="0"/>
           </a:p>
           <a:p>
             <a:pPr>
@@ -4220,8 +4244,19 @@
           <a:p>
             <a:r>
               <a:rPr lang="en-US" i="1" dirty="0" smtClean="0"/>
-              <a:t>In school, they teach the opposite.</a:t>
-            </a:r>
+              <a:t>‘In </a:t>
+            </a:r>
+            <a:r>
+              <a:rPr lang="en-US" i="1" dirty="0" smtClean="0"/>
+              <a:t>school, they teach the </a:t>
+            </a:r>
+            <a:r>
+              <a:rPr lang="en-US" i="1" dirty="0" smtClean="0"/>
+              <a:t>opposite’.</a:t>
+            </a:r>
+          </a:p>
+          <a:p>
+            <a:endParaRPr lang="en-US" i="1" dirty="0" smtClean="0"/>
           </a:p>
         </p:txBody>
       </p:sp>
@@ -4716,28 +4751,26 @@
       </p:sp>
       <p:pic>
         <p:nvPicPr>
-          <p:cNvPr id="41990" name="Picture 6" descr="http://images.clipartof.com/small/437789-Royalty-Free-RF-Clip-Art-Illustration-Of-A-Grateful-Cartoon-Boy-Holding-Thanks-Balloons.jpg"/>
+          <p:cNvPr id="4" name="Picture 3" descr="thanks.png"/>
           <p:cNvPicPr>
-            <a:picLocks noChangeAspect="1" noChangeArrowheads="1"/>
+            <a:picLocks noChangeAspect="1"/>
           </p:cNvPicPr>
           <p:nvPr/>
         </p:nvPicPr>
         <p:blipFill>
           <a:blip r:embed="rId2" cstate="print"/>
-          <a:srcRect/>
           <a:stretch>
             <a:fillRect/>
           </a:stretch>
         </p:blipFill>
-        <p:spPr bwMode="auto">
+        <p:spPr>
           <a:xfrm>
-            <a:off x="838200" y="1828800"/>
-            <a:ext cx="4286250" cy="3962399"/>
+            <a:off x="609600" y="1219200"/>
+            <a:ext cx="4525007" cy="3820058"/>
           </a:xfrm>
           <a:prstGeom prst="rect">
             <a:avLst/>
           </a:prstGeom>
-          <a:noFill/>
         </p:spPr>
       </p:pic>
     </p:spTree>
@@ -5023,71 +5056,46 @@
           <a:p>
             <a:r>
               <a:rPr lang="en-US" dirty="0" smtClean="0"/>
-              <a:t>Other OO Developers</a:t>
+              <a:t>Clean Code</a:t>
             </a:r>
             <a:endParaRPr lang="en-US" dirty="0"/>
           </a:p>
         </p:txBody>
       </p:sp>
-      <p:sp>
-        <p:nvSpPr>
-          <p:cNvPr id="3" name="Content Placeholder 2"/>
-          <p:cNvSpPr>
-            <a:spLocks noGrp="1"/>
-          </p:cNvSpPr>
+      <p:pic>
+        <p:nvPicPr>
+          <p:cNvPr id="1026" name="Picture 2"/>
+          <p:cNvPicPr>
+            <a:picLocks noGrp="1" noChangeAspect="1" noChangeArrowheads="1"/>
+          </p:cNvPicPr>
           <p:nvPr>
             <p:ph idx="1"/>
           </p:nvPr>
-        </p:nvSpPr>
-        <p:spPr/>
-        <p:txBody>
-          <a:bodyPr>
-            <a:normAutofit fontScale="92500" lnSpcReduction="10000"/>
-          </a:bodyPr>
-          <a:lstStyle/>
-          <a:p>
-            <a:r>
-              <a:rPr lang="en-US" dirty="0"/>
-              <a:t>H</a:t>
-            </a:r>
-            <a:r>
-              <a:rPr lang="en-US" dirty="0" smtClean="0"/>
-              <a:t>ave committed the same kind of design mistakes </a:t>
-            </a:r>
-          </a:p>
-          <a:p>
-            <a:r>
-              <a:rPr lang="en-US" dirty="0" smtClean="0"/>
-              <a:t>Have learnt from those mistakes</a:t>
-            </a:r>
-          </a:p>
-          <a:p>
-            <a:r>
-              <a:rPr lang="en-US" dirty="0" smtClean="0"/>
-              <a:t>Some have specified some GUIDELINES</a:t>
-            </a:r>
-          </a:p>
-          <a:p>
-            <a:r>
-              <a:rPr lang="en-US" dirty="0" smtClean="0"/>
-              <a:t>We can choose to follow or not!</a:t>
-            </a:r>
-          </a:p>
-          <a:p>
-            <a:r>
-              <a:rPr lang="en-US" dirty="0" smtClean="0"/>
-              <a:t>If we choose to follow, we have to understand the problems and where they apply.</a:t>
-            </a:r>
-          </a:p>
-          <a:p>
-            <a:r>
-              <a:rPr lang="en-US" dirty="0" smtClean="0"/>
-              <a:t>If we encounter the same issues, we can meditate on these guidelines and apply them.</a:t>
-            </a:r>
-            <a:endParaRPr lang="en-US" dirty="0"/>
-          </a:p>
-        </p:txBody>
-      </p:sp>
+        </p:nvPicPr>
+        <p:blipFill>
+          <a:blip r:embed="rId2" cstate="print"/>
+          <a:srcRect/>
+          <a:stretch>
+            <a:fillRect/>
+          </a:stretch>
+        </p:blipFill>
+        <p:spPr bwMode="auto">
+          <a:xfrm>
+            <a:off x="1524000" y="1600200"/>
+            <a:ext cx="6629400" cy="4876800"/>
+          </a:xfrm>
+          <a:prstGeom prst="rect">
+            <a:avLst/>
+          </a:prstGeom>
+          <a:noFill/>
+          <a:ln w="9525">
+            <a:noFill/>
+            <a:miter lim="800000"/>
+            <a:headEnd/>
+            <a:tailEnd/>
+          </a:ln>
+        </p:spPr>
+      </p:pic>
     </p:spTree>
   </p:cSld>
   <p:clrMapOvr>
@@ -5138,8 +5146,19 @@
           <a:lstStyle/>
           <a:p>
             <a:r>
-              <a:rPr lang="en-US" dirty="0" smtClean="0"/>
-              <a:t>So, what are SOLID principles about?</a:t>
+              <a:rPr lang="en-US" b="1" dirty="0" smtClean="0"/>
+              <a:t>SOLID</a:t>
+            </a:r>
+            <a:r>
+              <a:rPr lang="en-US" dirty="0" smtClean="0"/>
+              <a:t> principles of </a:t>
+            </a:r>
+            <a:br>
+              <a:rPr lang="en-US" dirty="0" smtClean="0"/>
+            </a:br>
+            <a:r>
+              <a:rPr lang="en-US" dirty="0" smtClean="0"/>
+              <a:t>Object Oriented Design</a:t>
             </a:r>
             <a:endParaRPr lang="en-US" dirty="0"/>
           </a:p>
@@ -5161,26 +5180,192 @@
           <a:lstStyle/>
           <a:p>
             <a:r>
-              <a:rPr lang="en-US" dirty="0" smtClean="0"/>
-              <a:t>Better question would be : What problems are they trying to solve?</a:t>
-            </a:r>
-          </a:p>
-          <a:p>
-            <a:endParaRPr lang="en-US" dirty="0" smtClean="0"/>
-          </a:p>
-          <a:p>
+              <a:rPr lang="en-US" b="1" dirty="0" smtClean="0"/>
+              <a:t>S</a:t>
+            </a:r>
+            <a:r>
+              <a:rPr lang="en-US" dirty="0" smtClean="0"/>
+              <a:t>ingle </a:t>
+            </a:r>
+            <a:r>
+              <a:rPr lang="en-US" b="1" dirty="0" smtClean="0"/>
+              <a:t>R</a:t>
+            </a:r>
+            <a:r>
+              <a:rPr lang="en-US" dirty="0" smtClean="0"/>
+              <a:t>esponsibility </a:t>
+            </a:r>
+            <a:r>
+              <a:rPr lang="en-US" b="1" dirty="0" smtClean="0"/>
+              <a:t>P</a:t>
+            </a:r>
+            <a:r>
+              <a:rPr lang="en-US" dirty="0" smtClean="0"/>
+              <a:t>rinciple</a:t>
+            </a:r>
+          </a:p>
+          <a:p>
+            <a:r>
+              <a:rPr lang="en-US" b="1" dirty="0" smtClean="0"/>
+              <a:t>O</a:t>
+            </a:r>
+            <a:r>
+              <a:rPr lang="en-US" dirty="0" smtClean="0"/>
+              <a:t>pen/</a:t>
+            </a:r>
+            <a:r>
+              <a:rPr lang="en-US" b="1" dirty="0" smtClean="0"/>
+              <a:t>C</a:t>
+            </a:r>
+            <a:r>
+              <a:rPr lang="en-US" dirty="0" smtClean="0"/>
+              <a:t>losed </a:t>
+            </a:r>
+            <a:r>
+              <a:rPr lang="en-US" b="1" dirty="0" smtClean="0"/>
+              <a:t>P</a:t>
+            </a:r>
+            <a:r>
+              <a:rPr lang="en-US" dirty="0" smtClean="0"/>
+              <a:t>rinciple</a:t>
+            </a:r>
+          </a:p>
+          <a:p>
+            <a:r>
+              <a:rPr lang="en-US" b="1" dirty="0" err="1" smtClean="0"/>
+              <a:t>L</a:t>
+            </a:r>
+            <a:r>
+              <a:rPr lang="en-US" dirty="0" err="1" smtClean="0"/>
+              <a:t>iskov</a:t>
+            </a:r>
+            <a:r>
+              <a:rPr lang="en-US" dirty="0" smtClean="0"/>
+              <a:t> </a:t>
+            </a:r>
+            <a:r>
+              <a:rPr lang="en-US" b="1" dirty="0" smtClean="0"/>
+              <a:t>S</a:t>
+            </a:r>
+            <a:r>
+              <a:rPr lang="en-US" dirty="0" smtClean="0"/>
+              <a:t>ubstitution </a:t>
+            </a:r>
+            <a:r>
+              <a:rPr lang="en-US" b="1" dirty="0" smtClean="0"/>
+              <a:t>P</a:t>
+            </a:r>
+            <a:r>
+              <a:rPr lang="en-US" dirty="0" smtClean="0"/>
+              <a:t>rinciple</a:t>
+            </a:r>
+          </a:p>
+          <a:p>
+            <a:r>
+              <a:rPr lang="en-US" b="1" dirty="0" smtClean="0"/>
+              <a:t>I</a:t>
+            </a:r>
+            <a:r>
+              <a:rPr lang="en-US" dirty="0" smtClean="0"/>
+              <a:t>nterface </a:t>
+            </a:r>
+            <a:r>
+              <a:rPr lang="en-US" b="1" dirty="0" smtClean="0"/>
+              <a:t>S</a:t>
+            </a:r>
+            <a:r>
+              <a:rPr lang="en-US" dirty="0" smtClean="0"/>
+              <a:t>egregation </a:t>
+            </a:r>
+            <a:r>
+              <a:rPr lang="en-US" b="1" dirty="0" smtClean="0"/>
+              <a:t>P</a:t>
+            </a:r>
+            <a:r>
+              <a:rPr lang="en-US" dirty="0" smtClean="0"/>
+              <a:t>rinciple</a:t>
+            </a:r>
+          </a:p>
+          <a:p>
+            <a:r>
+              <a:rPr lang="en-US" b="1" dirty="0" smtClean="0"/>
+              <a:t>D</a:t>
+            </a:r>
+            <a:r>
+              <a:rPr lang="en-US" dirty="0" smtClean="0"/>
+              <a:t>ependency </a:t>
+            </a:r>
+            <a:r>
+              <a:rPr lang="en-US" b="1" dirty="0" smtClean="0"/>
+              <a:t>I</a:t>
+            </a:r>
+            <a:r>
+              <a:rPr lang="en-US" dirty="0" smtClean="0"/>
+              <a:t>nversion </a:t>
+            </a:r>
+            <a:r>
+              <a:rPr lang="en-US" b="1" dirty="0" smtClean="0"/>
+              <a:t>P</a:t>
+            </a:r>
+            <a:r>
+              <a:rPr lang="en-US" dirty="0" smtClean="0"/>
+              <a:t>rinciple</a:t>
+            </a:r>
             <a:endParaRPr lang="en-US" dirty="0"/>
           </a:p>
-          <a:p>
-            <a:r>
-              <a:rPr lang="en-US" dirty="0" smtClean="0"/>
-              <a:t>They are trying to solve a specific set of problems, namely </a:t>
-            </a:r>
-          </a:p>
-          <a:p>
-            <a:endParaRPr lang="en-US" dirty="0" smtClean="0"/>
-          </a:p>
-          <a:p>
+        </p:txBody>
+      </p:sp>
+      <p:pic>
+        <p:nvPicPr>
+          <p:cNvPr id="33794" name="Picture 2" descr="http://t0.gstatic.com/images?q=tbn:ANd9GcQBQ9qUo5ympfTIpyV955tPnNgccmqPb9CjCmeMYIATAMg7PF_-zB70l6Zx6w"/>
+          <p:cNvPicPr>
+            <a:picLocks noChangeAspect="1" noChangeArrowheads="1"/>
+          </p:cNvPicPr>
+          <p:nvPr/>
+        </p:nvPicPr>
+        <p:blipFill>
+          <a:blip r:embed="rId2" cstate="print"/>
+          <a:srcRect/>
+          <a:stretch>
+            <a:fillRect/>
+          </a:stretch>
+        </p:blipFill>
+        <p:spPr bwMode="auto">
+          <a:xfrm>
+            <a:off x="7086600" y="4343400"/>
+            <a:ext cx="1457325" cy="1943101"/>
+          </a:xfrm>
+          <a:prstGeom prst="rect">
+            <a:avLst/>
+          </a:prstGeom>
+          <a:noFill/>
+        </p:spPr>
+      </p:pic>
+      <p:sp>
+        <p:nvSpPr>
+          <p:cNvPr id="5" name="Rectangle 4"/>
+          <p:cNvSpPr/>
+          <p:nvPr/>
+        </p:nvSpPr>
+        <p:spPr>
+          <a:xfrm>
+            <a:off x="609600" y="4953000"/>
+            <a:ext cx="4572000" cy="646331"/>
+          </a:xfrm>
+          <a:prstGeom prst="rect">
+            <a:avLst/>
+          </a:prstGeom>
+        </p:spPr>
+        <p:txBody>
+          <a:bodyPr>
+            <a:spAutoFit/>
+          </a:bodyPr>
+          <a:lstStyle/>
+          <a:p>
+            <a:r>
+              <a:rPr lang="en-US" dirty="0" smtClean="0"/>
+              <a:t>http://butunclebob.com/ArticleS.UncleBob.PrinciplesOfOod</a:t>
+            </a:r>
             <a:endParaRPr lang="en-US" dirty="0"/>
           </a:p>
         </p:txBody>
@@ -5219,7 +5404,7 @@
       </p:grpSpPr>
       <p:sp>
         <p:nvSpPr>
-          <p:cNvPr id="4" name="Title 3"/>
+          <p:cNvPr id="2" name="Title 1"/>
           <p:cNvSpPr>
             <a:spLocks noGrp="1"/>
           </p:cNvSpPr>
@@ -5229,519 +5414,19 @@
         </p:nvSpPr>
         <p:spPr/>
         <p:txBody>
-          <a:bodyPr>
-            <a:normAutofit fontScale="90000"/>
-          </a:bodyPr>
-          <a:lstStyle/>
-          <a:p>
-            <a:r>
-              <a:rPr lang="en-US" dirty="0" smtClean="0"/>
-              <a:t/>
-            </a:r>
-            <a:br>
-              <a:rPr lang="en-US" dirty="0" smtClean="0"/>
-            </a:br>
-            <a:r>
-              <a:rPr lang="en-US" dirty="0"/>
-              <a:t/>
-            </a:r>
-            <a:br>
-              <a:rPr lang="en-US" dirty="0"/>
-            </a:br>
-            <a:r>
-              <a:rPr lang="en-US" dirty="0" smtClean="0"/>
-              <a:t/>
-            </a:r>
-            <a:br>
-              <a:rPr lang="en-US" dirty="0" smtClean="0"/>
-            </a:br>
-            <a:r>
-              <a:rPr lang="en-US" dirty="0"/>
-              <a:t/>
-            </a:r>
-            <a:br>
-              <a:rPr lang="en-US" dirty="0"/>
-            </a:br>
-            <a:r>
-              <a:rPr lang="en-US" dirty="0" smtClean="0"/>
-              <a:t/>
-            </a:r>
-            <a:br>
-              <a:rPr lang="en-US" dirty="0" smtClean="0"/>
-            </a:br>
-            <a:r>
-              <a:rPr lang="en-US" dirty="0"/>
-              <a:t/>
-            </a:r>
-            <a:br>
-              <a:rPr lang="en-US" dirty="0"/>
-            </a:br>
-            <a:r>
-              <a:rPr lang="en-US" dirty="0" smtClean="0"/>
-              <a:t/>
-            </a:r>
-            <a:br>
-              <a:rPr lang="en-US" dirty="0" smtClean="0"/>
-            </a:br>
-            <a:r>
-              <a:rPr lang="en-US" dirty="0"/>
-              <a:t/>
-            </a:r>
-            <a:br>
-              <a:rPr lang="en-US" dirty="0"/>
-            </a:br>
-            <a:r>
-              <a:rPr lang="en-US" dirty="0" smtClean="0"/>
-              <a:t>DEPENDENCY MANAGEMENT ISSUES</a:t>
-            </a:r>
-            <a:endParaRPr lang="en-US" dirty="0"/>
-          </a:p>
-        </p:txBody>
-      </p:sp>
-      <p:sp>
-        <p:nvSpPr>
-          <p:cNvPr id="3" name="Content Placeholder 2"/>
-          <p:cNvSpPr>
-            <a:spLocks noGrp="1"/>
-          </p:cNvSpPr>
-          <p:nvPr>
-            <p:ph idx="4294967295"/>
-          </p:nvPr>
-        </p:nvSpPr>
-        <p:spPr>
-          <a:xfrm>
-            <a:off x="838200" y="1600200"/>
-            <a:ext cx="7620000" cy="4525963"/>
-          </a:xfrm>
-        </p:spPr>
-        <p:txBody>
           <a:bodyPr/>
           <a:lstStyle/>
           <a:p>
-            <a:pPr>
-              <a:buNone/>
-            </a:pPr>
-            <a:endParaRPr lang="en-US" dirty="0"/>
-          </a:p>
-          <a:p>
-            <a:pPr>
-              <a:buNone/>
-            </a:pPr>
-            <a:endParaRPr lang="en-US" dirty="0" smtClean="0"/>
-          </a:p>
-          <a:p>
-            <a:pPr>
-              <a:buNone/>
-            </a:pPr>
-            <a:r>
-              <a:rPr lang="en-US" dirty="0"/>
-              <a:t>	</a:t>
-            </a:r>
-            <a:r>
-              <a:rPr lang="en-US" dirty="0" smtClean="0"/>
-              <a:t>	</a:t>
-            </a:r>
-            <a:endParaRPr lang="en-US" dirty="0"/>
-          </a:p>
-        </p:txBody>
-      </p:sp>
-    </p:spTree>
-  </p:cSld>
-  <p:clrMapOvr>
-    <a:masterClrMapping/>
-  </p:clrMapOvr>
-  <p:timing>
-    <p:tnLst>
-      <p:par>
-        <p:cTn id="1" dur="indefinite" restart="never" nodeType="tmRoot"/>
-      </p:par>
-    </p:tnLst>
-  </p:timing>
-</p:sld>
-</file>
-
-<file path=ppt/slides/slide26.xml><?xml version="1.0" encoding="utf-8"?>
-<p:sld xmlns:a="http://schemas.openxmlformats.org/drawingml/2006/main" xmlns:r="http://schemas.openxmlformats.org/officeDocument/2006/relationships" xmlns:p="http://schemas.openxmlformats.org/presentationml/2006/main">
-  <p:cSld>
-    <p:spTree>
-      <p:nvGrpSpPr>
-        <p:cNvPr id="1" name=""/>
-        <p:cNvGrpSpPr/>
-        <p:nvPr/>
-      </p:nvGrpSpPr>
-      <p:grpSpPr>
-        <a:xfrm>
-          <a:off x="0" y="0"/>
-          <a:ext cx="0" cy="0"/>
-          <a:chOff x="0" y="0"/>
-          <a:chExt cx="0" cy="0"/>
-        </a:xfrm>
-      </p:grpSpPr>
-      <p:pic>
-        <p:nvPicPr>
-          <p:cNvPr id="7" name="Picture 6" descr="solid.jpg"/>
-          <p:cNvPicPr>
-            <a:picLocks noChangeAspect="1"/>
-          </p:cNvPicPr>
-          <p:nvPr/>
-        </p:nvPicPr>
-        <p:blipFill>
-          <a:blip r:embed="rId2" cstate="print"/>
-          <a:stretch>
-            <a:fillRect/>
-          </a:stretch>
-        </p:blipFill>
-        <p:spPr>
-          <a:xfrm>
-            <a:off x="990600" y="561975"/>
-            <a:ext cx="7162800" cy="5734050"/>
-          </a:xfrm>
-          <a:prstGeom prst="rect">
-            <a:avLst/>
-          </a:prstGeom>
-          <a:ln>
-            <a:noFill/>
-          </a:ln>
-          <a:effectLst>
-            <a:outerShdw blurRad="292100" dist="139700" dir="2700000" algn="tl" rotWithShape="0">
-              <a:srgbClr val="333333">
-                <a:alpha val="65000"/>
-              </a:srgbClr>
-            </a:outerShdw>
-          </a:effectLst>
-        </p:spPr>
-      </p:pic>
-    </p:spTree>
-  </p:cSld>
-  <p:clrMapOvr>
-    <a:masterClrMapping/>
-  </p:clrMapOvr>
-  <p:timing>
-    <p:tnLst>
-      <p:par>
-        <p:cTn id="1" dur="indefinite" restart="never" nodeType="tmRoot"/>
-      </p:par>
-    </p:tnLst>
-  </p:timing>
-</p:sld>
-</file>
-
-<file path=ppt/slides/slide27.xml><?xml version="1.0" encoding="utf-8"?>
-<p:sld xmlns:a="http://schemas.openxmlformats.org/drawingml/2006/main" xmlns:r="http://schemas.openxmlformats.org/officeDocument/2006/relationships" xmlns:p="http://schemas.openxmlformats.org/presentationml/2006/main">
-  <p:cSld>
-    <p:spTree>
-      <p:nvGrpSpPr>
-        <p:cNvPr id="1" name=""/>
-        <p:cNvGrpSpPr/>
-        <p:nvPr/>
-      </p:nvGrpSpPr>
-      <p:grpSpPr>
-        <a:xfrm>
-          <a:off x="0" y="0"/>
-          <a:ext cx="0" cy="0"/>
-          <a:chOff x="0" y="0"/>
-          <a:chExt cx="0" cy="0"/>
-        </a:xfrm>
-      </p:grpSpPr>
-      <p:sp>
-        <p:nvSpPr>
-          <p:cNvPr id="2" name="Title 1"/>
-          <p:cNvSpPr>
-            <a:spLocks noGrp="1"/>
-          </p:cNvSpPr>
-          <p:nvPr>
-            <p:ph type="title"/>
-          </p:nvPr>
-        </p:nvSpPr>
-        <p:spPr/>
-        <p:txBody>
-          <a:bodyPr>
-            <a:normAutofit fontScale="90000"/>
-          </a:bodyPr>
-          <a:lstStyle/>
-          <a:p>
+            <a:r>
+              <a:rPr lang="en-US" dirty="0" smtClean="0"/>
+              <a:t>The Acronym </a:t>
+            </a:r>
             <a:r>
               <a:rPr lang="en-US" b="1" dirty="0" smtClean="0"/>
               <a:t>SOLID</a:t>
             </a:r>
             <a:r>
               <a:rPr lang="en-US" dirty="0" smtClean="0"/>
-              <a:t> principles of </a:t>
-            </a:r>
-            <a:br>
-              <a:rPr lang="en-US" dirty="0" smtClean="0"/>
-            </a:br>
-            <a:r>
-              <a:rPr lang="en-US" dirty="0" smtClean="0"/>
-              <a:t>Object Oriented Design</a:t>
-            </a:r>
-            <a:endParaRPr lang="en-US" dirty="0"/>
-          </a:p>
-        </p:txBody>
-      </p:sp>
-      <p:sp>
-        <p:nvSpPr>
-          <p:cNvPr id="3" name="Content Placeholder 2"/>
-          <p:cNvSpPr>
-            <a:spLocks noGrp="1"/>
-          </p:cNvSpPr>
-          <p:nvPr>
-            <p:ph idx="1"/>
-          </p:nvPr>
-        </p:nvSpPr>
-        <p:spPr/>
-        <p:txBody>
-          <a:bodyPr/>
-          <a:lstStyle/>
-          <a:p>
-            <a:r>
-              <a:rPr lang="en-US" b="1" dirty="0" smtClean="0"/>
-              <a:t>S</a:t>
-            </a:r>
-            <a:r>
-              <a:rPr lang="en-US" dirty="0" smtClean="0"/>
-              <a:t>ingle </a:t>
-            </a:r>
-            <a:r>
-              <a:rPr lang="en-US" b="1" dirty="0" smtClean="0"/>
-              <a:t>R</a:t>
-            </a:r>
-            <a:r>
-              <a:rPr lang="en-US" dirty="0" smtClean="0"/>
-              <a:t>esponsibility </a:t>
-            </a:r>
-            <a:r>
-              <a:rPr lang="en-US" b="1" dirty="0" smtClean="0"/>
-              <a:t>P</a:t>
-            </a:r>
-            <a:r>
-              <a:rPr lang="en-US" dirty="0" smtClean="0"/>
-              <a:t>rinciple</a:t>
-            </a:r>
-          </a:p>
-          <a:p>
-            <a:r>
-              <a:rPr lang="en-US" b="1" dirty="0" smtClean="0"/>
-              <a:t>O</a:t>
-            </a:r>
-            <a:r>
-              <a:rPr lang="en-US" dirty="0" smtClean="0"/>
-              <a:t>pen/</a:t>
-            </a:r>
-            <a:r>
-              <a:rPr lang="en-US" b="1" dirty="0" smtClean="0"/>
-              <a:t>C</a:t>
-            </a:r>
-            <a:r>
-              <a:rPr lang="en-US" dirty="0" smtClean="0"/>
-              <a:t>losed </a:t>
-            </a:r>
-            <a:r>
-              <a:rPr lang="en-US" b="1" dirty="0" smtClean="0"/>
-              <a:t>P</a:t>
-            </a:r>
-            <a:r>
-              <a:rPr lang="en-US" dirty="0" smtClean="0"/>
-              <a:t>rinciple</a:t>
-            </a:r>
-          </a:p>
-          <a:p>
-            <a:r>
-              <a:rPr lang="en-US" b="1" dirty="0" err="1" smtClean="0"/>
-              <a:t>L</a:t>
-            </a:r>
-            <a:r>
-              <a:rPr lang="en-US" dirty="0" err="1" smtClean="0"/>
-              <a:t>iskov</a:t>
-            </a:r>
-            <a:r>
-              <a:rPr lang="en-US" dirty="0" smtClean="0"/>
-              <a:t> </a:t>
-            </a:r>
-            <a:r>
-              <a:rPr lang="en-US" b="1" dirty="0" smtClean="0"/>
-              <a:t>S</a:t>
-            </a:r>
-            <a:r>
-              <a:rPr lang="en-US" dirty="0" smtClean="0"/>
-              <a:t>ubstitution </a:t>
-            </a:r>
-            <a:r>
-              <a:rPr lang="en-US" b="1" dirty="0" smtClean="0"/>
-              <a:t>P</a:t>
-            </a:r>
-            <a:r>
-              <a:rPr lang="en-US" dirty="0" smtClean="0"/>
-              <a:t>rinciple</a:t>
-            </a:r>
-          </a:p>
-          <a:p>
-            <a:r>
-              <a:rPr lang="en-US" b="1" dirty="0" smtClean="0"/>
-              <a:t>I</a:t>
-            </a:r>
-            <a:r>
-              <a:rPr lang="en-US" dirty="0" smtClean="0"/>
-              <a:t>nterface </a:t>
-            </a:r>
-            <a:r>
-              <a:rPr lang="en-US" b="1" dirty="0" smtClean="0"/>
-              <a:t>S</a:t>
-            </a:r>
-            <a:r>
-              <a:rPr lang="en-US" dirty="0" smtClean="0"/>
-              <a:t>egregation </a:t>
-            </a:r>
-            <a:r>
-              <a:rPr lang="en-US" b="1" dirty="0" smtClean="0"/>
-              <a:t>P</a:t>
-            </a:r>
-            <a:r>
-              <a:rPr lang="en-US" dirty="0" smtClean="0"/>
-              <a:t>rinciple</a:t>
-            </a:r>
-          </a:p>
-          <a:p>
-            <a:r>
-              <a:rPr lang="en-US" b="1" dirty="0" smtClean="0"/>
-              <a:t>D</a:t>
-            </a:r>
-            <a:r>
-              <a:rPr lang="en-US" dirty="0" smtClean="0"/>
-              <a:t>ependency </a:t>
-            </a:r>
-            <a:r>
-              <a:rPr lang="en-US" b="1" dirty="0" smtClean="0"/>
-              <a:t>I</a:t>
-            </a:r>
-            <a:r>
-              <a:rPr lang="en-US" dirty="0" smtClean="0"/>
-              <a:t>nversion </a:t>
-            </a:r>
-            <a:r>
-              <a:rPr lang="en-US" b="1" dirty="0" smtClean="0"/>
-              <a:t>P</a:t>
-            </a:r>
-            <a:r>
-              <a:rPr lang="en-US" dirty="0" smtClean="0"/>
-              <a:t>rinciple</a:t>
-            </a:r>
-            <a:endParaRPr lang="en-US" dirty="0"/>
-          </a:p>
-        </p:txBody>
-      </p:sp>
-      <p:pic>
-        <p:nvPicPr>
-          <p:cNvPr id="33794" name="Picture 2" descr="http://t0.gstatic.com/images?q=tbn:ANd9GcQBQ9qUo5ympfTIpyV955tPnNgccmqPb9CjCmeMYIATAMg7PF_-zB70l6Zx6w"/>
-          <p:cNvPicPr>
-            <a:picLocks noChangeAspect="1" noChangeArrowheads="1"/>
-          </p:cNvPicPr>
-          <p:nvPr/>
-        </p:nvPicPr>
-        <p:blipFill>
-          <a:blip r:embed="rId2" cstate="print"/>
-          <a:srcRect/>
-          <a:stretch>
-            <a:fillRect/>
-          </a:stretch>
-        </p:blipFill>
-        <p:spPr bwMode="auto">
-          <a:xfrm>
-            <a:off x="7086600" y="4343400"/>
-            <a:ext cx="1457325" cy="1943101"/>
-          </a:xfrm>
-          <a:prstGeom prst="rect">
-            <a:avLst/>
-          </a:prstGeom>
-          <a:noFill/>
-        </p:spPr>
-      </p:pic>
-      <p:sp>
-        <p:nvSpPr>
-          <p:cNvPr id="5" name="Rectangle 4"/>
-          <p:cNvSpPr/>
-          <p:nvPr/>
-        </p:nvSpPr>
-        <p:spPr>
-          <a:xfrm>
-            <a:off x="609600" y="4953000"/>
-            <a:ext cx="4572000" cy="646331"/>
-          </a:xfrm>
-          <a:prstGeom prst="rect">
-            <a:avLst/>
-          </a:prstGeom>
-        </p:spPr>
-        <p:txBody>
-          <a:bodyPr>
-            <a:spAutoFit/>
-          </a:bodyPr>
-          <a:lstStyle/>
-          <a:p>
-            <a:r>
-              <a:rPr lang="en-US" dirty="0" smtClean="0"/>
-              <a:t>http://butunclebob.com/ArticleS.UncleBob.PrinciplesOfOod</a:t>
-            </a:r>
-            <a:endParaRPr lang="en-US" dirty="0"/>
-          </a:p>
-        </p:txBody>
-      </p:sp>
-    </p:spTree>
-  </p:cSld>
-  <p:clrMapOvr>
-    <a:masterClrMapping/>
-  </p:clrMapOvr>
-  <p:timing>
-    <p:tnLst>
-      <p:par>
-        <p:cTn id="1" dur="indefinite" restart="never" nodeType="tmRoot"/>
-      </p:par>
-    </p:tnLst>
-  </p:timing>
-</p:sld>
-</file>
-
-<file path=ppt/slides/slide28.xml><?xml version="1.0" encoding="utf-8"?>
-<p:sld xmlns:a="http://schemas.openxmlformats.org/drawingml/2006/main" xmlns:r="http://schemas.openxmlformats.org/officeDocument/2006/relationships" xmlns:p="http://schemas.openxmlformats.org/presentationml/2006/main">
-  <p:cSld>
-    <p:spTree>
-      <p:nvGrpSpPr>
-        <p:cNvPr id="1" name=""/>
-        <p:cNvGrpSpPr/>
-        <p:nvPr/>
-      </p:nvGrpSpPr>
-      <p:grpSpPr>
-        <a:xfrm>
-          <a:off x="0" y="0"/>
-          <a:ext cx="0" cy="0"/>
-          <a:chOff x="0" y="0"/>
-          <a:chExt cx="0" cy="0"/>
-        </a:xfrm>
-      </p:grpSpPr>
-      <p:sp>
-        <p:nvSpPr>
-          <p:cNvPr id="2" name="Title 1"/>
-          <p:cNvSpPr>
-            <a:spLocks noGrp="1"/>
-          </p:cNvSpPr>
-          <p:nvPr>
-            <p:ph type="title"/>
-          </p:nvPr>
-        </p:nvSpPr>
-        <p:spPr/>
-        <p:txBody>
-          <a:bodyPr/>
-          <a:lstStyle/>
-          <a:p>
-            <a:r>
-              <a:rPr lang="en-US" dirty="0" smtClean="0"/>
-              <a:t>The Acronym </a:t>
-            </a:r>
-            <a:r>
-              <a:rPr lang="en-US" b="1" dirty="0" smtClean="0"/>
-              <a:t>SOLID</a:t>
-            </a:r>
-            <a:r>
-              <a:rPr lang="en-US" dirty="0" smtClean="0"/>
               <a:t> was given by</a:t>
             </a:r>
             <a:endParaRPr lang="en-US" dirty="0"/>
@@ -5777,14 +5462,13 @@
               <a:rPr lang="en-US" dirty="0" smtClean="0"/>
               <a:t>Author of: </a:t>
             </a:r>
-          </a:p>
-          <a:p>
-            <a:pPr>
-              <a:buNone/>
-            </a:pPr>
             <a:r>
               <a:rPr lang="en-US" sz="2400" dirty="0" smtClean="0"/>
-              <a:t>Working Effectively with Legacy Code</a:t>
+              <a:t>Working </a:t>
+            </a:r>
+            <a:r>
+              <a:rPr lang="en-US" sz="2400" dirty="0" smtClean="0"/>
+              <a:t>Effectively with Legacy Code</a:t>
             </a:r>
           </a:p>
           <a:p>
@@ -5854,6 +5538,322 @@
 </p:sld>
 </file>
 
+<file path=ppt/slides/slide26.xml><?xml version="1.0" encoding="utf-8"?>
+<p:sld xmlns:a="http://schemas.openxmlformats.org/drawingml/2006/main" xmlns:r="http://schemas.openxmlformats.org/officeDocument/2006/relationships" xmlns:p="http://schemas.openxmlformats.org/presentationml/2006/main">
+  <p:cSld>
+    <p:spTree>
+      <p:nvGrpSpPr>
+        <p:cNvPr id="1" name=""/>
+        <p:cNvGrpSpPr/>
+        <p:nvPr/>
+      </p:nvGrpSpPr>
+      <p:grpSpPr>
+        <a:xfrm>
+          <a:off x="0" y="0"/>
+          <a:ext cx="0" cy="0"/>
+          <a:chOff x="0" y="0"/>
+          <a:chExt cx="0" cy="0"/>
+        </a:xfrm>
+      </p:grpSpPr>
+      <p:sp>
+        <p:nvSpPr>
+          <p:cNvPr id="2" name="Title 1"/>
+          <p:cNvSpPr>
+            <a:spLocks noGrp="1"/>
+          </p:cNvSpPr>
+          <p:nvPr>
+            <p:ph type="title"/>
+          </p:nvPr>
+        </p:nvSpPr>
+        <p:spPr>
+          <a:xfrm>
+            <a:off x="457200" y="2819400"/>
+            <a:ext cx="8229600" cy="1143000"/>
+          </a:xfrm>
+        </p:spPr>
+        <p:txBody>
+          <a:bodyPr>
+            <a:normAutofit/>
+          </a:bodyPr>
+          <a:lstStyle/>
+          <a:p>
+            <a:r>
+              <a:rPr lang="en-US" sz="3200" dirty="0" smtClean="0"/>
+              <a:t>SO, WHAT ARE THESE SOLID PRINCIPLES ABOUT?</a:t>
+            </a:r>
+            <a:endParaRPr lang="en-US" sz="3200" dirty="0"/>
+          </a:p>
+        </p:txBody>
+      </p:sp>
+    </p:spTree>
+  </p:cSld>
+  <p:clrMapOvr>
+    <a:masterClrMapping/>
+  </p:clrMapOvr>
+</p:sld>
+</file>
+
+<file path=ppt/slides/slide27.xml><?xml version="1.0" encoding="utf-8"?>
+<p:sld xmlns:a="http://schemas.openxmlformats.org/drawingml/2006/main" xmlns:r="http://schemas.openxmlformats.org/officeDocument/2006/relationships" xmlns:p="http://schemas.openxmlformats.org/presentationml/2006/main">
+  <p:cSld>
+    <p:spTree>
+      <p:nvGrpSpPr>
+        <p:cNvPr id="1" name=""/>
+        <p:cNvGrpSpPr/>
+        <p:nvPr/>
+      </p:nvGrpSpPr>
+      <p:grpSpPr>
+        <a:xfrm>
+          <a:off x="0" y="0"/>
+          <a:ext cx="0" cy="0"/>
+          <a:chOff x="0" y="0"/>
+          <a:chExt cx="0" cy="0"/>
+        </a:xfrm>
+      </p:grpSpPr>
+      <p:sp>
+        <p:nvSpPr>
+          <p:cNvPr id="2" name="Title 1"/>
+          <p:cNvSpPr>
+            <a:spLocks noGrp="1"/>
+          </p:cNvSpPr>
+          <p:nvPr>
+            <p:ph type="title"/>
+          </p:nvPr>
+        </p:nvSpPr>
+        <p:spPr/>
+        <p:txBody>
+          <a:bodyPr>
+            <a:normAutofit/>
+          </a:bodyPr>
+          <a:lstStyle/>
+          <a:p>
+            <a:r>
+              <a:rPr lang="en-US" dirty="0" smtClean="0"/>
+              <a:t>Better question would be </a:t>
+            </a:r>
+            <a:endParaRPr lang="en-US" dirty="0"/>
+          </a:p>
+        </p:txBody>
+      </p:sp>
+      <p:sp>
+        <p:nvSpPr>
+          <p:cNvPr id="3" name="Content Placeholder 2"/>
+          <p:cNvSpPr>
+            <a:spLocks noGrp="1"/>
+          </p:cNvSpPr>
+          <p:nvPr>
+            <p:ph idx="1"/>
+          </p:nvPr>
+        </p:nvSpPr>
+        <p:spPr/>
+        <p:txBody>
+          <a:bodyPr/>
+          <a:lstStyle/>
+          <a:p>
+            <a:r>
+              <a:rPr lang="en-US" dirty="0" smtClean="0"/>
+              <a:t>What </a:t>
+            </a:r>
+            <a:r>
+              <a:rPr lang="en-US" dirty="0" smtClean="0"/>
+              <a:t>problems are they trying to solve?</a:t>
+            </a:r>
+          </a:p>
+          <a:p>
+            <a:endParaRPr lang="en-US" dirty="0" smtClean="0"/>
+          </a:p>
+          <a:p>
+            <a:endParaRPr lang="en-US" dirty="0"/>
+          </a:p>
+          <a:p>
+            <a:r>
+              <a:rPr lang="en-US" dirty="0" smtClean="0"/>
+              <a:t>They are trying to solve a specific set of problems, namely </a:t>
+            </a:r>
+          </a:p>
+          <a:p>
+            <a:endParaRPr lang="en-US" dirty="0" smtClean="0"/>
+          </a:p>
+          <a:p>
+            <a:endParaRPr lang="en-US" dirty="0"/>
+          </a:p>
+        </p:txBody>
+      </p:sp>
+    </p:spTree>
+  </p:cSld>
+  <p:clrMapOvr>
+    <a:masterClrMapping/>
+  </p:clrMapOvr>
+  <p:timing>
+    <p:tnLst>
+      <p:par>
+        <p:cTn id="1" dur="indefinite" restart="never" nodeType="tmRoot"/>
+      </p:par>
+    </p:tnLst>
+  </p:timing>
+</p:sld>
+</file>
+
+<file path=ppt/slides/slide28.xml><?xml version="1.0" encoding="utf-8"?>
+<p:sld xmlns:a="http://schemas.openxmlformats.org/drawingml/2006/main" xmlns:r="http://schemas.openxmlformats.org/officeDocument/2006/relationships" xmlns:p="http://schemas.openxmlformats.org/presentationml/2006/main">
+  <p:cSld>
+    <p:spTree>
+      <p:nvGrpSpPr>
+        <p:cNvPr id="1" name=""/>
+        <p:cNvGrpSpPr/>
+        <p:nvPr/>
+      </p:nvGrpSpPr>
+      <p:grpSpPr>
+        <a:xfrm>
+          <a:off x="0" y="0"/>
+          <a:ext cx="0" cy="0"/>
+          <a:chOff x="0" y="0"/>
+          <a:chExt cx="0" cy="0"/>
+        </a:xfrm>
+      </p:grpSpPr>
+      <p:sp>
+        <p:nvSpPr>
+          <p:cNvPr id="4" name="Title 3"/>
+          <p:cNvSpPr>
+            <a:spLocks noGrp="1"/>
+          </p:cNvSpPr>
+          <p:nvPr>
+            <p:ph type="title"/>
+          </p:nvPr>
+        </p:nvSpPr>
+        <p:spPr/>
+        <p:txBody>
+          <a:bodyPr>
+            <a:normAutofit fontScale="90000"/>
+          </a:bodyPr>
+          <a:lstStyle/>
+          <a:p>
+            <a:r>
+              <a:rPr lang="en-US" dirty="0" smtClean="0"/>
+              <a:t/>
+            </a:r>
+            <a:br>
+              <a:rPr lang="en-US" dirty="0" smtClean="0"/>
+            </a:br>
+            <a:r>
+              <a:rPr lang="en-US" dirty="0"/>
+              <a:t/>
+            </a:r>
+            <a:br>
+              <a:rPr lang="en-US" dirty="0"/>
+            </a:br>
+            <a:r>
+              <a:rPr lang="en-US" dirty="0" smtClean="0"/>
+              <a:t/>
+            </a:r>
+            <a:br>
+              <a:rPr lang="en-US" dirty="0" smtClean="0"/>
+            </a:br>
+            <a:r>
+              <a:rPr lang="en-US" dirty="0"/>
+              <a:t/>
+            </a:r>
+            <a:br>
+              <a:rPr lang="en-US" dirty="0"/>
+            </a:br>
+            <a:r>
+              <a:rPr lang="en-US" dirty="0" smtClean="0"/>
+              <a:t/>
+            </a:r>
+            <a:br>
+              <a:rPr lang="en-US" dirty="0" smtClean="0"/>
+            </a:br>
+            <a:r>
+              <a:rPr lang="en-US" dirty="0"/>
+              <a:t/>
+            </a:r>
+            <a:br>
+              <a:rPr lang="en-US" dirty="0"/>
+            </a:br>
+            <a:r>
+              <a:rPr lang="en-US" dirty="0" smtClean="0"/>
+              <a:t/>
+            </a:r>
+            <a:br>
+              <a:rPr lang="en-US" dirty="0" smtClean="0"/>
+            </a:br>
+            <a:r>
+              <a:rPr lang="en-US" dirty="0"/>
+              <a:t/>
+            </a:r>
+            <a:br>
+              <a:rPr lang="en-US" dirty="0"/>
+            </a:br>
+            <a:r>
+              <a:rPr lang="en-US" dirty="0" smtClean="0"/>
+              <a:t>DEPENDENCY MANAGEMENT ISSUES</a:t>
+            </a:r>
+            <a:endParaRPr lang="en-US" dirty="0"/>
+          </a:p>
+        </p:txBody>
+      </p:sp>
+      <p:sp>
+        <p:nvSpPr>
+          <p:cNvPr id="3" name="Content Placeholder 2"/>
+          <p:cNvSpPr>
+            <a:spLocks noGrp="1"/>
+          </p:cNvSpPr>
+          <p:nvPr>
+            <p:ph idx="4294967295"/>
+          </p:nvPr>
+        </p:nvSpPr>
+        <p:spPr>
+          <a:xfrm>
+            <a:off x="838200" y="1600200"/>
+            <a:ext cx="7620000" cy="4525963"/>
+          </a:xfrm>
+        </p:spPr>
+        <p:txBody>
+          <a:bodyPr/>
+          <a:lstStyle/>
+          <a:p>
+            <a:pPr>
+              <a:buNone/>
+            </a:pPr>
+            <a:endParaRPr lang="en-US" dirty="0"/>
+          </a:p>
+          <a:p>
+            <a:pPr>
+              <a:buNone/>
+            </a:pPr>
+            <a:endParaRPr lang="en-US" dirty="0" smtClean="0"/>
+          </a:p>
+          <a:p>
+            <a:pPr>
+              <a:buNone/>
+            </a:pPr>
+            <a:r>
+              <a:rPr lang="en-US" dirty="0"/>
+              <a:t>	</a:t>
+            </a:r>
+            <a:r>
+              <a:rPr lang="en-US" dirty="0" smtClean="0"/>
+              <a:t>	</a:t>
+            </a:r>
+            <a:endParaRPr lang="en-US" dirty="0"/>
+          </a:p>
+        </p:txBody>
+      </p:sp>
+    </p:spTree>
+  </p:cSld>
+  <p:clrMapOvr>
+    <a:masterClrMapping/>
+  </p:clrMapOvr>
+  <p:timing>
+    <p:tnLst>
+      <p:par>
+        <p:cTn id="1" dur="indefinite" restart="never" nodeType="tmRoot"/>
+      </p:par>
+    </p:tnLst>
+  </p:timing>
+</p:sld>
+</file>
+
 <file path=ppt/slides/slide29.xml><?xml version="1.0" encoding="utf-8"?>
 <p:sld xmlns:a="http://schemas.openxmlformats.org/drawingml/2006/main" xmlns:r="http://schemas.openxmlformats.org/officeDocument/2006/relationships" xmlns:p="http://schemas.openxmlformats.org/presentationml/2006/main">
   <p:cSld>
@@ -5871,25 +5871,105 @@
           <a:chExt cx="0" cy="0"/>
         </a:xfrm>
       </p:grpSpPr>
+      <p:sp>
+        <p:nvSpPr>
+          <p:cNvPr id="2" name="Title 1"/>
+          <p:cNvSpPr>
+            <a:spLocks noGrp="1"/>
+          </p:cNvSpPr>
+          <p:nvPr>
+            <p:ph type="title"/>
+          </p:nvPr>
+        </p:nvSpPr>
+        <p:spPr/>
+        <p:txBody>
+          <a:bodyPr/>
+          <a:lstStyle/>
+          <a:p>
+            <a:r>
+              <a:rPr lang="en-US" dirty="0" smtClean="0"/>
+              <a:t>On Dependencies</a:t>
+            </a:r>
+            <a:endParaRPr lang="en-US" dirty="0"/>
+          </a:p>
+        </p:txBody>
+      </p:sp>
+      <p:sp>
+        <p:nvSpPr>
+          <p:cNvPr id="5" name="Rectangle 4"/>
+          <p:cNvSpPr/>
+          <p:nvPr/>
+        </p:nvSpPr>
+        <p:spPr>
+          <a:xfrm>
+            <a:off x="685800" y="5334000"/>
+            <a:ext cx="8001000" cy="369332"/>
+          </a:xfrm>
+          <a:prstGeom prst="rect">
+            <a:avLst/>
+          </a:prstGeom>
+        </p:spPr>
+        <p:txBody>
+          <a:bodyPr wrap="square">
+            <a:spAutoFit/>
+          </a:bodyPr>
+          <a:lstStyle/>
+          <a:p>
+            <a:r>
+              <a:rPr lang="en-US" b="1" dirty="0" smtClean="0"/>
+              <a:t>A IS DEPENDENT ON B. If something happens to B, what effect does it have on A?</a:t>
+            </a:r>
+            <a:endParaRPr lang="en-US" b="1" dirty="0"/>
+          </a:p>
+        </p:txBody>
+      </p:sp>
+      <p:sp>
+        <p:nvSpPr>
+          <p:cNvPr id="6" name="Rectangle 5"/>
+          <p:cNvSpPr/>
+          <p:nvPr/>
+        </p:nvSpPr>
+        <p:spPr>
+          <a:xfrm>
+            <a:off x="685800" y="5867400"/>
+            <a:ext cx="8077200" cy="338554"/>
+          </a:xfrm>
+          <a:prstGeom prst="rect">
+            <a:avLst/>
+          </a:prstGeom>
+        </p:spPr>
+        <p:txBody>
+          <a:bodyPr wrap="square">
+            <a:spAutoFit/>
+          </a:bodyPr>
+          <a:lstStyle/>
+          <a:p>
+            <a:r>
+              <a:rPr lang="en-US" sz="1600" b="1" dirty="0" smtClean="0"/>
+              <a:t>DEPENDENCIES GIVE US SOME DEGREE OF REASON TO SEE HOW CHANGES PROPOGATE</a:t>
+            </a:r>
+            <a:endParaRPr lang="en-US" sz="1600" b="1" dirty="0"/>
+          </a:p>
+        </p:txBody>
+      </p:sp>
       <p:pic>
         <p:nvPicPr>
-          <p:cNvPr id="2050" name="Picture 2" descr="http://lostechies.com/derickbailey/files/2011/03/SingleResponsibilityPrinciple2_71060858.jpg"/>
+          <p:cNvPr id="8" name="Picture 7" descr="DEPE.png"/>
           <p:cNvPicPr>
-            <a:picLocks noChangeAspect="1" noChangeArrowheads="1"/>
+            <a:picLocks noChangeAspect="1"/>
           </p:cNvPicPr>
           <p:nvPr/>
         </p:nvPicPr>
         <p:blipFill>
           <a:blip r:embed="rId2" cstate="print"/>
-          <a:srcRect/>
           <a:stretch>
             <a:fillRect/>
           </a:stretch>
         </p:blipFill>
-        <p:spPr bwMode="auto">
+        <p:spPr>
           <a:xfrm>
-            <a:off x="1295400" y="381000"/>
-            <a:ext cx="7143750" cy="5715000"/>
+            <a:off x="1866522" y="2204866"/>
+            <a:ext cx="5410956" cy="2448267"/>
           </a:xfrm>
           <a:prstGeom prst="rect">
             <a:avLst/>
@@ -5911,13 +5991,6 @@
   <p:clrMapOvr>
     <a:masterClrMapping/>
   </p:clrMapOvr>
-  <p:timing>
-    <p:tnLst>
-      <p:par>
-        <p:cTn id="1" dur="indefinite" restart="never" nodeType="tmRoot"/>
-      </p:par>
-    </p:tnLst>
-  </p:timing>
 </p:sld>
 </file>
 
@@ -6129,57 +6202,85 @@
             <p:ph type="title"/>
           </p:nvPr>
         </p:nvSpPr>
-        <p:spPr>
+        <p:spPr/>
+        <p:txBody>
+          <a:bodyPr>
+            <a:normAutofit/>
+          </a:bodyPr>
+          <a:lstStyle/>
+          <a:p>
+            <a:r>
+              <a:rPr lang="en-US" sz="4000" dirty="0" smtClean="0"/>
+              <a:t>What is Dependency Management?</a:t>
+            </a:r>
+            <a:endParaRPr lang="en-US" sz="4000" dirty="0"/>
+          </a:p>
+        </p:txBody>
+      </p:sp>
+      <p:sp>
+        <p:nvSpPr>
+          <p:cNvPr id="3" name="Content Placeholder 2"/>
+          <p:cNvSpPr>
+            <a:spLocks noGrp="1"/>
+          </p:cNvSpPr>
+          <p:nvPr>
+            <p:ph idx="1"/>
+          </p:nvPr>
+        </p:nvSpPr>
+        <p:spPr/>
+        <p:txBody>
+          <a:bodyPr>
+            <a:normAutofit/>
+          </a:bodyPr>
+          <a:lstStyle/>
+          <a:p>
+            <a:r>
+              <a:rPr lang="en-US" dirty="0" smtClean="0"/>
+              <a:t>“Dependency </a:t>
+            </a:r>
+            <a:r>
+              <a:rPr lang="en-US" dirty="0" smtClean="0"/>
+              <a:t>Management is an issue that most of us have faced. Whenever we bring up on our screens a nasty batch of tangled legacy code, we are experiencing the results of poor dependency management. </a:t>
+            </a:r>
+            <a:r>
+              <a:rPr lang="en-US" dirty="0" smtClean="0"/>
+              <a:t>“</a:t>
+            </a:r>
+            <a:endParaRPr lang="en-US" dirty="0"/>
+          </a:p>
+        </p:txBody>
+      </p:sp>
+      <p:pic>
+        <p:nvPicPr>
+          <p:cNvPr id="3074" name="Picture 2" descr="http://blogs.msdn.com/blogfiles/cdndevs/WindowsLiveWriter/CraftsmanshipandEthicsUncleBobsKeynote_E0E9/uncle_bob_martin_3.jpg"/>
+          <p:cNvPicPr>
+            <a:picLocks noChangeAspect="1" noChangeArrowheads="1"/>
+          </p:cNvPicPr>
+          <p:nvPr/>
+        </p:nvPicPr>
+        <p:blipFill>
+          <a:blip r:embed="rId2" cstate="print"/>
+          <a:srcRect/>
+          <a:stretch>
+            <a:fillRect/>
+          </a:stretch>
+        </p:blipFill>
+        <p:spPr bwMode="auto">
           <a:xfrm>
-            <a:off x="609600" y="2209800"/>
-            <a:ext cx="8229600" cy="1143000"/>
+            <a:off x="6629400" y="4419600"/>
+            <a:ext cx="1933575" cy="2038350"/>
           </a:xfrm>
+          <a:prstGeom prst="rect">
+            <a:avLst/>
+          </a:prstGeom>
+          <a:noFill/>
         </p:spPr>
-        <p:txBody>
-          <a:bodyPr>
-            <a:normAutofit fontScale="90000"/>
-          </a:bodyPr>
-          <a:lstStyle/>
-          <a:p>
-            <a:r>
-              <a:rPr lang="en-US" dirty="0" smtClean="0"/>
-              <a:t>Talk is cheap, show me the code</a:t>
-            </a:r>
-            <a:br>
-              <a:rPr lang="en-US" dirty="0" smtClean="0"/>
-            </a:br>
-            <a:r>
-              <a:rPr lang="en-US" dirty="0" smtClean="0"/>
-              <a:t>- </a:t>
-            </a:r>
-            <a:r>
-              <a:rPr lang="en-US" dirty="0" err="1" smtClean="0"/>
-              <a:t>Linus</a:t>
-            </a:r>
-            <a:r>
-              <a:rPr lang="en-US" dirty="0" smtClean="0"/>
-              <a:t> </a:t>
-            </a:r>
-            <a:r>
-              <a:rPr lang="en-US" dirty="0" err="1" smtClean="0"/>
-              <a:t>Torvalds</a:t>
-            </a:r>
-            <a:endParaRPr lang="en-US" dirty="0"/>
-          </a:p>
-        </p:txBody>
-      </p:sp>
+      </p:pic>
     </p:spTree>
   </p:cSld>
   <p:clrMapOvr>
     <a:masterClrMapping/>
   </p:clrMapOvr>
-  <p:timing>
-    <p:tnLst>
-      <p:par>
-        <p:cTn id="1" dur="indefinite" restart="never" nodeType="tmRoot"/>
-      </p:par>
-    </p:tnLst>
-  </p:timing>
 </p:sld>
 </file>
 
@@ -6210,21 +6311,66 @@
             <p:ph type="title"/>
           </p:nvPr>
         </p:nvSpPr>
-        <p:spPr>
-          <a:xfrm>
-            <a:off x="457200" y="2743200"/>
-            <a:ext cx="8229600" cy="1143000"/>
-          </a:xfrm>
-        </p:spPr>
-        <p:txBody>
-          <a:bodyPr/>
-          <a:lstStyle/>
-          <a:p>
-            <a:r>
-              <a:rPr lang="en-US" dirty="0" smtClean="0"/>
-              <a:t>STATIC (C#), DYNAMIC (RUBY)</a:t>
-            </a:r>
-            <a:endParaRPr lang="en-US" dirty="0"/>
+        <p:spPr/>
+        <p:txBody>
+          <a:bodyPr>
+            <a:normAutofit/>
+          </a:bodyPr>
+          <a:lstStyle/>
+          <a:p>
+            <a:r>
+              <a:rPr lang="en-US" sz="3200" dirty="0" smtClean="0"/>
+              <a:t>Why is Dependency Management so important?</a:t>
+            </a:r>
+            <a:endParaRPr lang="en-US" sz="3200" dirty="0"/>
+          </a:p>
+        </p:txBody>
+      </p:sp>
+      <p:sp>
+        <p:nvSpPr>
+          <p:cNvPr id="3" name="Content Placeholder 2"/>
+          <p:cNvSpPr>
+            <a:spLocks noGrp="1"/>
+          </p:cNvSpPr>
+          <p:nvPr>
+            <p:ph idx="1"/>
+          </p:nvPr>
+        </p:nvSpPr>
+        <p:spPr/>
+        <p:txBody>
+          <a:bodyPr>
+            <a:normAutofit/>
+          </a:bodyPr>
+          <a:lstStyle/>
+          <a:p>
+            <a:r>
+              <a:rPr lang="en-US" dirty="0" smtClean="0"/>
+              <a:t> Poor dependency </a:t>
+            </a:r>
+            <a:r>
+              <a:rPr lang="en-US" dirty="0" smtClean="0"/>
+              <a:t>management </a:t>
+            </a:r>
+            <a:r>
+              <a:rPr lang="en-US" dirty="0" smtClean="0"/>
+              <a:t>leads to code that is hard to change, fragile, and non-reusable</a:t>
+            </a:r>
+            <a:endParaRPr lang="en-US" dirty="0" smtClean="0"/>
+          </a:p>
+          <a:p>
+            <a:r>
+              <a:rPr lang="en-US" dirty="0" smtClean="0"/>
+              <a:t>On </a:t>
+            </a:r>
+            <a:r>
+              <a:rPr lang="en-US" dirty="0" smtClean="0"/>
+              <a:t>the other hand, when dependencies are well managed, the code remains flexible, robust, and </a:t>
+            </a:r>
+            <a:r>
+              <a:rPr lang="en-US" dirty="0" smtClean="0"/>
+              <a:t>reusable</a:t>
+            </a:r>
+            <a:endParaRPr lang="en-US" dirty="0" smtClean="0"/>
           </a:p>
         </p:txBody>
       </p:sp>
@@ -6233,13 +6379,6 @@
   <p:clrMapOvr>
     <a:masterClrMapping/>
   </p:clrMapOvr>
-  <p:timing>
-    <p:tnLst>
-      <p:par>
-        <p:cTn id="1" dur="indefinite" restart="never" nodeType="tmRoot"/>
-      </p:par>
-    </p:tnLst>
-  </p:timing>
 </p:sld>
 </file>
 
@@ -6277,7 +6416,7 @@
           <a:p>
             <a:r>
               <a:rPr lang="en-US" dirty="0" smtClean="0"/>
-              <a:t>Reflect on SRP</a:t>
+              <a:t>Other OO Developers</a:t>
             </a:r>
             <a:endParaRPr lang="en-US" dirty="0"/>
           </a:p>
@@ -6295,27 +6434,49 @@
         </p:nvSpPr>
         <p:spPr/>
         <p:txBody>
-          <a:bodyPr/>
-          <a:lstStyle/>
-          <a:p>
-            <a:r>
-              <a:rPr lang="en-US" i="1" dirty="0" smtClean="0"/>
-              <a:t>A CLASS SHOULD HAVE ONE AND ONLY ONE RESPONSIBILITY.</a:t>
-            </a:r>
-          </a:p>
-          <a:p>
-            <a:pPr>
-              <a:buNone/>
-            </a:pPr>
-            <a:endParaRPr lang="en-US" i="1" dirty="0" smtClean="0"/>
-          </a:p>
-          <a:p>
-            <a:r>
-              <a:rPr lang="en-US" i="1" dirty="0" smtClean="0"/>
-              <a:t>THERE SHOULD NEVER BE MORE THAN ONE REASON FOR A CLASS TO CHANGE.</a:t>
-            </a:r>
-          </a:p>
-          <a:p>
+          <a:bodyPr>
+            <a:normAutofit fontScale="92500" lnSpcReduction="10000"/>
+          </a:bodyPr>
+          <a:lstStyle/>
+          <a:p>
+            <a:r>
+              <a:rPr lang="en-US" dirty="0"/>
+              <a:t>H</a:t>
+            </a:r>
+            <a:r>
+              <a:rPr lang="en-US" dirty="0" smtClean="0"/>
+              <a:t>ave committed the same kind of design mistakes </a:t>
+            </a:r>
+          </a:p>
+          <a:p>
+            <a:r>
+              <a:rPr lang="en-US" dirty="0" smtClean="0"/>
+              <a:t>Have learnt from those mistakes</a:t>
+            </a:r>
+          </a:p>
+          <a:p>
+            <a:r>
+              <a:rPr lang="en-US" dirty="0" smtClean="0"/>
+              <a:t>Some have specified some GUIDELINES</a:t>
+            </a:r>
+          </a:p>
+          <a:p>
+            <a:r>
+              <a:rPr lang="en-US" dirty="0" smtClean="0"/>
+              <a:t>We can choose to follow or not!</a:t>
+            </a:r>
+          </a:p>
+          <a:p>
+            <a:r>
+              <a:rPr lang="en-US" dirty="0" smtClean="0"/>
+              <a:t>If we choose to follow, we have to understand the problems and where they apply.</a:t>
+            </a:r>
+          </a:p>
+          <a:p>
+            <a:r>
+              <a:rPr lang="en-US" dirty="0" smtClean="0"/>
+              <a:t>If we encounter the same issues, we can meditate on these guidelines and apply them.</a:t>
+            </a:r>
             <a:endParaRPr lang="en-US" dirty="0"/>
           </a:p>
         </p:txBody>
@@ -6352,169 +6513,40 @@
           <a:chExt cx="0" cy="0"/>
         </a:xfrm>
       </p:grpSpPr>
-      <p:sp>
-        <p:nvSpPr>
-          <p:cNvPr id="2" name="Title 1"/>
-          <p:cNvSpPr>
-            <a:spLocks noGrp="1"/>
-          </p:cNvSpPr>
-          <p:nvPr>
-            <p:ph type="title"/>
-          </p:nvPr>
-        </p:nvSpPr>
-        <p:spPr/>
-        <p:txBody>
-          <a:bodyPr/>
-          <a:lstStyle/>
-          <a:p>
-            <a:r>
-              <a:rPr lang="en-US" dirty="0" smtClean="0"/>
-              <a:t>SRP</a:t>
-            </a:r>
-            <a:endParaRPr lang="en-US" dirty="0"/>
-          </a:p>
-        </p:txBody>
-      </p:sp>
-      <p:sp>
-        <p:nvSpPr>
-          <p:cNvPr id="3" name="Content Placeholder 2"/>
-          <p:cNvSpPr>
-            <a:spLocks noGrp="1"/>
-          </p:cNvSpPr>
-          <p:nvPr>
-            <p:ph idx="1"/>
-          </p:nvPr>
-        </p:nvSpPr>
+      <p:pic>
+        <p:nvPicPr>
+          <p:cNvPr id="7" name="Picture 6" descr="solid.jpg"/>
+          <p:cNvPicPr>
+            <a:picLocks noChangeAspect="1"/>
+          </p:cNvPicPr>
+          <p:nvPr/>
+        </p:nvPicPr>
+        <p:blipFill>
+          <a:blip r:embed="rId2" cstate="print"/>
+          <a:stretch>
+            <a:fillRect/>
+          </a:stretch>
+        </p:blipFill>
         <p:spPr>
           <a:xfrm>
-            <a:off x="457200" y="1371600"/>
-            <a:ext cx="8229600" cy="4754563"/>
+            <a:off x="990600" y="561975"/>
+            <a:ext cx="7162800" cy="5734050"/>
           </a:xfrm>
+          <a:prstGeom prst="rect">
+            <a:avLst/>
+          </a:prstGeom>
+          <a:ln>
+            <a:noFill/>
+          </a:ln>
+          <a:effectLst>
+            <a:outerShdw blurRad="292100" dist="139700" dir="2700000" algn="tl" rotWithShape="0">
+              <a:srgbClr val="333333">
+                <a:alpha val="65000"/>
+              </a:srgbClr>
+            </a:outerShdw>
+          </a:effectLst>
         </p:spPr>
-        <p:txBody>
-          <a:bodyPr>
-            <a:normAutofit fontScale="70000" lnSpcReduction="20000"/>
-          </a:bodyPr>
-          <a:lstStyle/>
-          <a:p>
-            <a:pPr>
-              <a:buNone/>
-            </a:pPr>
-            <a:r>
-              <a:rPr lang="en-US" dirty="0" smtClean="0"/>
-              <a:t>    	Why </a:t>
-            </a:r>
-            <a:r>
-              <a:rPr lang="en-US" dirty="0" smtClean="0"/>
-              <a:t>is it important to separate two responsibilities into </a:t>
-            </a:r>
-            <a:r>
-              <a:rPr lang="en-US" dirty="0" smtClean="0"/>
-              <a:t>separate classes</a:t>
-            </a:r>
-            <a:r>
-              <a:rPr lang="en-US" dirty="0" smtClean="0"/>
-              <a:t>?</a:t>
-            </a:r>
-          </a:p>
-          <a:p>
-            <a:pPr>
-              <a:buNone/>
-            </a:pPr>
-            <a:endParaRPr lang="en-US" dirty="0" smtClean="0"/>
-          </a:p>
-          <a:p>
-            <a:pPr>
-              <a:buNone/>
-            </a:pPr>
-            <a:r>
-              <a:rPr lang="en-US" dirty="0" smtClean="0"/>
-              <a:t>	</a:t>
-            </a:r>
-            <a:r>
-              <a:rPr lang="en-US" dirty="0" smtClean="0"/>
-              <a:t>Because </a:t>
-            </a:r>
-            <a:r>
-              <a:rPr lang="en-US" dirty="0" smtClean="0"/>
-              <a:t>each responsibility is an axis of change. When the requirements change, </a:t>
-            </a:r>
-            <a:r>
-              <a:rPr lang="en-US" dirty="0" smtClean="0"/>
-              <a:t>that change </a:t>
-            </a:r>
-            <a:r>
-              <a:rPr lang="en-US" dirty="0" smtClean="0"/>
-              <a:t>will be manifest through a change in responsibility amongst the classes. If a </a:t>
-            </a:r>
-            <a:r>
-              <a:rPr lang="en-US" dirty="0" smtClean="0"/>
-              <a:t>class assumes </a:t>
-            </a:r>
-            <a:r>
-              <a:rPr lang="en-US" dirty="0" smtClean="0"/>
-              <a:t>more than one responsibility, then there will be more than one reason for it </a:t>
-            </a:r>
-            <a:r>
-              <a:rPr lang="en-US" dirty="0" smtClean="0"/>
-              <a:t>to change</a:t>
-            </a:r>
-            <a:r>
-              <a:rPr lang="en-US" dirty="0" smtClean="0"/>
-              <a:t>.</a:t>
-            </a:r>
-          </a:p>
-          <a:p>
-            <a:pPr>
-              <a:buNone/>
-            </a:pPr>
-            <a:endParaRPr lang="en-US" dirty="0" smtClean="0"/>
-          </a:p>
-          <a:p>
-            <a:pPr>
-              <a:buNone/>
-            </a:pPr>
-            <a:r>
-              <a:rPr lang="en-US" dirty="0" smtClean="0"/>
-              <a:t>	If </a:t>
-            </a:r>
-            <a:r>
-              <a:rPr lang="en-US" dirty="0" smtClean="0"/>
-              <a:t>a class has more then one responsibility, then the responsibilities become coupled</a:t>
-            </a:r>
-            <a:r>
-              <a:rPr lang="en-US" dirty="0" smtClean="0"/>
-              <a:t>. Changes </a:t>
-            </a:r>
-            <a:r>
-              <a:rPr lang="en-US" dirty="0" smtClean="0"/>
-              <a:t>to one responsibility may impair or inhibit the class’ ability to meet the others</a:t>
-            </a:r>
-            <a:r>
-              <a:rPr lang="en-US" dirty="0" smtClean="0"/>
-              <a:t>. This </a:t>
-            </a:r>
-            <a:r>
-              <a:rPr lang="en-US" dirty="0" smtClean="0"/>
-              <a:t>kind of coupling leads to fragile designs that break in unexpected ways when</a:t>
-            </a:r>
-          </a:p>
-          <a:p>
-            <a:pPr>
-              <a:buNone/>
-            </a:pPr>
-            <a:r>
-              <a:rPr lang="en-US" dirty="0" smtClean="0"/>
-              <a:t>	changed</a:t>
-            </a:r>
-            <a:r>
-              <a:rPr lang="en-US" dirty="0" smtClean="0"/>
-              <a:t>.</a:t>
-            </a:r>
-            <a:endParaRPr lang="en-US" dirty="0"/>
-          </a:p>
-        </p:txBody>
-      </p:sp>
+      </p:pic>
     </p:spTree>
   </p:cSld>
   <p:clrMapOvr>
@@ -6557,13 +6589,343 @@
             <p:ph type="title"/>
           </p:nvPr>
         </p:nvSpPr>
-        <p:spPr/>
+        <p:spPr>
+          <a:xfrm>
+            <a:off x="609600" y="2209800"/>
+            <a:ext cx="8229600" cy="1295400"/>
+          </a:xfrm>
+        </p:spPr>
+        <p:txBody>
+          <a:bodyPr>
+            <a:normAutofit fontScale="90000"/>
+          </a:bodyPr>
+          <a:lstStyle/>
+          <a:p>
+            <a:r>
+              <a:rPr lang="en-US" dirty="0" smtClean="0"/>
+              <a:t/>
+            </a:r>
+            <a:br>
+              <a:rPr lang="en-US" dirty="0" smtClean="0"/>
+            </a:br>
+            <a:r>
+              <a:rPr lang="en-US" dirty="0" smtClean="0"/>
+              <a:t>“</a:t>
+            </a:r>
+            <a:r>
+              <a:rPr lang="en-US" i="1" dirty="0" smtClean="0"/>
+              <a:t>Talk </a:t>
+            </a:r>
+            <a:r>
+              <a:rPr lang="en-US" i="1" dirty="0" smtClean="0"/>
+              <a:t>is cheap, show me the </a:t>
+            </a:r>
+            <a:r>
+              <a:rPr lang="en-US" i="1" dirty="0" smtClean="0"/>
+              <a:t>code</a:t>
+            </a:r>
+            <a:r>
+              <a:rPr lang="en-US" dirty="0" smtClean="0"/>
+              <a:t>”</a:t>
+            </a:r>
+            <a:br>
+              <a:rPr lang="en-US" dirty="0" smtClean="0"/>
+            </a:br>
+            <a:r>
+              <a:rPr lang="en-US" dirty="0" smtClean="0"/>
+              <a:t/>
+            </a:r>
+            <a:br>
+              <a:rPr lang="en-US" dirty="0" smtClean="0"/>
+            </a:br>
+            <a:r>
+              <a:rPr lang="en-US" dirty="0" smtClean="0"/>
+              <a:t>		              - </a:t>
+            </a:r>
+            <a:r>
+              <a:rPr lang="en-US" dirty="0" err="1" smtClean="0"/>
+              <a:t>Linus</a:t>
+            </a:r>
+            <a:r>
+              <a:rPr lang="en-US" dirty="0" smtClean="0"/>
+              <a:t> </a:t>
+            </a:r>
+            <a:r>
+              <a:rPr lang="en-US" dirty="0" err="1" smtClean="0"/>
+              <a:t>Torvalds</a:t>
+            </a:r>
+            <a:endParaRPr lang="en-US" dirty="0"/>
+          </a:p>
+        </p:txBody>
+      </p:sp>
+    </p:spTree>
+  </p:cSld>
+  <p:clrMapOvr>
+    <a:masterClrMapping/>
+  </p:clrMapOvr>
+  <p:timing>
+    <p:tnLst>
+      <p:par>
+        <p:cTn id="1" dur="indefinite" restart="never" nodeType="tmRoot"/>
+      </p:par>
+    </p:tnLst>
+  </p:timing>
+</p:sld>
+</file>
+
+<file path=ppt/slides/slide35.xml><?xml version="1.0" encoding="utf-8"?>
+<p:sld xmlns:a="http://schemas.openxmlformats.org/drawingml/2006/main" xmlns:r="http://schemas.openxmlformats.org/officeDocument/2006/relationships" xmlns:p="http://schemas.openxmlformats.org/presentationml/2006/main">
+  <p:cSld>
+    <p:spTree>
+      <p:nvGrpSpPr>
+        <p:cNvPr id="1" name=""/>
+        <p:cNvGrpSpPr/>
+        <p:nvPr/>
+      </p:nvGrpSpPr>
+      <p:grpSpPr>
+        <a:xfrm>
+          <a:off x="0" y="0"/>
+          <a:ext cx="0" cy="0"/>
+          <a:chOff x="0" y="0"/>
+          <a:chExt cx="0" cy="0"/>
+        </a:xfrm>
+      </p:grpSpPr>
+      <p:sp>
+        <p:nvSpPr>
+          <p:cNvPr id="2" name="Title 1"/>
+          <p:cNvSpPr>
+            <a:spLocks noGrp="1"/>
+          </p:cNvSpPr>
+          <p:nvPr>
+            <p:ph type="title"/>
+          </p:nvPr>
+        </p:nvSpPr>
+        <p:spPr>
+          <a:xfrm>
+            <a:off x="457200" y="2743200"/>
+            <a:ext cx="8229600" cy="1143000"/>
+          </a:xfrm>
+        </p:spPr>
         <p:txBody>
           <a:bodyPr/>
           <a:lstStyle/>
           <a:p>
             <a:r>
               <a:rPr lang="en-US" dirty="0" smtClean="0"/>
+              <a:t>STATIC (C#), DYNAMIC (RUBY)</a:t>
+            </a:r>
+            <a:endParaRPr lang="en-US" dirty="0"/>
+          </a:p>
+        </p:txBody>
+      </p:sp>
+    </p:spTree>
+  </p:cSld>
+  <p:clrMapOvr>
+    <a:masterClrMapping/>
+  </p:clrMapOvr>
+  <p:timing>
+    <p:tnLst>
+      <p:par>
+        <p:cTn id="1" dur="indefinite" restart="never" nodeType="tmRoot"/>
+      </p:par>
+    </p:tnLst>
+  </p:timing>
+</p:sld>
+</file>
+
+<file path=ppt/slides/slide36.xml><?xml version="1.0" encoding="utf-8"?>
+<p:sld xmlns:a="http://schemas.openxmlformats.org/drawingml/2006/main" xmlns:r="http://schemas.openxmlformats.org/officeDocument/2006/relationships" xmlns:p="http://schemas.openxmlformats.org/presentationml/2006/main">
+  <p:cSld>
+    <p:spTree>
+      <p:nvGrpSpPr>
+        <p:cNvPr id="1" name=""/>
+        <p:cNvGrpSpPr/>
+        <p:nvPr/>
+      </p:nvGrpSpPr>
+      <p:grpSpPr>
+        <a:xfrm>
+          <a:off x="0" y="0"/>
+          <a:ext cx="0" cy="0"/>
+          <a:chOff x="0" y="0"/>
+          <a:chExt cx="0" cy="0"/>
+        </a:xfrm>
+      </p:grpSpPr>
+      <p:pic>
+        <p:nvPicPr>
+          <p:cNvPr id="2050" name="Picture 2" descr="http://lostechies.com/derickbailey/files/2011/03/SingleResponsibilityPrinciple2_71060858.jpg"/>
+          <p:cNvPicPr>
+            <a:picLocks noChangeAspect="1" noChangeArrowheads="1"/>
+          </p:cNvPicPr>
+          <p:nvPr/>
+        </p:nvPicPr>
+        <p:blipFill>
+          <a:blip r:embed="rId2" cstate="print"/>
+          <a:srcRect/>
+          <a:stretch>
+            <a:fillRect/>
+          </a:stretch>
+        </p:blipFill>
+        <p:spPr bwMode="auto">
+          <a:xfrm>
+            <a:off x="1295400" y="381000"/>
+            <a:ext cx="7143750" cy="5715000"/>
+          </a:xfrm>
+          <a:prstGeom prst="rect">
+            <a:avLst/>
+          </a:prstGeom>
+          <a:ln>
+            <a:noFill/>
+          </a:ln>
+          <a:effectLst>
+            <a:outerShdw blurRad="292100" dist="139700" dir="2700000" algn="tl" rotWithShape="0">
+              <a:srgbClr val="333333">
+                <a:alpha val="65000"/>
+              </a:srgbClr>
+            </a:outerShdw>
+          </a:effectLst>
+        </p:spPr>
+      </p:pic>
+    </p:spTree>
+  </p:cSld>
+  <p:clrMapOvr>
+    <a:masterClrMapping/>
+  </p:clrMapOvr>
+  <p:timing>
+    <p:tnLst>
+      <p:par>
+        <p:cTn id="1" dur="indefinite" restart="never" nodeType="tmRoot"/>
+      </p:par>
+    </p:tnLst>
+  </p:timing>
+</p:sld>
+</file>
+
+<file path=ppt/slides/slide37.xml><?xml version="1.0" encoding="utf-8"?>
+<p:sld xmlns:a="http://schemas.openxmlformats.org/drawingml/2006/main" xmlns:r="http://schemas.openxmlformats.org/officeDocument/2006/relationships" xmlns:p="http://schemas.openxmlformats.org/presentationml/2006/main">
+  <p:cSld>
+    <p:spTree>
+      <p:nvGrpSpPr>
+        <p:cNvPr id="1" name=""/>
+        <p:cNvGrpSpPr/>
+        <p:nvPr/>
+      </p:nvGrpSpPr>
+      <p:grpSpPr>
+        <a:xfrm>
+          <a:off x="0" y="0"/>
+          <a:ext cx="0" cy="0"/>
+          <a:chOff x="0" y="0"/>
+          <a:chExt cx="0" cy="0"/>
+        </a:xfrm>
+      </p:grpSpPr>
+      <p:sp>
+        <p:nvSpPr>
+          <p:cNvPr id="2" name="Title 1"/>
+          <p:cNvSpPr>
+            <a:spLocks noGrp="1"/>
+          </p:cNvSpPr>
+          <p:nvPr>
+            <p:ph type="title"/>
+          </p:nvPr>
+        </p:nvSpPr>
+        <p:spPr/>
+        <p:txBody>
+          <a:bodyPr/>
+          <a:lstStyle/>
+          <a:p>
+            <a:r>
+              <a:rPr lang="en-US" dirty="0" smtClean="0"/>
+              <a:t>Reflect on SRP</a:t>
+            </a:r>
+            <a:endParaRPr lang="en-US" dirty="0"/>
+          </a:p>
+        </p:txBody>
+      </p:sp>
+      <p:sp>
+        <p:nvSpPr>
+          <p:cNvPr id="3" name="Content Placeholder 2"/>
+          <p:cNvSpPr>
+            <a:spLocks noGrp="1"/>
+          </p:cNvSpPr>
+          <p:nvPr>
+            <p:ph idx="1"/>
+          </p:nvPr>
+        </p:nvSpPr>
+        <p:spPr/>
+        <p:txBody>
+          <a:bodyPr/>
+          <a:lstStyle/>
+          <a:p>
+            <a:r>
+              <a:rPr lang="en-US" i="1" dirty="0" smtClean="0"/>
+              <a:t>A CLASS SHOULD HAVE ONE AND ONLY ONE RESPONSIBILITY.</a:t>
+            </a:r>
+          </a:p>
+          <a:p>
+            <a:pPr>
+              <a:buNone/>
+            </a:pPr>
+            <a:endParaRPr lang="en-US" i="1" dirty="0" smtClean="0"/>
+          </a:p>
+          <a:p>
+            <a:r>
+              <a:rPr lang="en-US" i="1" dirty="0" smtClean="0"/>
+              <a:t>THERE SHOULD NEVER BE MORE THAN ONE REASON FOR A CLASS TO CHANGE.</a:t>
+            </a:r>
+          </a:p>
+          <a:p>
+            <a:endParaRPr lang="en-US" dirty="0"/>
+          </a:p>
+        </p:txBody>
+      </p:sp>
+    </p:spTree>
+  </p:cSld>
+  <p:clrMapOvr>
+    <a:masterClrMapping/>
+  </p:clrMapOvr>
+  <p:timing>
+    <p:tnLst>
+      <p:par>
+        <p:cTn id="1" dur="indefinite" restart="never" nodeType="tmRoot"/>
+      </p:par>
+    </p:tnLst>
+  </p:timing>
+</p:sld>
+</file>
+
+<file path=ppt/slides/slide38.xml><?xml version="1.0" encoding="utf-8"?>
+<p:sld xmlns:a="http://schemas.openxmlformats.org/drawingml/2006/main" xmlns:r="http://schemas.openxmlformats.org/officeDocument/2006/relationships" xmlns:p="http://schemas.openxmlformats.org/presentationml/2006/main">
+  <p:cSld>
+    <p:spTree>
+      <p:nvGrpSpPr>
+        <p:cNvPr id="1" name=""/>
+        <p:cNvGrpSpPr/>
+        <p:nvPr/>
+      </p:nvGrpSpPr>
+      <p:grpSpPr>
+        <a:xfrm>
+          <a:off x="0" y="0"/>
+          <a:ext cx="0" cy="0"/>
+          <a:chOff x="0" y="0"/>
+          <a:chExt cx="0" cy="0"/>
+        </a:xfrm>
+      </p:grpSpPr>
+      <p:sp>
+        <p:nvSpPr>
+          <p:cNvPr id="2" name="Title 1"/>
+          <p:cNvSpPr>
+            <a:spLocks noGrp="1"/>
+          </p:cNvSpPr>
+          <p:nvPr>
+            <p:ph type="title"/>
+          </p:nvPr>
+        </p:nvSpPr>
+        <p:spPr/>
+        <p:txBody>
+          <a:bodyPr/>
+          <a:lstStyle/>
+          <a:p>
+            <a:r>
+              <a:rPr lang="en-US" dirty="0" smtClean="0"/>
               <a:t>SRP</a:t>
             </a:r>
             <a:endParaRPr lang="en-US" dirty="0"/>
@@ -6580,55 +6942,162 @@
             <p:ph idx="1"/>
           </p:nvPr>
         </p:nvSpPr>
-        <p:spPr/>
+        <p:spPr>
+          <a:xfrm>
+            <a:off x="457200" y="1371600"/>
+            <a:ext cx="8229600" cy="4754563"/>
+          </a:xfrm>
+        </p:spPr>
         <p:txBody>
           <a:bodyPr>
             <a:normAutofit fontScale="70000" lnSpcReduction="20000"/>
           </a:bodyPr>
           <a:lstStyle/>
           <a:p>
-            <a:r>
-              <a:rPr lang="en-US" dirty="0" smtClean="0"/>
-              <a:t>Responsibility means a reason to change. Responsibility is an axis for change</a:t>
-            </a:r>
-            <a:r>
-              <a:rPr lang="en-US" dirty="0" smtClean="0"/>
-              <a:t>.</a:t>
-            </a:r>
+            <a:pPr>
+              <a:buNone/>
+            </a:pPr>
+            <a:r>
+              <a:rPr lang="en-US" dirty="0" smtClean="0"/>
+              <a:t>    	Why is it important to separate two responsibilities into separate classes?</a:t>
+            </a:r>
+          </a:p>
+          <a:p>
+            <a:pPr>
+              <a:buNone/>
+            </a:pPr>
             <a:endParaRPr lang="en-US" dirty="0" smtClean="0"/>
           </a:p>
           <a:p>
-            <a:r>
-              <a:rPr lang="en-US" dirty="0" smtClean="0"/>
-              <a:t>Change in requirements are often the case</a:t>
-            </a:r>
-            <a:r>
-              <a:rPr lang="en-US" dirty="0" smtClean="0"/>
-              <a:t>.</a:t>
-            </a:r>
+            <a:pPr>
+              <a:buNone/>
+            </a:pPr>
+            <a:r>
+              <a:rPr lang="en-US" dirty="0" smtClean="0"/>
+              <a:t>	Because each responsibility is an axis of change. When the requirements change, that change will be manifest through a change in responsibility amongst the classes. If a class assumes more than one responsibility, then there will be more than one reason for it to change.</a:t>
+            </a:r>
+          </a:p>
+          <a:p>
+            <a:pPr>
+              <a:buNone/>
+            </a:pPr>
             <a:endParaRPr lang="en-US" dirty="0" smtClean="0"/>
           </a:p>
           <a:p>
-            <a:r>
-              <a:rPr lang="en-US" dirty="0" smtClean="0"/>
-              <a:t>Following the Single Responsibility Principle can lead us to our goal of Strong Cohesion &amp; Loose Coupling</a:t>
-            </a:r>
-            <a:r>
-              <a:rPr lang="en-US" dirty="0" smtClean="0"/>
-              <a:t>.</a:t>
-            </a:r>
-            <a:endParaRPr lang="en-US" dirty="0" smtClean="0"/>
-          </a:p>
-          <a:p>
-            <a:r>
-              <a:rPr lang="en-US" dirty="0" smtClean="0"/>
-              <a:t>Many small classes with distinct responsibilities results in a more flexible design</a:t>
-            </a:r>
-            <a:r>
-              <a:rPr lang="en-US" dirty="0" smtClean="0"/>
-              <a:t>.</a:t>
-            </a:r>
-            <a:endParaRPr lang="en-US" dirty="0" smtClean="0"/>
+            <a:pPr>
+              <a:buNone/>
+            </a:pPr>
+            <a:r>
+              <a:rPr lang="en-US" dirty="0" smtClean="0"/>
+              <a:t>	If a class has more then one responsibility, then the responsibilities become coupled. Changes to one responsibility may impair or inhibit the class’ ability to meet the others. This kind of coupling leads to fragile designs that break in unexpected ways when</a:t>
+            </a:r>
+          </a:p>
+          <a:p>
+            <a:pPr>
+              <a:buNone/>
+            </a:pPr>
+            <a:r>
+              <a:rPr lang="en-US" dirty="0" smtClean="0"/>
+              <a:t>	changed.</a:t>
+            </a:r>
+            <a:endParaRPr lang="en-US" dirty="0"/>
+          </a:p>
+        </p:txBody>
+      </p:sp>
+    </p:spTree>
+  </p:cSld>
+  <p:clrMapOvr>
+    <a:masterClrMapping/>
+  </p:clrMapOvr>
+  <p:timing>
+    <p:tnLst>
+      <p:par>
+        <p:cTn id="1" dur="indefinite" restart="never" nodeType="tmRoot"/>
+      </p:par>
+    </p:tnLst>
+  </p:timing>
+</p:sld>
+</file>
+
+<file path=ppt/slides/slide39.xml><?xml version="1.0" encoding="utf-8"?>
+<p:sld xmlns:a="http://schemas.openxmlformats.org/drawingml/2006/main" xmlns:r="http://schemas.openxmlformats.org/officeDocument/2006/relationships" xmlns:p="http://schemas.openxmlformats.org/presentationml/2006/main">
+  <p:cSld>
+    <p:spTree>
+      <p:nvGrpSpPr>
+        <p:cNvPr id="1" name=""/>
+        <p:cNvGrpSpPr/>
+        <p:nvPr/>
+      </p:nvGrpSpPr>
+      <p:grpSpPr>
+        <a:xfrm>
+          <a:off x="0" y="0"/>
+          <a:ext cx="0" cy="0"/>
+          <a:chOff x="0" y="0"/>
+          <a:chExt cx="0" cy="0"/>
+        </a:xfrm>
+      </p:grpSpPr>
+      <p:sp>
+        <p:nvSpPr>
+          <p:cNvPr id="2" name="Title 1"/>
+          <p:cNvSpPr>
+            <a:spLocks noGrp="1"/>
+          </p:cNvSpPr>
+          <p:nvPr>
+            <p:ph type="title"/>
+          </p:nvPr>
+        </p:nvSpPr>
+        <p:spPr/>
+        <p:txBody>
+          <a:bodyPr/>
+          <a:lstStyle/>
+          <a:p>
+            <a:r>
+              <a:rPr lang="en-US" dirty="0" smtClean="0"/>
+              <a:t>SRP</a:t>
+            </a:r>
+            <a:endParaRPr lang="en-US" dirty="0"/>
+          </a:p>
+        </p:txBody>
+      </p:sp>
+      <p:sp>
+        <p:nvSpPr>
+          <p:cNvPr id="3" name="Content Placeholder 2"/>
+          <p:cNvSpPr>
+            <a:spLocks noGrp="1"/>
+          </p:cNvSpPr>
+          <p:nvPr>
+            <p:ph idx="1"/>
+          </p:nvPr>
+        </p:nvSpPr>
+        <p:spPr/>
+        <p:txBody>
+          <a:bodyPr>
+            <a:normAutofit fontScale="70000" lnSpcReduction="20000"/>
+          </a:bodyPr>
+          <a:lstStyle/>
+          <a:p>
+            <a:r>
+              <a:rPr lang="en-US" dirty="0" smtClean="0"/>
+              <a:t>Responsibility means a reason to change. Responsibility is an axis for change.</a:t>
+            </a:r>
+          </a:p>
+          <a:p>
+            <a:r>
+              <a:rPr lang="en-US" dirty="0" smtClean="0"/>
+              <a:t>Change in requirements are often the case.</a:t>
+            </a:r>
+          </a:p>
+          <a:p>
+            <a:r>
+              <a:rPr lang="en-US" dirty="0" smtClean="0"/>
+              <a:t>Following the Single Responsibility Principle can lead us to our goal of Strong Cohesion &amp; Loose Coupling.</a:t>
+            </a:r>
+          </a:p>
+          <a:p>
+            <a:r>
+              <a:rPr lang="en-US" dirty="0" smtClean="0"/>
+              <a:t>Many small classes with distinct responsibilities results in a more flexible design.</a:t>
+            </a:r>
           </a:p>
           <a:p>
             <a:r>
@@ -6639,45 +7108,19 @@
           <a:p>
             <a:r>
               <a:rPr lang="en-US" dirty="0" smtClean="0"/>
-              <a:t>Conjoining responsibilities is something that we do naturally</a:t>
-            </a:r>
-            <a:r>
-              <a:rPr lang="en-US" dirty="0" smtClean="0"/>
-              <a:t>.</a:t>
-            </a:r>
-            <a:endParaRPr lang="en-US" dirty="0" smtClean="0"/>
-          </a:p>
-          <a:p>
-            <a:r>
-              <a:rPr lang="en-US" dirty="0" smtClean="0"/>
-              <a:t>Finding and separating those responsibilities from one another is much of what software design is really about</a:t>
-            </a:r>
-            <a:r>
-              <a:rPr lang="en-US" dirty="0" smtClean="0"/>
-              <a:t>.</a:t>
-            </a:r>
-            <a:endParaRPr lang="en-US" dirty="0" smtClean="0"/>
-          </a:p>
-          <a:p>
-            <a:r>
-              <a:rPr lang="en-US" dirty="0" smtClean="0"/>
-              <a:t>Multiple small </a:t>
-            </a:r>
-            <a:r>
-              <a:rPr lang="en-US" dirty="0" smtClean="0"/>
-              <a:t>interfaces </a:t>
-            </a:r>
-            <a:r>
-              <a:rPr lang="en-US" dirty="0" smtClean="0"/>
-              <a:t>that follow Interface Segregation Principle can help in </a:t>
-            </a:r>
-            <a:r>
-              <a:rPr lang="en-US" dirty="0" smtClean="0"/>
-              <a:t>achieving </a:t>
-            </a:r>
-            <a:r>
-              <a:rPr lang="en-US" dirty="0" smtClean="0"/>
-              <a:t>SRP.</a:t>
+              <a:t>Conjoining responsibilities is something that we do naturally.</a:t>
+            </a:r>
+          </a:p>
+          <a:p>
+            <a:r>
+              <a:rPr lang="en-US" dirty="0" smtClean="0"/>
+              <a:t>Finding and separating those responsibilities from one another is much of what software design is really about.</a:t>
+            </a:r>
+          </a:p>
+          <a:p>
+            <a:r>
+              <a:rPr lang="en-US" dirty="0" smtClean="0"/>
+              <a:t>Multiple small interfaces that follow Interface Segregation Principle can help in achieving SRP.</a:t>
             </a:r>
             <a:endParaRPr lang="en-US" dirty="0"/>
           </a:p>
@@ -6691,7 +7134,127 @@
 </p:sld>
 </file>
 
-<file path=ppt/slides/slide35.xml><?xml version="1.0" encoding="utf-8"?>
+<file path=ppt/slides/slide4.xml><?xml version="1.0" encoding="utf-8"?>
+<p:sld xmlns:a="http://schemas.openxmlformats.org/drawingml/2006/main" xmlns:r="http://schemas.openxmlformats.org/officeDocument/2006/relationships" xmlns:p="http://schemas.openxmlformats.org/presentationml/2006/main">
+  <p:cSld>
+    <p:spTree>
+      <p:nvGrpSpPr>
+        <p:cNvPr id="1" name=""/>
+        <p:cNvGrpSpPr/>
+        <p:nvPr/>
+      </p:nvGrpSpPr>
+      <p:grpSpPr>
+        <a:xfrm>
+          <a:off x="0" y="0"/>
+          <a:ext cx="0" cy="0"/>
+          <a:chOff x="0" y="0"/>
+          <a:chExt cx="0" cy="0"/>
+        </a:xfrm>
+      </p:grpSpPr>
+      <p:sp>
+        <p:nvSpPr>
+          <p:cNvPr id="2" name="Title 1"/>
+          <p:cNvSpPr>
+            <a:spLocks noGrp="1"/>
+          </p:cNvSpPr>
+          <p:nvPr>
+            <p:ph type="title"/>
+          </p:nvPr>
+        </p:nvSpPr>
+        <p:spPr/>
+        <p:txBody>
+          <a:bodyPr>
+            <a:normAutofit fontScale="90000"/>
+          </a:bodyPr>
+          <a:lstStyle/>
+          <a:p>
+            <a:r>
+              <a:rPr lang="en-US" dirty="0" smtClean="0"/>
+              <a:t/>
+            </a:r>
+            <a:br>
+              <a:rPr lang="en-US" dirty="0" smtClean="0"/>
+            </a:br>
+            <a:r>
+              <a:rPr lang="en-US" dirty="0"/>
+              <a:t/>
+            </a:r>
+            <a:br>
+              <a:rPr lang="en-US" dirty="0"/>
+            </a:br>
+            <a:r>
+              <a:rPr lang="en-US" dirty="0" smtClean="0"/>
+              <a:t/>
+            </a:r>
+            <a:br>
+              <a:rPr lang="en-US" dirty="0" smtClean="0"/>
+            </a:br>
+            <a:r>
+              <a:rPr lang="en-US" dirty="0"/>
+              <a:t/>
+            </a:r>
+            <a:br>
+              <a:rPr lang="en-US" dirty="0"/>
+            </a:br>
+            <a:r>
+              <a:rPr lang="en-US" dirty="0" smtClean="0"/>
+              <a:t/>
+            </a:r>
+            <a:br>
+              <a:rPr lang="en-US" dirty="0" smtClean="0"/>
+            </a:br>
+            <a:r>
+              <a:rPr lang="en-US" dirty="0"/>
+              <a:t/>
+            </a:r>
+            <a:br>
+              <a:rPr lang="en-US" dirty="0"/>
+            </a:br>
+            <a:r>
+              <a:rPr lang="en-US" dirty="0" smtClean="0"/>
+              <a:t/>
+            </a:r>
+            <a:br>
+              <a:rPr lang="en-US" dirty="0" smtClean="0"/>
+            </a:br>
+            <a:r>
+              <a:rPr lang="en-US" dirty="0"/>
+              <a:t/>
+            </a:r>
+            <a:br>
+              <a:rPr lang="en-US" dirty="0"/>
+            </a:br>
+            <a:r>
+              <a:rPr lang="en-US" dirty="0" smtClean="0"/>
+              <a:t/>
+            </a:r>
+            <a:br>
+              <a:rPr lang="en-US" dirty="0" smtClean="0"/>
+            </a:br>
+            <a:r>
+              <a:rPr lang="en-US" dirty="0" smtClean="0"/>
+              <a:t>EPP Motivation </a:t>
+            </a:r>
+            <a:endParaRPr lang="en-US" dirty="0"/>
+          </a:p>
+        </p:txBody>
+      </p:sp>
+    </p:spTree>
+  </p:cSld>
+  <p:clrMapOvr>
+    <a:masterClrMapping/>
+  </p:clrMapOvr>
+  <p:timing>
+    <p:tnLst>
+      <p:par>
+        <p:cTn id="1" dur="indefinite" restart="never" nodeType="tmRoot"/>
+      </p:par>
+    </p:tnLst>
+  </p:timing>
+</p:sld>
+</file>
+
+<file path=ppt/slides/slide40.xml><?xml version="1.0" encoding="utf-8"?>
 <p:sld xmlns:a="http://schemas.openxmlformats.org/drawingml/2006/main" xmlns:r="http://schemas.openxmlformats.org/officeDocument/2006/relationships" xmlns:p="http://schemas.openxmlformats.org/presentationml/2006/main">
   <p:cSld>
     <p:spTree>
@@ -6758,7 +7321,7 @@
 </p:sld>
 </file>
 
-<file path=ppt/slides/slide36.xml><?xml version="1.0" encoding="utf-8"?>
+<file path=ppt/slides/slide41.xml><?xml version="1.0" encoding="utf-8"?>
 <p:sld xmlns:a="http://schemas.openxmlformats.org/drawingml/2006/main" xmlns:r="http://schemas.openxmlformats.org/officeDocument/2006/relationships" xmlns:p="http://schemas.openxmlformats.org/presentationml/2006/main">
   <p:cSld>
     <p:spTree>
@@ -6851,7 +7414,7 @@
 </p:sld>
 </file>
 
-<file path=ppt/slides/slide37.xml><?xml version="1.0" encoding="utf-8"?>
+<file path=ppt/slides/slide42.xml><?xml version="1.0" encoding="utf-8"?>
 <p:sld xmlns:a="http://schemas.openxmlformats.org/drawingml/2006/main" xmlns:r="http://schemas.openxmlformats.org/officeDocument/2006/relationships" xmlns:p="http://schemas.openxmlformats.org/presentationml/2006/main">
   <p:cSld>
     <p:spTree>
@@ -6943,7 +7506,7 @@
 </p:sld>
 </file>
 
-<file path=ppt/slides/slide38.xml><?xml version="1.0" encoding="utf-8"?>
+<file path=ppt/slides/slide43.xml><?xml version="1.0" encoding="utf-8"?>
 <p:sld xmlns:a="http://schemas.openxmlformats.org/drawingml/2006/main" xmlns:r="http://schemas.openxmlformats.org/officeDocument/2006/relationships" xmlns:p="http://schemas.openxmlformats.org/presentationml/2006/main">
   <p:cSld>
     <p:spTree>
@@ -7076,7 +7639,7 @@
 </p:sld>
 </file>
 
-<file path=ppt/slides/slide39.xml><?xml version="1.0" encoding="utf-8"?>
+<file path=ppt/slides/slide44.xml><?xml version="1.0" encoding="utf-8"?>
 <p:sld xmlns:a="http://schemas.openxmlformats.org/drawingml/2006/main" xmlns:r="http://schemas.openxmlformats.org/officeDocument/2006/relationships" xmlns:p="http://schemas.openxmlformats.org/presentationml/2006/main">
   <p:cSld>
     <p:spTree>
@@ -7143,7 +7706,7 @@
 </p:sld>
 </file>
 
-<file path=ppt/slides/slide4.xml><?xml version="1.0" encoding="utf-8"?>
+<file path=ppt/slides/slide45.xml><?xml version="1.0" encoding="utf-8"?>
 <p:sld xmlns:a="http://schemas.openxmlformats.org/drawingml/2006/main" xmlns:r="http://schemas.openxmlformats.org/officeDocument/2006/relationships" xmlns:p="http://schemas.openxmlformats.org/presentationml/2006/main">
   <p:cSld>
     <p:spTree>
@@ -7172,79 +7735,49 @@
         </p:nvSpPr>
         <p:spPr/>
         <p:txBody>
-          <a:bodyPr>
-            <a:normAutofit fontScale="90000"/>
-          </a:bodyPr>
-          <a:lstStyle/>
-          <a:p>
-            <a:r>
-              <a:rPr lang="en-US" dirty="0" smtClean="0"/>
-              <a:t/>
-            </a:r>
-            <a:br>
-              <a:rPr lang="en-US" dirty="0" smtClean="0"/>
-            </a:br>
-            <a:r>
-              <a:rPr lang="en-US" dirty="0"/>
-              <a:t/>
-            </a:r>
-            <a:br>
-              <a:rPr lang="en-US" dirty="0"/>
-            </a:br>
-            <a:r>
-              <a:rPr lang="en-US" dirty="0" smtClean="0"/>
-              <a:t/>
-            </a:r>
-            <a:br>
-              <a:rPr lang="en-US" dirty="0" smtClean="0"/>
-            </a:br>
-            <a:r>
-              <a:rPr lang="en-US" dirty="0"/>
-              <a:t/>
-            </a:r>
-            <a:br>
-              <a:rPr lang="en-US" dirty="0"/>
-            </a:br>
-            <a:r>
-              <a:rPr lang="en-US" dirty="0" smtClean="0"/>
-              <a:t/>
-            </a:r>
-            <a:br>
-              <a:rPr lang="en-US" dirty="0" smtClean="0"/>
-            </a:br>
-            <a:r>
-              <a:rPr lang="en-US" dirty="0"/>
-              <a:t/>
-            </a:r>
-            <a:br>
-              <a:rPr lang="en-US" dirty="0"/>
-            </a:br>
-            <a:r>
-              <a:rPr lang="en-US" dirty="0" smtClean="0"/>
-              <a:t/>
-            </a:r>
-            <a:br>
-              <a:rPr lang="en-US" dirty="0" smtClean="0"/>
-            </a:br>
-            <a:r>
-              <a:rPr lang="en-US" dirty="0"/>
-              <a:t/>
-            </a:r>
-            <a:br>
-              <a:rPr lang="en-US" dirty="0"/>
-            </a:br>
-            <a:r>
-              <a:rPr lang="en-US" dirty="0" smtClean="0"/>
-              <a:t/>
-            </a:r>
-            <a:br>
-              <a:rPr lang="en-US" dirty="0" smtClean="0"/>
-            </a:br>
-            <a:r>
-              <a:rPr lang="en-US" dirty="0" smtClean="0"/>
-              <a:t>EPP Motivation </a:t>
+          <a:bodyPr/>
+          <a:lstStyle/>
+          <a:p>
+            <a:r>
+              <a:rPr lang="en-US" dirty="0" smtClean="0"/>
+              <a:t>Reflect on LSP</a:t>
             </a:r>
             <a:endParaRPr lang="en-US" dirty="0"/>
+          </a:p>
+        </p:txBody>
+      </p:sp>
+      <p:sp>
+        <p:nvSpPr>
+          <p:cNvPr id="3" name="Content Placeholder 2"/>
+          <p:cNvSpPr>
+            <a:spLocks noGrp="1"/>
+          </p:cNvSpPr>
+          <p:nvPr>
+            <p:ph idx="1"/>
+          </p:nvPr>
+        </p:nvSpPr>
+        <p:spPr/>
+        <p:txBody>
+          <a:bodyPr/>
+          <a:lstStyle/>
+          <a:p>
+            <a:pPr>
+              <a:buNone/>
+            </a:pPr>
+            <a:r>
+              <a:rPr lang="en-US" i="1" dirty="0" smtClean="0"/>
+              <a:t>    FUNCTIONS THAT USE POINTERS OR REFERENCES TO BASE CLASSES MUST BE ABLE TO USE OBJECTS OF DERIVED CLASSES</a:t>
+            </a:r>
+          </a:p>
+          <a:p>
+            <a:pPr>
+              <a:buNone/>
+            </a:pPr>
+            <a:r>
+              <a:rPr lang="en-US" i="1" dirty="0" smtClean="0"/>
+              <a:t>    WITHOUT KNOWING IT.</a:t>
+            </a:r>
+            <a:endParaRPr lang="en-US" i="1" dirty="0"/>
           </a:p>
         </p:txBody>
       </p:sp>
@@ -7263,7 +7796,7 @@
 </p:sld>
 </file>
 
-<file path=ppt/slides/slide40.xml><?xml version="1.0" encoding="utf-8"?>
+<file path=ppt/slides/slide46.xml><?xml version="1.0" encoding="utf-8"?>
 <p:sld xmlns:a="http://schemas.openxmlformats.org/drawingml/2006/main" xmlns:r="http://schemas.openxmlformats.org/officeDocument/2006/relationships" xmlns:p="http://schemas.openxmlformats.org/presentationml/2006/main">
   <p:cSld>
     <p:spTree>
@@ -7297,7 +7830,7 @@
           <a:p>
             <a:r>
               <a:rPr lang="en-US" dirty="0" smtClean="0"/>
-              <a:t>Reflect on LSP</a:t>
+              <a:t>LSP</a:t>
             </a:r>
             <a:endParaRPr lang="en-US" dirty="0"/>
           </a:p>
@@ -7315,15 +7848,25 @@
         </p:nvSpPr>
         <p:spPr/>
         <p:txBody>
-          <a:bodyPr/>
+          <a:bodyPr>
+            <a:normAutofit/>
+          </a:bodyPr>
           <a:lstStyle/>
           <a:p>
             <a:pPr>
               <a:buNone/>
             </a:pPr>
             <a:r>
-              <a:rPr lang="en-US" i="1" dirty="0" smtClean="0"/>
-              <a:t>    FUNCTIONS THAT USE POINTERS OR REFERENCES TO BASE CLASSES MUST BE ABLE TO USE OBJECTS OF DERIVED CLASSES</a:t>
+              <a:rPr lang="en-US" sz="2400" dirty="0" smtClean="0"/>
+              <a:t>The above is a paraphrase of the </a:t>
+            </a:r>
+            <a:r>
+              <a:rPr lang="en-US" sz="2400" dirty="0" err="1" smtClean="0"/>
+              <a:t>Liskov</a:t>
+            </a:r>
+            <a:r>
+              <a:rPr lang="en-US" sz="2400" dirty="0" smtClean="0"/>
+              <a:t> Substitution Principle</a:t>
             </a:r>
           </a:p>
           <a:p>
@@ -7331,10 +7874,32 @@
               <a:buNone/>
             </a:pPr>
             <a:r>
-              <a:rPr lang="en-US" i="1" dirty="0" smtClean="0"/>
-              <a:t>    WITHOUT KNOWING IT.</a:t>
-            </a:r>
-            <a:endParaRPr lang="en-US" i="1" dirty="0"/>
+              <a:rPr lang="en-US" dirty="0" smtClean="0"/>
+              <a:t>Barbara </a:t>
+            </a:r>
+            <a:r>
+              <a:rPr lang="en-US" dirty="0" err="1" smtClean="0"/>
+              <a:t>Liskov</a:t>
+            </a:r>
+            <a:r>
+              <a:rPr lang="en-US" dirty="0" smtClean="0"/>
+              <a:t> first wrote it as follows :</a:t>
+            </a:r>
+          </a:p>
+          <a:p>
+            <a:pPr>
+              <a:buNone/>
+            </a:pPr>
+            <a:r>
+              <a:rPr lang="en-US" dirty="0" smtClean="0"/>
+              <a:t>    If  for each object o1 of type S there is an object o2 of type T such that for all programs P defined in terms of T, the behavior of P is unchanged when o1 is substituted for o2 then S is a subtype of T.</a:t>
+            </a:r>
+          </a:p>
+          <a:p>
+            <a:pPr>
+              <a:buNone/>
+            </a:pPr>
+            <a:endParaRPr lang="en-US" dirty="0"/>
           </a:p>
         </p:txBody>
       </p:sp>
@@ -7353,7 +7918,7 @@
 </p:sld>
 </file>
 
-<file path=ppt/slides/slide41.xml><?xml version="1.0" encoding="utf-8"?>
+<file path=ppt/slides/slide47.xml><?xml version="1.0" encoding="utf-8"?>
 <p:sld xmlns:a="http://schemas.openxmlformats.org/drawingml/2006/main" xmlns:r="http://schemas.openxmlformats.org/officeDocument/2006/relationships" xmlns:p="http://schemas.openxmlformats.org/presentationml/2006/main">
   <p:cSld>
     <p:spTree>
@@ -7406,56 +7971,75 @@
         <p:spPr/>
         <p:txBody>
           <a:bodyPr>
-            <a:normAutofit/>
+            <a:normAutofit fontScale="77500" lnSpcReduction="20000"/>
           </a:bodyPr>
           <a:lstStyle/>
+          <a:p>
+            <a:r>
+              <a:rPr lang="en-US" dirty="0" smtClean="0"/>
+              <a:t>Named after Barbara </a:t>
+            </a:r>
+            <a:r>
+              <a:rPr lang="en-US" dirty="0" err="1" smtClean="0"/>
+              <a:t>Liskov</a:t>
+            </a:r>
+            <a:r>
+              <a:rPr lang="en-US" dirty="0" smtClean="0"/>
+              <a:t>, who gave the principle in 1988.</a:t>
+            </a:r>
+          </a:p>
+          <a:p>
+            <a:r>
+              <a:rPr lang="en-US" dirty="0" smtClean="0"/>
+              <a:t>Substitutability</a:t>
+            </a:r>
+          </a:p>
+          <a:p>
+            <a:r>
+              <a:rPr lang="en-US" dirty="0" smtClean="0"/>
+              <a:t>Calling code must not know the difference between a derived type and a base type.</a:t>
+            </a:r>
+          </a:p>
+          <a:p>
+            <a:r>
+              <a:rPr lang="en-US" dirty="0" smtClean="0"/>
+              <a:t>Sub-types must be substitutable for their base types.</a:t>
+            </a:r>
+          </a:p>
+          <a:p>
+            <a:r>
+              <a:rPr lang="en-US" dirty="0" smtClean="0"/>
+              <a:t>Child classes should not remove base class behavior.</a:t>
+            </a:r>
+          </a:p>
+          <a:p>
+            <a:r>
+              <a:rPr lang="en-US" dirty="0" smtClean="0"/>
+              <a:t>Native OOP: "IS-A" relationship </a:t>
+            </a:r>
+          </a:p>
+          <a:p>
+            <a:r>
+              <a:rPr lang="en-US" dirty="0" smtClean="0"/>
+              <a:t>LSP : "IS-SUBSTITUTABLE=FOR“</a:t>
+            </a:r>
+          </a:p>
           <a:p>
             <a:pPr>
               <a:buNone/>
             </a:pPr>
-            <a:r>
-              <a:rPr lang="en-US" sz="2400" dirty="0" smtClean="0"/>
-              <a:t>The above is a paraphrase of the </a:t>
-            </a:r>
-            <a:r>
-              <a:rPr lang="en-US" sz="2400" dirty="0" err="1" smtClean="0"/>
-              <a:t>Liskov</a:t>
-            </a:r>
-            <a:r>
-              <a:rPr lang="en-US" sz="2400" dirty="0" smtClean="0"/>
-              <a:t> Substitution Principle</a:t>
-            </a:r>
-          </a:p>
-          <a:p>
-            <a:pPr>
-              <a:buNone/>
-            </a:pPr>
-            <a:r>
-              <a:rPr lang="en-US" dirty="0" smtClean="0"/>
-              <a:t>Barbara </a:t>
-            </a:r>
-            <a:r>
-              <a:rPr lang="en-US" dirty="0" err="1" smtClean="0"/>
-              <a:t>Liskov</a:t>
-            </a:r>
-            <a:r>
-              <a:rPr lang="en-US" dirty="0" smtClean="0"/>
-              <a:t> first wrote it as follows :</a:t>
-            </a:r>
-          </a:p>
-          <a:p>
-            <a:pPr>
-              <a:buNone/>
-            </a:pPr>
-            <a:r>
-              <a:rPr lang="en-US" dirty="0" smtClean="0"/>
-              <a:t>    If  for each object o1 of type S there is an object o2 of type T such that for all programs P defined in terms of T, the behavior of P is unchanged when o1 is substituted for o2 then S is a subtype of T.</a:t>
-            </a:r>
-          </a:p>
-          <a:p>
-            <a:pPr>
-              <a:buNone/>
-            </a:pPr>
+            <a:endParaRPr lang="en-US" b="1" dirty="0" smtClean="0"/>
+          </a:p>
+          <a:p>
+            <a:r>
+              <a:rPr lang="en-US" b="1" dirty="0" smtClean="0"/>
+              <a:t>LSP surfaces the undesired behavior problems in subtypes caused due to inheritance</a:t>
+            </a:r>
+          </a:p>
+          <a:p>
+            <a:endParaRPr lang="en-US" b="1" dirty="0" smtClean="0"/>
+          </a:p>
+          <a:p>
             <a:endParaRPr lang="en-US" dirty="0"/>
           </a:p>
         </p:txBody>
@@ -7475,148 +8059,7 @@
 </p:sld>
 </file>
 
-<file path=ppt/slides/slide42.xml><?xml version="1.0" encoding="utf-8"?>
-<p:sld xmlns:a="http://schemas.openxmlformats.org/drawingml/2006/main" xmlns:r="http://schemas.openxmlformats.org/officeDocument/2006/relationships" xmlns:p="http://schemas.openxmlformats.org/presentationml/2006/main">
-  <p:cSld>
-    <p:spTree>
-      <p:nvGrpSpPr>
-        <p:cNvPr id="1" name=""/>
-        <p:cNvGrpSpPr/>
-        <p:nvPr/>
-      </p:nvGrpSpPr>
-      <p:grpSpPr>
-        <a:xfrm>
-          <a:off x="0" y="0"/>
-          <a:ext cx="0" cy="0"/>
-          <a:chOff x="0" y="0"/>
-          <a:chExt cx="0" cy="0"/>
-        </a:xfrm>
-      </p:grpSpPr>
-      <p:sp>
-        <p:nvSpPr>
-          <p:cNvPr id="2" name="Title 1"/>
-          <p:cNvSpPr>
-            <a:spLocks noGrp="1"/>
-          </p:cNvSpPr>
-          <p:nvPr>
-            <p:ph type="title"/>
-          </p:nvPr>
-        </p:nvSpPr>
-        <p:spPr/>
-        <p:txBody>
-          <a:bodyPr/>
-          <a:lstStyle/>
-          <a:p>
-            <a:r>
-              <a:rPr lang="en-US" dirty="0" smtClean="0"/>
-              <a:t>LSP</a:t>
-            </a:r>
-            <a:endParaRPr lang="en-US" dirty="0"/>
-          </a:p>
-        </p:txBody>
-      </p:sp>
-      <p:sp>
-        <p:nvSpPr>
-          <p:cNvPr id="3" name="Content Placeholder 2"/>
-          <p:cNvSpPr>
-            <a:spLocks noGrp="1"/>
-          </p:cNvSpPr>
-          <p:nvPr>
-            <p:ph idx="1"/>
-          </p:nvPr>
-        </p:nvSpPr>
-        <p:spPr/>
-        <p:txBody>
-          <a:bodyPr>
-            <a:normAutofit fontScale="77500" lnSpcReduction="20000"/>
-          </a:bodyPr>
-          <a:lstStyle/>
-          <a:p>
-            <a:r>
-              <a:rPr lang="en-US" dirty="0" smtClean="0"/>
-              <a:t>Named after Barbara </a:t>
-            </a:r>
-            <a:r>
-              <a:rPr lang="en-US" dirty="0" err="1" smtClean="0"/>
-              <a:t>Liskov</a:t>
-            </a:r>
-            <a:r>
-              <a:rPr lang="en-US" dirty="0" smtClean="0"/>
-              <a:t>, who gave the principle in 1988.</a:t>
-            </a:r>
-          </a:p>
-          <a:p>
-            <a:r>
-              <a:rPr lang="en-US" dirty="0" smtClean="0"/>
-              <a:t>Substitutability</a:t>
-            </a:r>
-          </a:p>
-          <a:p>
-            <a:r>
-              <a:rPr lang="en-US" dirty="0" smtClean="0"/>
-              <a:t>Calling code must not know the difference between a derived type and a base type.</a:t>
-            </a:r>
-          </a:p>
-          <a:p>
-            <a:r>
-              <a:rPr lang="en-US" dirty="0" smtClean="0"/>
-              <a:t>Sub-types must be substitutable for their base types.</a:t>
-            </a:r>
-          </a:p>
-          <a:p>
-            <a:r>
-              <a:rPr lang="en-US" dirty="0" smtClean="0"/>
-              <a:t>Child classes should not remove base class behavior.</a:t>
-            </a:r>
-          </a:p>
-          <a:p>
-            <a:r>
-              <a:rPr lang="en-US" dirty="0" smtClean="0"/>
-              <a:t>Native OOP: "IS-A" relationship </a:t>
-            </a:r>
-          </a:p>
-          <a:p>
-            <a:r>
-              <a:rPr lang="en-US" dirty="0" smtClean="0"/>
-              <a:t>LSP : "IS-SUBSTITUTABLE=FOR“</a:t>
-            </a:r>
-          </a:p>
-          <a:p>
-            <a:pPr>
-              <a:buNone/>
-            </a:pPr>
-            <a:endParaRPr lang="en-US" b="1" dirty="0" smtClean="0"/>
-          </a:p>
-          <a:p>
-            <a:r>
-              <a:rPr lang="en-US" b="1" dirty="0" smtClean="0"/>
-              <a:t>LSP surfaces the undesired behavior problems in subtypes caused due to inheritance</a:t>
-            </a:r>
-          </a:p>
-          <a:p>
-            <a:endParaRPr lang="en-US" b="1" dirty="0" smtClean="0"/>
-          </a:p>
-          <a:p>
-            <a:endParaRPr lang="en-US" dirty="0"/>
-          </a:p>
-        </p:txBody>
-      </p:sp>
-    </p:spTree>
-  </p:cSld>
-  <p:clrMapOvr>
-    <a:masterClrMapping/>
-  </p:clrMapOvr>
-  <p:timing>
-    <p:tnLst>
-      <p:par>
-        <p:cTn id="1" dur="indefinite" restart="never" nodeType="tmRoot"/>
-      </p:par>
-    </p:tnLst>
-  </p:timing>
-</p:sld>
-</file>
-
-<file path=ppt/slides/slide43.xml><?xml version="1.0" encoding="utf-8"?>
+<file path=ppt/slides/slide48.xml><?xml version="1.0" encoding="utf-8"?>
 <p:sld xmlns:a="http://schemas.openxmlformats.org/drawingml/2006/main" xmlns:r="http://schemas.openxmlformats.org/officeDocument/2006/relationships" xmlns:p="http://schemas.openxmlformats.org/presentationml/2006/main">
   <p:cSld>
     <p:spTree>
@@ -7683,7 +8126,7 @@
 </p:sld>
 </file>
 
-<file path=ppt/slides/slide44.xml><?xml version="1.0" encoding="utf-8"?>
+<file path=ppt/slides/slide49.xml><?xml version="1.0" encoding="utf-8"?>
 <p:sld xmlns:a="http://schemas.openxmlformats.org/drawingml/2006/main" xmlns:r="http://schemas.openxmlformats.org/officeDocument/2006/relationships" xmlns:p="http://schemas.openxmlformats.org/presentationml/2006/main">
   <p:cSld>
     <p:spTree>
@@ -7753,11 +8196,7 @@
             </a:pPr>
             <a:r>
               <a:rPr lang="en-US" i="1" dirty="0" smtClean="0"/>
-              <a:t>	CLIENTS </a:t>
-            </a:r>
-            <a:r>
-              <a:rPr lang="en-US" i="1" dirty="0" smtClean="0"/>
-              <a:t>SHOULD NOT BE FORCED TO DEPEND UPON INTERFACES THAT THEY DO NOT USE.</a:t>
+              <a:t>	CLIENTS SHOULD NOT BE FORCED TO DEPEND UPON INTERFACES THAT THEY DO NOT USE.</a:t>
             </a:r>
           </a:p>
           <a:p>
@@ -7783,7 +8222,7 @@
 </p:sld>
 </file>
 
-<file path=ppt/slides/slide45.xml><?xml version="1.0" encoding="utf-8"?>
+<file path=ppt/slides/slide5.xml><?xml version="1.0" encoding="utf-8"?>
 <p:sld xmlns:a="http://schemas.openxmlformats.org/drawingml/2006/main" xmlns:r="http://schemas.openxmlformats.org/officeDocument/2006/relationships" xmlns:p="http://schemas.openxmlformats.org/presentationml/2006/main">
   <p:cSld>
     <p:spTree>
@@ -7812,68 +8251,46 @@
         </p:nvSpPr>
         <p:spPr/>
         <p:txBody>
+          <a:bodyPr>
+            <a:normAutofit/>
+          </a:bodyPr>
+          <a:lstStyle/>
+          <a:p>
+            <a:r>
+              <a:rPr lang="en-US" dirty="0" smtClean="0"/>
+              <a:t>Engineering Philosophy</a:t>
+            </a:r>
+            <a:endParaRPr lang="en-US" dirty="0"/>
+          </a:p>
+        </p:txBody>
+      </p:sp>
+      <p:sp>
+        <p:nvSpPr>
+          <p:cNvPr id="3" name="Content Placeholder 2"/>
+          <p:cNvSpPr>
+            <a:spLocks noGrp="1"/>
+          </p:cNvSpPr>
+          <p:nvPr>
+            <p:ph idx="1"/>
+          </p:nvPr>
+        </p:nvSpPr>
+        <p:spPr/>
+        <p:txBody>
           <a:bodyPr/>
           <a:lstStyle/>
           <a:p>
             <a:r>
               <a:rPr lang="en-US" dirty="0" smtClean="0"/>
-              <a:t>ISP</a:t>
-            </a:r>
-            <a:endParaRPr lang="en-US" dirty="0"/>
-          </a:p>
-        </p:txBody>
-      </p:sp>
-      <p:sp>
-        <p:nvSpPr>
-          <p:cNvPr id="3" name="Content Placeholder 2"/>
-          <p:cNvSpPr>
-            <a:spLocks noGrp="1"/>
-          </p:cNvSpPr>
-          <p:nvPr>
-            <p:ph idx="1"/>
-          </p:nvPr>
-        </p:nvSpPr>
-        <p:spPr/>
-        <p:txBody>
-          <a:bodyPr>
-            <a:normAutofit fontScale="70000" lnSpcReduction="20000"/>
-          </a:bodyPr>
-          <a:lstStyle/>
-          <a:p>
-            <a:r>
-              <a:rPr lang="en-US" dirty="0" smtClean="0"/>
-              <a:t>Fat/Polluted interfaces</a:t>
-            </a:r>
-          </a:p>
-          <a:p>
-            <a:r>
-              <a:rPr lang="en-US" dirty="0" smtClean="0"/>
-              <a:t>Classes that have “fat” interfaces are classes whose interfaces are not cohesive.</a:t>
-            </a:r>
-          </a:p>
-          <a:p>
-            <a:r>
-              <a:rPr lang="en-US" dirty="0" smtClean="0"/>
-              <a:t>Let the client drive the interface.</a:t>
-            </a:r>
-          </a:p>
-          <a:p>
-            <a:r>
-              <a:rPr lang="en-US" dirty="0" smtClean="0"/>
-              <a:t>In other words, the interfaces of the class can be broken up into groups of member functions. Each group serves a different set of clients.  Thus some clients use one group of member functions, and other clients use the other groups.</a:t>
-            </a:r>
-          </a:p>
-          <a:p>
-            <a:r>
-              <a:rPr lang="en-US" dirty="0" smtClean="0"/>
-              <a:t>The ISP acknowledges that there are objects that require non-cohesive interfaces;  however it suggests that clients should not know about them as a single class.  Instead, clients should know about abstract base classes that have cohesive interfaces. </a:t>
-            </a:r>
-          </a:p>
-          <a:p>
-            <a:r>
-              <a:rPr lang="en-US" dirty="0" smtClean="0"/>
-              <a:t>Some languages refer to these abstract base classes as “interfaces”, “protocols” or “signatures”.</a:t>
-            </a:r>
+              <a:t>Beautiful, Maintainable Code</a:t>
+            </a:r>
+          </a:p>
+          <a:p>
+            <a:r>
+              <a:rPr lang="en-US" dirty="0" smtClean="0"/>
+              <a:t>We want to “Care” about our code</a:t>
+            </a:r>
+          </a:p>
+          <a:p>
             <a:endParaRPr lang="en-US" dirty="0"/>
           </a:p>
         </p:txBody>
@@ -7893,7 +8310,174 @@
 </p:sld>
 </file>
 
-<file path=ppt/slides/slide46.xml><?xml version="1.0" encoding="utf-8"?>
+<file path=ppt/slides/slide50.xml><?xml version="1.0" encoding="utf-8"?>
+<p:sld xmlns:a="http://schemas.openxmlformats.org/drawingml/2006/main" xmlns:r="http://schemas.openxmlformats.org/officeDocument/2006/relationships" xmlns:p="http://schemas.openxmlformats.org/presentationml/2006/main">
+  <p:cSld>
+    <p:spTree>
+      <p:nvGrpSpPr>
+        <p:cNvPr id="1" name=""/>
+        <p:cNvGrpSpPr/>
+        <p:nvPr/>
+      </p:nvGrpSpPr>
+      <p:grpSpPr>
+        <a:xfrm>
+          <a:off x="0" y="0"/>
+          <a:ext cx="0" cy="0"/>
+          <a:chOff x="0" y="0"/>
+          <a:chExt cx="0" cy="0"/>
+        </a:xfrm>
+      </p:grpSpPr>
+      <p:pic>
+        <p:nvPicPr>
+          <p:cNvPr id="82946" name="Picture 2"/>
+          <p:cNvPicPr>
+            <a:picLocks noChangeAspect="1" noChangeArrowheads="1"/>
+          </p:cNvPicPr>
+          <p:nvPr/>
+        </p:nvPicPr>
+        <p:blipFill>
+          <a:blip r:embed="rId2" cstate="print"/>
+          <a:srcRect/>
+          <a:stretch>
+            <a:fillRect/>
+          </a:stretch>
+        </p:blipFill>
+        <p:spPr bwMode="auto">
+          <a:xfrm>
+            <a:off x="266700" y="28575"/>
+            <a:ext cx="8877300" cy="6829425"/>
+          </a:xfrm>
+          <a:prstGeom prst="rect">
+            <a:avLst/>
+          </a:prstGeom>
+          <a:noFill/>
+          <a:ln w="9525">
+            <a:noFill/>
+            <a:miter lim="800000"/>
+            <a:headEnd/>
+            <a:tailEnd/>
+          </a:ln>
+        </p:spPr>
+      </p:pic>
+    </p:spTree>
+  </p:cSld>
+  <p:clrMapOvr>
+    <a:masterClrMapping/>
+  </p:clrMapOvr>
+</p:sld>
+</file>
+
+<file path=ppt/slides/slide51.xml><?xml version="1.0" encoding="utf-8"?>
+<p:sld xmlns:a="http://schemas.openxmlformats.org/drawingml/2006/main" xmlns:r="http://schemas.openxmlformats.org/officeDocument/2006/relationships" xmlns:p="http://schemas.openxmlformats.org/presentationml/2006/main">
+  <p:cSld>
+    <p:spTree>
+      <p:nvGrpSpPr>
+        <p:cNvPr id="1" name=""/>
+        <p:cNvGrpSpPr/>
+        <p:nvPr/>
+      </p:nvGrpSpPr>
+      <p:grpSpPr>
+        <a:xfrm>
+          <a:off x="0" y="0"/>
+          <a:ext cx="0" cy="0"/>
+          <a:chOff x="0" y="0"/>
+          <a:chExt cx="0" cy="0"/>
+        </a:xfrm>
+      </p:grpSpPr>
+      <p:sp>
+        <p:nvSpPr>
+          <p:cNvPr id="2" name="Title 1"/>
+          <p:cNvSpPr>
+            <a:spLocks noGrp="1"/>
+          </p:cNvSpPr>
+          <p:nvPr>
+            <p:ph type="title"/>
+          </p:nvPr>
+        </p:nvSpPr>
+        <p:spPr/>
+        <p:txBody>
+          <a:bodyPr/>
+          <a:lstStyle/>
+          <a:p>
+            <a:r>
+              <a:rPr lang="en-US" dirty="0" smtClean="0"/>
+              <a:t>ISP</a:t>
+            </a:r>
+            <a:endParaRPr lang="en-US" dirty="0"/>
+          </a:p>
+        </p:txBody>
+      </p:sp>
+      <p:sp>
+        <p:nvSpPr>
+          <p:cNvPr id="3" name="Content Placeholder 2"/>
+          <p:cNvSpPr>
+            <a:spLocks noGrp="1"/>
+          </p:cNvSpPr>
+          <p:nvPr>
+            <p:ph idx="1"/>
+          </p:nvPr>
+        </p:nvSpPr>
+        <p:spPr/>
+        <p:txBody>
+          <a:bodyPr>
+            <a:normAutofit fontScale="70000" lnSpcReduction="20000"/>
+          </a:bodyPr>
+          <a:lstStyle/>
+          <a:p>
+            <a:r>
+              <a:rPr lang="en-US" dirty="0" smtClean="0"/>
+              <a:t>Fat/Polluted interfaces</a:t>
+            </a:r>
+          </a:p>
+          <a:p>
+            <a:r>
+              <a:rPr lang="en-US" dirty="0" smtClean="0"/>
+              <a:t>Classes that have “fat” interfaces are classes whose interfaces are not cohesive.</a:t>
+            </a:r>
+          </a:p>
+          <a:p>
+            <a:r>
+              <a:rPr lang="en-US" dirty="0" smtClean="0"/>
+              <a:t>Let the client drive the interface.</a:t>
+            </a:r>
+          </a:p>
+          <a:p>
+            <a:r>
+              <a:rPr lang="en-US" dirty="0" smtClean="0"/>
+              <a:t>In other words, the interfaces of the class can be broken up into groups of member functions. Each group serves a different set of clients.  Thus some clients use one group of member functions, and other clients use the other groups.</a:t>
+            </a:r>
+          </a:p>
+          <a:p>
+            <a:r>
+              <a:rPr lang="en-US" dirty="0" smtClean="0"/>
+              <a:t>The ISP acknowledges that there are objects that require non-cohesive interfaces;  however it suggests that clients should not know about them as a single class.  Instead, clients should know about abstract base classes that have cohesive interfaces. </a:t>
+            </a:r>
+          </a:p>
+          <a:p>
+            <a:r>
+              <a:rPr lang="en-US" dirty="0" smtClean="0"/>
+              <a:t>Some languages refer to these abstract base classes as “interfaces”, “protocols” or “signatures”.</a:t>
+            </a:r>
+            <a:endParaRPr lang="en-US" dirty="0"/>
+          </a:p>
+        </p:txBody>
+      </p:sp>
+    </p:spTree>
+  </p:cSld>
+  <p:clrMapOvr>
+    <a:masterClrMapping/>
+  </p:clrMapOvr>
+  <p:timing>
+    <p:tnLst>
+      <p:par>
+        <p:cTn id="1" dur="indefinite" restart="never" nodeType="tmRoot"/>
+      </p:par>
+    </p:tnLst>
+  </p:timing>
+</p:sld>
+</file>
+
+<file path=ppt/slides/slide52.xml><?xml version="1.0" encoding="utf-8"?>
 <p:sld xmlns:a="http://schemas.openxmlformats.org/drawingml/2006/main" xmlns:r="http://schemas.openxmlformats.org/officeDocument/2006/relationships" xmlns:p="http://schemas.openxmlformats.org/presentationml/2006/main">
   <p:cSld>
     <p:spTree>
@@ -7960,7 +8544,7 @@
 </p:sld>
 </file>
 
-<file path=ppt/slides/slide47.xml><?xml version="1.0" encoding="utf-8"?>
+<file path=ppt/slides/slide53.xml><?xml version="1.0" encoding="utf-8"?>
 <p:sld xmlns:a="http://schemas.openxmlformats.org/drawingml/2006/main" xmlns:r="http://schemas.openxmlformats.org/officeDocument/2006/relationships" xmlns:p="http://schemas.openxmlformats.org/presentationml/2006/main">
   <p:cSld>
     <p:spTree>
@@ -8049,7 +8633,7 @@
 </p:sld>
 </file>
 
-<file path=ppt/slides/slide48.xml><?xml version="1.0" encoding="utf-8"?>
+<file path=ppt/slides/slide54.xml><?xml version="1.0" encoding="utf-8"?>
 <p:sld xmlns:a="http://schemas.openxmlformats.org/drawingml/2006/main" xmlns:r="http://schemas.openxmlformats.org/officeDocument/2006/relationships" xmlns:p="http://schemas.openxmlformats.org/presentationml/2006/main">
   <p:cSld>
     <p:spTree>
@@ -8128,11 +8712,7 @@
             </a:r>
             <a:r>
               <a:rPr lang="en-US" dirty="0" smtClean="0"/>
-              <a:t> </a:t>
-            </a:r>
-            <a:r>
-              <a:rPr lang="en-US" dirty="0" smtClean="0"/>
-              <a:t>with another ORM such as Entity FW or more still </a:t>
+              <a:t> with another ORM such as Entity FW or more still </a:t>
             </a:r>
             <a:r>
               <a:rPr lang="en-US" dirty="0" err="1" smtClean="0"/>
@@ -8177,7 +8757,7 @@
 </p:sld>
 </file>
 
-<file path=ppt/slides/slide49.xml><?xml version="1.0" encoding="utf-8"?>
+<file path=ppt/slides/slide55.xml><?xml version="1.0" encoding="utf-8"?>
 <p:sld xmlns:a="http://schemas.openxmlformats.org/drawingml/2006/main" xmlns:r="http://schemas.openxmlformats.org/officeDocument/2006/relationships" xmlns:p="http://schemas.openxmlformats.org/presentationml/2006/main">
   <p:cSld>
     <p:spTree>
@@ -8196,7 +8776,7 @@
       </p:grpSpPr>
       <p:sp>
         <p:nvSpPr>
-          <p:cNvPr id="2" name="Title 1"/>
+          <p:cNvPr id="4" name="Title 3"/>
           <p:cNvSpPr>
             <a:spLocks noGrp="1"/>
           </p:cNvSpPr>
@@ -8204,44 +8784,21 @@
             <p:ph type="title"/>
           </p:nvPr>
         </p:nvSpPr>
-        <p:spPr/>
+        <p:spPr>
+          <a:xfrm>
+            <a:off x="609600" y="2667000"/>
+            <a:ext cx="8229600" cy="1143000"/>
+          </a:xfrm>
+        </p:spPr>
         <p:txBody>
           <a:bodyPr/>
           <a:lstStyle/>
           <a:p>
             <a:r>
               <a:rPr lang="en-US" dirty="0" smtClean="0"/>
-              <a:t>Other design smells &amp; principles</a:t>
+              <a:t>STATIC vs. DYNAMIC</a:t>
             </a:r>
             <a:endParaRPr lang="en-US" dirty="0"/>
-          </a:p>
-        </p:txBody>
-      </p:sp>
-      <p:sp>
-        <p:nvSpPr>
-          <p:cNvPr id="3" name="Content Placeholder 2"/>
-          <p:cNvSpPr>
-            <a:spLocks noGrp="1"/>
-          </p:cNvSpPr>
-          <p:nvPr>
-            <p:ph idx="1"/>
-          </p:nvPr>
-        </p:nvSpPr>
-        <p:spPr/>
-        <p:txBody>
-          <a:bodyPr/>
-          <a:lstStyle/>
-          <a:p>
-            <a:r>
-              <a:rPr lang="en-US" dirty="0" smtClean="0"/>
-              <a:t>Needless Repetition : DRY</a:t>
-            </a:r>
-          </a:p>
-          <a:p>
-            <a:r>
-              <a:rPr lang="en-US" dirty="0" smtClean="0"/>
-              <a:t>Complex/Over design : YAGNI, KISS</a:t>
-            </a:r>
           </a:p>
         </p:txBody>
       </p:sp>
@@ -8250,17 +8807,10 @@
   <p:clrMapOvr>
     <a:masterClrMapping/>
   </p:clrMapOvr>
-  <p:timing>
-    <p:tnLst>
-      <p:par>
-        <p:cTn id="1" dur="indefinite" restart="never" nodeType="tmRoot"/>
-      </p:par>
-    </p:tnLst>
-  </p:timing>
 </p:sld>
 </file>
 
-<file path=ppt/slides/slide5.xml><?xml version="1.0" encoding="utf-8"?>
+<file path=ppt/slides/slide56.xml><?xml version="1.0" encoding="utf-8"?>
 <p:sld xmlns:a="http://schemas.openxmlformats.org/drawingml/2006/main" xmlns:r="http://schemas.openxmlformats.org/officeDocument/2006/relationships" xmlns:p="http://schemas.openxmlformats.org/presentationml/2006/main">
   <p:cSld>
     <p:spTree>
@@ -8287,6 +8837,59 @@
             <p:ph type="title"/>
           </p:nvPr>
         </p:nvSpPr>
+        <p:spPr>
+          <a:xfrm>
+            <a:off x="457200" y="2819400"/>
+            <a:ext cx="8229600" cy="1143000"/>
+          </a:xfrm>
+        </p:spPr>
+        <p:txBody>
+          <a:bodyPr/>
+          <a:lstStyle/>
+          <a:p>
+            <a:r>
+              <a:rPr lang="en-US" dirty="0" smtClean="0"/>
+              <a:t>Why do we need an Interface?</a:t>
+            </a:r>
+            <a:endParaRPr lang="en-US" dirty="0"/>
+          </a:p>
+        </p:txBody>
+      </p:sp>
+    </p:spTree>
+  </p:cSld>
+  <p:clrMapOvr>
+    <a:masterClrMapping/>
+  </p:clrMapOvr>
+</p:sld>
+</file>
+
+<file path=ppt/slides/slide57.xml><?xml version="1.0" encoding="utf-8"?>
+<p:sld xmlns:a="http://schemas.openxmlformats.org/drawingml/2006/main" xmlns:r="http://schemas.openxmlformats.org/officeDocument/2006/relationships" xmlns:p="http://schemas.openxmlformats.org/presentationml/2006/main">
+  <p:cSld>
+    <p:spTree>
+      <p:nvGrpSpPr>
+        <p:cNvPr id="1" name=""/>
+        <p:cNvGrpSpPr/>
+        <p:nvPr/>
+      </p:nvGrpSpPr>
+      <p:grpSpPr>
+        <a:xfrm>
+          <a:off x="0" y="0"/>
+          <a:ext cx="0" cy="0"/>
+          <a:chOff x="0" y="0"/>
+          <a:chExt cx="0" cy="0"/>
+        </a:xfrm>
+      </p:grpSpPr>
+      <p:sp>
+        <p:nvSpPr>
+          <p:cNvPr id="2" name="Title 1"/>
+          <p:cNvSpPr>
+            <a:spLocks noGrp="1"/>
+          </p:cNvSpPr>
+          <p:nvPr>
+            <p:ph type="title"/>
+          </p:nvPr>
+        </p:nvSpPr>
         <p:spPr/>
         <p:txBody>
           <a:bodyPr>
@@ -8295,44 +8898,147 @@
           <a:lstStyle/>
           <a:p>
             <a:r>
-              <a:rPr lang="en-US" dirty="0" smtClean="0"/>
-              <a:t>Engineering Philosophy</a:t>
-            </a:r>
-            <a:endParaRPr lang="en-US" dirty="0"/>
-          </a:p>
-        </p:txBody>
-      </p:sp>
-      <p:sp>
-        <p:nvSpPr>
-          <p:cNvPr id="3" name="Content Placeholder 2"/>
-          <p:cNvSpPr>
-            <a:spLocks noGrp="1"/>
-          </p:cNvSpPr>
-          <p:nvPr>
-            <p:ph idx="1"/>
-          </p:nvPr>
-        </p:nvSpPr>
-        <p:spPr/>
-        <p:txBody>
-          <a:bodyPr/>
-          <a:lstStyle/>
-          <a:p>
-            <a:r>
-              <a:rPr lang="en-US" dirty="0" smtClean="0"/>
-              <a:t>Beautiful, Maintainable Code</a:t>
-            </a:r>
-          </a:p>
-          <a:p>
-            <a:r>
-              <a:rPr lang="en-US" dirty="0" smtClean="0"/>
-              <a:t>We want to “Care” about our code</a:t>
-            </a:r>
-          </a:p>
-          <a:p>
-            <a:endParaRPr lang="en-US" dirty="0"/>
-          </a:p>
-        </p:txBody>
-      </p:sp>
+              <a:rPr lang="en-US" sz="2800" dirty="0" smtClean="0"/>
+              <a:t>In static </a:t>
+            </a:r>
+            <a:r>
+              <a:rPr lang="en-US" sz="2800" dirty="0" smtClean="0"/>
+              <a:t>l</a:t>
+            </a:r>
+            <a:r>
+              <a:rPr lang="en-US" sz="2800" dirty="0" smtClean="0"/>
+              <a:t>anguages,</a:t>
+            </a:r>
+            <a:br>
+              <a:rPr lang="en-US" sz="2800" dirty="0" smtClean="0"/>
+            </a:br>
+            <a:r>
+              <a:rPr lang="en-US" sz="2800" dirty="0" smtClean="0"/>
+              <a:t>We must know about Types being passed around!</a:t>
+            </a:r>
+            <a:endParaRPr lang="en-US" sz="2800" dirty="0"/>
+          </a:p>
+        </p:txBody>
+      </p:sp>
+      <p:pic>
+        <p:nvPicPr>
+          <p:cNvPr id="83971" name="Picture 3"/>
+          <p:cNvPicPr>
+            <a:picLocks noChangeAspect="1" noChangeArrowheads="1"/>
+          </p:cNvPicPr>
+          <p:nvPr/>
+        </p:nvPicPr>
+        <p:blipFill>
+          <a:blip r:embed="rId2" cstate="print"/>
+          <a:srcRect/>
+          <a:stretch>
+            <a:fillRect/>
+          </a:stretch>
+        </p:blipFill>
+        <p:spPr bwMode="auto">
+          <a:xfrm>
+            <a:off x="1905000" y="2286000"/>
+            <a:ext cx="5638800" cy="2362200"/>
+          </a:xfrm>
+          <a:prstGeom prst="rect">
+            <a:avLst/>
+          </a:prstGeom>
+          <a:noFill/>
+          <a:ln w="9525">
+            <a:noFill/>
+            <a:miter lim="800000"/>
+            <a:headEnd/>
+            <a:tailEnd/>
+          </a:ln>
+        </p:spPr>
+      </p:pic>
+    </p:spTree>
+  </p:cSld>
+  <p:clrMapOvr>
+    <a:masterClrMapping/>
+  </p:clrMapOvr>
+</p:sld>
+</file>
+
+<file path=ppt/slides/slide58.xml><?xml version="1.0" encoding="utf-8"?>
+<p:sld xmlns:a="http://schemas.openxmlformats.org/drawingml/2006/main" xmlns:r="http://schemas.openxmlformats.org/officeDocument/2006/relationships" xmlns:p="http://schemas.openxmlformats.org/presentationml/2006/main">
+  <p:cSld>
+    <p:spTree>
+      <p:nvGrpSpPr>
+        <p:cNvPr id="1" name=""/>
+        <p:cNvGrpSpPr/>
+        <p:nvPr/>
+      </p:nvGrpSpPr>
+      <p:grpSpPr>
+        <a:xfrm>
+          <a:off x="0" y="0"/>
+          <a:ext cx="0" cy="0"/>
+          <a:chOff x="0" y="0"/>
+          <a:chExt cx="0" cy="0"/>
+        </a:xfrm>
+      </p:grpSpPr>
+      <p:sp>
+        <p:nvSpPr>
+          <p:cNvPr id="2" name="Title 1"/>
+          <p:cNvSpPr>
+            <a:spLocks noGrp="1"/>
+          </p:cNvSpPr>
+          <p:nvPr>
+            <p:ph type="title"/>
+          </p:nvPr>
+        </p:nvSpPr>
+        <p:spPr>
+          <a:xfrm>
+            <a:off x="457200" y="274638"/>
+            <a:ext cx="8229600" cy="1401762"/>
+          </a:xfrm>
+        </p:spPr>
+        <p:txBody>
+          <a:bodyPr>
+            <a:normAutofit/>
+          </a:bodyPr>
+          <a:lstStyle/>
+          <a:p>
+            <a:r>
+              <a:rPr lang="en-US" sz="2800" dirty="0" smtClean="0"/>
+              <a:t>A dynamic language like Ruby is designed to never worry about types in the first place</a:t>
+            </a:r>
+            <a:endParaRPr lang="en-US" sz="2800" dirty="0"/>
+          </a:p>
+        </p:txBody>
+      </p:sp>
+      <p:pic>
+        <p:nvPicPr>
+          <p:cNvPr id="84995" name="Picture 3"/>
+          <p:cNvPicPr>
+            <a:picLocks noChangeAspect="1" noChangeArrowheads="1"/>
+          </p:cNvPicPr>
+          <p:nvPr/>
+        </p:nvPicPr>
+        <p:blipFill>
+          <a:blip r:embed="rId2" cstate="print"/>
+          <a:srcRect/>
+          <a:stretch>
+            <a:fillRect/>
+          </a:stretch>
+        </p:blipFill>
+        <p:spPr bwMode="auto">
+          <a:xfrm>
+            <a:off x="1514475" y="2133600"/>
+            <a:ext cx="6115050" cy="2590799"/>
+          </a:xfrm>
+          <a:prstGeom prst="rect">
+            <a:avLst/>
+          </a:prstGeom>
+          <a:noFill/>
+          <a:ln w="9525">
+            <a:noFill/>
+            <a:miter lim="800000"/>
+            <a:headEnd/>
+            <a:tailEnd/>
+          </a:ln>
+        </p:spPr>
+      </p:pic>
     </p:spTree>
   </p:cSld>
   <p:clrMapOvr>
@@ -8348,7 +9054,353 @@
 </p:sld>
 </file>
 
-<file path=ppt/slides/slide50.xml><?xml version="1.0" encoding="utf-8"?>
+<file path=ppt/slides/slide59.xml><?xml version="1.0" encoding="utf-8"?>
+<p:sld xmlns:a="http://schemas.openxmlformats.org/drawingml/2006/main" xmlns:r="http://schemas.openxmlformats.org/officeDocument/2006/relationships" xmlns:p="http://schemas.openxmlformats.org/presentationml/2006/main">
+  <p:cSld>
+    <p:spTree>
+      <p:nvGrpSpPr>
+        <p:cNvPr id="1" name=""/>
+        <p:cNvGrpSpPr/>
+        <p:nvPr/>
+      </p:nvGrpSpPr>
+      <p:grpSpPr>
+        <a:xfrm>
+          <a:off x="0" y="0"/>
+          <a:ext cx="0" cy="0"/>
+          <a:chOff x="0" y="0"/>
+          <a:chExt cx="0" cy="0"/>
+        </a:xfrm>
+      </p:grpSpPr>
+      <p:pic>
+        <p:nvPicPr>
+          <p:cNvPr id="81922" name="Picture 2"/>
+          <p:cNvPicPr>
+            <a:picLocks noChangeAspect="1" noChangeArrowheads="1"/>
+          </p:cNvPicPr>
+          <p:nvPr/>
+        </p:nvPicPr>
+        <p:blipFill>
+          <a:blip r:embed="rId2" cstate="print"/>
+          <a:srcRect/>
+          <a:stretch>
+            <a:fillRect/>
+          </a:stretch>
+        </p:blipFill>
+        <p:spPr bwMode="auto">
+          <a:xfrm>
+            <a:off x="457200" y="533400"/>
+            <a:ext cx="3676650" cy="4486275"/>
+          </a:xfrm>
+          <a:prstGeom prst="rect">
+            <a:avLst/>
+          </a:prstGeom>
+          <a:noFill/>
+          <a:ln w="9525">
+            <a:noFill/>
+            <a:miter lim="800000"/>
+            <a:headEnd/>
+            <a:tailEnd/>
+          </a:ln>
+        </p:spPr>
+      </p:pic>
+      <p:pic>
+        <p:nvPicPr>
+          <p:cNvPr id="81923" name="Picture 3"/>
+          <p:cNvPicPr>
+            <a:picLocks noChangeAspect="1" noChangeArrowheads="1"/>
+          </p:cNvPicPr>
+          <p:nvPr/>
+        </p:nvPicPr>
+        <p:blipFill>
+          <a:blip r:embed="rId3" cstate="print"/>
+          <a:srcRect/>
+          <a:stretch>
+            <a:fillRect/>
+          </a:stretch>
+        </p:blipFill>
+        <p:spPr bwMode="auto">
+          <a:xfrm>
+            <a:off x="4724400" y="609600"/>
+            <a:ext cx="3971925" cy="4438650"/>
+          </a:xfrm>
+          <a:prstGeom prst="rect">
+            <a:avLst/>
+          </a:prstGeom>
+          <a:noFill/>
+          <a:ln w="9525">
+            <a:noFill/>
+            <a:miter lim="800000"/>
+            <a:headEnd/>
+            <a:tailEnd/>
+          </a:ln>
+        </p:spPr>
+      </p:pic>
+      <p:pic>
+        <p:nvPicPr>
+          <p:cNvPr id="81924" name="Picture 4"/>
+          <p:cNvPicPr>
+            <a:picLocks noChangeAspect="1" noChangeArrowheads="1"/>
+          </p:cNvPicPr>
+          <p:nvPr/>
+        </p:nvPicPr>
+        <p:blipFill>
+          <a:blip r:embed="rId4" cstate="print"/>
+          <a:srcRect/>
+          <a:stretch>
+            <a:fillRect/>
+          </a:stretch>
+        </p:blipFill>
+        <p:spPr bwMode="auto">
+          <a:xfrm>
+            <a:off x="1981200" y="5105400"/>
+            <a:ext cx="5362575" cy="1409700"/>
+          </a:xfrm>
+          <a:prstGeom prst="rect">
+            <a:avLst/>
+          </a:prstGeom>
+          <a:noFill/>
+          <a:ln w="9525">
+            <a:noFill/>
+            <a:miter lim="800000"/>
+            <a:headEnd/>
+            <a:tailEnd/>
+          </a:ln>
+        </p:spPr>
+      </p:pic>
+      <p:pic>
+        <p:nvPicPr>
+          <p:cNvPr id="81925" name="Picture 5"/>
+          <p:cNvPicPr>
+            <a:picLocks noChangeAspect="1" noChangeArrowheads="1"/>
+          </p:cNvPicPr>
+          <p:nvPr/>
+        </p:nvPicPr>
+        <p:blipFill>
+          <a:blip r:embed="rId5" cstate="print"/>
+          <a:srcRect/>
+          <a:stretch>
+            <a:fillRect/>
+          </a:stretch>
+        </p:blipFill>
+        <p:spPr bwMode="auto">
+          <a:xfrm>
+            <a:off x="0" y="0"/>
+            <a:ext cx="9601200" cy="6867525"/>
+          </a:xfrm>
+          <a:prstGeom prst="rect">
+            <a:avLst/>
+          </a:prstGeom>
+          <a:noFill/>
+          <a:ln w="9525">
+            <a:noFill/>
+            <a:miter lim="800000"/>
+            <a:headEnd/>
+            <a:tailEnd/>
+          </a:ln>
+        </p:spPr>
+      </p:pic>
+    </p:spTree>
+  </p:cSld>
+  <p:clrMapOvr>
+    <a:masterClrMapping/>
+  </p:clrMapOvr>
+  <p:timing>
+    <p:tnLst>
+      <p:par>
+        <p:cTn id="1" dur="indefinite" restart="never" nodeType="tmRoot"/>
+      </p:par>
+    </p:tnLst>
+  </p:timing>
+</p:sld>
+</file>
+
+<file path=ppt/slides/slide6.xml><?xml version="1.0" encoding="utf-8"?>
+<p:sld xmlns:a="http://schemas.openxmlformats.org/drawingml/2006/main" xmlns:r="http://schemas.openxmlformats.org/officeDocument/2006/relationships" xmlns:p="http://schemas.openxmlformats.org/presentationml/2006/main">
+  <p:cSld>
+    <p:spTree>
+      <p:nvGrpSpPr>
+        <p:cNvPr id="1" name=""/>
+        <p:cNvGrpSpPr/>
+        <p:nvPr/>
+      </p:nvGrpSpPr>
+      <p:grpSpPr>
+        <a:xfrm>
+          <a:off x="0" y="0"/>
+          <a:ext cx="0" cy="0"/>
+          <a:chOff x="0" y="0"/>
+          <a:chExt cx="0" cy="0"/>
+        </a:xfrm>
+      </p:grpSpPr>
+      <p:sp>
+        <p:nvSpPr>
+          <p:cNvPr id="2" name="Title 1"/>
+          <p:cNvSpPr>
+            <a:spLocks noGrp="1"/>
+          </p:cNvSpPr>
+          <p:nvPr>
+            <p:ph type="title"/>
+          </p:nvPr>
+        </p:nvSpPr>
+        <p:spPr/>
+        <p:txBody>
+          <a:bodyPr/>
+          <a:lstStyle/>
+          <a:p>
+            <a:r>
+              <a:rPr lang="en-US" dirty="0" smtClean="0"/>
+              <a:t>Norman </a:t>
+            </a:r>
+            <a:r>
+              <a:rPr lang="en-US" dirty="0" err="1" smtClean="0"/>
+              <a:t>Rockstars</a:t>
+            </a:r>
+            <a:r>
+              <a:rPr lang="en-US" dirty="0" smtClean="0"/>
+              <a:t> </a:t>
+            </a:r>
+            <a:r>
+              <a:rPr lang="en-US" dirty="0" smtClean="0"/>
+              <a:t>follow Kaizen</a:t>
+            </a:r>
+            <a:endParaRPr lang="en-US" dirty="0"/>
+          </a:p>
+        </p:txBody>
+      </p:sp>
+      <p:sp>
+        <p:nvSpPr>
+          <p:cNvPr id="3" name="Content Placeholder 2"/>
+          <p:cNvSpPr>
+            <a:spLocks noGrp="1"/>
+          </p:cNvSpPr>
+          <p:nvPr>
+            <p:ph idx="1"/>
+          </p:nvPr>
+        </p:nvSpPr>
+        <p:spPr/>
+        <p:txBody>
+          <a:bodyPr/>
+          <a:lstStyle/>
+          <a:p>
+            <a:r>
+              <a:rPr lang="en-US" dirty="0" smtClean="0"/>
+              <a:t>Yesterday </a:t>
+            </a:r>
+            <a:r>
+              <a:rPr lang="en-US" dirty="0" smtClean="0"/>
+              <a:t>we have code that works </a:t>
+            </a:r>
+          </a:p>
+          <a:p>
+            <a:r>
+              <a:rPr lang="en-US" b="1" dirty="0" smtClean="0"/>
+              <a:t>Today we want to improve </a:t>
+            </a:r>
+            <a:r>
+              <a:rPr lang="en-US" b="1" dirty="0" smtClean="0"/>
+              <a:t>it</a:t>
+            </a:r>
+          </a:p>
+        </p:txBody>
+      </p:sp>
+    </p:spTree>
+  </p:cSld>
+  <p:clrMapOvr>
+    <a:masterClrMapping/>
+  </p:clrMapOvr>
+  <p:timing>
+    <p:tnLst>
+      <p:par>
+        <p:cTn id="1" dur="indefinite" restart="never" nodeType="tmRoot"/>
+      </p:par>
+    </p:tnLst>
+  </p:timing>
+</p:sld>
+</file>
+
+<file path=ppt/slides/slide60.xml><?xml version="1.0" encoding="utf-8"?>
+<p:sld xmlns:a="http://schemas.openxmlformats.org/drawingml/2006/main" xmlns:r="http://schemas.openxmlformats.org/officeDocument/2006/relationships" xmlns:p="http://schemas.openxmlformats.org/presentationml/2006/main">
+  <p:cSld>
+    <p:spTree>
+      <p:nvGrpSpPr>
+        <p:cNvPr id="1" name=""/>
+        <p:cNvGrpSpPr/>
+        <p:nvPr/>
+      </p:nvGrpSpPr>
+      <p:grpSpPr>
+        <a:xfrm>
+          <a:off x="0" y="0"/>
+          <a:ext cx="0" cy="0"/>
+          <a:chOff x="0" y="0"/>
+          <a:chExt cx="0" cy="0"/>
+        </a:xfrm>
+      </p:grpSpPr>
+      <p:sp>
+        <p:nvSpPr>
+          <p:cNvPr id="2" name="Title 1"/>
+          <p:cNvSpPr>
+            <a:spLocks noGrp="1"/>
+          </p:cNvSpPr>
+          <p:nvPr>
+            <p:ph type="title"/>
+          </p:nvPr>
+        </p:nvSpPr>
+        <p:spPr/>
+        <p:txBody>
+          <a:bodyPr/>
+          <a:lstStyle/>
+          <a:p>
+            <a:r>
+              <a:rPr lang="en-US" dirty="0" smtClean="0"/>
+              <a:t>Other design smells &amp; principles</a:t>
+            </a:r>
+            <a:endParaRPr lang="en-US" dirty="0"/>
+          </a:p>
+        </p:txBody>
+      </p:sp>
+      <p:sp>
+        <p:nvSpPr>
+          <p:cNvPr id="3" name="Content Placeholder 2"/>
+          <p:cNvSpPr>
+            <a:spLocks noGrp="1"/>
+          </p:cNvSpPr>
+          <p:nvPr>
+            <p:ph idx="1"/>
+          </p:nvPr>
+        </p:nvSpPr>
+        <p:spPr/>
+        <p:txBody>
+          <a:bodyPr/>
+          <a:lstStyle/>
+          <a:p>
+            <a:r>
+              <a:rPr lang="en-US" dirty="0" smtClean="0"/>
+              <a:t>Needless Repetition : DRY</a:t>
+            </a:r>
+          </a:p>
+          <a:p>
+            <a:r>
+              <a:rPr lang="en-US" dirty="0" smtClean="0"/>
+              <a:t>Complex/Over design : YAGNI, KISS</a:t>
+            </a:r>
+          </a:p>
+        </p:txBody>
+      </p:sp>
+    </p:spTree>
+  </p:cSld>
+  <p:clrMapOvr>
+    <a:masterClrMapping/>
+  </p:clrMapOvr>
+  <p:timing>
+    <p:tnLst>
+      <p:par>
+        <p:cTn id="1" dur="indefinite" restart="never" nodeType="tmRoot"/>
+      </p:par>
+    </p:tnLst>
+  </p:timing>
+</p:sld>
+</file>
+
+<file path=ppt/slides/slide61.xml><?xml version="1.0" encoding="utf-8"?>
 <p:sld xmlns:a="http://schemas.openxmlformats.org/drawingml/2006/main" xmlns:r="http://schemas.openxmlformats.org/officeDocument/2006/relationships" xmlns:p="http://schemas.openxmlformats.org/presentationml/2006/main">
   <p:cSld>
     <p:spTree>
@@ -8460,7 +9512,7 @@
 </p:sld>
 </file>
 
-<file path=ppt/slides/slide51.xml><?xml version="1.0" encoding="utf-8"?>
+<file path=ppt/slides/slide62.xml><?xml version="1.0" encoding="utf-8"?>
 <p:sld xmlns:a="http://schemas.openxmlformats.org/drawingml/2006/main" xmlns:r="http://schemas.openxmlformats.org/officeDocument/2006/relationships" xmlns:p="http://schemas.openxmlformats.org/presentationml/2006/main">
   <p:cSld>
     <p:spTree>
@@ -8526,7 +9578,7 @@
 </p:sld>
 </file>
 
-<file path=ppt/slides/slide52.xml><?xml version="1.0" encoding="utf-8"?>
+<file path=ppt/slides/slide63.xml><?xml version="1.0" encoding="utf-8"?>
 <p:sld xmlns:a="http://schemas.openxmlformats.org/drawingml/2006/main" xmlns:r="http://schemas.openxmlformats.org/officeDocument/2006/relationships" xmlns:p="http://schemas.openxmlformats.org/presentationml/2006/main">
   <p:cSld>
     <p:spTree>
@@ -8592,7 +9644,7 @@
 </p:sld>
 </file>
 
-<file path=ppt/slides/slide53.xml><?xml version="1.0" encoding="utf-8"?>
+<file path=ppt/slides/slide64.xml><?xml version="1.0" encoding="utf-8"?>
 <p:sld xmlns:a="http://schemas.openxmlformats.org/drawingml/2006/main" xmlns:r="http://schemas.openxmlformats.org/officeDocument/2006/relationships" xmlns:p="http://schemas.openxmlformats.org/presentationml/2006/main">
   <p:cSld>
     <p:spTree>
@@ -8658,7 +9710,7 @@
 </p:sld>
 </file>
 
-<file path=ppt/slides/slide54.xml><?xml version="1.0" encoding="utf-8"?>
+<file path=ppt/slides/slide65.xml><?xml version="1.0" encoding="utf-8"?>
 <p:sld xmlns:a="http://schemas.openxmlformats.org/drawingml/2006/main" xmlns:r="http://schemas.openxmlformats.org/officeDocument/2006/relationships" xmlns:p="http://schemas.openxmlformats.org/presentationml/2006/main">
   <p:cSld>
     <p:spTree>
@@ -8718,7 +9770,7 @@
 </p:sld>
 </file>
 
-<file path=ppt/slides/slide55.xml><?xml version="1.0" encoding="utf-8"?>
+<file path=ppt/slides/slide66.xml><?xml version="1.0" encoding="utf-8"?>
 <p:sld xmlns:a="http://schemas.openxmlformats.org/drawingml/2006/main" xmlns:r="http://schemas.openxmlformats.org/officeDocument/2006/relationships" xmlns:p="http://schemas.openxmlformats.org/presentationml/2006/main">
   <p:cSld>
     <p:spTree>
@@ -8809,7 +9861,7 @@
 </p:sld>
 </file>
 
-<file path=ppt/slides/slide56.xml><?xml version="1.0" encoding="utf-8"?>
+<file path=ppt/slides/slide67.xml><?xml version="1.0" encoding="utf-8"?>
 <p:sld xmlns:a="http://schemas.openxmlformats.org/drawingml/2006/main" xmlns:r="http://schemas.openxmlformats.org/officeDocument/2006/relationships" xmlns:p="http://schemas.openxmlformats.org/presentationml/2006/main">
   <p:cSld>
     <p:spTree>
@@ -8905,7 +9957,7 @@
 </p:sld>
 </file>
 
-<file path=ppt/slides/slide57.xml><?xml version="1.0" encoding="utf-8"?>
+<file path=ppt/slides/slide68.xml><?xml version="1.0" encoding="utf-8"?>
 <p:sld xmlns:a="http://schemas.openxmlformats.org/drawingml/2006/main" xmlns:r="http://schemas.openxmlformats.org/officeDocument/2006/relationships" xmlns:p="http://schemas.openxmlformats.org/presentationml/2006/main">
   <p:cSld>
     <p:spTree>
@@ -8983,7 +10035,7 @@
 </p:sld>
 </file>
 
-<file path=ppt/slides/slide58.xml><?xml version="1.0" encoding="utf-8"?>
+<file path=ppt/slides/slide69.xml><?xml version="1.0" encoding="utf-8"?>
 <p:sld xmlns:a="http://schemas.openxmlformats.org/drawingml/2006/main" xmlns:r="http://schemas.openxmlformats.org/officeDocument/2006/relationships" xmlns:p="http://schemas.openxmlformats.org/presentationml/2006/main">
   <p:cSld>
     <p:spTree>
@@ -9060,8 +10112,26 @@
               <a:rPr lang="en-US" dirty="0" smtClean="0">
                 <a:hlinkClick r:id="rId4"/>
               </a:rPr>
-              <a:t>http://bighugelabs.com/motivator.php</a:t>
-            </a:r>
+              <a:t>http://</a:t>
+            </a:r>
+            <a:r>
+              <a:rPr lang="en-US" dirty="0" smtClean="0">
+                <a:hlinkClick r:id="rId4"/>
+              </a:rPr>
+              <a:t>bighugelabs.com/motivator.php</a:t>
+            </a:r>
+            <a:endParaRPr lang="en-US" dirty="0" smtClean="0"/>
+          </a:p>
+          <a:p>
+            <a:r>
+              <a:rPr lang="en-US" i="1" dirty="0" smtClean="0">
+                <a:hlinkClick r:id="rId5"/>
+              </a:rPr>
+              <a:t>http://www.developerdotstar.com/mag/bios/jack_reeves.html</a:t>
+            </a:r>
+            <a:endParaRPr lang="en-US" i="1" dirty="0" smtClean="0"/>
+          </a:p>
+          <a:p>
             <a:endParaRPr lang="en-US" dirty="0" smtClean="0"/>
           </a:p>
           <a:p>
@@ -9087,7 +10157,7 @@
 </p:sld>
 </file>
 
-<file path=ppt/slides/slide59.xml><?xml version="1.0" encoding="utf-8"?>
+<file path=ppt/slides/slide7.xml><?xml version="1.0" encoding="utf-8"?>
 <p:sld xmlns:a="http://schemas.openxmlformats.org/drawingml/2006/main" xmlns:r="http://schemas.openxmlformats.org/officeDocument/2006/relationships" xmlns:p="http://schemas.openxmlformats.org/presentationml/2006/main">
   <p:cSld>
     <p:spTree>
@@ -9116,53 +10186,71 @@
         </p:nvSpPr>
         <p:spPr/>
         <p:txBody>
-          <a:bodyPr/>
-          <a:lstStyle/>
-          <a:p>
-            <a:r>
-              <a:rPr lang="en-US" dirty="0" smtClean="0"/>
-              <a:t>Ruby SOLID Principles</a:t>
-            </a:r>
-            <a:endParaRPr lang="en-US" dirty="0"/>
-          </a:p>
-        </p:txBody>
-      </p:sp>
-      <p:sp>
-        <p:nvSpPr>
-          <p:cNvPr id="3" name="Content Placeholder 2"/>
-          <p:cNvSpPr>
-            <a:spLocks noGrp="1"/>
-          </p:cNvSpPr>
-          <p:nvPr>
-            <p:ph idx="1"/>
-          </p:nvPr>
-        </p:nvSpPr>
-        <p:spPr/>
-        <p:txBody>
-          <a:bodyPr/>
-          <a:lstStyle/>
-          <a:p>
-            <a:r>
-              <a:rPr lang="en-US" dirty="0" smtClean="0">
-                <a:hlinkClick r:id="rId2"/>
-              </a:rPr>
-              <a:t>http://blip.tv/rubynation/jim-weirich-3672101</a:t>
-            </a:r>
-            <a:endParaRPr lang="en-US" dirty="0" smtClean="0"/>
-          </a:p>
-          <a:p>
-            <a:r>
-              <a:rPr lang="en-US" dirty="0" smtClean="0">
-                <a:hlinkClick r:id="rId3"/>
-              </a:rPr>
-              <a:t>http://www.confreaks.com/videos/240-goruco2009-solid-object-oriented-design</a:t>
-            </a:r>
-            <a:endParaRPr lang="en-US" dirty="0" smtClean="0"/>
-          </a:p>
-          <a:p>
-            <a:endParaRPr lang="en-US" dirty="0" smtClean="0"/>
-          </a:p>
-          <a:p>
+          <a:bodyPr>
+            <a:normAutofit fontScale="90000"/>
+          </a:bodyPr>
+          <a:lstStyle/>
+          <a:p>
+            <a:r>
+              <a:rPr lang="en-US" dirty="0" smtClean="0"/>
+              <a:t/>
+            </a:r>
+            <a:br>
+              <a:rPr lang="en-US" dirty="0" smtClean="0"/>
+            </a:br>
+            <a:r>
+              <a:rPr lang="en-US" dirty="0"/>
+              <a:t/>
+            </a:r>
+            <a:br>
+              <a:rPr lang="en-US" dirty="0"/>
+            </a:br>
+            <a:r>
+              <a:rPr lang="en-US" dirty="0" smtClean="0"/>
+              <a:t/>
+            </a:r>
+            <a:br>
+              <a:rPr lang="en-US" dirty="0" smtClean="0"/>
+            </a:br>
+            <a:r>
+              <a:rPr lang="en-US" dirty="0"/>
+              <a:t/>
+            </a:r>
+            <a:br>
+              <a:rPr lang="en-US" dirty="0"/>
+            </a:br>
+            <a:r>
+              <a:rPr lang="en-US" dirty="0" smtClean="0"/>
+              <a:t/>
+            </a:r>
+            <a:br>
+              <a:rPr lang="en-US" dirty="0" smtClean="0"/>
+            </a:br>
+            <a:r>
+              <a:rPr lang="en-US" dirty="0"/>
+              <a:t/>
+            </a:r>
+            <a:br>
+              <a:rPr lang="en-US" dirty="0"/>
+            </a:br>
+            <a:r>
+              <a:rPr lang="en-US" dirty="0" smtClean="0"/>
+              <a:t/>
+            </a:r>
+            <a:br>
+              <a:rPr lang="en-US" dirty="0" smtClean="0"/>
+            </a:br>
+            <a:r>
+              <a:rPr lang="en-US" dirty="0"/>
+              <a:t/>
+            </a:r>
+            <a:br>
+              <a:rPr lang="en-US" dirty="0"/>
+            </a:br>
+            <a:r>
+              <a:rPr lang="en-US" dirty="0" smtClean="0"/>
+              <a:t>SOLID Design Principles</a:t>
+            </a:r>
             <a:endParaRPr lang="en-US" dirty="0"/>
           </a:p>
         </p:txBody>
@@ -9172,10 +10260,17 @@
   <p:clrMapOvr>
     <a:masterClrMapping/>
   </p:clrMapOvr>
+  <p:timing>
+    <p:tnLst>
+      <p:par>
+        <p:cTn id="1" dur="indefinite" restart="never" nodeType="tmRoot"/>
+      </p:par>
+    </p:tnLst>
+  </p:timing>
 </p:sld>
 </file>
 
-<file path=ppt/slides/slide6.xml><?xml version="1.0" encoding="utf-8"?>
+<file path=ppt/slides/slide70.xml><?xml version="1.0" encoding="utf-8"?>
 <p:sld xmlns:a="http://schemas.openxmlformats.org/drawingml/2006/main" xmlns:r="http://schemas.openxmlformats.org/officeDocument/2006/relationships" xmlns:p="http://schemas.openxmlformats.org/presentationml/2006/main">
   <p:cSld>
     <p:spTree>
@@ -9209,15 +10304,7 @@
           <a:p>
             <a:r>
               <a:rPr lang="en-US" dirty="0" smtClean="0"/>
-              <a:t>Norman </a:t>
-            </a:r>
-            <a:r>
-              <a:rPr lang="en-US" dirty="0" err="1" smtClean="0"/>
-              <a:t>Rockstars</a:t>
-            </a:r>
-            <a:r>
-              <a:rPr lang="en-US" dirty="0" smtClean="0"/>
-              <a:t> follow</a:t>
+              <a:t>Ruby SOLID Principles</a:t>
             </a:r>
             <a:endParaRPr lang="en-US" dirty="0"/>
           </a:p>
@@ -9239,21 +10326,21 @@
           <a:lstStyle/>
           <a:p>
             <a:r>
-              <a:rPr lang="en-US" dirty="0" smtClean="0"/>
-              <a:t>Kaizen</a:t>
-            </a:r>
-          </a:p>
-          <a:p>
-            <a:r>
-              <a:rPr lang="en-US" dirty="0" smtClean="0"/>
-              <a:t>Yesterday we have code that works </a:t>
-            </a:r>
-          </a:p>
-          <a:p>
-            <a:r>
-              <a:rPr lang="en-US" b="1" dirty="0" smtClean="0"/>
-              <a:t>Today we want to improve it</a:t>
-            </a:r>
+              <a:rPr lang="en-US" dirty="0" smtClean="0">
+                <a:hlinkClick r:id="rId2"/>
+              </a:rPr>
+              <a:t>http://blip.tv/rubynation/jim-weirich-3672101</a:t>
+            </a:r>
+            <a:endParaRPr lang="en-US" dirty="0" smtClean="0"/>
+          </a:p>
+          <a:p>
+            <a:r>
+              <a:rPr lang="en-US" dirty="0" smtClean="0">
+                <a:hlinkClick r:id="rId3"/>
+              </a:rPr>
+              <a:t>http://www.confreaks.com/videos/240-goruco2009-solid-object-oriented-design</a:t>
+            </a:r>
+            <a:endParaRPr lang="en-US" dirty="0" smtClean="0"/>
           </a:p>
           <a:p>
             <a:endParaRPr lang="en-US" dirty="0" smtClean="0"/>
@@ -9268,17 +10355,10 @@
   <p:clrMapOvr>
     <a:masterClrMapping/>
   </p:clrMapOvr>
-  <p:timing>
-    <p:tnLst>
-      <p:par>
-        <p:cTn id="1" dur="indefinite" restart="never" nodeType="tmRoot"/>
-      </p:par>
-    </p:tnLst>
-  </p:timing>
 </p:sld>
 </file>
 
-<file path=ppt/slides/slide60.xml><?xml version="1.0" encoding="utf-8"?>
+<file path=ppt/slides/slide71.xml><?xml version="1.0" encoding="utf-8"?>
 <p:sld xmlns:a="http://schemas.openxmlformats.org/drawingml/2006/main" xmlns:r="http://schemas.openxmlformats.org/officeDocument/2006/relationships" xmlns:p="http://schemas.openxmlformats.org/presentationml/2006/main">
   <p:cSld>
     <p:spTree>
@@ -9433,95 +10513,6 @@
 </p:sld>
 </file>
 
-<file path=ppt/slides/slide7.xml><?xml version="1.0" encoding="utf-8"?>
-<p:sld xmlns:a="http://schemas.openxmlformats.org/drawingml/2006/main" xmlns:r="http://schemas.openxmlformats.org/officeDocument/2006/relationships" xmlns:p="http://schemas.openxmlformats.org/presentationml/2006/main">
-  <p:cSld>
-    <p:spTree>
-      <p:nvGrpSpPr>
-        <p:cNvPr id="1" name=""/>
-        <p:cNvGrpSpPr/>
-        <p:nvPr/>
-      </p:nvGrpSpPr>
-      <p:grpSpPr>
-        <a:xfrm>
-          <a:off x="0" y="0"/>
-          <a:ext cx="0" cy="0"/>
-          <a:chOff x="0" y="0"/>
-          <a:chExt cx="0" cy="0"/>
-        </a:xfrm>
-      </p:grpSpPr>
-      <p:sp>
-        <p:nvSpPr>
-          <p:cNvPr id="2" name="Title 1"/>
-          <p:cNvSpPr>
-            <a:spLocks noGrp="1"/>
-          </p:cNvSpPr>
-          <p:nvPr>
-            <p:ph type="title"/>
-          </p:nvPr>
-        </p:nvSpPr>
-        <p:spPr/>
-        <p:txBody>
-          <a:bodyPr/>
-          <a:lstStyle/>
-          <a:p>
-            <a:r>
-              <a:rPr lang="en-US" dirty="0" smtClean="0"/>
-              <a:t>Clean Code</a:t>
-            </a:r>
-            <a:endParaRPr lang="en-US" dirty="0"/>
-          </a:p>
-        </p:txBody>
-      </p:sp>
-      <p:pic>
-        <p:nvPicPr>
-          <p:cNvPr id="1026" name="Picture 2"/>
-          <p:cNvPicPr>
-            <a:picLocks noGrp="1" noChangeAspect="1" noChangeArrowheads="1"/>
-          </p:cNvPicPr>
-          <p:nvPr>
-            <p:ph idx="1"/>
-          </p:nvPr>
-        </p:nvPicPr>
-        <p:blipFill>
-          <a:blip r:embed="rId2" cstate="print"/>
-          <a:srcRect/>
-          <a:stretch>
-            <a:fillRect/>
-          </a:stretch>
-        </p:blipFill>
-        <p:spPr bwMode="auto">
-          <a:xfrm>
-            <a:off x="1524000" y="1600200"/>
-            <a:ext cx="6629400" cy="4876800"/>
-          </a:xfrm>
-          <a:prstGeom prst="rect">
-            <a:avLst/>
-          </a:prstGeom>
-          <a:noFill/>
-          <a:ln w="9525">
-            <a:noFill/>
-            <a:miter lim="800000"/>
-            <a:headEnd/>
-            <a:tailEnd/>
-          </a:ln>
-        </p:spPr>
-      </p:pic>
-    </p:spTree>
-  </p:cSld>
-  <p:clrMapOvr>
-    <a:masterClrMapping/>
-  </p:clrMapOvr>
-  <p:timing>
-    <p:tnLst>
-      <p:par>
-        <p:cTn id="1" dur="indefinite" restart="never" nodeType="tmRoot"/>
-      </p:par>
-    </p:tnLst>
-  </p:timing>
-</p:sld>
-</file>
-
 <file path=ppt/slides/slide8.xml><?xml version="1.0" encoding="utf-8"?>
 <p:sld xmlns:a="http://schemas.openxmlformats.org/drawingml/2006/main" xmlns:r="http://schemas.openxmlformats.org/officeDocument/2006/relationships" xmlns:p="http://schemas.openxmlformats.org/presentationml/2006/main">
   <p:cSld>
@@ -9549,74 +10540,23 @@
             <p:ph type="title"/>
           </p:nvPr>
         </p:nvSpPr>
-        <p:spPr/>
+        <p:spPr>
+          <a:xfrm>
+            <a:off x="457200" y="2743200"/>
+            <a:ext cx="8229600" cy="1143000"/>
+          </a:xfrm>
+        </p:spPr>
         <p:txBody>
           <a:bodyPr>
-            <a:normAutofit fontScale="90000"/>
+            <a:normAutofit/>
           </a:bodyPr>
           <a:lstStyle/>
           <a:p>
             <a:r>
-              <a:rPr lang="en-US" dirty="0" smtClean="0"/>
-              <a:t/>
-            </a:r>
-            <a:br>
-              <a:rPr lang="en-US" dirty="0" smtClean="0"/>
-            </a:br>
-            <a:r>
-              <a:rPr lang="en-US" dirty="0"/>
-              <a:t/>
-            </a:r>
-            <a:br>
-              <a:rPr lang="en-US" dirty="0"/>
-            </a:br>
-            <a:r>
-              <a:rPr lang="en-US" dirty="0" smtClean="0"/>
-              <a:t/>
-            </a:r>
-            <a:br>
-              <a:rPr lang="en-US" dirty="0" smtClean="0"/>
-            </a:br>
-            <a:r>
-              <a:rPr lang="en-US" dirty="0"/>
-              <a:t/>
-            </a:r>
-            <a:br>
-              <a:rPr lang="en-US" dirty="0"/>
-            </a:br>
-            <a:r>
-              <a:rPr lang="en-US" dirty="0" smtClean="0"/>
-              <a:t/>
-            </a:r>
-            <a:br>
-              <a:rPr lang="en-US" dirty="0" smtClean="0"/>
-            </a:br>
-            <a:r>
-              <a:rPr lang="en-US" dirty="0"/>
-              <a:t/>
-            </a:r>
-            <a:br>
-              <a:rPr lang="en-US" dirty="0"/>
-            </a:br>
-            <a:r>
-              <a:rPr lang="en-US" dirty="0" smtClean="0"/>
-              <a:t/>
-            </a:r>
-            <a:br>
-              <a:rPr lang="en-US" dirty="0" smtClean="0"/>
-            </a:br>
-            <a:r>
-              <a:rPr lang="en-US" dirty="0"/>
-              <a:t/>
-            </a:r>
-            <a:br>
-              <a:rPr lang="en-US" dirty="0"/>
-            </a:br>
-            <a:r>
-              <a:rPr lang="en-US" dirty="0" smtClean="0"/>
-              <a:t>SOLID Design Principles</a:t>
-            </a:r>
-            <a:endParaRPr lang="en-US" dirty="0"/>
+              <a:rPr lang="en-US" sz="2800" dirty="0" smtClean="0"/>
+              <a:t>What is the only constant in software development?</a:t>
+            </a:r>
+            <a:endParaRPr lang="en-US" sz="2800" dirty="0"/>
           </a:p>
         </p:txBody>
       </p:sp>
@@ -9625,13 +10565,6 @@
   <p:clrMapOvr>
     <a:masterClrMapping/>
   </p:clrMapOvr>
-  <p:timing>
-    <p:tnLst>
-      <p:par>
-        <p:cTn id="1" dur="indefinite" restart="never" nodeType="tmRoot"/>
-      </p:par>
-    </p:tnLst>
-  </p:timing>
 </p:sld>
 </file>
 

</xml_diff>